<commit_message>
added info for marie
</commit_message>
<xml_diff>
--- a/Slides/Slides-01-Welcome_and_Orientation/Slides-01-Welcome_and_Orientation.pptx
+++ b/Slides/Slides-01-Welcome_and_Orientation/Slides-01-Welcome_and_Orientation.pptx
@@ -216,7 +216,7 @@
           <a:p>
             <a:fld id="{AE1375EF-7AC2-40F0-8984-3657FAAC21B8}" type="datetimeFigureOut">
               <a:rPr lang="en-US" smtClean="0"/>
-              <a:t>5/21/2021</a:t>
+              <a:t>5/25/2021</a:t>
             </a:fld>
             <a:endParaRPr lang="en-US"/>
           </a:p>
@@ -527,10 +527,7 @@
           <a:bodyPr/>
           <a:lstStyle/>
           <a:p>
-            <a:r>
-              <a:rPr lang="en-US" dirty="0"/>
-              <a:t>Please ask questions  - we are here to help! Also, we will work through the examples together</a:t>
-            </a:r>
+            <a:endParaRPr lang="en-US" dirty="0"/>
           </a:p>
         </p:txBody>
       </p:sp>
@@ -551,7 +548,7 @@
           <a:p>
             <a:fld id="{B9F26414-4BE6-427A-9F34-1430B41B92D6}" type="slidenum">
               <a:rPr lang="en-US" smtClean="0"/>
-              <a:t>15</a:t>
+              <a:t>5</a:t>
             </a:fld>
             <a:endParaRPr lang="en-US"/>
           </a:p>
@@ -560,7 +557,7 @@
     </p:spTree>
     <p:extLst>
       <p:ext uri="{BB962C8B-B14F-4D97-AF65-F5344CB8AC3E}">
-        <p14:creationId xmlns:p14="http://schemas.microsoft.com/office/powerpoint/2010/main" val="3200179349"/>
+        <p14:creationId xmlns:p14="http://schemas.microsoft.com/office/powerpoint/2010/main" val="3445192030"/>
       </p:ext>
     </p:extLst>
   </p:cSld>
@@ -616,7 +613,7 @@
           <a:p>
             <a:r>
               <a:rPr lang="en-US" dirty="0"/>
-              <a:t>Bear with us. We are working on the correct leveling, and we will get into more complex topics in validation. This workshop is specifically trying to build a foundation for knowledge. And you never know, you might learn something.</a:t>
+              <a:t>Please ask questions  - we are here to help! Also, we will work through the examples together</a:t>
             </a:r>
           </a:p>
         </p:txBody>
@@ -638,7 +635,7 @@
           <a:p>
             <a:fld id="{B9F26414-4BE6-427A-9F34-1430B41B92D6}" type="slidenum">
               <a:rPr lang="en-US" smtClean="0"/>
-              <a:t>16</a:t>
+              <a:t>15</a:t>
             </a:fld>
             <a:endParaRPr lang="en-US"/>
           </a:p>
@@ -647,7 +644,7 @@
     </p:spTree>
     <p:extLst>
       <p:ext uri="{BB962C8B-B14F-4D97-AF65-F5344CB8AC3E}">
-        <p14:creationId xmlns:p14="http://schemas.microsoft.com/office/powerpoint/2010/main" val="282342033"/>
+        <p14:creationId xmlns:p14="http://schemas.microsoft.com/office/powerpoint/2010/main" val="3200179349"/>
       </p:ext>
     </p:extLst>
   </p:cSld>
@@ -701,38 +698,10 @@
           <a:bodyPr/>
           <a:lstStyle/>
           <a:p>
-            <a:pPr marL="0" marR="0" lvl="0" indent="0" algn="l" defTabSz="914400" rtl="0" eaLnBrk="1" fontAlgn="auto" latinLnBrk="0" hangingPunct="1">
-              <a:lnSpc>
-                <a:spcPct val="100000"/>
-              </a:lnSpc>
-              <a:spcBef>
-                <a:spcPts val="0"/>
-              </a:spcBef>
-              <a:spcAft>
-                <a:spcPts val="0"/>
-              </a:spcAft>
-              <a:buClrTx/>
-              <a:buSzTx/>
-              <a:buFontTx/>
-              <a:buNone/>
-              <a:tabLst/>
-              <a:defRPr/>
-            </a:pPr>
             <a:r>
               <a:rPr lang="en-US" dirty="0"/>
-              <a:t>Please open an issue in the </a:t>
-            </a:r>
-            <a:r>
-              <a:rPr lang="en-US" dirty="0" err="1"/>
-              <a:t>github</a:t>
-            </a:r>
-            <a:r>
-              <a:rPr lang="en-US" dirty="0"/>
-              <a:t> page. We are human, we did our best, but would love to do better and make this easy for you to understand these concepts</a:t>
-            </a:r>
-          </a:p>
-          <a:p>
-            <a:endParaRPr lang="en-US" dirty="0"/>
+              <a:t>Bear with us. We are working on the correct leveling, and we will get into more complex topics in validation. This workshop is specifically trying to build a foundation for knowledge. And you never know, you might learn something.</a:t>
+            </a:r>
           </a:p>
         </p:txBody>
       </p:sp>
@@ -753,7 +722,7 @@
           <a:p>
             <a:fld id="{B9F26414-4BE6-427A-9F34-1430B41B92D6}" type="slidenum">
               <a:rPr lang="en-US" smtClean="0"/>
-              <a:t>17</a:t>
+              <a:t>16</a:t>
             </a:fld>
             <a:endParaRPr lang="en-US"/>
           </a:p>
@@ -762,7 +731,7 @@
     </p:spTree>
     <p:extLst>
       <p:ext uri="{BB962C8B-B14F-4D97-AF65-F5344CB8AC3E}">
-        <p14:creationId xmlns:p14="http://schemas.microsoft.com/office/powerpoint/2010/main" val="493363971"/>
+        <p14:creationId xmlns:p14="http://schemas.microsoft.com/office/powerpoint/2010/main" val="282342033"/>
       </p:ext>
     </p:extLst>
   </p:cSld>
@@ -816,10 +785,38 @@
           <a:bodyPr/>
           <a:lstStyle/>
           <a:p>
+            <a:pPr marL="0" marR="0" lvl="0" indent="0" algn="l" defTabSz="914400" rtl="0" eaLnBrk="1" fontAlgn="auto" latinLnBrk="0" hangingPunct="1">
+              <a:lnSpc>
+                <a:spcPct val="100000"/>
+              </a:lnSpc>
+              <a:spcBef>
+                <a:spcPts val="0"/>
+              </a:spcBef>
+              <a:spcAft>
+                <a:spcPts val="0"/>
+              </a:spcAft>
+              <a:buClrTx/>
+              <a:buSzTx/>
+              <a:buFontTx/>
+              <a:buNone/>
+              <a:tabLst/>
+              <a:defRPr/>
+            </a:pPr>
             <a:r>
               <a:rPr lang="en-US" dirty="0"/>
-              <a:t>That is okay – if you are working on the spartan examples, go back to the more verbose set! You could also pose a question in slack to the rest of the workshop or directly message the instructors. Finally, we will work through all of the answers together!</a:t>
-            </a:r>
+              <a:t>Please open an issue in the </a:t>
+            </a:r>
+            <a:r>
+              <a:rPr lang="en-US" dirty="0" err="1"/>
+              <a:t>github</a:t>
+            </a:r>
+            <a:r>
+              <a:rPr lang="en-US" dirty="0"/>
+              <a:t> page. We are human, we did our best, but would love to do better and make this easy for you to understand these concepts</a:t>
+            </a:r>
+          </a:p>
+          <a:p>
+            <a:endParaRPr lang="en-US" dirty="0"/>
           </a:p>
         </p:txBody>
       </p:sp>
@@ -840,7 +837,7 @@
           <a:p>
             <a:fld id="{B9F26414-4BE6-427A-9F34-1430B41B92D6}" type="slidenum">
               <a:rPr lang="en-US" smtClean="0"/>
-              <a:t>18</a:t>
+              <a:t>17</a:t>
             </a:fld>
             <a:endParaRPr lang="en-US"/>
           </a:p>
@@ -849,7 +846,7 @@
     </p:spTree>
     <p:extLst>
       <p:ext uri="{BB962C8B-B14F-4D97-AF65-F5344CB8AC3E}">
-        <p14:creationId xmlns:p14="http://schemas.microsoft.com/office/powerpoint/2010/main" val="1741456198"/>
+        <p14:creationId xmlns:p14="http://schemas.microsoft.com/office/powerpoint/2010/main" val="493363971"/>
       </p:ext>
     </p:extLst>
   </p:cSld>
@@ -905,6 +902,93 @@
           <a:p>
             <a:r>
               <a:rPr lang="en-US" dirty="0"/>
+              <a:t>That is okay – if you are working on the spartan examples, go back to the more verbose set! You could also pose a question in slack to the rest of the workshop or directly message the instructors. Finally, we will work through all of the answers together!</a:t>
+            </a:r>
+          </a:p>
+        </p:txBody>
+      </p:sp>
+      <p:sp>
+        <p:nvSpPr>
+          <p:cNvPr id="4" name="Slide Number Placeholder 3"/>
+          <p:cNvSpPr>
+            <a:spLocks noGrp="1"/>
+          </p:cNvSpPr>
+          <p:nvPr>
+            <p:ph type="sldNum" sz="quarter" idx="5"/>
+          </p:nvPr>
+        </p:nvSpPr>
+        <p:spPr/>
+        <p:txBody>
+          <a:bodyPr/>
+          <a:lstStyle/>
+          <a:p>
+            <a:fld id="{B9F26414-4BE6-427A-9F34-1430B41B92D6}" type="slidenum">
+              <a:rPr lang="en-US" smtClean="0"/>
+              <a:t>18</a:t>
+            </a:fld>
+            <a:endParaRPr lang="en-US"/>
+          </a:p>
+        </p:txBody>
+      </p:sp>
+    </p:spTree>
+    <p:extLst>
+      <p:ext uri="{BB962C8B-B14F-4D97-AF65-F5344CB8AC3E}">
+        <p14:creationId xmlns:p14="http://schemas.microsoft.com/office/powerpoint/2010/main" val="1741456198"/>
+      </p:ext>
+    </p:extLst>
+  </p:cSld>
+  <p:clrMapOvr>
+    <a:masterClrMapping/>
+  </p:clrMapOvr>
+</p:notes>
+</file>
+
+<file path=ppt/notesSlides/notesSlide6.xml><?xml version="1.0" encoding="utf-8"?>
+<p:notes xmlns:a="http://schemas.openxmlformats.org/drawingml/2006/main" xmlns:r="http://schemas.openxmlformats.org/officeDocument/2006/relationships" xmlns:p="http://schemas.openxmlformats.org/presentationml/2006/main">
+  <p:cSld>
+    <p:spTree>
+      <p:nvGrpSpPr>
+        <p:cNvPr id="1" name=""/>
+        <p:cNvGrpSpPr/>
+        <p:nvPr/>
+      </p:nvGrpSpPr>
+      <p:grpSpPr>
+        <a:xfrm>
+          <a:off x="0" y="0"/>
+          <a:ext cx="0" cy="0"/>
+          <a:chOff x="0" y="0"/>
+          <a:chExt cx="0" cy="0"/>
+        </a:xfrm>
+      </p:grpSpPr>
+      <p:sp>
+        <p:nvSpPr>
+          <p:cNvPr id="2" name="Slide Image Placeholder 1"/>
+          <p:cNvSpPr>
+            <a:spLocks noGrp="1" noRot="1" noChangeAspect="1"/>
+          </p:cNvSpPr>
+          <p:nvPr>
+            <p:ph type="sldImg"/>
+          </p:nvPr>
+        </p:nvSpPr>
+        <p:spPr/>
+      </p:sp>
+      <p:sp>
+        <p:nvSpPr>
+          <p:cNvPr id="3" name="Notes Placeholder 2"/>
+          <p:cNvSpPr>
+            <a:spLocks noGrp="1"/>
+          </p:cNvSpPr>
+          <p:nvPr>
+            <p:ph type="body" idx="1"/>
+          </p:nvPr>
+        </p:nvSpPr>
+        <p:spPr/>
+        <p:txBody>
+          <a:bodyPr/>
+          <a:lstStyle/>
+          <a:p>
+            <a:r>
+              <a:rPr lang="en-US" dirty="0"/>
               <a:t>I don’t think I can help you there.. </a:t>
             </a:r>
           </a:p>
@@ -946,7 +1030,7 @@
 </p:notes>
 </file>
 
-<file path=ppt/notesSlides/notesSlide6.xml><?xml version="1.0" encoding="utf-8"?>
+<file path=ppt/notesSlides/notesSlide7.xml><?xml version="1.0" encoding="utf-8"?>
 <p:notes xmlns:a="http://schemas.openxmlformats.org/drawingml/2006/main" xmlns:r="http://schemas.openxmlformats.org/officeDocument/2006/relationships" xmlns:p="http://schemas.openxmlformats.org/presentationml/2006/main">
   <p:cSld>
     <p:spTree>
@@ -1507,7 +1591,7 @@
           <a:p>
             <a:fld id="{EA0C0817-A112-4847-8014-A94B7D2A4EA3}" type="datetime1">
               <a:rPr lang="en-US" smtClean="0"/>
-              <a:t>5/20/2021</a:t>
+              <a:t>5/25/2021</a:t>
             </a:fld>
             <a:endParaRPr lang="en-US" dirty="0"/>
           </a:p>
@@ -1709,7 +1793,7 @@
           <a:p>
             <a:fld id="{7332B432-ACDA-4023-A761-2BAB76577B62}" type="datetime1">
               <a:rPr lang="en-US" smtClean="0"/>
-              <a:t>5/20/2021</a:t>
+              <a:t>5/25/2021</a:t>
             </a:fld>
             <a:endParaRPr lang="en-US" dirty="0"/>
           </a:p>
@@ -2308,7 +2392,7 @@
           <a:p>
             <a:fld id="{D9C646AA-F36E-4540-911D-FFFC0A0EF24A}" type="datetime1">
               <a:rPr lang="en-US" smtClean="0"/>
-              <a:t>5/20/2021</a:t>
+              <a:t>5/25/2021</a:t>
             </a:fld>
             <a:endParaRPr lang="en-US" dirty="0"/>
           </a:p>
@@ -2628,7 +2712,7 @@
           <a:p>
             <a:fld id="{69186D26-FA5F-4637-B602-B7C2DC34CFD4}" type="datetime1">
               <a:rPr lang="en-US" smtClean="0"/>
-              <a:t>5/20/2021</a:t>
+              <a:t>5/25/2021</a:t>
             </a:fld>
             <a:endParaRPr lang="en-US" dirty="0"/>
           </a:p>
@@ -3065,7 +3149,7 @@
           <a:p>
             <a:fld id="{8A7F15D8-96D1-4781-BC50-CA8A088B2FE4}" type="datetime1">
               <a:rPr lang="en-US" smtClean="0"/>
-              <a:t>5/20/2021</a:t>
+              <a:t>5/25/2021</a:t>
             </a:fld>
             <a:endParaRPr lang="en-US" dirty="0"/>
           </a:p>
@@ -3183,7 +3267,7 @@
           <a:p>
             <a:fld id="{F9A96C99-B8F8-4528-BD05-0E16E943DC09}" type="datetime1">
               <a:rPr lang="en-US" smtClean="0"/>
-              <a:t>5/20/2021</a:t>
+              <a:t>5/25/2021</a:t>
             </a:fld>
             <a:endParaRPr lang="en-US" dirty="0"/>
           </a:p>
@@ -3278,7 +3362,7 @@
           <a:p>
             <a:fld id="{03636942-C211-4B28-8DBD-C953E00AF71B}" type="datetime1">
               <a:rPr lang="en-US" smtClean="0"/>
-              <a:t>5/20/2021</a:t>
+              <a:t>5/25/2021</a:t>
             </a:fld>
             <a:endParaRPr lang="en-US" dirty="0"/>
           </a:p>
@@ -3695,7 +3779,7 @@
           <a:p>
             <a:fld id="{7E8D12A6-918A-48BD-8CB9-CA713993B0EA}" type="datetime1">
               <a:rPr lang="en-US" smtClean="0"/>
-              <a:t>5/20/2021</a:t>
+              <a:t>5/25/2021</a:t>
             </a:fld>
             <a:endParaRPr lang="en-US" dirty="0"/>
           </a:p>
@@ -3957,7 +4041,7 @@
             <a:fld id="{E778CE86-875F-4587-BCF6-FA054AFC0D53}" type="datetime1">
               <a:rPr lang="en-US" smtClean="0"/>
               <a:pPr/>
-              <a:t>5/20/2021</a:t>
+              <a:t>5/25/2021</a:t>
             </a:fld>
             <a:endParaRPr lang="en-US" dirty="0"/>
           </a:p>
@@ -4473,7 +4557,7 @@
           <a:p>
             <a:fld id="{F6FA2B21-3FCD-4721-B95C-427943F61125}" type="datetime1">
               <a:rPr lang="en-US" smtClean="0"/>
-              <a:t>5/20/2021</a:t>
+              <a:t>5/25/2021</a:t>
             </a:fld>
             <a:endParaRPr lang="en-US" dirty="0"/>
           </a:p>
@@ -9038,38 +9122,38 @@
           </a:p>
         </p:txBody>
       </p:sp>
-      <p:sp>
-        <p:nvSpPr>
-          <p:cNvPr id="3" name="Content Placeholder 2">
+      <p:pic>
+        <p:nvPicPr>
+          <p:cNvPr id="6" name="Content Placeholder 5">
             <a:extLst>
               <a:ext uri="{FF2B5EF4-FFF2-40B4-BE49-F238E27FC236}">
-                <a16:creationId xmlns:a16="http://schemas.microsoft.com/office/drawing/2014/main" id="{37E9709E-5457-48A1-A3E0-58A90B971B97}"/>
+                <a16:creationId xmlns:a16="http://schemas.microsoft.com/office/drawing/2014/main" id="{EF865C96-2337-4A23-9653-09031EF4BDD1}"/>
               </a:ext>
             </a:extLst>
           </p:cNvPr>
-          <p:cNvSpPr>
-            <a:spLocks noGrp="1"/>
-          </p:cNvSpPr>
+          <p:cNvPicPr>
+            <a:picLocks noGrp="1" noChangeAspect="1"/>
+          </p:cNvPicPr>
           <p:nvPr>
             <p:ph sz="half" idx="1"/>
           </p:nvPr>
-        </p:nvSpPr>
+        </p:nvPicPr>
+        <p:blipFill>
+          <a:blip r:embed="rId3"/>
+          <a:stretch>
+            <a:fillRect/>
+          </a:stretch>
+        </p:blipFill>
         <p:spPr>
           <a:xfrm>
-            <a:off x="1740309" y="1798320"/>
-            <a:ext cx="3950601" cy="4417086"/>
+            <a:off x="1782297" y="1986306"/>
+            <a:ext cx="3749039" cy="3749039"/>
           </a:xfrm>
+          <a:prstGeom prst="rect">
+            <a:avLst/>
+          </a:prstGeom>
         </p:spPr>
-        <p:txBody>
-          <a:bodyPr>
-            <a:normAutofit/>
-          </a:bodyPr>
-          <a:lstStyle/>
-          <a:p>
-            <a:endParaRPr lang="en-US" dirty="0"/>
-          </a:p>
-        </p:txBody>
-      </p:sp>
+      </p:pic>
       <p:sp>
         <p:nvSpPr>
           <p:cNvPr id="5" name="Content Placeholder 4">
@@ -9086,15 +9170,351 @@
             <p:ph sz="half" idx="2"/>
           </p:nvPr>
         </p:nvSpPr>
-        <p:spPr/>
+        <p:spPr>
+          <a:xfrm>
+            <a:off x="5958448" y="2312758"/>
+            <a:ext cx="5044832" cy="1635356"/>
+          </a:xfrm>
+        </p:spPr>
         <p:txBody>
           <a:bodyPr/>
           <a:lstStyle/>
           <a:p>
-            <a:endParaRPr lang="en-US"/>
+            <a:r>
+              <a:rPr lang="en-US" sz="2000" dirty="0"/>
+              <a:t>Statistical Programmer</a:t>
+            </a:r>
+          </a:p>
+          <a:p>
+            <a:pPr lvl="1"/>
+            <a:r>
+              <a:rPr lang="en-US" sz="1800" dirty="0"/>
+              <a:t>R package developer</a:t>
+            </a:r>
+          </a:p>
+          <a:p>
+            <a:pPr lvl="1"/>
+            <a:r>
+              <a:rPr lang="en-US" sz="1800" dirty="0"/>
+              <a:t>Industry &amp; gov regulatory experience</a:t>
+            </a:r>
+          </a:p>
+          <a:p>
+            <a:pPr lvl="1"/>
+            <a:r>
+              <a:rPr lang="en-US" sz="1800" dirty="0"/>
+              <a:t>Recovering wet lab scientist</a:t>
+            </a:r>
+          </a:p>
+          <a:p>
+            <a:pPr marL="0" indent="0">
+              <a:buNone/>
+            </a:pPr>
+            <a:endParaRPr lang="en-US" sz="1800" dirty="0"/>
+          </a:p>
+          <a:p>
+            <a:pPr lvl="1"/>
+            <a:endParaRPr lang="en-US" dirty="0"/>
           </a:p>
         </p:txBody>
       </p:sp>
+      <p:grpSp>
+        <p:nvGrpSpPr>
+          <p:cNvPr id="23" name="Group 22">
+            <a:extLst>
+              <a:ext uri="{FF2B5EF4-FFF2-40B4-BE49-F238E27FC236}">
+                <a16:creationId xmlns:a16="http://schemas.microsoft.com/office/drawing/2014/main" id="{7B66FF87-DDA2-43E9-8DA4-03D2187E7D8E}"/>
+              </a:ext>
+            </a:extLst>
+          </p:cNvPr>
+          <p:cNvGrpSpPr/>
+          <p:nvPr/>
+        </p:nvGrpSpPr>
+        <p:grpSpPr>
+          <a:xfrm>
+            <a:off x="6313547" y="4950170"/>
+            <a:ext cx="5114512" cy="576999"/>
+            <a:chOff x="6709787" y="4873970"/>
+            <a:chExt cx="5114512" cy="576999"/>
+          </a:xfrm>
+        </p:grpSpPr>
+        <p:grpSp>
+          <p:nvGrpSpPr>
+            <p:cNvPr id="21" name="Group 20">
+              <a:extLst>
+                <a:ext uri="{FF2B5EF4-FFF2-40B4-BE49-F238E27FC236}">
+                  <a16:creationId xmlns:a16="http://schemas.microsoft.com/office/drawing/2014/main" id="{B6043552-B536-4BE5-A7A8-2D20EA3131AD}"/>
+                </a:ext>
+              </a:extLst>
+            </p:cNvPr>
+            <p:cNvGrpSpPr/>
+            <p:nvPr/>
+          </p:nvGrpSpPr>
+          <p:grpSpPr>
+            <a:xfrm>
+              <a:off x="6709787" y="4873970"/>
+              <a:ext cx="4464695" cy="576999"/>
+              <a:chOff x="6660666" y="4815105"/>
+              <a:chExt cx="4056196" cy="576999"/>
+            </a:xfrm>
+          </p:grpSpPr>
+          <p:grpSp>
+            <p:nvGrpSpPr>
+              <p:cNvPr id="19" name="Group 18">
+                <a:extLst>
+                  <a:ext uri="{FF2B5EF4-FFF2-40B4-BE49-F238E27FC236}">
+                    <a16:creationId xmlns:a16="http://schemas.microsoft.com/office/drawing/2014/main" id="{0937586A-1A08-4716-A1A6-85AA4A5A35B7}"/>
+                  </a:ext>
+                </a:extLst>
+              </p:cNvPr>
+              <p:cNvGrpSpPr/>
+              <p:nvPr/>
+            </p:nvGrpSpPr>
+            <p:grpSpPr>
+              <a:xfrm>
+                <a:off x="6660666" y="4864825"/>
+                <a:ext cx="1702559" cy="421615"/>
+                <a:chOff x="6533678" y="3390977"/>
+                <a:chExt cx="1702559" cy="421615"/>
+              </a:xfrm>
+            </p:grpSpPr>
+            <p:pic>
+              <p:nvPicPr>
+                <p:cNvPr id="10" name="Picture 9">
+                  <a:hlinkClick r:id="rId4"/>
+                  <a:extLst>
+                    <a:ext uri="{FF2B5EF4-FFF2-40B4-BE49-F238E27FC236}">
+                      <a16:creationId xmlns:a16="http://schemas.microsoft.com/office/drawing/2014/main" id="{DFBCDDA2-17B0-4D17-9617-27F717DDF9D0}"/>
+                    </a:ext>
+                  </a:extLst>
+                </p:cNvPr>
+                <p:cNvPicPr>
+                  <a:picLocks noChangeAspect="1"/>
+                </p:cNvPicPr>
+                <p:nvPr/>
+              </p:nvPicPr>
+              <p:blipFill>
+                <a:blip r:embed="rId5"/>
+                <a:stretch>
+                  <a:fillRect/>
+                </a:stretch>
+              </p:blipFill>
+              <p:spPr>
+                <a:xfrm>
+                  <a:off x="6533678" y="3390977"/>
+                  <a:ext cx="421615" cy="421615"/>
+                </a:xfrm>
+                <a:prstGeom prst="rect">
+                  <a:avLst/>
+                </a:prstGeom>
+              </p:spPr>
+            </p:pic>
+            <p:sp>
+              <p:nvSpPr>
+                <p:cNvPr id="11" name="TextBox 10">
+                  <a:extLst>
+                    <a:ext uri="{FF2B5EF4-FFF2-40B4-BE49-F238E27FC236}">
+                      <a16:creationId xmlns:a16="http://schemas.microsoft.com/office/drawing/2014/main" id="{61AAC64F-6C8C-4419-A007-C655711C278A}"/>
+                    </a:ext>
+                  </a:extLst>
+                </p:cNvPr>
+                <p:cNvSpPr txBox="1"/>
+                <p:nvPr/>
+              </p:nvSpPr>
+              <p:spPr>
+                <a:xfrm>
+                  <a:off x="6961930" y="3401729"/>
+                  <a:ext cx="1274307" cy="400110"/>
+                </a:xfrm>
+                <a:prstGeom prst="rect">
+                  <a:avLst/>
+                </a:prstGeom>
+                <a:noFill/>
+              </p:spPr>
+              <p:txBody>
+                <a:bodyPr wrap="square" rtlCol="0" anchor="ctr">
+                  <a:spAutoFit/>
+                </a:bodyPr>
+                <a:lstStyle/>
+                <a:p>
+                  <a:r>
+                    <a:rPr lang="en-US" sz="2000" dirty="0">
+                      <a:hlinkClick r:id="rId4"/>
+                    </a:rPr>
+                    <a:t>mariev</a:t>
+                  </a:r>
+                  <a:endParaRPr lang="en-US" sz="2000" dirty="0"/>
+                </a:p>
+              </p:txBody>
+            </p:sp>
+          </p:grpSp>
+          <p:grpSp>
+            <p:nvGrpSpPr>
+              <p:cNvPr id="20" name="Group 19">
+                <a:extLst>
+                  <a:ext uri="{FF2B5EF4-FFF2-40B4-BE49-F238E27FC236}">
+                    <a16:creationId xmlns:a16="http://schemas.microsoft.com/office/drawing/2014/main" id="{BC1B9026-B07D-44D9-BA2F-E7B8BAA26FEC}"/>
+                  </a:ext>
+                </a:extLst>
+              </p:cNvPr>
+              <p:cNvGrpSpPr/>
+              <p:nvPr/>
+            </p:nvGrpSpPr>
+            <p:grpSpPr>
+              <a:xfrm>
+                <a:off x="8856320" y="4815105"/>
+                <a:ext cx="1860542" cy="576999"/>
+                <a:chOff x="8806820" y="5201966"/>
+                <a:chExt cx="1860542" cy="576999"/>
+              </a:xfrm>
+            </p:grpSpPr>
+            <p:pic>
+              <p:nvPicPr>
+                <p:cNvPr id="14" name="Picture 13" descr="Logo, icon&#10;&#10;Description automatically generated">
+                  <a:hlinkClick r:id="rId6"/>
+                  <a:extLst>
+                    <a:ext uri="{FF2B5EF4-FFF2-40B4-BE49-F238E27FC236}">
+                      <a16:creationId xmlns:a16="http://schemas.microsoft.com/office/drawing/2014/main" id="{1F549E15-3955-4606-A759-7C9B3E2B0137}"/>
+                    </a:ext>
+                  </a:extLst>
+                </p:cNvPr>
+                <p:cNvPicPr>
+                  <a:picLocks noChangeAspect="1"/>
+                </p:cNvPicPr>
+                <p:nvPr/>
+              </p:nvPicPr>
+              <p:blipFill>
+                <a:blip r:embed="rId7"/>
+                <a:stretch>
+                  <a:fillRect/>
+                </a:stretch>
+              </p:blipFill>
+              <p:spPr>
+                <a:xfrm>
+                  <a:off x="8806820" y="5201966"/>
+                  <a:ext cx="306360" cy="260527"/>
+                </a:xfrm>
+                <a:prstGeom prst="rect">
+                  <a:avLst/>
+                </a:prstGeom>
+              </p:spPr>
+            </p:pic>
+            <p:pic>
+              <p:nvPicPr>
+                <p:cNvPr id="16" name="Picture 15" descr="A picture containing ax, vector graphics, tool&#10;&#10;Description automatically generated">
+                  <a:hlinkClick r:id="rId8"/>
+                  <a:extLst>
+                    <a:ext uri="{FF2B5EF4-FFF2-40B4-BE49-F238E27FC236}">
+                      <a16:creationId xmlns:a16="http://schemas.microsoft.com/office/drawing/2014/main" id="{BCB2A5CC-D7D3-4CAD-BD70-42608C6F4B9A}"/>
+                    </a:ext>
+                  </a:extLst>
+                </p:cNvPr>
+                <p:cNvPicPr>
+                  <a:picLocks noChangeAspect="1"/>
+                </p:cNvPicPr>
+                <p:nvPr/>
+              </p:nvPicPr>
+              <p:blipFill>
+                <a:blip r:embed="rId9"/>
+                <a:stretch>
+                  <a:fillRect/>
+                </a:stretch>
+              </p:blipFill>
+              <p:spPr>
+                <a:xfrm>
+                  <a:off x="8818549" y="5546131"/>
+                  <a:ext cx="282903" cy="232834"/>
+                </a:xfrm>
+                <a:prstGeom prst="rect">
+                  <a:avLst/>
+                </a:prstGeom>
+              </p:spPr>
+            </p:pic>
+            <p:sp>
+              <p:nvSpPr>
+                <p:cNvPr id="17" name="TextBox 16">
+                  <a:extLst>
+                    <a:ext uri="{FF2B5EF4-FFF2-40B4-BE49-F238E27FC236}">
+                      <a16:creationId xmlns:a16="http://schemas.microsoft.com/office/drawing/2014/main" id="{E00864D8-354D-43DF-9773-7BE698A64200}"/>
+                    </a:ext>
+                  </a:extLst>
+                </p:cNvPr>
+                <p:cNvSpPr txBox="1"/>
+                <p:nvPr/>
+              </p:nvSpPr>
+              <p:spPr>
+                <a:xfrm>
+                  <a:off x="9101452" y="5494897"/>
+                  <a:ext cx="1565910" cy="261610"/>
+                </a:xfrm>
+                <a:prstGeom prst="rect">
+                  <a:avLst/>
+                </a:prstGeom>
+                <a:noFill/>
+              </p:spPr>
+              <p:txBody>
+                <a:bodyPr wrap="square" rtlCol="0" anchor="ctr">
+                  <a:spAutoFit/>
+                </a:bodyPr>
+                <a:lstStyle/>
+                <a:p>
+                  <a:r>
+                    <a:rPr lang="en-US" sz="1100" dirty="0">
+                      <a:hlinkClick r:id="rId8"/>
+                    </a:rPr>
+                    <a:t>@</a:t>
+                  </a:r>
+                  <a:r>
+                    <a:rPr lang="en-US" sz="1050" dirty="0">
+                      <a:hlinkClick r:id="rId8"/>
+                    </a:rPr>
+                    <a:t>mvendettuoli</a:t>
+                  </a:r>
+                  <a:endParaRPr lang="en-US" sz="1100" dirty="0"/>
+                </a:p>
+              </p:txBody>
+            </p:sp>
+          </p:grpSp>
+        </p:grpSp>
+        <p:sp>
+          <p:nvSpPr>
+            <p:cNvPr id="22" name="TextBox 21">
+              <a:extLst>
+                <a:ext uri="{FF2B5EF4-FFF2-40B4-BE49-F238E27FC236}">
+                  <a16:creationId xmlns:a16="http://schemas.microsoft.com/office/drawing/2014/main" id="{612B68EA-8263-442D-815F-C3308D8899FF}"/>
+                </a:ext>
+              </a:extLst>
+            </p:cNvPr>
+            <p:cNvSpPr txBox="1"/>
+            <p:nvPr/>
+          </p:nvSpPr>
+          <p:spPr>
+            <a:xfrm>
+              <a:off x="9403080" y="4890995"/>
+              <a:ext cx="2421219" cy="246221"/>
+            </a:xfrm>
+            <a:prstGeom prst="rect">
+              <a:avLst/>
+            </a:prstGeom>
+            <a:noFill/>
+          </p:spPr>
+          <p:txBody>
+            <a:bodyPr wrap="square" rtlCol="0" anchor="ctr">
+              <a:spAutoFit/>
+            </a:bodyPr>
+            <a:lstStyle/>
+            <a:p>
+              <a:r>
+                <a:rPr lang="en-US" sz="1000" dirty="0">
+                  <a:hlinkClick r:id="rId6"/>
+                </a:rPr>
+                <a:t>www.linkedin.com/in/mvendettuoli</a:t>
+              </a:r>
+              <a:endParaRPr lang="en-US" sz="1000" dirty="0"/>
+            </a:p>
+          </p:txBody>
+        </p:sp>
+      </p:grpSp>
     </p:spTree>
     <p:extLst>
       <p:ext uri="{BB962C8B-B14F-4D97-AF65-F5344CB8AC3E}">
@@ -10458,21 +10878,21 @@
 </file>
 
 <file path=customXml/item1.xml><?xml version="1.0" encoding="utf-8"?>
+<?mso-contentType ?>
+<FormTemplates xmlns="http://schemas.microsoft.com/sharepoint/v3/contenttype/forms">
+  <Display>DocumentLibraryForm</Display>
+  <Edit>DocumentLibraryForm</Edit>
+  <New>DocumentLibraryForm</New>
+</FormTemplates>
+</file>
+
+<file path=customXml/item2.xml><?xml version="1.0" encoding="utf-8"?>
 <p:properties xmlns:p="http://schemas.microsoft.com/office/2006/metadata/properties" xmlns:xsi="http://www.w3.org/2001/XMLSchema-instance" xmlns:pc="http://schemas.microsoft.com/office/infopath/2007/PartnerControls">
   <documentManagement>
     <Status xmlns="71af3243-3dd4-4a8d-8c0d-dd76da1f02a5">Not started</Status>
     <MediaServiceKeyPoints xmlns="71af3243-3dd4-4a8d-8c0d-dd76da1f02a5" xsi:nil="true"/>
   </documentManagement>
 </p:properties>
-</file>
-
-<file path=customXml/item2.xml><?xml version="1.0" encoding="utf-8"?>
-<?mso-contentType ?>
-<FormTemplates xmlns="http://schemas.microsoft.com/sharepoint/v3/contenttype/forms">
-  <Display>DocumentLibraryForm</Display>
-  <Edit>DocumentLibraryForm</Edit>
-  <New>DocumentLibraryForm</New>
-</FormTemplates>
 </file>
 
 <file path=customXml/item3.xml><?xml version="1.0" encoding="utf-8"?>
@@ -10697,19 +11117,19 @@
 </file>
 
 <file path=customXml/itemProps1.xml><?xml version="1.0" encoding="utf-8"?>
+<ds:datastoreItem xmlns:ds="http://schemas.openxmlformats.org/officeDocument/2006/customXml" ds:itemID="{CDB58277-F8DF-46FF-84EC-EF41B835E69F}">
+  <ds:schemaRefs>
+    <ds:schemaRef ds:uri="http://schemas.microsoft.com/sharepoint/v3/contenttype/forms"/>
+  </ds:schemaRefs>
+</ds:datastoreItem>
+</file>
+
+<file path=customXml/itemProps2.xml><?xml version="1.0" encoding="utf-8"?>
 <ds:datastoreItem xmlns:ds="http://schemas.openxmlformats.org/officeDocument/2006/customXml" ds:itemID="{137651BA-F45C-4845-9AB3-E0A65B39F5E1}">
   <ds:schemaRefs>
     <ds:schemaRef ds:uri="http://schemas.microsoft.com/office/2006/metadata/properties"/>
     <ds:schemaRef ds:uri="http://schemas.microsoft.com/office/infopath/2007/PartnerControls"/>
     <ds:schemaRef ds:uri="71af3243-3dd4-4a8d-8c0d-dd76da1f02a5"/>
-  </ds:schemaRefs>
-</ds:datastoreItem>
-</file>
-
-<file path=customXml/itemProps2.xml><?xml version="1.0" encoding="utf-8"?>
-<ds:datastoreItem xmlns:ds="http://schemas.openxmlformats.org/officeDocument/2006/customXml" ds:itemID="{CDB58277-F8DF-46FF-84EC-EF41B835E69F}">
-  <ds:schemaRefs>
-    <ds:schemaRef ds:uri="http://schemas.microsoft.com/sharepoint/v3/contenttype/forms"/>
   </ds:schemaRefs>
 </ds:datastoreItem>
 </file>

</xml_diff>

<commit_message>
Update pptx and convert to pdf
</commit_message>
<xml_diff>
--- a/Slides/Slides-01-Welcome_and_Orientation/Slides-01-Welcome_and_Orientation.pptx
+++ b/Slides/Slides-01-Welcome_and_Orientation/Slides-01-Welcome_and_Orientation.pptx
@@ -613,7 +613,16 @@
           <a:p>
             <a:r>
               <a:rPr lang="en-US" dirty="0"/>
-              <a:t>Please ask questions  - we are here to help! Also, we will work through the examples together</a:t>
+              <a:t>Please ask questions  - we are here to help! Also, we will work through the examples together.</a:t>
+            </a:r>
+          </a:p>
+          <a:p>
+            <a:endParaRPr lang="en-US" dirty="0"/>
+          </a:p>
+          <a:p>
+            <a:r>
+              <a:rPr lang="en-US" dirty="0"/>
+              <a:t>Post questions into the slack channel is preferred to raising your hand on zoom or posting into zoom chat so it is preserved for the future and we can make improvements to the workshop.</a:t>
             </a:r>
           </a:p>
         </p:txBody>
@@ -703,6 +712,15 @@
               <a:t>Bear with us. We are working on the correct leveling, and we will get into more complex topics in validation. This workshop is specifically trying to build a foundation for knowledge. And you never know, you might learn something.</a:t>
             </a:r>
           </a:p>
+          <a:p>
+            <a:endParaRPr lang="en-US" dirty="0"/>
+          </a:p>
+          <a:p>
+            <a:r>
+              <a:rPr lang="en-US" dirty="0"/>
+              <a:t>Also, as we go into breakout rooms, it would be helpful if you could work with the rest of the members of the breakout group to answer any questions. There are more of you than us, and any help we can get is appreciated!</a:t>
+            </a:r>
+          </a:p>
         </p:txBody>
       </p:sp>
       <p:sp>
@@ -1076,13 +1094,39 @@
           <a:p>
             <a:r>
               <a:rPr lang="en-US" dirty="0"/>
-              <a:t>If you have not yet, clone the repository. We will move onto the first series – basics of </a:t>
-            </a:r>
-            <a:r>
-              <a:rPr lang="en-US"/>
-              <a:t>package building!</a:t>
-            </a:r>
+              <a:t>If you have not yet, clone the R Package Validation Tutorial repository.</a:t>
+            </a:r>
+          </a:p>
+          <a:p>
             <a:endParaRPr lang="en-US" dirty="0"/>
+          </a:p>
+          <a:p>
+            <a:r>
+              <a:rPr lang="en-US" dirty="0"/>
+              <a:t>Github.com/</a:t>
+            </a:r>
+            <a:r>
+              <a:rPr lang="en-US" dirty="0" err="1"/>
+              <a:t>FredHutch</a:t>
+            </a:r>
+            <a:r>
+              <a:rPr lang="en-US" dirty="0"/>
+              <a:t>/</a:t>
+            </a:r>
+            <a:r>
+              <a:rPr lang="en-US" dirty="0" err="1"/>
+              <a:t>R_Package_Validation_Tutorial</a:t>
+            </a:r>
+            <a:endParaRPr lang="en-US" dirty="0"/>
+          </a:p>
+          <a:p>
+            <a:endParaRPr lang="en-US" dirty="0"/>
+          </a:p>
+          <a:p>
+            <a:r>
+              <a:rPr lang="en-US" dirty="0"/>
+              <a:t> We will move onto the first series – basics of package building!</a:t>
+            </a:r>
           </a:p>
         </p:txBody>
       </p:sp>
@@ -8794,6 +8838,41 @@
           </a:p>
         </p:txBody>
       </p:sp>
+      <p:sp>
+        <p:nvSpPr>
+          <p:cNvPr id="3" name="Rectangle 2">
+            <a:extLst>
+              <a:ext uri="{FF2B5EF4-FFF2-40B4-BE49-F238E27FC236}">
+                <a16:creationId xmlns:a16="http://schemas.microsoft.com/office/drawing/2014/main" id="{9C2AC537-9E18-4C7B-889E-68B6DAF73C40}"/>
+              </a:ext>
+            </a:extLst>
+          </p:cNvPr>
+          <p:cNvSpPr/>
+          <p:nvPr/>
+        </p:nvSpPr>
+        <p:spPr>
+          <a:xfrm>
+            <a:off x="1443319" y="5069105"/>
+            <a:ext cx="9305364" cy="369332"/>
+          </a:xfrm>
+          <a:prstGeom prst="rect">
+            <a:avLst/>
+          </a:prstGeom>
+        </p:spPr>
+        <p:txBody>
+          <a:bodyPr wrap="square">
+            <a:spAutoFit/>
+          </a:bodyPr>
+          <a:lstStyle/>
+          <a:p>
+            <a:pPr algn="ctr"/>
+            <a:r>
+              <a:rPr lang="en-US" dirty="0"/>
+              <a:t>Clone https://github.com/FredHutch/R_Package_Validation_Tutorial</a:t>
+            </a:r>
+          </a:p>
+        </p:txBody>
+      </p:sp>
     </p:spTree>
     <p:extLst>
       <p:ext uri="{BB962C8B-B14F-4D97-AF65-F5344CB8AC3E}">
@@ -9013,6 +9092,13 @@
             <a:endParaRPr lang="en-US" sz="8000" dirty="0"/>
           </a:p>
           <a:p>
+            <a:pPr marL="0" indent="0">
+              <a:buNone/>
+            </a:pPr>
+            <a:r>
+              <a:rPr lang="en-US" sz="8000" dirty="0"/>
+              <a:t>    </a:t>
+            </a:r>
             <a:r>
               <a:rPr lang="en-US" sz="8000" dirty="0">
                 <a:hlinkClick r:id="rId2"/>
@@ -9022,6 +9108,13 @@
             <a:endParaRPr lang="en-US" sz="8000" dirty="0"/>
           </a:p>
           <a:p>
+            <a:pPr marL="0" indent="0">
+              <a:buNone/>
+            </a:pPr>
+            <a:r>
+              <a:rPr lang="en-US" sz="8000" dirty="0"/>
+              <a:t>    </a:t>
+            </a:r>
             <a:r>
               <a:rPr lang="en-US" sz="8000" dirty="0" err="1">
                 <a:hlinkClick r:id="rId3"/>
@@ -9062,6 +9155,68 @@
             <a:off x="6597444" y="800424"/>
             <a:ext cx="4060723" cy="5414982"/>
           </a:xfrm>
+        </p:spPr>
+      </p:pic>
+      <p:pic>
+        <p:nvPicPr>
+          <p:cNvPr id="5" name="Picture 4" descr="A picture containing ax, vector graphics, tool&#10;&#10;Description automatically generated">
+            <a:hlinkClick r:id="rId5"/>
+            <a:extLst>
+              <a:ext uri="{FF2B5EF4-FFF2-40B4-BE49-F238E27FC236}">
+                <a16:creationId xmlns:a16="http://schemas.microsoft.com/office/drawing/2014/main" id="{036F6E0C-5803-469B-ABC1-2798AD6137BE}"/>
+              </a:ext>
+            </a:extLst>
+          </p:cNvPr>
+          <p:cNvPicPr>
+            <a:picLocks noChangeAspect="1"/>
+          </p:cNvPicPr>
+          <p:nvPr/>
+        </p:nvPicPr>
+        <p:blipFill>
+          <a:blip r:embed="rId6"/>
+          <a:stretch>
+            <a:fillRect/>
+          </a:stretch>
+        </p:blipFill>
+        <p:spPr>
+          <a:xfrm>
+            <a:off x="1741802" y="4971606"/>
+            <a:ext cx="311394" cy="232834"/>
+          </a:xfrm>
+          <a:prstGeom prst="rect">
+            <a:avLst/>
+          </a:prstGeom>
+        </p:spPr>
+      </p:pic>
+      <p:pic>
+        <p:nvPicPr>
+          <p:cNvPr id="6" name="Picture 5">
+            <a:hlinkClick r:id="rId7"/>
+            <a:extLst>
+              <a:ext uri="{FF2B5EF4-FFF2-40B4-BE49-F238E27FC236}">
+                <a16:creationId xmlns:a16="http://schemas.microsoft.com/office/drawing/2014/main" id="{4C33B757-0AEB-4F53-AB7F-9E42D5B9DD55}"/>
+              </a:ext>
+            </a:extLst>
+          </p:cNvPr>
+          <p:cNvPicPr>
+            <a:picLocks noChangeAspect="1"/>
+          </p:cNvPicPr>
+          <p:nvPr/>
+        </p:nvPicPr>
+        <p:blipFill>
+          <a:blip r:embed="rId8"/>
+          <a:stretch>
+            <a:fillRect/>
+          </a:stretch>
+        </p:blipFill>
+        <p:spPr>
+          <a:xfrm>
+            <a:off x="1750767" y="5317203"/>
+            <a:ext cx="312549" cy="283952"/>
+          </a:xfrm>
+          <a:prstGeom prst="rect">
+            <a:avLst/>
+          </a:prstGeom>
         </p:spPr>
       </p:pic>
     </p:spTree>
@@ -10878,21 +11033,21 @@
 </file>
 
 <file path=customXml/item1.xml><?xml version="1.0" encoding="utf-8"?>
+<p:properties xmlns:p="http://schemas.microsoft.com/office/2006/metadata/properties" xmlns:xsi="http://www.w3.org/2001/XMLSchema-instance" xmlns:pc="http://schemas.microsoft.com/office/infopath/2007/PartnerControls">
+  <documentManagement>
+    <Status xmlns="71af3243-3dd4-4a8d-8c0d-dd76da1f02a5">Not started</Status>
+    <MediaServiceKeyPoints xmlns="71af3243-3dd4-4a8d-8c0d-dd76da1f02a5" xsi:nil="true"/>
+  </documentManagement>
+</p:properties>
+</file>
+
+<file path=customXml/item2.xml><?xml version="1.0" encoding="utf-8"?>
 <?mso-contentType ?>
 <FormTemplates xmlns="http://schemas.microsoft.com/sharepoint/v3/contenttype/forms">
   <Display>DocumentLibraryForm</Display>
   <Edit>DocumentLibraryForm</Edit>
   <New>DocumentLibraryForm</New>
 </FormTemplates>
-</file>
-
-<file path=customXml/item2.xml><?xml version="1.0" encoding="utf-8"?>
-<p:properties xmlns:p="http://schemas.microsoft.com/office/2006/metadata/properties" xmlns:xsi="http://www.w3.org/2001/XMLSchema-instance" xmlns:pc="http://schemas.microsoft.com/office/infopath/2007/PartnerControls">
-  <documentManagement>
-    <Status xmlns="71af3243-3dd4-4a8d-8c0d-dd76da1f02a5">Not started</Status>
-    <MediaServiceKeyPoints xmlns="71af3243-3dd4-4a8d-8c0d-dd76da1f02a5" xsi:nil="true"/>
-  </documentManagement>
-</p:properties>
 </file>
 
 <file path=customXml/item3.xml><?xml version="1.0" encoding="utf-8"?>
@@ -11117,19 +11272,26 @@
 </file>
 
 <file path=customXml/itemProps1.xml><?xml version="1.0" encoding="utf-8"?>
-<ds:datastoreItem xmlns:ds="http://schemas.openxmlformats.org/officeDocument/2006/customXml" ds:itemID="{CDB58277-F8DF-46FF-84EC-EF41B835E69F}">
+<ds:datastoreItem xmlns:ds="http://schemas.openxmlformats.org/officeDocument/2006/customXml" ds:itemID="{137651BA-F45C-4845-9AB3-E0A65B39F5E1}">
   <ds:schemaRefs>
-    <ds:schemaRef ds:uri="http://schemas.microsoft.com/sharepoint/v3/contenttype/forms"/>
+    <ds:schemaRef ds:uri="http://schemas.openxmlformats.org/package/2006/metadata/core-properties"/>
+    <ds:schemaRef ds:uri="http://schemas.microsoft.com/office/infopath/2007/PartnerControls"/>
+    <ds:schemaRef ds:uri="http://schemas.microsoft.com/office/2006/documentManagement/types"/>
+    <ds:schemaRef ds:uri="http://schemas.microsoft.com/office/2006/metadata/properties"/>
+    <ds:schemaRef ds:uri="http://purl.org/dc/elements/1.1/"/>
+    <ds:schemaRef ds:uri="71af3243-3dd4-4a8d-8c0d-dd76da1f02a5"/>
+    <ds:schemaRef ds:uri="http://purl.org/dc/terms/"/>
+    <ds:schemaRef ds:uri="16c05727-aa75-4e4a-9b5f-8a80a1165891"/>
+    <ds:schemaRef ds:uri="http://www.w3.org/XML/1998/namespace"/>
+    <ds:schemaRef ds:uri="http://purl.org/dc/dcmitype/"/>
   </ds:schemaRefs>
 </ds:datastoreItem>
 </file>
 
 <file path=customXml/itemProps2.xml><?xml version="1.0" encoding="utf-8"?>
-<ds:datastoreItem xmlns:ds="http://schemas.openxmlformats.org/officeDocument/2006/customXml" ds:itemID="{137651BA-F45C-4845-9AB3-E0A65B39F5E1}">
+<ds:datastoreItem xmlns:ds="http://schemas.openxmlformats.org/officeDocument/2006/customXml" ds:itemID="{CDB58277-F8DF-46FF-84EC-EF41B835E69F}">
   <ds:schemaRefs>
-    <ds:schemaRef ds:uri="http://schemas.microsoft.com/office/2006/metadata/properties"/>
-    <ds:schemaRef ds:uri="http://schemas.microsoft.com/office/infopath/2007/PartnerControls"/>
-    <ds:schemaRef ds:uri="71af3243-3dd4-4a8d-8c0d-dd76da1f02a5"/>
+    <ds:schemaRef ds:uri="http://schemas.microsoft.com/sharepoint/v3/contenttype/forms"/>
   </ds:schemaRefs>
 </ds:datastoreItem>
 </file>

</xml_diff>

<commit_message>
Update to include Zoom chat has been disabled
</commit_message>
<xml_diff>
--- a/Slides/Slides-01-Welcome_and_Orientation/Slides-01-Welcome_and_Orientation.pptx
+++ b/Slides/Slides-01-Welcome_and_Orientation/Slides-01-Welcome_and_Orientation.pptx
@@ -216,7 +216,7 @@
           <a:p>
             <a:fld id="{AE1375EF-7AC2-40F0-8984-3657FAAC21B8}" type="datetimeFigureOut">
               <a:rPr lang="en-US" smtClean="0"/>
-              <a:t>5/25/2021</a:t>
+              <a:t>5/26/2021</a:t>
             </a:fld>
             <a:endParaRPr lang="en-US"/>
           </a:p>
@@ -613,16 +613,7 @@
           <a:p>
             <a:r>
               <a:rPr lang="en-US" dirty="0"/>
-              <a:t>Please ask questions  - we are here to help! Also, we will work through the examples together.</a:t>
-            </a:r>
-          </a:p>
-          <a:p>
-            <a:endParaRPr lang="en-US" dirty="0"/>
-          </a:p>
-          <a:p>
-            <a:r>
-              <a:rPr lang="en-US" dirty="0"/>
-              <a:t>Post questions into the slack channel is preferred to raising your hand on zoom or posting into zoom chat so it is preserved for the future and we can make improvements to the workshop.</a:t>
+              <a:t>During lunch the Digital track for Cascadia R will be released – Be sure to check it out!</a:t>
             </a:r>
           </a:p>
         </p:txBody>
@@ -644,7 +635,7 @@
           <a:p>
             <a:fld id="{B9F26414-4BE6-427A-9F34-1430B41B92D6}" type="slidenum">
               <a:rPr lang="en-US" smtClean="0"/>
-              <a:t>15</a:t>
+              <a:t>13</a:t>
             </a:fld>
             <a:endParaRPr lang="en-US"/>
           </a:p>
@@ -653,7 +644,7 @@
     </p:spTree>
     <p:extLst>
       <p:ext uri="{BB962C8B-B14F-4D97-AF65-F5344CB8AC3E}">
-        <p14:creationId xmlns:p14="http://schemas.microsoft.com/office/powerpoint/2010/main" val="3200179349"/>
+        <p14:creationId xmlns:p14="http://schemas.microsoft.com/office/powerpoint/2010/main" val="2674332949"/>
       </p:ext>
     </p:extLst>
   </p:cSld>
@@ -709,7 +700,7 @@
           <a:p>
             <a:r>
               <a:rPr lang="en-US" dirty="0"/>
-              <a:t>Bear with us. We are working on the correct leveling, and we will get into more complex topics in validation. This workshop is specifically trying to build a foundation for knowledge. And you never know, you might learn something.</a:t>
+              <a:t>Please ask questions  - we are here to help! Also, we will work through the examples together.</a:t>
             </a:r>
           </a:p>
           <a:p>
@@ -718,7 +709,7 @@
           <a:p>
             <a:r>
               <a:rPr lang="en-US" dirty="0"/>
-              <a:t>Also, as we go into breakout rooms, it would be helpful if you could work with the rest of the members of the breakout group to answer any questions. There are more of you than us, and any help we can get is appreciated!</a:t>
+              <a:t>Post questions into the slack channel is preferred to raising your hand on zoom or posting into zoom chat so it is preserved for the future and we can make improvements to the workshop.</a:t>
             </a:r>
           </a:p>
         </p:txBody>
@@ -740,7 +731,7 @@
           <a:p>
             <a:fld id="{B9F26414-4BE6-427A-9F34-1430B41B92D6}" type="slidenum">
               <a:rPr lang="en-US" smtClean="0"/>
-              <a:t>16</a:t>
+              <a:t>15</a:t>
             </a:fld>
             <a:endParaRPr lang="en-US"/>
           </a:p>
@@ -749,7 +740,7 @@
     </p:spTree>
     <p:extLst>
       <p:ext uri="{BB962C8B-B14F-4D97-AF65-F5344CB8AC3E}">
-        <p14:creationId xmlns:p14="http://schemas.microsoft.com/office/powerpoint/2010/main" val="282342033"/>
+        <p14:creationId xmlns:p14="http://schemas.microsoft.com/office/powerpoint/2010/main" val="3200179349"/>
       </p:ext>
     </p:extLst>
   </p:cSld>
@@ -803,38 +794,19 @@
           <a:bodyPr/>
           <a:lstStyle/>
           <a:p>
-            <a:pPr marL="0" marR="0" lvl="0" indent="0" algn="l" defTabSz="914400" rtl="0" eaLnBrk="1" fontAlgn="auto" latinLnBrk="0" hangingPunct="1">
-              <a:lnSpc>
-                <a:spcPct val="100000"/>
-              </a:lnSpc>
-              <a:spcBef>
-                <a:spcPts val="0"/>
-              </a:spcBef>
-              <a:spcAft>
-                <a:spcPts val="0"/>
-              </a:spcAft>
-              <a:buClrTx/>
-              <a:buSzTx/>
-              <a:buFontTx/>
-              <a:buNone/>
-              <a:tabLst/>
-              <a:defRPr/>
-            </a:pPr>
             <a:r>
               <a:rPr lang="en-US" dirty="0"/>
-              <a:t>Please open an issue in the </a:t>
-            </a:r>
-            <a:r>
-              <a:rPr lang="en-US" dirty="0" err="1"/>
-              <a:t>github</a:t>
-            </a:r>
+              <a:t>Bear with us. We will get into more complex topics in validation. This workshop is specifically trying to build a foundation for knowledge. And you never know, you might learn something.</a:t>
+            </a:r>
+          </a:p>
+          <a:p>
+            <a:endParaRPr lang="en-US" dirty="0"/>
+          </a:p>
+          <a:p>
             <a:r>
               <a:rPr lang="en-US" dirty="0"/>
-              <a:t> page. We are human, we did our best, but would love to do better and make this easy for you to understand these concepts</a:t>
-            </a:r>
-          </a:p>
-          <a:p>
-            <a:endParaRPr lang="en-US" dirty="0"/>
+              <a:t>Also, as we go into breakout rooms, it would be helpful if you could work with the rest of the members of the breakout group to answer any questions. There are more of you than us, and any help we can get is appreciated!</a:t>
+            </a:r>
           </a:p>
         </p:txBody>
       </p:sp>
@@ -855,7 +827,7 @@
           <a:p>
             <a:fld id="{B9F26414-4BE6-427A-9F34-1430B41B92D6}" type="slidenum">
               <a:rPr lang="en-US" smtClean="0"/>
-              <a:t>17</a:t>
+              <a:t>16</a:t>
             </a:fld>
             <a:endParaRPr lang="en-US"/>
           </a:p>
@@ -864,7 +836,7 @@
     </p:spTree>
     <p:extLst>
       <p:ext uri="{BB962C8B-B14F-4D97-AF65-F5344CB8AC3E}">
-        <p14:creationId xmlns:p14="http://schemas.microsoft.com/office/powerpoint/2010/main" val="493363971"/>
+        <p14:creationId xmlns:p14="http://schemas.microsoft.com/office/powerpoint/2010/main" val="282342033"/>
       </p:ext>
     </p:extLst>
   </p:cSld>
@@ -918,10 +890,81 @@
           <a:bodyPr/>
           <a:lstStyle/>
           <a:p>
+            <a:pPr marL="0" marR="0" lvl="0" indent="0" algn="l" defTabSz="914400" rtl="0" eaLnBrk="1" fontAlgn="auto" latinLnBrk="0" hangingPunct="1">
+              <a:lnSpc>
+                <a:spcPct val="100000"/>
+              </a:lnSpc>
+              <a:spcBef>
+                <a:spcPts val="0"/>
+              </a:spcBef>
+              <a:spcAft>
+                <a:spcPts val="0"/>
+              </a:spcAft>
+              <a:buClrTx/>
+              <a:buSzTx/>
+              <a:buFontTx/>
+              <a:buNone/>
+              <a:tabLst/>
+              <a:defRPr/>
+            </a:pPr>
             <a:r>
               <a:rPr lang="en-US" dirty="0"/>
-              <a:t>That is okay – if you are working on the spartan examples, go back to the more verbose set! You could also pose a question in slack to the rest of the workshop or directly message the instructors. Finally, we will work through all of the answers together!</a:t>
-            </a:r>
+              <a:t>Please open an issue in the </a:t>
+            </a:r>
+            <a:r>
+              <a:rPr lang="en-US" dirty="0" err="1"/>
+              <a:t>github</a:t>
+            </a:r>
+            <a:r>
+              <a:rPr lang="en-US" dirty="0"/>
+              <a:t> page. We are human, we did our best, but would love to do better and make this easy for you to understand these concepts</a:t>
+            </a:r>
+          </a:p>
+          <a:p>
+            <a:pPr marL="0" marR="0" lvl="0" indent="0" algn="l" defTabSz="914400" rtl="0" eaLnBrk="1" fontAlgn="auto" latinLnBrk="0" hangingPunct="1">
+              <a:lnSpc>
+                <a:spcPct val="100000"/>
+              </a:lnSpc>
+              <a:spcBef>
+                <a:spcPts val="0"/>
+              </a:spcBef>
+              <a:spcAft>
+                <a:spcPts val="0"/>
+              </a:spcAft>
+              <a:buClrTx/>
+              <a:buSzTx/>
+              <a:buFontTx/>
+              <a:buNone/>
+              <a:tabLst/>
+              <a:defRPr/>
+            </a:pPr>
+            <a:endParaRPr lang="en-US" dirty="0"/>
+          </a:p>
+          <a:p>
+            <a:pPr marL="0" marR="0" lvl="0" indent="0" algn="l" defTabSz="914400" rtl="0" eaLnBrk="1" fontAlgn="auto" latinLnBrk="0" hangingPunct="1">
+              <a:lnSpc>
+                <a:spcPct val="100000"/>
+              </a:lnSpc>
+              <a:spcBef>
+                <a:spcPts val="0"/>
+              </a:spcBef>
+              <a:spcAft>
+                <a:spcPts val="0"/>
+              </a:spcAft>
+              <a:buClrTx/>
+              <a:buSzTx/>
+              <a:buFontTx/>
+              <a:buNone/>
+              <a:tabLst/>
+              <a:defRPr/>
+            </a:pPr>
+            <a:r>
+              <a:rPr lang="en-US" dirty="0"/>
+              <a:t>Also, anything that would help make things clearer we would love to know too!</a:t>
+            </a:r>
+          </a:p>
+          <a:p>
+            <a:endParaRPr lang="en-US" dirty="0"/>
           </a:p>
         </p:txBody>
       </p:sp>
@@ -942,7 +985,7 @@
           <a:p>
             <a:fld id="{B9F26414-4BE6-427A-9F34-1430B41B92D6}" type="slidenum">
               <a:rPr lang="en-US" smtClean="0"/>
-              <a:t>18</a:t>
+              <a:t>17</a:t>
             </a:fld>
             <a:endParaRPr lang="en-US"/>
           </a:p>
@@ -951,7 +994,7 @@
     </p:spTree>
     <p:extLst>
       <p:ext uri="{BB962C8B-B14F-4D97-AF65-F5344CB8AC3E}">
-        <p14:creationId xmlns:p14="http://schemas.microsoft.com/office/powerpoint/2010/main" val="1741456198"/>
+        <p14:creationId xmlns:p14="http://schemas.microsoft.com/office/powerpoint/2010/main" val="493363971"/>
       </p:ext>
     </p:extLst>
   </p:cSld>
@@ -1007,6 +1050,110 @@
           <a:p>
             <a:r>
               <a:rPr lang="en-US" dirty="0"/>
+              <a:t>That is okay – if you are working on the spartan examples, go back to the more verbose set! Also, we will be setting up break out rooms, so see if any other members are also stuck. You can also pose a question in slack to the rest of the workshop or directly message the instructors.</a:t>
+            </a:r>
+          </a:p>
+          <a:p>
+            <a:endParaRPr lang="en-US" dirty="0"/>
+          </a:p>
+          <a:p>
+            <a:r>
+              <a:rPr lang="en-US" dirty="0"/>
+              <a:t>Finally, we will work </a:t>
+            </a:r>
+            <a:r>
+              <a:rPr lang="en-US"/>
+              <a:t>through all </a:t>
+            </a:r>
+            <a:r>
+              <a:rPr lang="en-US" dirty="0"/>
+              <a:t>the answers together!</a:t>
+            </a:r>
+          </a:p>
+        </p:txBody>
+      </p:sp>
+      <p:sp>
+        <p:nvSpPr>
+          <p:cNvPr id="4" name="Slide Number Placeholder 3"/>
+          <p:cNvSpPr>
+            <a:spLocks noGrp="1"/>
+          </p:cNvSpPr>
+          <p:nvPr>
+            <p:ph type="sldNum" sz="quarter" idx="5"/>
+          </p:nvPr>
+        </p:nvSpPr>
+        <p:spPr/>
+        <p:txBody>
+          <a:bodyPr/>
+          <a:lstStyle/>
+          <a:p>
+            <a:fld id="{B9F26414-4BE6-427A-9F34-1430B41B92D6}" type="slidenum">
+              <a:rPr lang="en-US" smtClean="0"/>
+              <a:t>18</a:t>
+            </a:fld>
+            <a:endParaRPr lang="en-US"/>
+          </a:p>
+        </p:txBody>
+      </p:sp>
+    </p:spTree>
+    <p:extLst>
+      <p:ext uri="{BB962C8B-B14F-4D97-AF65-F5344CB8AC3E}">
+        <p14:creationId xmlns:p14="http://schemas.microsoft.com/office/powerpoint/2010/main" val="1741456198"/>
+      </p:ext>
+    </p:extLst>
+  </p:cSld>
+  <p:clrMapOvr>
+    <a:masterClrMapping/>
+  </p:clrMapOvr>
+</p:notes>
+</file>
+
+<file path=ppt/notesSlides/notesSlide7.xml><?xml version="1.0" encoding="utf-8"?>
+<p:notes xmlns:a="http://schemas.openxmlformats.org/drawingml/2006/main" xmlns:r="http://schemas.openxmlformats.org/officeDocument/2006/relationships" xmlns:p="http://schemas.openxmlformats.org/presentationml/2006/main">
+  <p:cSld>
+    <p:spTree>
+      <p:nvGrpSpPr>
+        <p:cNvPr id="1" name=""/>
+        <p:cNvGrpSpPr/>
+        <p:nvPr/>
+      </p:nvGrpSpPr>
+      <p:grpSpPr>
+        <a:xfrm>
+          <a:off x="0" y="0"/>
+          <a:ext cx="0" cy="0"/>
+          <a:chOff x="0" y="0"/>
+          <a:chExt cx="0" cy="0"/>
+        </a:xfrm>
+      </p:grpSpPr>
+      <p:sp>
+        <p:nvSpPr>
+          <p:cNvPr id="2" name="Slide Image Placeholder 1"/>
+          <p:cNvSpPr>
+            <a:spLocks noGrp="1" noRot="1" noChangeAspect="1"/>
+          </p:cNvSpPr>
+          <p:nvPr>
+            <p:ph type="sldImg"/>
+          </p:nvPr>
+        </p:nvSpPr>
+        <p:spPr/>
+      </p:sp>
+      <p:sp>
+        <p:nvSpPr>
+          <p:cNvPr id="3" name="Notes Placeholder 2"/>
+          <p:cNvSpPr>
+            <a:spLocks noGrp="1"/>
+          </p:cNvSpPr>
+          <p:nvPr>
+            <p:ph type="body" idx="1"/>
+          </p:nvPr>
+        </p:nvSpPr>
+        <p:spPr/>
+        <p:txBody>
+          <a:bodyPr/>
+          <a:lstStyle/>
+          <a:p>
+            <a:r>
+              <a:rPr lang="en-US" dirty="0"/>
               <a:t>I don’t think I can help you there.. </a:t>
             </a:r>
           </a:p>
@@ -1048,7 +1195,7 @@
 </p:notes>
 </file>
 
-<file path=ppt/notesSlides/notesSlide7.xml><?xml version="1.0" encoding="utf-8"?>
+<file path=ppt/notesSlides/notesSlide8.xml><?xml version="1.0" encoding="utf-8"?>
 <p:notes xmlns:a="http://schemas.openxmlformats.org/drawingml/2006/main" xmlns:r="http://schemas.openxmlformats.org/officeDocument/2006/relationships" xmlns:p="http://schemas.openxmlformats.org/presentationml/2006/main">
   <p:cSld>
     <p:spTree>
@@ -1635,7 +1782,7 @@
           <a:p>
             <a:fld id="{EA0C0817-A112-4847-8014-A94B7D2A4EA3}" type="datetime1">
               <a:rPr lang="en-US" smtClean="0"/>
-              <a:t>5/25/2021</a:t>
+              <a:t>5/26/2021</a:t>
             </a:fld>
             <a:endParaRPr lang="en-US" dirty="0"/>
           </a:p>
@@ -1837,7 +1984,7 @@
           <a:p>
             <a:fld id="{7332B432-ACDA-4023-A761-2BAB76577B62}" type="datetime1">
               <a:rPr lang="en-US" smtClean="0"/>
-              <a:t>5/25/2021</a:t>
+              <a:t>5/26/2021</a:t>
             </a:fld>
             <a:endParaRPr lang="en-US" dirty="0"/>
           </a:p>
@@ -2436,7 +2583,7 @@
           <a:p>
             <a:fld id="{D9C646AA-F36E-4540-911D-FFFC0A0EF24A}" type="datetime1">
               <a:rPr lang="en-US" smtClean="0"/>
-              <a:t>5/25/2021</a:t>
+              <a:t>5/26/2021</a:t>
             </a:fld>
             <a:endParaRPr lang="en-US" dirty="0"/>
           </a:p>
@@ -2756,7 +2903,7 @@
           <a:p>
             <a:fld id="{69186D26-FA5F-4637-B602-B7C2DC34CFD4}" type="datetime1">
               <a:rPr lang="en-US" smtClean="0"/>
-              <a:t>5/25/2021</a:t>
+              <a:t>5/26/2021</a:t>
             </a:fld>
             <a:endParaRPr lang="en-US" dirty="0"/>
           </a:p>
@@ -3193,7 +3340,7 @@
           <a:p>
             <a:fld id="{8A7F15D8-96D1-4781-BC50-CA8A088B2FE4}" type="datetime1">
               <a:rPr lang="en-US" smtClean="0"/>
-              <a:t>5/25/2021</a:t>
+              <a:t>5/26/2021</a:t>
             </a:fld>
             <a:endParaRPr lang="en-US" dirty="0"/>
           </a:p>
@@ -3311,7 +3458,7 @@
           <a:p>
             <a:fld id="{F9A96C99-B8F8-4528-BD05-0E16E943DC09}" type="datetime1">
               <a:rPr lang="en-US" smtClean="0"/>
-              <a:t>5/25/2021</a:t>
+              <a:t>5/26/2021</a:t>
             </a:fld>
             <a:endParaRPr lang="en-US" dirty="0"/>
           </a:p>
@@ -3406,7 +3553,7 @@
           <a:p>
             <a:fld id="{03636942-C211-4B28-8DBD-C953E00AF71B}" type="datetime1">
               <a:rPr lang="en-US" smtClean="0"/>
-              <a:t>5/25/2021</a:t>
+              <a:t>5/26/2021</a:t>
             </a:fld>
             <a:endParaRPr lang="en-US" dirty="0"/>
           </a:p>
@@ -3823,7 +3970,7 @@
           <a:p>
             <a:fld id="{7E8D12A6-918A-48BD-8CB9-CA713993B0EA}" type="datetime1">
               <a:rPr lang="en-US" smtClean="0"/>
-              <a:t>5/25/2021</a:t>
+              <a:t>5/26/2021</a:t>
             </a:fld>
             <a:endParaRPr lang="en-US" dirty="0"/>
           </a:p>
@@ -4085,7 +4232,7 @@
             <a:fld id="{E778CE86-875F-4587-BCF6-FA054AFC0D53}" type="datetime1">
               <a:rPr lang="en-US" smtClean="0"/>
               <a:pPr/>
-              <a:t>5/25/2021</a:t>
+              <a:t>5/26/2021</a:t>
             </a:fld>
             <a:endParaRPr lang="en-US" dirty="0"/>
           </a:p>
@@ -4601,7 +4748,7 @@
           <a:p>
             <a:fld id="{F6FA2B21-3FCD-4721-B95C-427943F61125}" type="datetime1">
               <a:rPr lang="en-US" smtClean="0"/>
-              <a:t>5/25/2021</a:t>
+              <a:t>5/26/2021</a:t>
             </a:fld>
             <a:endParaRPr lang="en-US" dirty="0"/>
           </a:p>
@@ -5706,7 +5853,7 @@
         <p:spPr>
           <a:xfrm>
             <a:off x="1337734" y="3266119"/>
-            <a:ext cx="9787466" cy="2954655"/>
+            <a:ext cx="9787466" cy="3693319"/>
           </a:xfrm>
           <a:prstGeom prst="rect">
             <a:avLst/>
@@ -5798,6 +5945,31 @@
                 </a:solidFill>
               </a:rPr>
               <a:t>Pose questions to the rest of the class</a:t>
+            </a:r>
+          </a:p>
+          <a:p>
+            <a:pPr marL="625475" lvl="2" indent="-342900">
+              <a:buFontTx/>
+              <a:buChar char="-"/>
+            </a:pPr>
+            <a:endParaRPr lang="en-US" sz="2400" dirty="0">
+              <a:solidFill>
+                <a:schemeClr val="accent2"/>
+              </a:solidFill>
+            </a:endParaRPr>
+          </a:p>
+          <a:p>
+            <a:pPr marL="625475" lvl="2" indent="-342900">
+              <a:buFontTx/>
+              <a:buChar char="-"/>
+            </a:pPr>
+            <a:r>
+              <a:rPr lang="en-US" sz="2400" dirty="0">
+                <a:solidFill>
+                  <a:srgbClr val="002060"/>
+                </a:solidFill>
+              </a:rPr>
+              <a:t>Zoom Chat has been disabled</a:t>
             </a:r>
           </a:p>
           <a:p>
@@ -11042,15 +11214,6 @@
 </file>
 
 <file path=customXml/item2.xml><?xml version="1.0" encoding="utf-8"?>
-<?mso-contentType ?>
-<FormTemplates xmlns="http://schemas.microsoft.com/sharepoint/v3/contenttype/forms">
-  <Display>DocumentLibraryForm</Display>
-  <Edit>DocumentLibraryForm</Edit>
-  <New>DocumentLibraryForm</New>
-</FormTemplates>
-</file>
-
-<file path=customXml/item3.xml><?xml version="1.0" encoding="utf-8"?>
 <ct:contentTypeSchema xmlns:ct="http://schemas.microsoft.com/office/2006/metadata/contentType" xmlns:ma="http://schemas.microsoft.com/office/2006/metadata/properties/metaAttributes" ct:_="" ma:_="" ma:contentTypeName="Document" ma:contentTypeID="0x01010079F111ED35F8CC479449609E8A0923A6" ma:contentTypeVersion="12" ma:contentTypeDescription="Create a new document." ma:contentTypeScope="" ma:versionID="a410dd7f93c95333ffa1b60ed6adedd1">
   <xsd:schema xmlns:xsd="http://www.w3.org/2001/XMLSchema" xmlns:xs="http://www.w3.org/2001/XMLSchema" xmlns:p="http://schemas.microsoft.com/office/2006/metadata/properties" xmlns:ns2="71af3243-3dd4-4a8d-8c0d-dd76da1f02a5" xmlns:ns3="16c05727-aa75-4e4a-9b5f-8a80a1165891" targetNamespace="http://schemas.microsoft.com/office/2006/metadata/properties" ma:root="true" ma:fieldsID="a936d9baba76aa3866493feff160faab" ns2:_="" ns3:_="">
     <xsd:import namespace="71af3243-3dd4-4a8d-8c0d-dd76da1f02a5"/>
@@ -11271,6 +11434,15 @@
 </ct:contentTypeSchema>
 </file>
 
+<file path=customXml/item3.xml><?xml version="1.0" encoding="utf-8"?>
+<?mso-contentType ?>
+<FormTemplates xmlns="http://schemas.microsoft.com/sharepoint/v3/contenttype/forms">
+  <Display>DocumentLibraryForm</Display>
+  <Edit>DocumentLibraryForm</Edit>
+  <New>DocumentLibraryForm</New>
+</FormTemplates>
+</file>
+
 <file path=customXml/itemProps1.xml><?xml version="1.0" encoding="utf-8"?>
 <ds:datastoreItem xmlns:ds="http://schemas.openxmlformats.org/officeDocument/2006/customXml" ds:itemID="{137651BA-F45C-4845-9AB3-E0A65B39F5E1}">
   <ds:schemaRefs>
@@ -11289,14 +11461,6 @@
 </file>
 
 <file path=customXml/itemProps2.xml><?xml version="1.0" encoding="utf-8"?>
-<ds:datastoreItem xmlns:ds="http://schemas.openxmlformats.org/officeDocument/2006/customXml" ds:itemID="{CDB58277-F8DF-46FF-84EC-EF41B835E69F}">
-  <ds:schemaRefs>
-    <ds:schemaRef ds:uri="http://schemas.microsoft.com/sharepoint/v3/contenttype/forms"/>
-  </ds:schemaRefs>
-</ds:datastoreItem>
-</file>
-
-<file path=customXml/itemProps3.xml><?xml version="1.0" encoding="utf-8"?>
 <ds:datastoreItem xmlns:ds="http://schemas.openxmlformats.org/officeDocument/2006/customXml" ds:itemID="{2D276E62-80A3-44DD-9BCC-97ED2B99B57F}">
   <ds:schemaRefs>
     <ds:schemaRef ds:uri="http://schemas.microsoft.com/office/2006/metadata/contentType"/>
@@ -11313,4 +11477,12 @@
     <ds:schemaRef ds:uri="http://schemas.microsoft.com/internal/obd"/>
   </ds:schemaRefs>
 </ds:datastoreItem>
+</file>
+
+<file path=customXml/itemProps3.xml><?xml version="1.0" encoding="utf-8"?>
+<ds:datastoreItem xmlns:ds="http://schemas.openxmlformats.org/officeDocument/2006/customXml" ds:itemID="{CDB58277-F8DF-46FF-84EC-EF41B835E69F}">
+  <ds:schemaRefs>
+    <ds:schemaRef ds:uri="http://schemas.microsoft.com/sharepoint/v3/contenttype/forms"/>
+  </ds:schemaRefs>
+</ds:datastoreItem>
 </file>
</xml_diff>

<commit_message>
add slide for RStudio Cloud workspace
</commit_message>
<xml_diff>
--- a/Slides/Slides-01-Welcome_and_Orientation/Slides-01-Welcome_and_Orientation.pptx
+++ b/Slides/Slides-01-Welcome_and_Orientation/Slides-01-Welcome_and_Orientation.pptx
@@ -5,7 +5,7 @@
     <p:sldMasterId id="2147483673" r:id="rId4"/>
   </p:sldMasterIdLst>
   <p:notesMasterIdLst>
-    <p:notesMasterId r:id="rId25"/>
+    <p:notesMasterId r:id="rId26"/>
   </p:notesMasterIdLst>
   <p:sldIdLst>
     <p:sldId id="257" r:id="rId5"/>
@@ -18,16 +18,17 @@
     <p:sldId id="275" r:id="rId12"/>
     <p:sldId id="271" r:id="rId13"/>
     <p:sldId id="272" r:id="rId14"/>
-    <p:sldId id="276" r:id="rId15"/>
-    <p:sldId id="273" r:id="rId16"/>
-    <p:sldId id="274" r:id="rId17"/>
-    <p:sldId id="277" r:id="rId18"/>
-    <p:sldId id="278" r:id="rId19"/>
-    <p:sldId id="279" r:id="rId20"/>
-    <p:sldId id="282" r:id="rId21"/>
-    <p:sldId id="283" r:id="rId22"/>
-    <p:sldId id="280" r:id="rId23"/>
-    <p:sldId id="281" r:id="rId24"/>
+    <p:sldId id="284" r:id="rId15"/>
+    <p:sldId id="276" r:id="rId16"/>
+    <p:sldId id="273" r:id="rId17"/>
+    <p:sldId id="274" r:id="rId18"/>
+    <p:sldId id="277" r:id="rId19"/>
+    <p:sldId id="278" r:id="rId20"/>
+    <p:sldId id="279" r:id="rId21"/>
+    <p:sldId id="282" r:id="rId22"/>
+    <p:sldId id="283" r:id="rId23"/>
+    <p:sldId id="280" r:id="rId24"/>
+    <p:sldId id="281" r:id="rId25"/>
   </p:sldIdLst>
   <p:sldSz cx="12192000" cy="6858000"/>
   <p:notesSz cx="6858000" cy="9144000"/>
@@ -635,7 +636,7 @@
           <a:p>
             <a:fld id="{B9F26414-4BE6-427A-9F34-1430B41B92D6}" type="slidenum">
               <a:rPr lang="en-US" smtClean="0"/>
-              <a:t>13</a:t>
+              <a:t>14</a:t>
             </a:fld>
             <a:endParaRPr lang="en-US"/>
           </a:p>
@@ -731,7 +732,7 @@
           <a:p>
             <a:fld id="{B9F26414-4BE6-427A-9F34-1430B41B92D6}" type="slidenum">
               <a:rPr lang="en-US" smtClean="0"/>
-              <a:t>15</a:t>
+              <a:t>16</a:t>
             </a:fld>
             <a:endParaRPr lang="en-US"/>
           </a:p>
@@ -827,7 +828,7 @@
           <a:p>
             <a:fld id="{B9F26414-4BE6-427A-9F34-1430B41B92D6}" type="slidenum">
               <a:rPr lang="en-US" smtClean="0"/>
-              <a:t>16</a:t>
+              <a:t>17</a:t>
             </a:fld>
             <a:endParaRPr lang="en-US"/>
           </a:p>
@@ -985,7 +986,7 @@
           <a:p>
             <a:fld id="{B9F26414-4BE6-427A-9F34-1430B41B92D6}" type="slidenum">
               <a:rPr lang="en-US" smtClean="0"/>
-              <a:t>17</a:t>
+              <a:t>18</a:t>
             </a:fld>
             <a:endParaRPr lang="en-US"/>
           </a:p>
@@ -1081,7 +1082,7 @@
           <a:p>
             <a:fld id="{B9F26414-4BE6-427A-9F34-1430B41B92D6}" type="slidenum">
               <a:rPr lang="en-US" smtClean="0"/>
-              <a:t>18</a:t>
+              <a:t>19</a:t>
             </a:fld>
             <a:endParaRPr lang="en-US"/>
           </a:p>
@@ -1168,7 +1169,7 @@
           <a:p>
             <a:fld id="{B9F26414-4BE6-427A-9F34-1430B41B92D6}" type="slidenum">
               <a:rPr lang="en-US" smtClean="0"/>
-              <a:t>19</a:t>
+              <a:t>20</a:t>
             </a:fld>
             <a:endParaRPr lang="en-US"/>
           </a:p>
@@ -1291,7 +1292,7 @@
           <a:p>
             <a:fld id="{B9F26414-4BE6-427A-9F34-1430B41B92D6}" type="slidenum">
               <a:rPr lang="en-US" smtClean="0"/>
-              <a:t>20</a:t>
+              <a:t>21</a:t>
             </a:fld>
             <a:endParaRPr lang="en-US"/>
           </a:p>
@@ -5644,7 +5645,7 @@
             </a:r>
             <a:r>
               <a:rPr lang="en-US" sz="2400" dirty="0"/>
-              <a:t> folder contains exercises 2 types of exercises:</a:t>
+              <a:t> folder contains 2 types of exercises:</a:t>
             </a:r>
             <a:r>
               <a:rPr lang="en-US" sz="2400" dirty="0">
@@ -5770,7 +5771,7 @@
           <a:p>
             <a:r>
               <a:rPr lang="en-US" dirty="0"/>
-              <a:t>Slack Chat</a:t>
+              <a:t>R Studio Cloud workspace</a:t>
             </a:r>
           </a:p>
         </p:txBody>
@@ -5793,7 +5794,7 @@
         </p:nvSpPr>
         <p:spPr>
           <a:xfrm>
-            <a:off x="914400" y="2014194"/>
+            <a:off x="1066800" y="3034145"/>
             <a:ext cx="10363200" cy="789709"/>
           </a:xfrm>
         </p:spPr>
@@ -5806,41 +5807,36 @@
             </a:pPr>
             <a:r>
               <a:rPr lang="en-US" sz="3600" b="1" dirty="0"/>
-              <a:t>bit.ly/</a:t>
-            </a:r>
-            <a:r>
-              <a:rPr lang="en-US" sz="3600" b="1" dirty="0" err="1"/>
-              <a:t>cascadia_validation_slack</a:t>
-            </a:r>
-            <a:endParaRPr lang="en-US" sz="3600" b="1" dirty="0"/>
+              <a:t>R Package Validation Workshop</a:t>
+            </a:r>
           </a:p>
           <a:p>
             <a:pPr marL="274320" lvl="1" indent="0">
               <a:buNone/>
             </a:pPr>
-            <a:endParaRPr lang="en-US" sz="1400" dirty="0"/>
+            <a:endParaRPr lang="en-US" sz="1400" b="1" dirty="0"/>
           </a:p>
           <a:p>
             <a:pPr marL="822960" lvl="3" indent="0">
               <a:buNone/>
             </a:pPr>
-            <a:endParaRPr lang="en-US" sz="1800" dirty="0"/>
+            <a:endParaRPr lang="en-US" sz="1800" b="1" dirty="0"/>
           </a:p>
           <a:p>
             <a:pPr lvl="1"/>
-            <a:endParaRPr lang="en-US" dirty="0"/>
-          </a:p>
-          <a:p>
-            <a:endParaRPr lang="en-US" dirty="0"/>
+            <a:endParaRPr lang="en-US" b="1" dirty="0"/>
+          </a:p>
+          <a:p>
+            <a:endParaRPr lang="en-US" b="1" dirty="0"/>
           </a:p>
         </p:txBody>
       </p:sp>
       <p:sp>
         <p:nvSpPr>
-          <p:cNvPr id="4" name="TextBox 3">
+          <p:cNvPr id="5" name="TextBox 4">
             <a:extLst>
               <a:ext uri="{FF2B5EF4-FFF2-40B4-BE49-F238E27FC236}">
-                <a16:creationId xmlns:a16="http://schemas.microsoft.com/office/drawing/2014/main" id="{D59083DE-6E1A-4132-A4C8-A18D53074B76}"/>
+                <a16:creationId xmlns:a16="http://schemas.microsoft.com/office/drawing/2014/main" id="{2B0E1A9C-DED3-4FD3-978C-825945879A48}"/>
               </a:ext>
             </a:extLst>
           </p:cNvPr>
@@ -5849,8 +5845,8 @@
         </p:nvSpPr>
         <p:spPr>
           <a:xfrm>
-            <a:off x="1337734" y="3266119"/>
-            <a:ext cx="9787466" cy="3693319"/>
+            <a:off x="1066800" y="3770806"/>
+            <a:ext cx="9867207" cy="954107"/>
           </a:xfrm>
           <a:prstGeom prst="rect">
             <a:avLst/>
@@ -5863,133 +5859,52 @@
           </a:bodyPr>
           <a:lstStyle/>
           <a:p>
-            <a:pPr marL="625475" lvl="2" indent="-342900">
-              <a:buFontTx/>
-              <a:buChar char="-"/>
-            </a:pPr>
-            <a:r>
-              <a:rPr lang="en-US" sz="2400" dirty="0">
-                <a:solidFill>
-                  <a:schemeClr val="accent2"/>
-                </a:solidFill>
-              </a:rPr>
-              <a:t>Polls to understand where the everyone is on the examples</a:t>
-            </a:r>
-          </a:p>
-          <a:p>
-            <a:pPr marL="625475" lvl="2" indent="-342900">
-              <a:buFontTx/>
-              <a:buChar char="-"/>
-            </a:pPr>
-            <a:endParaRPr lang="en-US" sz="2400" dirty="0">
-              <a:solidFill>
-                <a:schemeClr val="accent2"/>
-              </a:solidFill>
-            </a:endParaRPr>
-          </a:p>
-          <a:p>
-            <a:pPr marL="625475" lvl="2" indent="-342900">
-              <a:buFontTx/>
-              <a:buChar char="-"/>
-            </a:pPr>
-            <a:r>
-              <a:rPr lang="en-US" sz="2400" dirty="0">
-                <a:solidFill>
-                  <a:schemeClr val="accent2"/>
-                </a:solidFill>
-              </a:rPr>
-              <a:t>Pose questions for the instructors to answer</a:t>
-            </a:r>
-          </a:p>
-          <a:p>
-            <a:pPr marL="1082675" lvl="3" indent="-342900">
-              <a:buFontTx/>
-              <a:buChar char="-"/>
-            </a:pPr>
-            <a:r>
-              <a:rPr lang="en-US" dirty="0">
-                <a:solidFill>
-                  <a:schemeClr val="accent2"/>
-                </a:solidFill>
-              </a:rPr>
-              <a:t>Alternatively, directly message one of the instructors</a:t>
-            </a:r>
-            <a:endParaRPr lang="en-US" dirty="0">
-              <a:solidFill>
-                <a:schemeClr val="accent4">
-                  <a:lumMod val="75000"/>
-                </a:schemeClr>
-              </a:solidFill>
-            </a:endParaRPr>
-          </a:p>
-          <a:p>
-            <a:pPr marL="282575" lvl="2"/>
-            <a:endParaRPr lang="en-US" sz="2400" dirty="0">
-              <a:solidFill>
-                <a:schemeClr val="accent2"/>
-              </a:solidFill>
-            </a:endParaRPr>
-          </a:p>
-          <a:p>
-            <a:pPr marL="625475" lvl="2" indent="-342900">
-              <a:buFontTx/>
-              <a:buChar char="-"/>
-            </a:pPr>
-            <a:r>
-              <a:rPr lang="en-US" sz="2400" dirty="0">
-                <a:solidFill>
-                  <a:schemeClr val="accent2"/>
-                </a:solidFill>
-              </a:rPr>
-              <a:t>Pose questions to the rest of the class</a:t>
-            </a:r>
-          </a:p>
-          <a:p>
-            <a:pPr marL="625475" lvl="2" indent="-342900">
-              <a:buFontTx/>
-              <a:buChar char="-"/>
-            </a:pPr>
-            <a:endParaRPr lang="en-US" sz="2400" dirty="0">
-              <a:solidFill>
-                <a:schemeClr val="accent2"/>
-              </a:solidFill>
-            </a:endParaRPr>
-          </a:p>
-          <a:p>
-            <a:pPr marL="625475" lvl="2" indent="-342900">
-              <a:buFontTx/>
-              <a:buChar char="-"/>
-            </a:pPr>
-            <a:r>
-              <a:rPr lang="en-US" sz="2400" dirty="0">
-                <a:solidFill>
-                  <a:srgbClr val="002060"/>
-                </a:solidFill>
-              </a:rPr>
-              <a:t>Zoom Chat has been disabled</a:t>
-            </a:r>
-          </a:p>
-          <a:p>
-            <a:pPr marL="625475" lvl="2" indent="-342900">
-              <a:buFontTx/>
-              <a:buChar char="-"/>
-            </a:pPr>
-            <a:endParaRPr lang="en-US" sz="2400" dirty="0">
-              <a:solidFill>
-                <a:schemeClr val="accent2"/>
-              </a:solidFill>
-            </a:endParaRPr>
-          </a:p>
-          <a:p>
             <a:pPr algn="ctr"/>
-            <a:endParaRPr lang="en-US" sz="2400" dirty="0"/>
+            <a:r>
+              <a:rPr lang="en-US" sz="2800" dirty="0"/>
+              <a:t>Please check your email for invites!</a:t>
+            </a:r>
+          </a:p>
+          <a:p>
+            <a:pPr algn="ctr"/>
+            <a:endParaRPr lang="en-US" sz="2800" dirty="0"/>
           </a:p>
         </p:txBody>
       </p:sp>
+      <p:pic>
+        <p:nvPicPr>
+          <p:cNvPr id="7" name="Picture 6" descr="Graphical user interface, text&#10;&#10;Description automatically generated">
+            <a:extLst>
+              <a:ext uri="{FF2B5EF4-FFF2-40B4-BE49-F238E27FC236}">
+                <a16:creationId xmlns:a16="http://schemas.microsoft.com/office/drawing/2014/main" id="{D8A3034C-41BD-4820-B9F6-D84867DB66F9}"/>
+              </a:ext>
+            </a:extLst>
+          </p:cNvPr>
+          <p:cNvPicPr>
+            <a:picLocks noChangeAspect="1"/>
+          </p:cNvPicPr>
+          <p:nvPr/>
+        </p:nvPicPr>
+        <p:blipFill>
+          <a:blip r:embed="rId2"/>
+          <a:stretch>
+            <a:fillRect/>
+          </a:stretch>
+        </p:blipFill>
+        <p:spPr>
+          <a:xfrm>
+            <a:off x="9976744" y="5682414"/>
+            <a:ext cx="1914525" cy="666750"/>
+          </a:xfrm>
+          <a:prstGeom prst="rect">
+            <a:avLst/>
+          </a:prstGeom>
+        </p:spPr>
+      </p:pic>
     </p:spTree>
     <p:extLst>
       <p:ext uri="{BB962C8B-B14F-4D97-AF65-F5344CB8AC3E}">
-        <p14:creationId xmlns:p14="http://schemas.microsoft.com/office/powerpoint/2010/main" val="1490375809"/>
+        <p14:creationId xmlns:p14="http://schemas.microsoft.com/office/powerpoint/2010/main" val="4286147586"/>
       </p:ext>
     </p:extLst>
   </p:cSld>
@@ -6021,6 +5936,275 @@
           <p:cNvPr id="2" name="Title 1">
             <a:extLst>
               <a:ext uri="{FF2B5EF4-FFF2-40B4-BE49-F238E27FC236}">
+                <a16:creationId xmlns:a16="http://schemas.microsoft.com/office/drawing/2014/main" id="{4DA197EC-75CE-4967-B49A-620F6D94CA9D}"/>
+              </a:ext>
+            </a:extLst>
+          </p:cNvPr>
+          <p:cNvSpPr>
+            <a:spLocks noGrp="1"/>
+          </p:cNvSpPr>
+          <p:nvPr>
+            <p:ph type="title"/>
+          </p:nvPr>
+        </p:nvSpPr>
+        <p:spPr/>
+        <p:txBody>
+          <a:bodyPr/>
+          <a:lstStyle/>
+          <a:p>
+            <a:r>
+              <a:rPr lang="en-US" dirty="0"/>
+              <a:t>Slack Chat</a:t>
+            </a:r>
+          </a:p>
+        </p:txBody>
+      </p:sp>
+      <p:sp>
+        <p:nvSpPr>
+          <p:cNvPr id="3" name="Content Placeholder 2">
+            <a:extLst>
+              <a:ext uri="{FF2B5EF4-FFF2-40B4-BE49-F238E27FC236}">
+                <a16:creationId xmlns:a16="http://schemas.microsoft.com/office/drawing/2014/main" id="{8AB0FEEC-3BEF-46E7-912B-C736F42B180B}"/>
+              </a:ext>
+            </a:extLst>
+          </p:cNvPr>
+          <p:cNvSpPr>
+            <a:spLocks noGrp="1"/>
+          </p:cNvSpPr>
+          <p:nvPr>
+            <p:ph sz="half" idx="1"/>
+          </p:nvPr>
+        </p:nvSpPr>
+        <p:spPr>
+          <a:xfrm>
+            <a:off x="914400" y="2014194"/>
+            <a:ext cx="10363200" cy="789709"/>
+          </a:xfrm>
+        </p:spPr>
+        <p:txBody>
+          <a:bodyPr/>
+          <a:lstStyle/>
+          <a:p>
+            <a:pPr marL="0" indent="0" algn="ctr">
+              <a:buNone/>
+            </a:pPr>
+            <a:r>
+              <a:rPr lang="en-US" sz="3600" b="1" dirty="0"/>
+              <a:t>bit.ly/</a:t>
+            </a:r>
+            <a:r>
+              <a:rPr lang="en-US" sz="3600" b="1" dirty="0" err="1"/>
+              <a:t>cascadia_validation_slack</a:t>
+            </a:r>
+            <a:endParaRPr lang="en-US" sz="3600" b="1" dirty="0"/>
+          </a:p>
+          <a:p>
+            <a:pPr marL="274320" lvl="1" indent="0">
+              <a:buNone/>
+            </a:pPr>
+            <a:endParaRPr lang="en-US" sz="1400" dirty="0"/>
+          </a:p>
+          <a:p>
+            <a:pPr marL="822960" lvl="3" indent="0">
+              <a:buNone/>
+            </a:pPr>
+            <a:endParaRPr lang="en-US" sz="1800" dirty="0"/>
+          </a:p>
+          <a:p>
+            <a:pPr lvl="1"/>
+            <a:endParaRPr lang="en-US" dirty="0"/>
+          </a:p>
+          <a:p>
+            <a:endParaRPr lang="en-US" dirty="0"/>
+          </a:p>
+        </p:txBody>
+      </p:sp>
+      <p:sp>
+        <p:nvSpPr>
+          <p:cNvPr id="4" name="TextBox 3">
+            <a:extLst>
+              <a:ext uri="{FF2B5EF4-FFF2-40B4-BE49-F238E27FC236}">
+                <a16:creationId xmlns:a16="http://schemas.microsoft.com/office/drawing/2014/main" id="{D59083DE-6E1A-4132-A4C8-A18D53074B76}"/>
+              </a:ext>
+            </a:extLst>
+          </p:cNvPr>
+          <p:cNvSpPr txBox="1"/>
+          <p:nvPr/>
+        </p:nvSpPr>
+        <p:spPr>
+          <a:xfrm>
+            <a:off x="1337734" y="3266119"/>
+            <a:ext cx="9787466" cy="3693319"/>
+          </a:xfrm>
+          <a:prstGeom prst="rect">
+            <a:avLst/>
+          </a:prstGeom>
+          <a:noFill/>
+        </p:spPr>
+        <p:txBody>
+          <a:bodyPr wrap="square" rtlCol="0">
+            <a:spAutoFit/>
+          </a:bodyPr>
+          <a:lstStyle/>
+          <a:p>
+            <a:pPr marL="625475" lvl="2" indent="-342900">
+              <a:buFontTx/>
+              <a:buChar char="-"/>
+            </a:pPr>
+            <a:r>
+              <a:rPr lang="en-US" sz="2400" dirty="0">
+                <a:solidFill>
+                  <a:schemeClr val="accent2"/>
+                </a:solidFill>
+              </a:rPr>
+              <a:t>Polls to understand where the everyone is on the examples</a:t>
+            </a:r>
+          </a:p>
+          <a:p>
+            <a:pPr marL="625475" lvl="2" indent="-342900">
+              <a:buFontTx/>
+              <a:buChar char="-"/>
+            </a:pPr>
+            <a:endParaRPr lang="en-US" sz="2400" dirty="0">
+              <a:solidFill>
+                <a:schemeClr val="accent2"/>
+              </a:solidFill>
+            </a:endParaRPr>
+          </a:p>
+          <a:p>
+            <a:pPr marL="625475" lvl="2" indent="-342900">
+              <a:buFontTx/>
+              <a:buChar char="-"/>
+            </a:pPr>
+            <a:r>
+              <a:rPr lang="en-US" sz="2400" dirty="0">
+                <a:solidFill>
+                  <a:schemeClr val="accent2"/>
+                </a:solidFill>
+              </a:rPr>
+              <a:t>Pose questions for the instructors to answer</a:t>
+            </a:r>
+          </a:p>
+          <a:p>
+            <a:pPr marL="1082675" lvl="3" indent="-342900">
+              <a:buFontTx/>
+              <a:buChar char="-"/>
+            </a:pPr>
+            <a:r>
+              <a:rPr lang="en-US" dirty="0">
+                <a:solidFill>
+                  <a:schemeClr val="accent2"/>
+                </a:solidFill>
+              </a:rPr>
+              <a:t>Alternatively, directly message one of the instructors</a:t>
+            </a:r>
+            <a:endParaRPr lang="en-US" dirty="0">
+              <a:solidFill>
+                <a:schemeClr val="accent4">
+                  <a:lumMod val="75000"/>
+                </a:schemeClr>
+              </a:solidFill>
+            </a:endParaRPr>
+          </a:p>
+          <a:p>
+            <a:pPr marL="282575" lvl="2"/>
+            <a:endParaRPr lang="en-US" sz="2400" dirty="0">
+              <a:solidFill>
+                <a:schemeClr val="accent2"/>
+              </a:solidFill>
+            </a:endParaRPr>
+          </a:p>
+          <a:p>
+            <a:pPr marL="625475" lvl="2" indent="-342900">
+              <a:buFontTx/>
+              <a:buChar char="-"/>
+            </a:pPr>
+            <a:r>
+              <a:rPr lang="en-US" sz="2400" dirty="0">
+                <a:solidFill>
+                  <a:schemeClr val="accent2"/>
+                </a:solidFill>
+              </a:rPr>
+              <a:t>Pose questions to the rest of the class</a:t>
+            </a:r>
+          </a:p>
+          <a:p>
+            <a:pPr marL="625475" lvl="2" indent="-342900">
+              <a:buFontTx/>
+              <a:buChar char="-"/>
+            </a:pPr>
+            <a:endParaRPr lang="en-US" sz="2400" dirty="0">
+              <a:solidFill>
+                <a:schemeClr val="accent2"/>
+              </a:solidFill>
+            </a:endParaRPr>
+          </a:p>
+          <a:p>
+            <a:pPr marL="625475" lvl="2" indent="-342900">
+              <a:buFontTx/>
+              <a:buChar char="-"/>
+            </a:pPr>
+            <a:r>
+              <a:rPr lang="en-US" sz="2400" dirty="0">
+                <a:solidFill>
+                  <a:srgbClr val="002060"/>
+                </a:solidFill>
+              </a:rPr>
+              <a:t>Zoom Chat has been disabled</a:t>
+            </a:r>
+          </a:p>
+          <a:p>
+            <a:pPr marL="625475" lvl="2" indent="-342900">
+              <a:buFontTx/>
+              <a:buChar char="-"/>
+            </a:pPr>
+            <a:endParaRPr lang="en-US" sz="2400" dirty="0">
+              <a:solidFill>
+                <a:schemeClr val="accent2"/>
+              </a:solidFill>
+            </a:endParaRPr>
+          </a:p>
+          <a:p>
+            <a:pPr algn="ctr"/>
+            <a:endParaRPr lang="en-US" sz="2400" dirty="0"/>
+          </a:p>
+        </p:txBody>
+      </p:sp>
+    </p:spTree>
+    <p:extLst>
+      <p:ext uri="{BB962C8B-B14F-4D97-AF65-F5344CB8AC3E}">
+        <p14:creationId xmlns:p14="http://schemas.microsoft.com/office/powerpoint/2010/main" val="1490375809"/>
+      </p:ext>
+    </p:extLst>
+  </p:cSld>
+  <p:clrMapOvr>
+    <a:masterClrMapping/>
+  </p:clrMapOvr>
+</p:sld>
+</file>
+
+<file path=ppt/slides/slide13.xml><?xml version="1.0" encoding="utf-8"?>
+<p:sld xmlns:a="http://schemas.openxmlformats.org/drawingml/2006/main" xmlns:r="http://schemas.openxmlformats.org/officeDocument/2006/relationships" xmlns:p="http://schemas.openxmlformats.org/presentationml/2006/main">
+  <p:cSld>
+    <p:spTree>
+      <p:nvGrpSpPr>
+        <p:cNvPr id="1" name=""/>
+        <p:cNvGrpSpPr/>
+        <p:nvPr/>
+      </p:nvGrpSpPr>
+      <p:grpSpPr>
+        <a:xfrm>
+          <a:off x="0" y="0"/>
+          <a:ext cx="0" cy="0"/>
+          <a:chOff x="0" y="0"/>
+          <a:chExt cx="0" cy="0"/>
+        </a:xfrm>
+      </p:grpSpPr>
+      <p:sp>
+        <p:nvSpPr>
+          <p:cNvPr id="2" name="Title 1">
+            <a:extLst>
+              <a:ext uri="{FF2B5EF4-FFF2-40B4-BE49-F238E27FC236}">
                 <a16:creationId xmlns:a16="http://schemas.microsoft.com/office/drawing/2014/main" id="{7614332B-4F24-42F4-A704-A6F1183E9470}"/>
               </a:ext>
             </a:extLst>
@@ -6057,7 +6241,7 @@
 </p:sld>
 </file>
 
-<file path=ppt/slides/slide13.xml><?xml version="1.0" encoding="utf-8"?>
+<file path=ppt/slides/slide14.xml><?xml version="1.0" encoding="utf-8"?>
 <p:sld xmlns:a="http://schemas.openxmlformats.org/drawingml/2006/main" xmlns:r="http://schemas.openxmlformats.org/officeDocument/2006/relationships" xmlns:p="http://schemas.openxmlformats.org/presentationml/2006/main">
   <p:cSld>
     <p:spTree>
@@ -8428,7 +8612,7 @@
 </p:sld>
 </file>
 
-<file path=ppt/slides/slide14.xml><?xml version="1.0" encoding="utf-8"?>
+<file path=ppt/slides/slide15.xml><?xml version="1.0" encoding="utf-8"?>
 <p:sld xmlns:a="http://schemas.openxmlformats.org/drawingml/2006/main" xmlns:r="http://schemas.openxmlformats.org/officeDocument/2006/relationships" xmlns:p="http://schemas.openxmlformats.org/presentationml/2006/main">
   <p:cSld>
     <p:spTree>
@@ -8486,7 +8670,7 @@
 </p:sld>
 </file>
 
-<file path=ppt/slides/slide15.xml><?xml version="1.0" encoding="utf-8"?>
+<file path=ppt/slides/slide16.xml><?xml version="1.0" encoding="utf-8"?>
 <p:sld xmlns:a="http://schemas.openxmlformats.org/drawingml/2006/main" xmlns:r="http://schemas.openxmlformats.org/officeDocument/2006/relationships" xmlns:p="http://schemas.openxmlformats.org/presentationml/2006/main">
   <p:cSld>
     <p:spTree>
@@ -8579,72 +8763,6 @@
 </p:sld>
 </file>
 
-<file path=ppt/slides/slide16.xml><?xml version="1.0" encoding="utf-8"?>
-<p:sld xmlns:a="http://schemas.openxmlformats.org/drawingml/2006/main" xmlns:r="http://schemas.openxmlformats.org/officeDocument/2006/relationships" xmlns:p="http://schemas.openxmlformats.org/presentationml/2006/main">
-  <p:cSld>
-    <p:spTree>
-      <p:nvGrpSpPr>
-        <p:cNvPr id="1" name=""/>
-        <p:cNvGrpSpPr/>
-        <p:nvPr/>
-      </p:nvGrpSpPr>
-      <p:grpSpPr>
-        <a:xfrm>
-          <a:off x="0" y="0"/>
-          <a:ext cx="0" cy="0"/>
-          <a:chOff x="0" y="0"/>
-          <a:chExt cx="0" cy="0"/>
-        </a:xfrm>
-      </p:grpSpPr>
-      <p:sp>
-        <p:nvSpPr>
-          <p:cNvPr id="2" name="Title 1">
-            <a:extLst>
-              <a:ext uri="{FF2B5EF4-FFF2-40B4-BE49-F238E27FC236}">
-                <a16:creationId xmlns:a16="http://schemas.microsoft.com/office/drawing/2014/main" id="{85099D8A-7BF6-4A5A-ACD4-C59D23E4D745}"/>
-              </a:ext>
-            </a:extLst>
-          </p:cNvPr>
-          <p:cNvSpPr>
-            <a:spLocks noGrp="1"/>
-          </p:cNvSpPr>
-          <p:nvPr>
-            <p:ph type="title"/>
-          </p:nvPr>
-        </p:nvSpPr>
-        <p:spPr>
-          <a:xfrm>
-            <a:off x="1066800" y="2454764"/>
-            <a:ext cx="10058400" cy="2025792"/>
-          </a:xfrm>
-        </p:spPr>
-        <p:txBody>
-          <a:bodyPr>
-            <a:normAutofit/>
-          </a:bodyPr>
-          <a:lstStyle/>
-          <a:p>
-            <a:pPr algn="ctr"/>
-            <a:r>
-              <a:rPr lang="en-US" sz="5400" dirty="0"/>
-              <a:t>What if this is too basic?!</a:t>
-            </a:r>
-          </a:p>
-        </p:txBody>
-      </p:sp>
-    </p:spTree>
-    <p:extLst>
-      <p:ext uri="{BB962C8B-B14F-4D97-AF65-F5344CB8AC3E}">
-        <p14:creationId xmlns:p14="http://schemas.microsoft.com/office/powerpoint/2010/main" val="2605250684"/>
-      </p:ext>
-    </p:extLst>
-  </p:cSld>
-  <p:clrMapOvr>
-    <a:masterClrMapping/>
-  </p:clrMapOvr>
-</p:sld>
-</file>
-
 <file path=ppt/slides/slide17.xml><?xml version="1.0" encoding="utf-8"?>
 <p:sld xmlns:a="http://schemas.openxmlformats.org/drawingml/2006/main" xmlns:r="http://schemas.openxmlformats.org/officeDocument/2006/relationships" xmlns:p="http://schemas.openxmlformats.org/presentationml/2006/main">
   <p:cSld>
@@ -8693,7 +8811,7 @@
             <a:pPr algn="ctr"/>
             <a:r>
               <a:rPr lang="en-US" sz="5400" dirty="0"/>
-              <a:t>What if I find an issue in the documentation?</a:t>
+              <a:t>What if this is too basic?!</a:t>
             </a:r>
           </a:p>
         </p:txBody>
@@ -8701,7 +8819,7 @@
     </p:spTree>
     <p:extLst>
       <p:ext uri="{BB962C8B-B14F-4D97-AF65-F5344CB8AC3E}">
-        <p14:creationId xmlns:p14="http://schemas.microsoft.com/office/powerpoint/2010/main" val="51954009"/>
+        <p14:creationId xmlns:p14="http://schemas.microsoft.com/office/powerpoint/2010/main" val="2605250684"/>
       </p:ext>
     </p:extLst>
   </p:cSld>
@@ -8759,7 +8877,7 @@
             <a:pPr algn="ctr"/>
             <a:r>
               <a:rPr lang="en-US" sz="5400" dirty="0"/>
-              <a:t>What if I get stuck?</a:t>
+              <a:t>What if I find an issue in the documentation?</a:t>
             </a:r>
           </a:p>
         </p:txBody>
@@ -8767,7 +8885,7 @@
     </p:spTree>
     <p:extLst>
       <p:ext uri="{BB962C8B-B14F-4D97-AF65-F5344CB8AC3E}">
-        <p14:creationId xmlns:p14="http://schemas.microsoft.com/office/powerpoint/2010/main" val="190418656"/>
+        <p14:creationId xmlns:p14="http://schemas.microsoft.com/office/powerpoint/2010/main" val="51954009"/>
       </p:ext>
     </p:extLst>
   </p:cSld>
@@ -8818,14 +8936,14 @@
         </p:spPr>
         <p:txBody>
           <a:bodyPr>
-            <a:normAutofit fontScale="90000"/>
+            <a:normAutofit/>
           </a:bodyPr>
           <a:lstStyle/>
           <a:p>
             <a:pPr algn="ctr"/>
             <a:r>
               <a:rPr lang="en-US" sz="5400" dirty="0"/>
-              <a:t>What if we are in the middle of a pandemic, there are killer bees, and ...!?</a:t>
+              <a:t>What if I get stuck?</a:t>
             </a:r>
           </a:p>
         </p:txBody>
@@ -8833,7 +8951,7 @@
     </p:spTree>
     <p:extLst>
       <p:ext uri="{BB962C8B-B14F-4D97-AF65-F5344CB8AC3E}">
-        <p14:creationId xmlns:p14="http://schemas.microsoft.com/office/powerpoint/2010/main" val="251002931"/>
+        <p14:creationId xmlns:p14="http://schemas.microsoft.com/office/powerpoint/2010/main" val="190418656"/>
       </p:ext>
     </p:extLst>
   </p:cSld>
@@ -8977,6 +9095,72 @@
           <p:cNvPr id="2" name="Title 1">
             <a:extLst>
               <a:ext uri="{FF2B5EF4-FFF2-40B4-BE49-F238E27FC236}">
+                <a16:creationId xmlns:a16="http://schemas.microsoft.com/office/drawing/2014/main" id="{85099D8A-7BF6-4A5A-ACD4-C59D23E4D745}"/>
+              </a:ext>
+            </a:extLst>
+          </p:cNvPr>
+          <p:cNvSpPr>
+            <a:spLocks noGrp="1"/>
+          </p:cNvSpPr>
+          <p:nvPr>
+            <p:ph type="title"/>
+          </p:nvPr>
+        </p:nvSpPr>
+        <p:spPr>
+          <a:xfrm>
+            <a:off x="1066800" y="2454764"/>
+            <a:ext cx="10058400" cy="2025792"/>
+          </a:xfrm>
+        </p:spPr>
+        <p:txBody>
+          <a:bodyPr>
+            <a:normAutofit fontScale="90000"/>
+          </a:bodyPr>
+          <a:lstStyle/>
+          <a:p>
+            <a:pPr algn="ctr"/>
+            <a:r>
+              <a:rPr lang="en-US" sz="5400" dirty="0"/>
+              <a:t>What if we are in the middle of a pandemic, there are killer bees, and ...!?</a:t>
+            </a:r>
+          </a:p>
+        </p:txBody>
+      </p:sp>
+    </p:spTree>
+    <p:extLst>
+      <p:ext uri="{BB962C8B-B14F-4D97-AF65-F5344CB8AC3E}">
+        <p14:creationId xmlns:p14="http://schemas.microsoft.com/office/powerpoint/2010/main" val="251002931"/>
+      </p:ext>
+    </p:extLst>
+  </p:cSld>
+  <p:clrMapOvr>
+    <a:masterClrMapping/>
+  </p:clrMapOvr>
+</p:sld>
+</file>
+
+<file path=ppt/slides/slide21.xml><?xml version="1.0" encoding="utf-8"?>
+<p:sld xmlns:a="http://schemas.openxmlformats.org/drawingml/2006/main" xmlns:r="http://schemas.openxmlformats.org/officeDocument/2006/relationships" xmlns:p="http://schemas.openxmlformats.org/presentationml/2006/main">
+  <p:cSld>
+    <p:spTree>
+      <p:nvGrpSpPr>
+        <p:cNvPr id="1" name=""/>
+        <p:cNvGrpSpPr/>
+        <p:nvPr/>
+      </p:nvGrpSpPr>
+      <p:grpSpPr>
+        <a:xfrm>
+          <a:off x="0" y="0"/>
+          <a:ext cx="0" cy="0"/>
+          <a:chOff x="0" y="0"/>
+          <a:chExt cx="0" cy="0"/>
+        </a:xfrm>
+      </p:grpSpPr>
+      <p:sp>
+        <p:nvSpPr>
+          <p:cNvPr id="2" name="Title 1">
+            <a:extLst>
+              <a:ext uri="{FF2B5EF4-FFF2-40B4-BE49-F238E27FC236}">
                 <a16:creationId xmlns:a16="http://schemas.microsoft.com/office/drawing/2014/main" id="{7614332B-4F24-42F4-A704-A6F1183E9470}"/>
               </a:ext>
             </a:extLst>
@@ -8988,7 +9172,12 @@
             <p:ph type="ctrTitle"/>
           </p:nvPr>
         </p:nvSpPr>
-        <p:spPr/>
+        <p:spPr>
+          <a:xfrm>
+            <a:off x="1629102" y="1847788"/>
+            <a:ext cx="8933796" cy="2437232"/>
+          </a:xfrm>
+        </p:spPr>
         <p:txBody>
           <a:bodyPr/>
           <a:lstStyle/>
@@ -9021,8 +9210,8 @@
         </p:nvSpPr>
         <p:spPr>
           <a:xfrm>
-            <a:off x="1443319" y="5069105"/>
-            <a:ext cx="9305364" cy="369332"/>
+            <a:off x="1443318" y="4022357"/>
+            <a:ext cx="9305364" cy="923330"/>
           </a:xfrm>
           <a:prstGeom prst="rect">
             <a:avLst/>
@@ -9037,7 +9226,25 @@
             <a:pPr algn="ctr"/>
             <a:r>
               <a:rPr lang="en-US" dirty="0"/>
-              <a:t>Clone https://github.com/FredHutch/R_Package_Validation_Tutorial</a:t>
+              <a:t>Clone </a:t>
+            </a:r>
+            <a:r>
+              <a:rPr lang="en-US" dirty="0">
+                <a:hlinkClick r:id="rId3"/>
+              </a:rPr>
+              <a:t>https://github.com/FredHutch/R_Package_Validation_Tutorial</a:t>
+            </a:r>
+            <a:endParaRPr lang="en-US" dirty="0"/>
+          </a:p>
+          <a:p>
+            <a:pPr algn="ctr"/>
+            <a:endParaRPr lang="en-US" dirty="0"/>
+          </a:p>
+          <a:p>
+            <a:pPr algn="ctr"/>
+            <a:r>
+              <a:rPr lang="en-US" dirty="0"/>
+              <a:t>OR view “R Package Validation Workshop” project space in RStudio Cloud</a:t>
             </a:r>
           </a:p>
         </p:txBody>
@@ -11202,15 +11409,6 @@
 </file>
 
 <file path=customXml/item1.xml><?xml version="1.0" encoding="utf-8"?>
-<?mso-contentType ?>
-<FormTemplates xmlns="http://schemas.microsoft.com/sharepoint/v3/contenttype/forms">
-  <Display>DocumentLibraryForm</Display>
-  <Edit>DocumentLibraryForm</Edit>
-  <New>DocumentLibraryForm</New>
-</FormTemplates>
-</file>
-
-<file path=customXml/item2.xml><?xml version="1.0" encoding="utf-8"?>
 <ct:contentTypeSchema xmlns:ct="http://schemas.microsoft.com/office/2006/metadata/contentType" xmlns:ma="http://schemas.microsoft.com/office/2006/metadata/properties/metaAttributes" ct:_="" ma:_="" ma:contentTypeName="Document" ma:contentTypeID="0x01010079F111ED35F8CC479449609E8A0923A6" ma:contentTypeVersion="12" ma:contentTypeDescription="Create a new document." ma:contentTypeScope="" ma:versionID="a410dd7f93c95333ffa1b60ed6adedd1">
   <xsd:schema xmlns:xsd="http://www.w3.org/2001/XMLSchema" xmlns:xs="http://www.w3.org/2001/XMLSchema" xmlns:p="http://schemas.microsoft.com/office/2006/metadata/properties" xmlns:ns2="71af3243-3dd4-4a8d-8c0d-dd76da1f02a5" xmlns:ns3="16c05727-aa75-4e4a-9b5f-8a80a1165891" targetNamespace="http://schemas.microsoft.com/office/2006/metadata/properties" ma:root="true" ma:fieldsID="a936d9baba76aa3866493feff160faab" ns2:_="" ns3:_="">
     <xsd:import namespace="71af3243-3dd4-4a8d-8c0d-dd76da1f02a5"/>
@@ -11431,6 +11629,15 @@
 </ct:contentTypeSchema>
 </file>
 
+<file path=customXml/item2.xml><?xml version="1.0" encoding="utf-8"?>
+<?mso-contentType ?>
+<FormTemplates xmlns="http://schemas.microsoft.com/sharepoint/v3/contenttype/forms">
+  <Display>DocumentLibraryForm</Display>
+  <Edit>DocumentLibraryForm</Edit>
+  <New>DocumentLibraryForm</New>
+</FormTemplates>
+</file>
+
 <file path=customXml/item3.xml><?xml version="1.0" encoding="utf-8"?>
 <p:properties xmlns:p="http://schemas.microsoft.com/office/2006/metadata/properties" xmlns:xsi="http://www.w3.org/2001/XMLSchema-instance" xmlns:pc="http://schemas.microsoft.com/office/infopath/2007/PartnerControls">
   <documentManagement>
@@ -11441,14 +11648,6 @@
 </file>
 
 <file path=customXml/itemProps1.xml><?xml version="1.0" encoding="utf-8"?>
-<ds:datastoreItem xmlns:ds="http://schemas.openxmlformats.org/officeDocument/2006/customXml" ds:itemID="{CDB58277-F8DF-46FF-84EC-EF41B835E69F}">
-  <ds:schemaRefs>
-    <ds:schemaRef ds:uri="http://schemas.microsoft.com/sharepoint/v3/contenttype/forms"/>
-  </ds:schemaRefs>
-</ds:datastoreItem>
-</file>
-
-<file path=customXml/itemProps2.xml><?xml version="1.0" encoding="utf-8"?>
 <ds:datastoreItem xmlns:ds="http://schemas.openxmlformats.org/officeDocument/2006/customXml" ds:itemID="{2D276E62-80A3-44DD-9BCC-97ED2B99B57F}">
   <ds:schemaRefs>
     <ds:schemaRef ds:uri="http://schemas.microsoft.com/office/2006/metadata/contentType"/>
@@ -11463,6 +11662,14 @@
     <ds:schemaRef ds:uri="http://purl.org/dc/elements/1.1/"/>
     <ds:schemaRef ds:uri="http://purl.org/dc/terms/"/>
     <ds:schemaRef ds:uri="http://schemas.microsoft.com/internal/obd"/>
+  </ds:schemaRefs>
+</ds:datastoreItem>
+</file>
+
+<file path=customXml/itemProps2.xml><?xml version="1.0" encoding="utf-8"?>
+<ds:datastoreItem xmlns:ds="http://schemas.openxmlformats.org/officeDocument/2006/customXml" ds:itemID="{CDB58277-F8DF-46FF-84EC-EF41B835E69F}">
+  <ds:schemaRefs>
+    <ds:schemaRef ds:uri="http://schemas.microsoft.com/sharepoint/v3/contenttype/forms"/>
   </ds:schemaRefs>
 </ds:datastoreItem>
 </file>

</xml_diff>

<commit_message>
Fixes identified during workshop
</commit_message>
<xml_diff>
--- a/Slides/Slides-01-Welcome_and_Orientation/Slides-01-Welcome_and_Orientation.pptx
+++ b/Slides/Slides-01-Welcome_and_Orientation/Slides-01-Welcome_and_Orientation.pptx
@@ -5,28 +5,29 @@
     <p:sldMasterId id="2147483673" r:id="rId4"/>
   </p:sldMasterIdLst>
   <p:notesMasterIdLst>
-    <p:notesMasterId r:id="rId24"/>
+    <p:notesMasterId r:id="rId25"/>
   </p:notesMasterIdLst>
   <p:sldIdLst>
     <p:sldId id="257" r:id="rId5"/>
     <p:sldId id="262" r:id="rId6"/>
     <p:sldId id="263" r:id="rId7"/>
     <p:sldId id="265" r:id="rId8"/>
-    <p:sldId id="268" r:id="rId9"/>
-    <p:sldId id="270" r:id="rId10"/>
-    <p:sldId id="285" r:id="rId11"/>
-    <p:sldId id="286" r:id="rId12"/>
-    <p:sldId id="271" r:id="rId13"/>
-    <p:sldId id="272" r:id="rId14"/>
-    <p:sldId id="284" r:id="rId15"/>
-    <p:sldId id="273" r:id="rId16"/>
-    <p:sldId id="274" r:id="rId17"/>
-    <p:sldId id="277" r:id="rId18"/>
-    <p:sldId id="278" r:id="rId19"/>
-    <p:sldId id="279" r:id="rId20"/>
-    <p:sldId id="282" r:id="rId21"/>
-    <p:sldId id="283" r:id="rId22"/>
-    <p:sldId id="281" r:id="rId23"/>
+    <p:sldId id="287" r:id="rId9"/>
+    <p:sldId id="268" r:id="rId10"/>
+    <p:sldId id="270" r:id="rId11"/>
+    <p:sldId id="285" r:id="rId12"/>
+    <p:sldId id="286" r:id="rId13"/>
+    <p:sldId id="271" r:id="rId14"/>
+    <p:sldId id="272" r:id="rId15"/>
+    <p:sldId id="284" r:id="rId16"/>
+    <p:sldId id="273" r:id="rId17"/>
+    <p:sldId id="274" r:id="rId18"/>
+    <p:sldId id="277" r:id="rId19"/>
+    <p:sldId id="278" r:id="rId20"/>
+    <p:sldId id="279" r:id="rId21"/>
+    <p:sldId id="282" r:id="rId22"/>
+    <p:sldId id="283" r:id="rId23"/>
+    <p:sldId id="281" r:id="rId24"/>
   </p:sldIdLst>
   <p:sldSz cx="12192000" cy="6858000"/>
   <p:notesSz cx="6858000" cy="9144000"/>
@@ -127,7 +128,7 @@
   </p:defaultTextStyle>
   <p:extLst>
     <p:ext uri="{EFAFB233-063F-42B5-8137-9DF3F51BA10A}">
-      <p15:sldGuideLst xmlns:p15="http://schemas.microsoft.com/office/powerpoint/2012/main" xmlns=""/>
+      <p15:sldGuideLst xmlns="" xmlns:p15="http://schemas.microsoft.com/office/powerpoint/2012/main"/>
     </p:ext>
   </p:extLst>
 </p:presentation>
@@ -215,7 +216,7 @@
           <a:p>
             <a:fld id="{AE1375EF-7AC2-40F0-8984-3657FAAC21B8}" type="datetimeFigureOut">
               <a:rPr lang="en-US" smtClean="0"/>
-              <a:t>9/12/2021</a:t>
+              <a:t>10/7/2021</a:t>
             </a:fld>
             <a:endParaRPr lang="en-US"/>
           </a:p>
@@ -610,14 +611,6 @@
           <a:bodyPr/>
           <a:lstStyle/>
           <a:p>
-            <a:r>
-              <a:rPr lang="en-US" dirty="0" smtClean="0"/>
-              <a:t>Many thanks to R/Pharma</a:t>
-            </a:r>
-            <a:r>
-              <a:rPr lang="en-US" baseline="0" dirty="0" smtClean="0"/>
-              <a:t> for providing this resource</a:t>
-            </a:r>
             <a:endParaRPr lang="en-US" dirty="0"/>
           </a:p>
         </p:txBody>
@@ -629,7 +622,7 @@
             <a:spLocks noGrp="1"/>
           </p:cNvSpPr>
           <p:nvPr>
-            <p:ph type="sldNum" sz="quarter" idx="10"/>
+            <p:ph type="sldNum" sz="quarter" idx="5"/>
           </p:nvPr>
         </p:nvSpPr>
         <p:spPr/>
@@ -639,7 +632,7 @@
           <a:p>
             <a:fld id="{B9F26414-4BE6-427A-9F34-1430B41B92D6}" type="slidenum">
               <a:rPr lang="en-US" smtClean="0"/>
-              <a:t>11</a:t>
+              <a:t>5</a:t>
             </a:fld>
             <a:endParaRPr lang="en-US"/>
           </a:p>
@@ -648,7 +641,7 @@
     </p:spTree>
     <p:extLst>
       <p:ext uri="{BB962C8B-B14F-4D97-AF65-F5344CB8AC3E}">
-        <p14:creationId xmlns:p14="http://schemas.microsoft.com/office/powerpoint/2010/main" val="1470043137"/>
+        <p14:creationId xmlns:p14="http://schemas.microsoft.com/office/powerpoint/2010/main" val="3445192030"/>
       </p:ext>
     </p:extLst>
   </p:cSld>
@@ -702,6 +695,14 @@
           <a:bodyPr/>
           <a:lstStyle/>
           <a:p>
+            <a:r>
+              <a:rPr lang="en-US" dirty="0" smtClean="0"/>
+              <a:t>Many thanks to R/Pharma</a:t>
+            </a:r>
+            <a:r>
+              <a:rPr lang="en-US" baseline="0" dirty="0" smtClean="0"/>
+              <a:t> for providing this resource</a:t>
+            </a:r>
             <a:endParaRPr lang="en-US" dirty="0"/>
           </a:p>
         </p:txBody>
@@ -713,7 +714,7 @@
             <a:spLocks noGrp="1"/>
           </p:cNvSpPr>
           <p:nvPr>
-            <p:ph type="sldNum" sz="quarter" idx="5"/>
+            <p:ph type="sldNum" sz="quarter" idx="10"/>
           </p:nvPr>
         </p:nvSpPr>
         <p:spPr/>
@@ -723,7 +724,7 @@
           <a:p>
             <a:fld id="{B9F26414-4BE6-427A-9F34-1430B41B92D6}" type="slidenum">
               <a:rPr lang="en-US" smtClean="0"/>
-              <a:t>13</a:t>
+              <a:t>12</a:t>
             </a:fld>
             <a:endParaRPr lang="en-US"/>
           </a:p>
@@ -732,7 +733,7 @@
     </p:spTree>
     <p:extLst>
       <p:ext uri="{BB962C8B-B14F-4D97-AF65-F5344CB8AC3E}">
-        <p14:creationId xmlns:p14="http://schemas.microsoft.com/office/powerpoint/2010/main" val="2674332949"/>
+        <p14:creationId xmlns:p14="http://schemas.microsoft.com/office/powerpoint/2010/main" val="1470043137"/>
       </p:ext>
     </p:extLst>
   </p:cSld>
@@ -786,19 +787,7 @@
           <a:bodyPr/>
           <a:lstStyle/>
           <a:p>
-            <a:r>
-              <a:rPr lang="en-US" dirty="0"/>
-              <a:t>Please ask questions  - we are here to help! Also, we will work through the examples together.</a:t>
-            </a:r>
-          </a:p>
-          <a:p>
             <a:endParaRPr lang="en-US" dirty="0"/>
-          </a:p>
-          <a:p>
-            <a:r>
-              <a:rPr lang="en-US" dirty="0"/>
-              <a:t>Post questions into the slack channel is preferred to raising your hand on zoom or posting into zoom chat so it is preserved for the future and we can make improvements to the workshop.</a:t>
-            </a:r>
           </a:p>
         </p:txBody>
       </p:sp>
@@ -819,7 +808,7 @@
           <a:p>
             <a:fld id="{B9F26414-4BE6-427A-9F34-1430B41B92D6}" type="slidenum">
               <a:rPr lang="en-US" smtClean="0"/>
-              <a:t>15</a:t>
+              <a:t>14</a:t>
             </a:fld>
             <a:endParaRPr lang="en-US"/>
           </a:p>
@@ -828,7 +817,7 @@
     </p:spTree>
     <p:extLst>
       <p:ext uri="{BB962C8B-B14F-4D97-AF65-F5344CB8AC3E}">
-        <p14:creationId xmlns:p14="http://schemas.microsoft.com/office/powerpoint/2010/main" val="3200179349"/>
+        <p14:creationId xmlns:p14="http://schemas.microsoft.com/office/powerpoint/2010/main" val="2674332949"/>
       </p:ext>
     </p:extLst>
   </p:cSld>
@@ -884,7 +873,7 @@
           <a:p>
             <a:r>
               <a:rPr lang="en-US" dirty="0"/>
-              <a:t>Bear with us. We will get into more complex topics in validation. This workshop is specifically trying to build a foundation for knowledge. And you never know, you might learn something.</a:t>
+              <a:t>Please ask questions  - we are here to help! Also, we will work through the examples together.</a:t>
             </a:r>
           </a:p>
           <a:p>
@@ -893,7 +882,7 @@
           <a:p>
             <a:r>
               <a:rPr lang="en-US" dirty="0"/>
-              <a:t>Also, as we go into breakout rooms, it would be helpful if you could work with the rest of the members of the breakout group to answer any questions. There are more of you than us, and any help we can get is appreciated!</a:t>
+              <a:t>Post questions into the slack channel is preferred to raising your hand on zoom or posting into zoom chat so it is preserved for the future and we can make improvements to the workshop.</a:t>
             </a:r>
           </a:p>
         </p:txBody>
@@ -924,7 +913,7 @@
     </p:spTree>
     <p:extLst>
       <p:ext uri="{BB962C8B-B14F-4D97-AF65-F5344CB8AC3E}">
-        <p14:creationId xmlns:p14="http://schemas.microsoft.com/office/powerpoint/2010/main" val="282342033"/>
+        <p14:creationId xmlns:p14="http://schemas.microsoft.com/office/powerpoint/2010/main" val="3200179349"/>
       </p:ext>
     </p:extLst>
   </p:cSld>
@@ -978,81 +967,19 @@
           <a:bodyPr/>
           <a:lstStyle/>
           <a:p>
-            <a:pPr marL="0" marR="0" lvl="0" indent="0" algn="l" defTabSz="914400" rtl="0" eaLnBrk="1" fontAlgn="auto" latinLnBrk="0" hangingPunct="1">
-              <a:lnSpc>
-                <a:spcPct val="100000"/>
-              </a:lnSpc>
-              <a:spcBef>
-                <a:spcPts val="0"/>
-              </a:spcBef>
-              <a:spcAft>
-                <a:spcPts val="0"/>
-              </a:spcAft>
-              <a:buClrTx/>
-              <a:buSzTx/>
-              <a:buFontTx/>
-              <a:buNone/>
-              <a:tabLst/>
-              <a:defRPr/>
-            </a:pPr>
             <a:r>
               <a:rPr lang="en-US" dirty="0"/>
-              <a:t>Please open an issue in the </a:t>
-            </a:r>
-            <a:r>
-              <a:rPr lang="en-US" dirty="0" err="1"/>
-              <a:t>github</a:t>
-            </a:r>
+              <a:t>Bear with us. We will get into more complex topics in validation. This workshop is specifically trying to build a foundation for knowledge. And you never know, you might learn something.</a:t>
+            </a:r>
+          </a:p>
+          <a:p>
+            <a:endParaRPr lang="en-US" dirty="0"/>
+          </a:p>
+          <a:p>
             <a:r>
               <a:rPr lang="en-US" dirty="0"/>
-              <a:t> page. We are human, we did our best, but would love to do better and make this easy for you to understand these concepts</a:t>
-            </a:r>
-          </a:p>
-          <a:p>
-            <a:pPr marL="0" marR="0" lvl="0" indent="0" algn="l" defTabSz="914400" rtl="0" eaLnBrk="1" fontAlgn="auto" latinLnBrk="0" hangingPunct="1">
-              <a:lnSpc>
-                <a:spcPct val="100000"/>
-              </a:lnSpc>
-              <a:spcBef>
-                <a:spcPts val="0"/>
-              </a:spcBef>
-              <a:spcAft>
-                <a:spcPts val="0"/>
-              </a:spcAft>
-              <a:buClrTx/>
-              <a:buSzTx/>
-              <a:buFontTx/>
-              <a:buNone/>
-              <a:tabLst/>
-              <a:defRPr/>
-            </a:pPr>
-            <a:endParaRPr lang="en-US" dirty="0"/>
-          </a:p>
-          <a:p>
-            <a:pPr marL="0" marR="0" lvl="0" indent="0" algn="l" defTabSz="914400" rtl="0" eaLnBrk="1" fontAlgn="auto" latinLnBrk="0" hangingPunct="1">
-              <a:lnSpc>
-                <a:spcPct val="100000"/>
-              </a:lnSpc>
-              <a:spcBef>
-                <a:spcPts val="0"/>
-              </a:spcBef>
-              <a:spcAft>
-                <a:spcPts val="0"/>
-              </a:spcAft>
-              <a:buClrTx/>
-              <a:buSzTx/>
-              <a:buFontTx/>
-              <a:buNone/>
-              <a:tabLst/>
-              <a:defRPr/>
-            </a:pPr>
-            <a:r>
-              <a:rPr lang="en-US" dirty="0"/>
-              <a:t>Also, anything that would help make things clearer we would love to know too!</a:t>
-            </a:r>
-          </a:p>
-          <a:p>
-            <a:endParaRPr lang="en-US" dirty="0"/>
+              <a:t>Also, as we go into breakout rooms, it would be helpful if you could work with the rest of the members of the breakout group to answer any questions. There are more of you than us, and any help we can get is appreciated!</a:t>
+            </a:r>
           </a:p>
         </p:txBody>
       </p:sp>
@@ -1082,7 +1009,7 @@
     </p:spTree>
     <p:extLst>
       <p:ext uri="{BB962C8B-B14F-4D97-AF65-F5344CB8AC3E}">
-        <p14:creationId xmlns:p14="http://schemas.microsoft.com/office/powerpoint/2010/main" val="493363971"/>
+        <p14:creationId xmlns:p14="http://schemas.microsoft.com/office/powerpoint/2010/main" val="282342033"/>
       </p:ext>
     </p:extLst>
   </p:cSld>
@@ -1136,19 +1063,81 @@
           <a:bodyPr/>
           <a:lstStyle/>
           <a:p>
+            <a:pPr marL="0" marR="0" lvl="0" indent="0" algn="l" defTabSz="914400" rtl="0" eaLnBrk="1" fontAlgn="auto" latinLnBrk="0" hangingPunct="1">
+              <a:lnSpc>
+                <a:spcPct val="100000"/>
+              </a:lnSpc>
+              <a:spcBef>
+                <a:spcPts val="0"/>
+              </a:spcBef>
+              <a:spcAft>
+                <a:spcPts val="0"/>
+              </a:spcAft>
+              <a:buClrTx/>
+              <a:buSzTx/>
+              <a:buFontTx/>
+              <a:buNone/>
+              <a:tabLst/>
+              <a:defRPr/>
+            </a:pPr>
             <a:r>
               <a:rPr lang="en-US" dirty="0"/>
-              <a:t>That is okay – if you are working on the sparse exercise documentation, go back to the more verbose set! Also, we will be setting up break out rooms, so see if any other members are also stuck. You can also pose a question in slack to the rest of the workshop or directly message the instructors.</a:t>
-            </a:r>
-          </a:p>
-          <a:p>
+              <a:t>Please open an issue in the </a:t>
+            </a:r>
+            <a:r>
+              <a:rPr lang="en-US" dirty="0" err="1"/>
+              <a:t>github</a:t>
+            </a:r>
+            <a:r>
+              <a:rPr lang="en-US" dirty="0"/>
+              <a:t> page. We are human, we did our best, but would love to do better and make this easy for you to understand these concepts</a:t>
+            </a:r>
+          </a:p>
+          <a:p>
+            <a:pPr marL="0" marR="0" lvl="0" indent="0" algn="l" defTabSz="914400" rtl="0" eaLnBrk="1" fontAlgn="auto" latinLnBrk="0" hangingPunct="1">
+              <a:lnSpc>
+                <a:spcPct val="100000"/>
+              </a:lnSpc>
+              <a:spcBef>
+                <a:spcPts val="0"/>
+              </a:spcBef>
+              <a:spcAft>
+                <a:spcPts val="0"/>
+              </a:spcAft>
+              <a:buClrTx/>
+              <a:buSzTx/>
+              <a:buFontTx/>
+              <a:buNone/>
+              <a:tabLst/>
+              <a:defRPr/>
+            </a:pPr>
             <a:endParaRPr lang="en-US" dirty="0"/>
           </a:p>
           <a:p>
+            <a:pPr marL="0" marR="0" lvl="0" indent="0" algn="l" defTabSz="914400" rtl="0" eaLnBrk="1" fontAlgn="auto" latinLnBrk="0" hangingPunct="1">
+              <a:lnSpc>
+                <a:spcPct val="100000"/>
+              </a:lnSpc>
+              <a:spcBef>
+                <a:spcPts val="0"/>
+              </a:spcBef>
+              <a:spcAft>
+                <a:spcPts val="0"/>
+              </a:spcAft>
+              <a:buClrTx/>
+              <a:buSzTx/>
+              <a:buFontTx/>
+              <a:buNone/>
+              <a:tabLst/>
+              <a:defRPr/>
+            </a:pPr>
             <a:r>
               <a:rPr lang="en-US" dirty="0"/>
-              <a:t>Finally, we will work through all the answers together!</a:t>
-            </a:r>
+              <a:t>Also, anything that would help make things clearer we would love to know too!</a:t>
+            </a:r>
+          </a:p>
+          <a:p>
+            <a:endParaRPr lang="en-US" dirty="0"/>
           </a:p>
         </p:txBody>
       </p:sp>
@@ -1178,7 +1167,7 @@
     </p:spTree>
     <p:extLst>
       <p:ext uri="{BB962C8B-B14F-4D97-AF65-F5344CB8AC3E}">
-        <p14:creationId xmlns:p14="http://schemas.microsoft.com/office/powerpoint/2010/main" val="1741456198"/>
+        <p14:creationId xmlns:p14="http://schemas.microsoft.com/office/powerpoint/2010/main" val="493363971"/>
       </p:ext>
     </p:extLst>
   </p:cSld>
@@ -1234,46 +1223,16 @@
           <a:p>
             <a:r>
               <a:rPr lang="en-US" dirty="0"/>
-              <a:t>If you have not yet, clone the R Package Validation Tutorial repository or make sure you have access to materials via </a:t>
-            </a:r>
-            <a:r>
-              <a:rPr lang="en-US" dirty="0" err="1"/>
-              <a:t>RStudio</a:t>
-            </a:r>
+              <a:t>That is okay – if you are working on the sparse exercise documentation, go back to the more verbose set! Also, we will be setting up break out rooms, so see if any other members are also stuck. You can also pose a question in slack to the rest of the workshop or directly message the instructors.</a:t>
+            </a:r>
+          </a:p>
+          <a:p>
+            <a:endParaRPr lang="en-US" dirty="0"/>
+          </a:p>
+          <a:p>
             <a:r>
               <a:rPr lang="en-US" dirty="0"/>
-              <a:t> Cloud.</a:t>
-            </a:r>
-          </a:p>
-          <a:p>
-            <a:endParaRPr lang="en-US" dirty="0"/>
-          </a:p>
-          <a:p>
-            <a:r>
-              <a:rPr lang="en-US" dirty="0" smtClean="0"/>
-              <a:t>Github.com/</a:t>
-            </a:r>
-            <a:r>
-              <a:rPr lang="en-US" dirty="0" err="1" smtClean="0"/>
-              <a:t>thebioengineer</a:t>
-            </a:r>
-            <a:r>
-              <a:rPr lang="en-US" dirty="0" smtClean="0"/>
-              <a:t>/</a:t>
-            </a:r>
-            <a:r>
-              <a:rPr lang="en-US" dirty="0" err="1" smtClean="0"/>
-              <a:t>R_Package_Validation_Tutorial</a:t>
-            </a:r>
-            <a:endParaRPr lang="en-US" dirty="0"/>
-          </a:p>
-          <a:p>
-            <a:endParaRPr lang="en-US" dirty="0"/>
-          </a:p>
-          <a:p>
-            <a:r>
-              <a:rPr lang="en-US" dirty="0"/>
-              <a:t> We will move onto the first series – basics of package building!</a:t>
+              <a:t>Finally, we will work through all the answers together!</a:t>
             </a:r>
           </a:p>
         </p:txBody>
@@ -1296,6 +1255,132 @@
             <a:fld id="{B9F26414-4BE6-427A-9F34-1430B41B92D6}" type="slidenum">
               <a:rPr lang="en-US" smtClean="0"/>
               <a:t>19</a:t>
+            </a:fld>
+            <a:endParaRPr lang="en-US"/>
+          </a:p>
+        </p:txBody>
+      </p:sp>
+    </p:spTree>
+    <p:extLst>
+      <p:ext uri="{BB962C8B-B14F-4D97-AF65-F5344CB8AC3E}">
+        <p14:creationId xmlns:p14="http://schemas.microsoft.com/office/powerpoint/2010/main" val="1741456198"/>
+      </p:ext>
+    </p:extLst>
+  </p:cSld>
+  <p:clrMapOvr>
+    <a:masterClrMapping/>
+  </p:clrMapOvr>
+</p:notes>
+</file>
+
+<file path=ppt/notesSlides/notesSlide9.xml><?xml version="1.0" encoding="utf-8"?>
+<p:notes xmlns:a="http://schemas.openxmlformats.org/drawingml/2006/main" xmlns:r="http://schemas.openxmlformats.org/officeDocument/2006/relationships" xmlns:p="http://schemas.openxmlformats.org/presentationml/2006/main">
+  <p:cSld>
+    <p:spTree>
+      <p:nvGrpSpPr>
+        <p:cNvPr id="1" name=""/>
+        <p:cNvGrpSpPr/>
+        <p:nvPr/>
+      </p:nvGrpSpPr>
+      <p:grpSpPr>
+        <a:xfrm>
+          <a:off x="0" y="0"/>
+          <a:ext cx="0" cy="0"/>
+          <a:chOff x="0" y="0"/>
+          <a:chExt cx="0" cy="0"/>
+        </a:xfrm>
+      </p:grpSpPr>
+      <p:sp>
+        <p:nvSpPr>
+          <p:cNvPr id="2" name="Slide Image Placeholder 1"/>
+          <p:cNvSpPr>
+            <a:spLocks noGrp="1" noRot="1" noChangeAspect="1"/>
+          </p:cNvSpPr>
+          <p:nvPr>
+            <p:ph type="sldImg"/>
+          </p:nvPr>
+        </p:nvSpPr>
+        <p:spPr/>
+      </p:sp>
+      <p:sp>
+        <p:nvSpPr>
+          <p:cNvPr id="3" name="Notes Placeholder 2"/>
+          <p:cNvSpPr>
+            <a:spLocks noGrp="1"/>
+          </p:cNvSpPr>
+          <p:nvPr>
+            <p:ph type="body" idx="1"/>
+          </p:nvPr>
+        </p:nvSpPr>
+        <p:spPr/>
+        <p:txBody>
+          <a:bodyPr/>
+          <a:lstStyle/>
+          <a:p>
+            <a:r>
+              <a:rPr lang="en-US" dirty="0"/>
+              <a:t>If you have not yet, clone the R Package Validation Tutorial repository or make sure you have access to materials via </a:t>
+            </a:r>
+            <a:r>
+              <a:rPr lang="en-US" dirty="0" err="1"/>
+              <a:t>RStudio</a:t>
+            </a:r>
+            <a:r>
+              <a:rPr lang="en-US" dirty="0"/>
+              <a:t> Cloud.</a:t>
+            </a:r>
+          </a:p>
+          <a:p>
+            <a:endParaRPr lang="en-US" dirty="0"/>
+          </a:p>
+          <a:p>
+            <a:r>
+              <a:rPr lang="en-US" dirty="0" smtClean="0"/>
+              <a:t>Github.com/</a:t>
+            </a:r>
+            <a:r>
+              <a:rPr lang="en-US" dirty="0" err="1" smtClean="0"/>
+              <a:t>thebioengineer</a:t>
+            </a:r>
+            <a:r>
+              <a:rPr lang="en-US" dirty="0" smtClean="0"/>
+              <a:t>/</a:t>
+            </a:r>
+            <a:r>
+              <a:rPr lang="en-US" dirty="0" err="1" smtClean="0"/>
+              <a:t>R_Package_Validation_Tutorial</a:t>
+            </a:r>
+            <a:endParaRPr lang="en-US" dirty="0"/>
+          </a:p>
+          <a:p>
+            <a:endParaRPr lang="en-US" dirty="0"/>
+          </a:p>
+          <a:p>
+            <a:r>
+              <a:rPr lang="en-US" dirty="0"/>
+              <a:t> We will move onto the first series – basics of package building!</a:t>
+            </a:r>
+          </a:p>
+        </p:txBody>
+      </p:sp>
+      <p:sp>
+        <p:nvSpPr>
+          <p:cNvPr id="4" name="Slide Number Placeholder 3"/>
+          <p:cNvSpPr>
+            <a:spLocks noGrp="1"/>
+          </p:cNvSpPr>
+          <p:nvPr>
+            <p:ph type="sldNum" sz="quarter" idx="5"/>
+          </p:nvPr>
+        </p:nvSpPr>
+        <p:spPr/>
+        <p:txBody>
+          <a:bodyPr/>
+          <a:lstStyle/>
+          <a:p>
+            <a:fld id="{B9F26414-4BE6-427A-9F34-1430B41B92D6}" type="slidenum">
+              <a:rPr lang="en-US" smtClean="0"/>
+              <a:t>20</a:t>
             </a:fld>
             <a:endParaRPr lang="en-US"/>
           </a:p>
@@ -1336,7 +1421,7 @@
           <p:cNvPr id="5" name="Rectangle 4">
             <a:extLst>
               <a:ext uri="{FF2B5EF4-FFF2-40B4-BE49-F238E27FC236}">
-                <a16:creationId xmlns:a16="http://schemas.microsoft.com/office/drawing/2014/main" xmlns="" id="{904DB13E-F722-4ED6-BB00-556651E95281}"/>
+                <a16:creationId xmlns="" xmlns:a16="http://schemas.microsoft.com/office/drawing/2014/main" id="{904DB13E-F722-4ED6-BB00-556651E95281}"/>
               </a:ext>
             </a:extLst>
           </p:cNvPr>
@@ -1485,7 +1570,7 @@
           <p:cNvPr id="7" name="Group 6">
             <a:extLst>
               <a:ext uri="{FF2B5EF4-FFF2-40B4-BE49-F238E27FC236}">
-                <a16:creationId xmlns:a16="http://schemas.microsoft.com/office/drawing/2014/main" xmlns="" id="{E26428D7-C6F3-473D-A360-A3F5C3E8728C}"/>
+                <a16:creationId xmlns="" xmlns:a16="http://schemas.microsoft.com/office/drawing/2014/main" id="{E26428D7-C6F3-473D-A360-A3F5C3E8728C}"/>
               </a:ext>
             </a:extLst>
           </p:cNvPr>
@@ -1783,7 +1868,7 @@
           <a:p>
             <a:fld id="{EA0C0817-A112-4847-8014-A94B7D2A4EA3}" type="datetime1">
               <a:rPr lang="en-US" smtClean="0"/>
-              <a:t>9/12/2021</a:t>
+              <a:t>10/7/2021</a:t>
             </a:fld>
             <a:endParaRPr lang="en-US" dirty="0"/>
           </a:p>
@@ -1985,7 +2070,7 @@
           <a:p>
             <a:fld id="{7332B432-ACDA-4023-A761-2BAB76577B62}" type="datetime1">
               <a:rPr lang="en-US" smtClean="0"/>
-              <a:t>9/12/2021</a:t>
+              <a:t>10/7/2021</a:t>
             </a:fld>
             <a:endParaRPr lang="en-US" dirty="0"/>
           </a:p>
@@ -2068,7 +2153,7 @@
           <p:cNvPr id="15" name="Rectangle 14">
             <a:extLst>
               <a:ext uri="{FF2B5EF4-FFF2-40B4-BE49-F238E27FC236}">
-                <a16:creationId xmlns:a16="http://schemas.microsoft.com/office/drawing/2014/main" xmlns="" id="{0A4A1889-E37C-4EC3-9E41-9DAD221CF389}"/>
+                <a16:creationId xmlns="" xmlns:a16="http://schemas.microsoft.com/office/drawing/2014/main" id="{0A4A1889-E37C-4EC3-9E41-9DAD221CF389}"/>
               </a:ext>
             </a:extLst>
           </p:cNvPr>
@@ -2265,7 +2350,7 @@
           <p:cNvPr id="16" name="Group 15">
             <a:extLst>
               <a:ext uri="{FF2B5EF4-FFF2-40B4-BE49-F238E27FC236}">
-                <a16:creationId xmlns:a16="http://schemas.microsoft.com/office/drawing/2014/main" xmlns="" id="{1683EB04-C23E-490C-A1A6-030CF79D23C8}"/>
+                <a16:creationId xmlns="" xmlns:a16="http://schemas.microsoft.com/office/drawing/2014/main" id="{1683EB04-C23E-490C-A1A6-030CF79D23C8}"/>
               </a:ext>
             </a:extLst>
           </p:cNvPr>
@@ -2285,7 +2370,7 @@
             <p:cNvPr id="17" name="Straight Connector 16">
               <a:extLst>
                 <a:ext uri="{FF2B5EF4-FFF2-40B4-BE49-F238E27FC236}">
-                  <a16:creationId xmlns:a16="http://schemas.microsoft.com/office/drawing/2014/main" xmlns="" id="{F8A84C03-E1CA-4A4E-81D6-9BB0C335B7A0}"/>
+                  <a16:creationId xmlns="" xmlns:a16="http://schemas.microsoft.com/office/drawing/2014/main" id="{F8A84C03-E1CA-4A4E-81D6-9BB0C335B7A0}"/>
                 </a:ext>
               </a:extLst>
             </p:cNvPr>
@@ -2333,7 +2418,7 @@
             <p:cNvPr id="18" name="Straight Connector 17">
               <a:extLst>
                 <a:ext uri="{FF2B5EF4-FFF2-40B4-BE49-F238E27FC236}">
-                  <a16:creationId xmlns:a16="http://schemas.microsoft.com/office/drawing/2014/main" xmlns="" id="{4A26FB5A-D5D1-4DAB-AC43-7F51A7F2D197}"/>
+                  <a16:creationId xmlns="" xmlns:a16="http://schemas.microsoft.com/office/drawing/2014/main" id="{4A26FB5A-D5D1-4DAB-AC43-7F51A7F2D197}"/>
                 </a:ext>
               </a:extLst>
             </p:cNvPr>
@@ -2381,7 +2466,7 @@
             <p:cNvPr id="19" name="Straight Connector 18">
               <a:extLst>
                 <a:ext uri="{FF2B5EF4-FFF2-40B4-BE49-F238E27FC236}">
-                  <a16:creationId xmlns:a16="http://schemas.microsoft.com/office/drawing/2014/main" xmlns="" id="{49303F14-E560-4C02-94F4-B4695FE26813}"/>
+                  <a16:creationId xmlns="" xmlns:a16="http://schemas.microsoft.com/office/drawing/2014/main" id="{49303F14-E560-4C02-94F4-B4695FE26813}"/>
                 </a:ext>
               </a:extLst>
             </p:cNvPr>
@@ -2584,7 +2669,7 @@
           <a:p>
             <a:fld id="{D9C646AA-F36E-4540-911D-FFFC0A0EF24A}" type="datetime1">
               <a:rPr lang="en-US" smtClean="0"/>
-              <a:t>9/12/2021</a:t>
+              <a:t>10/7/2021</a:t>
             </a:fld>
             <a:endParaRPr lang="en-US" dirty="0"/>
           </a:p>
@@ -2904,7 +2989,7 @@
           <a:p>
             <a:fld id="{69186D26-FA5F-4637-B602-B7C2DC34CFD4}" type="datetime1">
               <a:rPr lang="en-US" smtClean="0"/>
-              <a:t>9/12/2021</a:t>
+              <a:t>10/7/2021</a:t>
             </a:fld>
             <a:endParaRPr lang="en-US" dirty="0"/>
           </a:p>
@@ -3341,7 +3426,7 @@
           <a:p>
             <a:fld id="{8A7F15D8-96D1-4781-BC50-CA8A088B2FE4}" type="datetime1">
               <a:rPr lang="en-US" smtClean="0"/>
-              <a:t>9/12/2021</a:t>
+              <a:t>10/7/2021</a:t>
             </a:fld>
             <a:endParaRPr lang="en-US" dirty="0"/>
           </a:p>
@@ -3459,7 +3544,7 @@
           <a:p>
             <a:fld id="{F9A96C99-B8F8-4528-BD05-0E16E943DC09}" type="datetime1">
               <a:rPr lang="en-US" smtClean="0"/>
-              <a:t>9/12/2021</a:t>
+              <a:t>10/7/2021</a:t>
             </a:fld>
             <a:endParaRPr lang="en-US" dirty="0"/>
           </a:p>
@@ -3554,7 +3639,7 @@
           <a:p>
             <a:fld id="{03636942-C211-4B28-8DBD-C953E00AF71B}" type="datetime1">
               <a:rPr lang="en-US" smtClean="0"/>
-              <a:t>9/12/2021</a:t>
+              <a:t>10/7/2021</a:t>
             </a:fld>
             <a:endParaRPr lang="en-US" dirty="0"/>
           </a:p>
@@ -3637,7 +3722,7 @@
           <p:cNvPr id="10" name="Rectangle 9">
             <a:extLst>
               <a:ext uri="{FF2B5EF4-FFF2-40B4-BE49-F238E27FC236}">
-                <a16:creationId xmlns:a16="http://schemas.microsoft.com/office/drawing/2014/main" xmlns="" id="{D5E1BBF9-8BEF-4353-BA68-30AAF9EBD8D8}"/>
+                <a16:creationId xmlns="" xmlns:a16="http://schemas.microsoft.com/office/drawing/2014/main" id="{D5E1BBF9-8BEF-4353-BA68-30AAF9EBD8D8}"/>
               </a:ext>
             </a:extLst>
           </p:cNvPr>
@@ -3684,7 +3769,7 @@
           <p:cNvPr id="13" name="Rectangle 12">
             <a:extLst>
               <a:ext uri="{FF2B5EF4-FFF2-40B4-BE49-F238E27FC236}">
-                <a16:creationId xmlns:a16="http://schemas.microsoft.com/office/drawing/2014/main" xmlns="" id="{5B941C21-2A5D-4912-AB06-1BB0C0EB6AE1}"/>
+                <a16:creationId xmlns="" xmlns:a16="http://schemas.microsoft.com/office/drawing/2014/main" id="{5B941C21-2A5D-4912-AB06-1BB0C0EB6AE1}"/>
               </a:ext>
             </a:extLst>
           </p:cNvPr>
@@ -3971,7 +4056,7 @@
           <a:p>
             <a:fld id="{7E8D12A6-918A-48BD-8CB9-CA713993B0EA}" type="datetime1">
               <a:rPr lang="en-US" smtClean="0"/>
-              <a:t>9/12/2021</a:t>
+              <a:t>10/7/2021</a:t>
             </a:fld>
             <a:endParaRPr lang="en-US" dirty="0"/>
           </a:p>
@@ -4079,7 +4164,7 @@
           <p:cNvPr id="11" name="Rectangle 10">
             <a:extLst>
               <a:ext uri="{FF2B5EF4-FFF2-40B4-BE49-F238E27FC236}">
-                <a16:creationId xmlns:a16="http://schemas.microsoft.com/office/drawing/2014/main" xmlns="" id="{E687CA98-D9C7-497F-A1DA-7D22F8753BCE}"/>
+                <a16:creationId xmlns="" xmlns:a16="http://schemas.microsoft.com/office/drawing/2014/main" id="{E687CA98-D9C7-497F-A1DA-7D22F8753BCE}"/>
               </a:ext>
             </a:extLst>
           </p:cNvPr>
@@ -4233,7 +4318,7 @@
             <a:fld id="{E778CE86-875F-4587-BCF6-FA054AFC0D53}" type="datetime1">
               <a:rPr lang="en-US" smtClean="0"/>
               <a:pPr/>
-              <a:t>9/12/2021</a:t>
+              <a:t>10/7/2021</a:t>
             </a:fld>
             <a:endParaRPr lang="en-US" dirty="0"/>
           </a:p>
@@ -4315,7 +4400,7 @@
           <p:cNvPr id="12" name="Rectangle 11">
             <a:extLst>
               <a:ext uri="{FF2B5EF4-FFF2-40B4-BE49-F238E27FC236}">
-                <a16:creationId xmlns:a16="http://schemas.microsoft.com/office/drawing/2014/main" xmlns="" id="{F8B3D8CC-BB13-41A5-8F34-B8E84A4F9534}"/>
+                <a16:creationId xmlns="" xmlns:a16="http://schemas.microsoft.com/office/drawing/2014/main" id="{F8B3D8CC-BB13-41A5-8F34-B8E84A4F9534}"/>
               </a:ext>
             </a:extLst>
           </p:cNvPr>
@@ -4517,7 +4602,7 @@
           <p:cNvPr id="9" name="Rectangle 8">
             <a:extLst>
               <a:ext uri="{FF2B5EF4-FFF2-40B4-BE49-F238E27FC236}">
-                <a16:creationId xmlns:a16="http://schemas.microsoft.com/office/drawing/2014/main" xmlns="" id="{1E94681D-2A4C-4A8D-B9B5-31D440D0328D}"/>
+                <a16:creationId xmlns="" xmlns:a16="http://schemas.microsoft.com/office/drawing/2014/main" id="{1E94681D-2A4C-4A8D-B9B5-31D440D0328D}"/>
               </a:ext>
             </a:extLst>
           </p:cNvPr>
@@ -4749,7 +4834,7 @@
           <a:p>
             <a:fld id="{F6FA2B21-3FCD-4721-B95C-427943F61125}" type="datetime1">
               <a:rPr lang="en-US" smtClean="0"/>
-              <a:t>9/12/2021</a:t>
+              <a:t>10/7/2021</a:t>
             </a:fld>
             <a:endParaRPr lang="en-US" dirty="0"/>
           </a:p>
@@ -5229,7 +5314,7 @@
           <p:cNvPr id="6" name="Picture 5" descr="abstract image">
             <a:extLst>
               <a:ext uri="{FF2B5EF4-FFF2-40B4-BE49-F238E27FC236}">
-                <a16:creationId xmlns:a16="http://schemas.microsoft.com/office/drawing/2014/main" xmlns="" id="{8045422F-7258-40AC-BD2E-2469AA448922}"/>
+                <a16:creationId xmlns="" xmlns:a16="http://schemas.microsoft.com/office/drawing/2014/main" id="{8045422F-7258-40AC-BD2E-2469AA448922}"/>
               </a:ext>
             </a:extLst>
           </p:cNvPr>
@@ -5264,10 +5349,10 @@
           <p:cNvPr id="82" name="Rectangle 81">
             <a:extLst>
               <a:ext uri="{FF2B5EF4-FFF2-40B4-BE49-F238E27FC236}">
-                <a16:creationId xmlns:a16="http://schemas.microsoft.com/office/drawing/2014/main" xmlns="" id="{2644B391-9BFE-445C-A9EC-F544BB85FBC7}"/>
+                <a16:creationId xmlns="" xmlns:a16="http://schemas.microsoft.com/office/drawing/2014/main" id="{2644B391-9BFE-445C-A9EC-F544BB85FBC7}"/>
               </a:ext>
               <a:ext uri="{C183D7F6-B498-43B3-948B-1728B52AA6E4}">
-                <adec:decorative xmlns:adec="http://schemas.microsoft.com/office/drawing/2017/decorative" xmlns="" val="1"/>
+                <adec:decorative xmlns="" xmlns:adec="http://schemas.microsoft.com/office/drawing/2017/decorative" val="1"/>
               </a:ext>
             </a:extLst>
           </p:cNvPr>
@@ -5277,7 +5362,7 @@
           <p:nvPr>
             <p:extLst>
               <p:ext uri="{386F3935-93C4-4BCD-93E2-E3B085C9AB24}">
-                <p16:designElem xmlns:p16="http://schemas.microsoft.com/office/powerpoint/2015/main" xmlns="" val="1"/>
+                <p16:designElem xmlns="" xmlns:p16="http://schemas.microsoft.com/office/powerpoint/2015/main" val="1"/>
               </p:ext>
             </p:extLst>
           </p:nvPr>
@@ -5309,10 +5394,10 @@
           <p:cNvPr id="84" name="Rectangle 83">
             <a:extLst>
               <a:ext uri="{FF2B5EF4-FFF2-40B4-BE49-F238E27FC236}">
-                <a16:creationId xmlns:a16="http://schemas.microsoft.com/office/drawing/2014/main" xmlns="" id="{80F26E69-87D9-4655-AE7B-280A87AA3CAD}"/>
+                <a16:creationId xmlns="" xmlns:a16="http://schemas.microsoft.com/office/drawing/2014/main" id="{80F26E69-87D9-4655-AE7B-280A87AA3CAD}"/>
               </a:ext>
               <a:ext uri="{C183D7F6-B498-43B3-948B-1728B52AA6E4}">
-                <adec:decorative xmlns:adec="http://schemas.microsoft.com/office/drawing/2017/decorative" xmlns="" val="1"/>
+                <adec:decorative xmlns="" xmlns:adec="http://schemas.microsoft.com/office/drawing/2017/decorative" val="1"/>
               </a:ext>
             </a:extLst>
           </p:cNvPr>
@@ -5322,7 +5407,7 @@
           <p:nvPr>
             <p:extLst>
               <p:ext uri="{386F3935-93C4-4BCD-93E2-E3B085C9AB24}">
-                <p16:designElem xmlns:p16="http://schemas.microsoft.com/office/powerpoint/2015/main" xmlns="" val="1"/>
+                <p16:designElem xmlns="" xmlns:p16="http://schemas.microsoft.com/office/powerpoint/2015/main" val="1"/>
               </p:ext>
             </p:extLst>
           </p:nvPr>
@@ -5353,7 +5438,7 @@
           <p:cNvPr id="2" name="Title 1">
             <a:extLst>
               <a:ext uri="{FF2B5EF4-FFF2-40B4-BE49-F238E27FC236}">
-                <a16:creationId xmlns:a16="http://schemas.microsoft.com/office/drawing/2014/main" xmlns="" id="{18C3B467-088C-4F3D-A9A7-105C4E1E20CD}"/>
+                <a16:creationId xmlns="" xmlns:a16="http://schemas.microsoft.com/office/drawing/2014/main" id="{18C3B467-088C-4F3D-A9A7-105C4E1E20CD}"/>
               </a:ext>
             </a:extLst>
           </p:cNvPr>
@@ -5404,7 +5489,7 @@
           <p:cNvPr id="3" name="Subtitle 2">
             <a:extLst>
               <a:ext uri="{FF2B5EF4-FFF2-40B4-BE49-F238E27FC236}">
-                <a16:creationId xmlns:a16="http://schemas.microsoft.com/office/drawing/2014/main" xmlns="" id="{C8722DDC-8EEE-4A06-8DFE-B44871EAA2CF}"/>
+                <a16:creationId xmlns="" xmlns:a16="http://schemas.microsoft.com/office/drawing/2014/main" id="{C8722DDC-8EEE-4A06-8DFE-B44871EAA2CF}"/>
               </a:ext>
             </a:extLst>
           </p:cNvPr>
@@ -5448,7 +5533,7 @@
           <p:cNvPr id="5" name="Straight Connector 4">
             <a:extLst>
               <a:ext uri="{FF2B5EF4-FFF2-40B4-BE49-F238E27FC236}">
-                <a16:creationId xmlns:a16="http://schemas.microsoft.com/office/drawing/2014/main" xmlns="" id="{20AC4B09-ED72-42FC-9845-45FC1F4BC29D}"/>
+                <a16:creationId xmlns="" xmlns:a16="http://schemas.microsoft.com/office/drawing/2014/main" id="{20AC4B09-ED72-42FC-9845-45FC1F4BC29D}"/>
               </a:ext>
             </a:extLst>
           </p:cNvPr>
@@ -5519,7 +5604,7 @@
           <p:cNvPr id="2" name="Title 1">
             <a:extLst>
               <a:ext uri="{FF2B5EF4-FFF2-40B4-BE49-F238E27FC236}">
-                <a16:creationId xmlns:a16="http://schemas.microsoft.com/office/drawing/2014/main" xmlns="" id="{4DA197EC-75CE-4967-B49A-620F6D94CA9D}"/>
+                <a16:creationId xmlns="" xmlns:a16="http://schemas.microsoft.com/office/drawing/2014/main" id="{7614332B-4F24-42F4-A704-A6F1183E9470}"/>
               </a:ext>
             </a:extLst>
           </p:cNvPr>
@@ -5527,7 +5612,7 @@
             <a:spLocks noGrp="1"/>
           </p:cNvSpPr>
           <p:nvPr>
-            <p:ph type="title"/>
+            <p:ph type="ctrTitle"/>
           </p:nvPr>
         </p:nvSpPr>
         <p:spPr/>
@@ -5537,206 +5622,15 @@
           <a:p>
             <a:r>
               <a:rPr lang="en-US" dirty="0"/>
-              <a:t>Workshop Materials</a:t>
-            </a:r>
-          </a:p>
-        </p:txBody>
-      </p:sp>
-      <p:sp>
-        <p:nvSpPr>
-          <p:cNvPr id="3" name="Content Placeholder 2">
-            <a:extLst>
-              <a:ext uri="{FF2B5EF4-FFF2-40B4-BE49-F238E27FC236}">
-                <a16:creationId xmlns:a16="http://schemas.microsoft.com/office/drawing/2014/main" xmlns="" id="{8AB0FEEC-3BEF-46E7-912B-C736F42B180B}"/>
-              </a:ext>
-            </a:extLst>
-          </p:cNvPr>
-          <p:cNvSpPr>
-            <a:spLocks noGrp="1"/>
-          </p:cNvSpPr>
-          <p:nvPr>
-            <p:ph sz="half" idx="1"/>
-          </p:nvPr>
-        </p:nvSpPr>
-        <p:spPr>
-          <a:xfrm>
-            <a:off x="914400" y="2014194"/>
-            <a:ext cx="10363200" cy="789709"/>
-          </a:xfrm>
-        </p:spPr>
-        <p:txBody>
-          <a:bodyPr/>
-          <a:lstStyle/>
-          <a:p>
-            <a:pPr marL="0" indent="0" algn="ctr">
-              <a:buNone/>
-            </a:pPr>
-            <a:r>
-              <a:rPr lang="en-US" sz="3600" b="1" dirty="0" smtClean="0"/>
-              <a:t>bit.ly/</a:t>
-            </a:r>
-            <a:r>
-              <a:rPr lang="en-US" sz="3600" b="1" dirty="0" err="1" smtClean="0"/>
-              <a:t>valtools_CSS</a:t>
-            </a:r>
-            <a:endParaRPr lang="en-US" sz="3600" b="1" dirty="0"/>
-          </a:p>
-          <a:p>
-            <a:pPr marL="274320" lvl="1" indent="0">
-              <a:buNone/>
-            </a:pPr>
-            <a:endParaRPr lang="en-US" sz="1400" b="1" dirty="0"/>
-          </a:p>
-          <a:p>
-            <a:pPr marL="822960" lvl="3" indent="0">
-              <a:buNone/>
-            </a:pPr>
-            <a:endParaRPr lang="en-US" sz="1800" b="1" dirty="0"/>
-          </a:p>
-          <a:p>
-            <a:pPr lvl="1"/>
-            <a:endParaRPr lang="en-US" b="1" dirty="0"/>
-          </a:p>
-          <a:p>
-            <a:endParaRPr lang="en-US" b="1" dirty="0"/>
-          </a:p>
-        </p:txBody>
-      </p:sp>
-      <p:sp>
-        <p:nvSpPr>
-          <p:cNvPr id="4" name="TextBox 3">
-            <a:extLst>
-              <a:ext uri="{FF2B5EF4-FFF2-40B4-BE49-F238E27FC236}">
-                <a16:creationId xmlns:a16="http://schemas.microsoft.com/office/drawing/2014/main" xmlns="" id="{D59083DE-6E1A-4132-A4C8-A18D53074B76}"/>
-              </a:ext>
-            </a:extLst>
-          </p:cNvPr>
-          <p:cNvSpPr txBox="1"/>
-          <p:nvPr/>
-        </p:nvSpPr>
-        <p:spPr>
-          <a:xfrm>
-            <a:off x="2643447" y="2990406"/>
-            <a:ext cx="7187736" cy="1938992"/>
-          </a:xfrm>
-          <a:prstGeom prst="rect">
-            <a:avLst/>
-          </a:prstGeom>
-          <a:noFill/>
-        </p:spPr>
-        <p:txBody>
-          <a:bodyPr wrap="square" rtlCol="0">
-            <a:spAutoFit/>
-          </a:bodyPr>
-          <a:lstStyle/>
-          <a:p>
-            <a:pPr marL="0" lvl="2" algn="ctr" defTabSz="114300"/>
-            <a:r>
-              <a:rPr lang="en-US" sz="2400" dirty="0">
-                <a:solidFill>
-                  <a:schemeClr val="accent2"/>
-                </a:solidFill>
-              </a:rPr>
-              <a:t>Slides</a:t>
-            </a:r>
-            <a:r>
-              <a:rPr lang="en-US" sz="2400" dirty="0"/>
-              <a:t> folder contains presentation slides</a:t>
-            </a:r>
-          </a:p>
-          <a:p>
-            <a:pPr marL="0" lvl="2" algn="ctr" defTabSz="114300"/>
-            <a:endParaRPr lang="en-US" sz="2400" dirty="0"/>
-          </a:p>
-          <a:p>
-            <a:pPr marL="0" lvl="2" algn="ctr" defTabSz="114300"/>
-            <a:r>
-              <a:rPr lang="en-US" sz="2400" dirty="0">
-                <a:solidFill>
-                  <a:schemeClr val="accent2"/>
-                </a:solidFill>
-              </a:rPr>
-              <a:t>Materials</a:t>
-            </a:r>
-            <a:r>
-              <a:rPr lang="en-US" sz="2400" dirty="0"/>
-              <a:t> folder contains 2 types of exercises:</a:t>
-            </a:r>
-            <a:r>
-              <a:rPr lang="en-US" sz="2400" dirty="0">
-                <a:solidFill>
-                  <a:schemeClr val="accent1">
-                    <a:lumMod val="75000"/>
-                  </a:schemeClr>
-                </a:solidFill>
-              </a:rPr>
-              <a:t> Sparse </a:t>
-            </a:r>
-            <a:r>
-              <a:rPr lang="en-US" sz="2400" dirty="0"/>
-              <a:t>or </a:t>
-            </a:r>
-            <a:r>
-              <a:rPr lang="en-US" sz="2400" dirty="0">
-                <a:solidFill>
-                  <a:schemeClr val="accent4">
-                    <a:lumMod val="75000"/>
-                  </a:schemeClr>
-                </a:solidFill>
-              </a:rPr>
-              <a:t>Verbose</a:t>
-            </a:r>
-          </a:p>
-          <a:p>
-            <a:pPr algn="ctr"/>
-            <a:endParaRPr lang="en-US" sz="2400" dirty="0"/>
-          </a:p>
-        </p:txBody>
-      </p:sp>
-      <p:sp>
-        <p:nvSpPr>
-          <p:cNvPr id="5" name="TextBox 4">
-            <a:extLst>
-              <a:ext uri="{FF2B5EF4-FFF2-40B4-BE49-F238E27FC236}">
-                <a16:creationId xmlns:a16="http://schemas.microsoft.com/office/drawing/2014/main" xmlns="" id="{2B0E1A9C-DED3-4FD3-978C-825945879A48}"/>
-              </a:ext>
-            </a:extLst>
-          </p:cNvPr>
-          <p:cNvSpPr txBox="1"/>
-          <p:nvPr/>
-        </p:nvSpPr>
-        <p:spPr>
-          <a:xfrm>
-            <a:off x="1162395" y="4879571"/>
-            <a:ext cx="9867207" cy="1384995"/>
-          </a:xfrm>
-          <a:prstGeom prst="rect">
-            <a:avLst/>
-          </a:prstGeom>
-          <a:noFill/>
-        </p:spPr>
-        <p:txBody>
-          <a:bodyPr wrap="square" rtlCol="0">
-            <a:spAutoFit/>
-          </a:bodyPr>
-          <a:lstStyle/>
-          <a:p>
-            <a:pPr algn="ctr"/>
-            <a:r>
-              <a:rPr lang="en-US" sz="2800" dirty="0"/>
-              <a:t>Workshop slides and exercises are online now and will be available after the conference too.</a:t>
-            </a:r>
-          </a:p>
-          <a:p>
-            <a:pPr algn="ctr"/>
-            <a:endParaRPr lang="en-US" sz="2800" dirty="0"/>
+              <a:t>How are we going to get there</a:t>
+            </a:r>
           </a:p>
         </p:txBody>
       </p:sp>
     </p:spTree>
     <p:extLst>
       <p:ext uri="{BB962C8B-B14F-4D97-AF65-F5344CB8AC3E}">
-        <p14:creationId xmlns:p14="http://schemas.microsoft.com/office/powerpoint/2010/main" val="2961198549"/>
+        <p14:creationId xmlns:p14="http://schemas.microsoft.com/office/powerpoint/2010/main" val="2358439516"/>
       </p:ext>
     </p:extLst>
   </p:cSld>
@@ -5768,7 +5662,7 @@
           <p:cNvPr id="2" name="Title 1">
             <a:extLst>
               <a:ext uri="{FF2B5EF4-FFF2-40B4-BE49-F238E27FC236}">
-                <a16:creationId xmlns:a16="http://schemas.microsoft.com/office/drawing/2014/main" xmlns="" id="{4DA197EC-75CE-4967-B49A-620F6D94CA9D}"/>
+                <a16:creationId xmlns="" xmlns:a16="http://schemas.microsoft.com/office/drawing/2014/main" id="{4DA197EC-75CE-4967-B49A-620F6D94CA9D}"/>
               </a:ext>
             </a:extLst>
           </p:cNvPr>
@@ -5786,7 +5680,7 @@
           <a:p>
             <a:r>
               <a:rPr lang="en-US" dirty="0"/>
-              <a:t>R Studio Cloud workspace</a:t>
+              <a:t>Workshop Materials</a:t>
             </a:r>
           </a:p>
         </p:txBody>
@@ -5796,7 +5690,256 @@
           <p:cNvPr id="3" name="Content Placeholder 2">
             <a:extLst>
               <a:ext uri="{FF2B5EF4-FFF2-40B4-BE49-F238E27FC236}">
-                <a16:creationId xmlns:a16="http://schemas.microsoft.com/office/drawing/2014/main" xmlns="" id="{8AB0FEEC-3BEF-46E7-912B-C736F42B180B}"/>
+                <a16:creationId xmlns="" xmlns:a16="http://schemas.microsoft.com/office/drawing/2014/main" id="{8AB0FEEC-3BEF-46E7-912B-C736F42B180B}"/>
+              </a:ext>
+            </a:extLst>
+          </p:cNvPr>
+          <p:cNvSpPr>
+            <a:spLocks noGrp="1"/>
+          </p:cNvSpPr>
+          <p:nvPr>
+            <p:ph sz="half" idx="1"/>
+          </p:nvPr>
+        </p:nvSpPr>
+        <p:spPr>
+          <a:xfrm>
+            <a:off x="914400" y="2014194"/>
+            <a:ext cx="10363200" cy="789709"/>
+          </a:xfrm>
+        </p:spPr>
+        <p:txBody>
+          <a:bodyPr/>
+          <a:lstStyle/>
+          <a:p>
+            <a:pPr marL="0" indent="0" algn="ctr">
+              <a:buNone/>
+            </a:pPr>
+            <a:r>
+              <a:rPr lang="en-US" sz="3600" b="1" dirty="0" smtClean="0"/>
+              <a:t>bit.ly/</a:t>
+            </a:r>
+            <a:r>
+              <a:rPr lang="en-US" sz="3600" b="1" dirty="0" err="1" smtClean="0"/>
+              <a:t>valtools_CSS</a:t>
+            </a:r>
+            <a:endParaRPr lang="en-US" sz="3600" b="1" dirty="0"/>
+          </a:p>
+          <a:p>
+            <a:pPr marL="274320" lvl="1" indent="0">
+              <a:buNone/>
+            </a:pPr>
+            <a:endParaRPr lang="en-US" sz="1400" b="1" dirty="0"/>
+          </a:p>
+          <a:p>
+            <a:pPr marL="822960" lvl="3" indent="0">
+              <a:buNone/>
+            </a:pPr>
+            <a:endParaRPr lang="en-US" sz="1800" b="1" dirty="0"/>
+          </a:p>
+          <a:p>
+            <a:pPr lvl="1"/>
+            <a:endParaRPr lang="en-US" b="1" dirty="0"/>
+          </a:p>
+          <a:p>
+            <a:endParaRPr lang="en-US" b="1" dirty="0"/>
+          </a:p>
+        </p:txBody>
+      </p:sp>
+      <p:sp>
+        <p:nvSpPr>
+          <p:cNvPr id="4" name="TextBox 3">
+            <a:extLst>
+              <a:ext uri="{FF2B5EF4-FFF2-40B4-BE49-F238E27FC236}">
+                <a16:creationId xmlns="" xmlns:a16="http://schemas.microsoft.com/office/drawing/2014/main" id="{D59083DE-6E1A-4132-A4C8-A18D53074B76}"/>
+              </a:ext>
+            </a:extLst>
+          </p:cNvPr>
+          <p:cNvSpPr txBox="1"/>
+          <p:nvPr/>
+        </p:nvSpPr>
+        <p:spPr>
+          <a:xfrm>
+            <a:off x="2643447" y="2990406"/>
+            <a:ext cx="7187736" cy="1938992"/>
+          </a:xfrm>
+          <a:prstGeom prst="rect">
+            <a:avLst/>
+          </a:prstGeom>
+          <a:noFill/>
+        </p:spPr>
+        <p:txBody>
+          <a:bodyPr wrap="square" rtlCol="0">
+            <a:spAutoFit/>
+          </a:bodyPr>
+          <a:lstStyle/>
+          <a:p>
+            <a:pPr marL="0" lvl="2" algn="ctr" defTabSz="114300"/>
+            <a:r>
+              <a:rPr lang="en-US" sz="2400" dirty="0">
+                <a:solidFill>
+                  <a:schemeClr val="accent2"/>
+                </a:solidFill>
+              </a:rPr>
+              <a:t>Slides</a:t>
+            </a:r>
+            <a:r>
+              <a:rPr lang="en-US" sz="2400" dirty="0"/>
+              <a:t> folder contains presentation slides</a:t>
+            </a:r>
+          </a:p>
+          <a:p>
+            <a:pPr marL="0" lvl="2" algn="ctr" defTabSz="114300"/>
+            <a:endParaRPr lang="en-US" sz="2400" dirty="0"/>
+          </a:p>
+          <a:p>
+            <a:pPr marL="0" lvl="2" algn="ctr" defTabSz="114300"/>
+            <a:r>
+              <a:rPr lang="en-US" sz="2400" dirty="0">
+                <a:solidFill>
+                  <a:schemeClr val="accent2"/>
+                </a:solidFill>
+              </a:rPr>
+              <a:t>Materials</a:t>
+            </a:r>
+            <a:r>
+              <a:rPr lang="en-US" sz="2400" dirty="0"/>
+              <a:t> folder contains 2 types of exercises:</a:t>
+            </a:r>
+            <a:r>
+              <a:rPr lang="en-US" sz="2400" dirty="0">
+                <a:solidFill>
+                  <a:schemeClr val="accent1">
+                    <a:lumMod val="75000"/>
+                  </a:schemeClr>
+                </a:solidFill>
+              </a:rPr>
+              <a:t> Sparse </a:t>
+            </a:r>
+            <a:r>
+              <a:rPr lang="en-US" sz="2400" dirty="0"/>
+              <a:t>or </a:t>
+            </a:r>
+            <a:r>
+              <a:rPr lang="en-US" sz="2400" dirty="0">
+                <a:solidFill>
+                  <a:schemeClr val="accent4">
+                    <a:lumMod val="75000"/>
+                  </a:schemeClr>
+                </a:solidFill>
+              </a:rPr>
+              <a:t>Verbose</a:t>
+            </a:r>
+          </a:p>
+          <a:p>
+            <a:pPr algn="ctr"/>
+            <a:endParaRPr lang="en-US" sz="2400" dirty="0"/>
+          </a:p>
+        </p:txBody>
+      </p:sp>
+      <p:sp>
+        <p:nvSpPr>
+          <p:cNvPr id="5" name="TextBox 4">
+            <a:extLst>
+              <a:ext uri="{FF2B5EF4-FFF2-40B4-BE49-F238E27FC236}">
+                <a16:creationId xmlns="" xmlns:a16="http://schemas.microsoft.com/office/drawing/2014/main" id="{2B0E1A9C-DED3-4FD3-978C-825945879A48}"/>
+              </a:ext>
+            </a:extLst>
+          </p:cNvPr>
+          <p:cNvSpPr txBox="1"/>
+          <p:nvPr/>
+        </p:nvSpPr>
+        <p:spPr>
+          <a:xfrm>
+            <a:off x="1162395" y="4879571"/>
+            <a:ext cx="9867207" cy="1384995"/>
+          </a:xfrm>
+          <a:prstGeom prst="rect">
+            <a:avLst/>
+          </a:prstGeom>
+          <a:noFill/>
+        </p:spPr>
+        <p:txBody>
+          <a:bodyPr wrap="square" rtlCol="0">
+            <a:spAutoFit/>
+          </a:bodyPr>
+          <a:lstStyle/>
+          <a:p>
+            <a:pPr algn="ctr"/>
+            <a:r>
+              <a:rPr lang="en-US" sz="2800" dirty="0"/>
+              <a:t>Workshop slides and exercises are online now and will be available after the conference too.</a:t>
+            </a:r>
+          </a:p>
+          <a:p>
+            <a:pPr algn="ctr"/>
+            <a:endParaRPr lang="en-US" sz="2800" dirty="0"/>
+          </a:p>
+        </p:txBody>
+      </p:sp>
+    </p:spTree>
+    <p:extLst>
+      <p:ext uri="{BB962C8B-B14F-4D97-AF65-F5344CB8AC3E}">
+        <p14:creationId xmlns:p14="http://schemas.microsoft.com/office/powerpoint/2010/main" val="2961198549"/>
+      </p:ext>
+    </p:extLst>
+  </p:cSld>
+  <p:clrMapOvr>
+    <a:masterClrMapping/>
+  </p:clrMapOvr>
+</p:sld>
+</file>
+
+<file path=ppt/slides/slide12.xml><?xml version="1.0" encoding="utf-8"?>
+<p:sld xmlns:a="http://schemas.openxmlformats.org/drawingml/2006/main" xmlns:r="http://schemas.openxmlformats.org/officeDocument/2006/relationships" xmlns:p="http://schemas.openxmlformats.org/presentationml/2006/main">
+  <p:cSld>
+    <p:spTree>
+      <p:nvGrpSpPr>
+        <p:cNvPr id="1" name=""/>
+        <p:cNvGrpSpPr/>
+        <p:nvPr/>
+      </p:nvGrpSpPr>
+      <p:grpSpPr>
+        <a:xfrm>
+          <a:off x="0" y="0"/>
+          <a:ext cx="0" cy="0"/>
+          <a:chOff x="0" y="0"/>
+          <a:chExt cx="0" cy="0"/>
+        </a:xfrm>
+      </p:grpSpPr>
+      <p:sp>
+        <p:nvSpPr>
+          <p:cNvPr id="2" name="Title 1">
+            <a:extLst>
+              <a:ext uri="{FF2B5EF4-FFF2-40B4-BE49-F238E27FC236}">
+                <a16:creationId xmlns="" xmlns:a16="http://schemas.microsoft.com/office/drawing/2014/main" id="{4DA197EC-75CE-4967-B49A-620F6D94CA9D}"/>
+              </a:ext>
+            </a:extLst>
+          </p:cNvPr>
+          <p:cNvSpPr>
+            <a:spLocks noGrp="1"/>
+          </p:cNvSpPr>
+          <p:nvPr>
+            <p:ph type="title"/>
+          </p:nvPr>
+        </p:nvSpPr>
+        <p:spPr/>
+        <p:txBody>
+          <a:bodyPr/>
+          <a:lstStyle/>
+          <a:p>
+            <a:r>
+              <a:rPr lang="en-US" dirty="0"/>
+              <a:t>R Studio Cloud workspace</a:t>
+            </a:r>
+          </a:p>
+        </p:txBody>
+      </p:sp>
+      <p:sp>
+        <p:nvSpPr>
+          <p:cNvPr id="3" name="Content Placeholder 2">
+            <a:extLst>
+              <a:ext uri="{FF2B5EF4-FFF2-40B4-BE49-F238E27FC236}">
+                <a16:creationId xmlns="" xmlns:a16="http://schemas.microsoft.com/office/drawing/2014/main" id="{8AB0FEEC-3BEF-46E7-912B-C736F42B180B}"/>
               </a:ext>
             </a:extLst>
           </p:cNvPr>
@@ -5851,7 +5994,7 @@
           <p:cNvPr id="5" name="TextBox 4">
             <a:extLst>
               <a:ext uri="{FF2B5EF4-FFF2-40B4-BE49-F238E27FC236}">
-                <a16:creationId xmlns:a16="http://schemas.microsoft.com/office/drawing/2014/main" xmlns="" id="{2B0E1A9C-DED3-4FD3-978C-825945879A48}"/>
+                <a16:creationId xmlns="" xmlns:a16="http://schemas.microsoft.com/office/drawing/2014/main" id="{2B0E1A9C-DED3-4FD3-978C-825945879A48}"/>
               </a:ext>
             </a:extLst>
           </p:cNvPr>
@@ -5891,7 +6034,7 @@
           <p:cNvPr id="7" name="Picture 6" descr="Graphical user interface, text&#10;&#10;Description automatically generated">
             <a:extLst>
               <a:ext uri="{FF2B5EF4-FFF2-40B4-BE49-F238E27FC236}">
-                <a16:creationId xmlns:a16="http://schemas.microsoft.com/office/drawing/2014/main" xmlns="" id="{D8A3034C-41BD-4820-B9F6-D84867DB66F9}"/>
+                <a16:creationId xmlns="" xmlns:a16="http://schemas.microsoft.com/office/drawing/2014/main" id="{D8A3034C-41BD-4820-B9F6-D84867DB66F9}"/>
               </a:ext>
             </a:extLst>
           </p:cNvPr>
@@ -5929,64 +6072,6 @@
 </p:sld>
 </file>
 
-<file path=ppt/slides/slide12.xml><?xml version="1.0" encoding="utf-8"?>
-<p:sld xmlns:a="http://schemas.openxmlformats.org/drawingml/2006/main" xmlns:r="http://schemas.openxmlformats.org/officeDocument/2006/relationships" xmlns:p="http://schemas.openxmlformats.org/presentationml/2006/main">
-  <p:cSld>
-    <p:spTree>
-      <p:nvGrpSpPr>
-        <p:cNvPr id="1" name=""/>
-        <p:cNvGrpSpPr/>
-        <p:nvPr/>
-      </p:nvGrpSpPr>
-      <p:grpSpPr>
-        <a:xfrm>
-          <a:off x="0" y="0"/>
-          <a:ext cx="0" cy="0"/>
-          <a:chOff x="0" y="0"/>
-          <a:chExt cx="0" cy="0"/>
-        </a:xfrm>
-      </p:grpSpPr>
-      <p:sp>
-        <p:nvSpPr>
-          <p:cNvPr id="2" name="Title 1">
-            <a:extLst>
-              <a:ext uri="{FF2B5EF4-FFF2-40B4-BE49-F238E27FC236}">
-                <a16:creationId xmlns:a16="http://schemas.microsoft.com/office/drawing/2014/main" xmlns="" id="{7614332B-4F24-42F4-A704-A6F1183E9470}"/>
-              </a:ext>
-            </a:extLst>
-          </p:cNvPr>
-          <p:cNvSpPr>
-            <a:spLocks noGrp="1"/>
-          </p:cNvSpPr>
-          <p:nvPr>
-            <p:ph type="ctrTitle"/>
-          </p:nvPr>
-        </p:nvSpPr>
-        <p:spPr/>
-        <p:txBody>
-          <a:bodyPr/>
-          <a:lstStyle/>
-          <a:p>
-            <a:r>
-              <a:rPr lang="en-US" dirty="0"/>
-              <a:t>When are we getting there</a:t>
-            </a:r>
-          </a:p>
-        </p:txBody>
-      </p:sp>
-    </p:spTree>
-    <p:extLst>
-      <p:ext uri="{BB962C8B-B14F-4D97-AF65-F5344CB8AC3E}">
-        <p14:creationId xmlns:p14="http://schemas.microsoft.com/office/powerpoint/2010/main" val="1671609768"/>
-      </p:ext>
-    </p:extLst>
-  </p:cSld>
-  <p:clrMapOvr>
-    <a:masterClrMapping/>
-  </p:clrMapOvr>
-</p:sld>
-</file>
-
 <file path=ppt/slides/slide13.xml><?xml version="1.0" encoding="utf-8"?>
 <p:sld xmlns:a="http://schemas.openxmlformats.org/drawingml/2006/main" xmlns:r="http://schemas.openxmlformats.org/officeDocument/2006/relationships" xmlns:p="http://schemas.openxmlformats.org/presentationml/2006/main">
   <p:cSld>
@@ -6009,7 +6094,65 @@
           <p:cNvPr id="2" name="Title 1">
             <a:extLst>
               <a:ext uri="{FF2B5EF4-FFF2-40B4-BE49-F238E27FC236}">
-                <a16:creationId xmlns:a16="http://schemas.microsoft.com/office/drawing/2014/main" xmlns="" id="{4DA197EC-75CE-4967-B49A-620F6D94CA9D}"/>
+                <a16:creationId xmlns="" xmlns:a16="http://schemas.microsoft.com/office/drawing/2014/main" id="{7614332B-4F24-42F4-A704-A6F1183E9470}"/>
+              </a:ext>
+            </a:extLst>
+          </p:cNvPr>
+          <p:cNvSpPr>
+            <a:spLocks noGrp="1"/>
+          </p:cNvSpPr>
+          <p:nvPr>
+            <p:ph type="ctrTitle"/>
+          </p:nvPr>
+        </p:nvSpPr>
+        <p:spPr/>
+        <p:txBody>
+          <a:bodyPr/>
+          <a:lstStyle/>
+          <a:p>
+            <a:r>
+              <a:rPr lang="en-US" dirty="0"/>
+              <a:t>When are we getting there</a:t>
+            </a:r>
+          </a:p>
+        </p:txBody>
+      </p:sp>
+    </p:spTree>
+    <p:extLst>
+      <p:ext uri="{BB962C8B-B14F-4D97-AF65-F5344CB8AC3E}">
+        <p14:creationId xmlns:p14="http://schemas.microsoft.com/office/powerpoint/2010/main" val="1671609768"/>
+      </p:ext>
+    </p:extLst>
+  </p:cSld>
+  <p:clrMapOvr>
+    <a:masterClrMapping/>
+  </p:clrMapOvr>
+</p:sld>
+</file>
+
+<file path=ppt/slides/slide14.xml><?xml version="1.0" encoding="utf-8"?>
+<p:sld xmlns:a="http://schemas.openxmlformats.org/drawingml/2006/main" xmlns:r="http://schemas.openxmlformats.org/officeDocument/2006/relationships" xmlns:p="http://schemas.openxmlformats.org/presentationml/2006/main">
+  <p:cSld>
+    <p:spTree>
+      <p:nvGrpSpPr>
+        <p:cNvPr id="1" name=""/>
+        <p:cNvGrpSpPr/>
+        <p:nvPr/>
+      </p:nvGrpSpPr>
+      <p:grpSpPr>
+        <a:xfrm>
+          <a:off x="0" y="0"/>
+          <a:ext cx="0" cy="0"/>
+          <a:chOff x="0" y="0"/>
+          <a:chExt cx="0" cy="0"/>
+        </a:xfrm>
+      </p:grpSpPr>
+      <p:sp>
+        <p:nvSpPr>
+          <p:cNvPr id="2" name="Title 1">
+            <a:extLst>
+              <a:ext uri="{FF2B5EF4-FFF2-40B4-BE49-F238E27FC236}">
+                <a16:creationId xmlns="" xmlns:a16="http://schemas.microsoft.com/office/drawing/2014/main" id="{4DA197EC-75CE-4967-B49A-620F6D94CA9D}"/>
               </a:ext>
             </a:extLst>
           </p:cNvPr>
@@ -6042,7 +6185,7 @@
           <p:cNvPr id="6" name="Table 5">
             <a:extLst>
               <a:ext uri="{FF2B5EF4-FFF2-40B4-BE49-F238E27FC236}">
-                <a16:creationId xmlns:a16="http://schemas.microsoft.com/office/drawing/2014/main" xmlns="" id="{79681E2D-3A7F-49C3-9B7F-2E9CED5B8FC5}"/>
+                <a16:creationId xmlns="" xmlns:a16="http://schemas.microsoft.com/office/drawing/2014/main" id="{79681E2D-3A7F-49C3-9B7F-2E9CED5B8FC5}"/>
               </a:ext>
             </a:extLst>
           </p:cNvPr>
@@ -6071,21 +6214,21 @@
                 <a:gridCol w="2068072">
                   <a:extLst>
                     <a:ext uri="{9D8B030D-6E8A-4147-A177-3AD203B41FA5}">
-                      <a16:colId xmlns:a16="http://schemas.microsoft.com/office/drawing/2014/main" xmlns="" val="1356780315"/>
+                      <a16:colId xmlns="" xmlns:a16="http://schemas.microsoft.com/office/drawing/2014/main" val="1356780315"/>
                     </a:ext>
                   </a:extLst>
                 </a:gridCol>
                 <a:gridCol w="3402349">
                   <a:extLst>
                     <a:ext uri="{9D8B030D-6E8A-4147-A177-3AD203B41FA5}">
-                      <a16:colId xmlns:a16="http://schemas.microsoft.com/office/drawing/2014/main" xmlns="" val="3006423282"/>
+                      <a16:colId xmlns="" xmlns:a16="http://schemas.microsoft.com/office/drawing/2014/main" val="3006423282"/>
                     </a:ext>
                   </a:extLst>
                 </a:gridCol>
                 <a:gridCol w="3789957">
                   <a:extLst>
                     <a:ext uri="{9D8B030D-6E8A-4147-A177-3AD203B41FA5}">
-                      <a16:colId xmlns:a16="http://schemas.microsoft.com/office/drawing/2014/main" xmlns="" val="857023930"/>
+                      <a16:colId xmlns="" xmlns:a16="http://schemas.microsoft.com/office/drawing/2014/main" val="857023930"/>
                     </a:ext>
                   </a:extLst>
                 </a:gridCol>
@@ -6273,7 +6416,7 @@
                 </a:tc>
                 <a:extLst>
                   <a:ext uri="{0D108BD9-81ED-4DB2-BD59-A6C34878D82A}">
-                    <a16:rowId xmlns:a16="http://schemas.microsoft.com/office/drawing/2014/main" xmlns="" val="1183580986"/>
+                    <a16:rowId xmlns="" xmlns:a16="http://schemas.microsoft.com/office/drawing/2014/main" val="1183580986"/>
                   </a:ext>
                 </a:extLst>
               </a:tr>
@@ -6463,7 +6606,7 @@
                 </a:tc>
                 <a:extLst>
                   <a:ext uri="{0D108BD9-81ED-4DB2-BD59-A6C34878D82A}">
-                    <a16:rowId xmlns:a16="http://schemas.microsoft.com/office/drawing/2014/main" xmlns="" val="2899440749"/>
+                    <a16:rowId xmlns="" xmlns:a16="http://schemas.microsoft.com/office/drawing/2014/main" val="2899440749"/>
                   </a:ext>
                 </a:extLst>
               </a:tr>
@@ -6681,7 +6824,7 @@
                 </a:tc>
                 <a:extLst>
                   <a:ext uri="{0D108BD9-81ED-4DB2-BD59-A6C34878D82A}">
-                    <a16:rowId xmlns:a16="http://schemas.microsoft.com/office/drawing/2014/main" xmlns="" val="3644456092"/>
+                    <a16:rowId xmlns="" xmlns:a16="http://schemas.microsoft.com/office/drawing/2014/main" val="3644456092"/>
                   </a:ext>
                 </a:extLst>
               </a:tr>
@@ -6871,7 +7014,7 @@
                 </a:tc>
                 <a:extLst>
                   <a:ext uri="{0D108BD9-81ED-4DB2-BD59-A6C34878D82A}">
-                    <a16:rowId xmlns:a16="http://schemas.microsoft.com/office/drawing/2014/main" xmlns="" val="4195182062"/>
+                    <a16:rowId xmlns="" xmlns:a16="http://schemas.microsoft.com/office/drawing/2014/main" val="4195182062"/>
                   </a:ext>
                 </a:extLst>
               </a:tr>
@@ -7089,7 +7232,7 @@
                 </a:tc>
                 <a:extLst>
                   <a:ext uri="{0D108BD9-81ED-4DB2-BD59-A6C34878D82A}">
-                    <a16:rowId xmlns:a16="http://schemas.microsoft.com/office/drawing/2014/main" xmlns="" val="3452375224"/>
+                    <a16:rowId xmlns="" xmlns:a16="http://schemas.microsoft.com/office/drawing/2014/main" val="3452375224"/>
                   </a:ext>
                 </a:extLst>
               </a:tr>
@@ -7321,7 +7464,7 @@
                 </a:tc>
                 <a:extLst>
                   <a:ext uri="{0D108BD9-81ED-4DB2-BD59-A6C34878D82A}">
-                    <a16:rowId xmlns:a16="http://schemas.microsoft.com/office/drawing/2014/main" xmlns="" val="2400179646"/>
+                    <a16:rowId xmlns="" xmlns:a16="http://schemas.microsoft.com/office/drawing/2014/main" val="2400179646"/>
                   </a:ext>
                 </a:extLst>
               </a:tr>
@@ -7721,7 +7864,7 @@
                 </a:tc>
                 <a:extLst>
                   <a:ext uri="{0D108BD9-81ED-4DB2-BD59-A6C34878D82A}">
-                    <a16:rowId xmlns:a16="http://schemas.microsoft.com/office/drawing/2014/main" xmlns="" val="885546553"/>
+                    <a16:rowId xmlns="" xmlns:a16="http://schemas.microsoft.com/office/drawing/2014/main" val="885546553"/>
                   </a:ext>
                 </a:extLst>
               </a:tr>
@@ -8121,7 +8264,7 @@
                 </a:tc>
                 <a:extLst>
                   <a:ext uri="{0D108BD9-81ED-4DB2-BD59-A6C34878D82A}">
-                    <a16:rowId xmlns:a16="http://schemas.microsoft.com/office/drawing/2014/main" xmlns="" val="1210118487"/>
+                    <a16:rowId xmlns="" xmlns:a16="http://schemas.microsoft.com/office/drawing/2014/main" val="1210118487"/>
                   </a:ext>
                 </a:extLst>
               </a:tr>
@@ -8133,64 +8276,6 @@
     <p:extLst>
       <p:ext uri="{BB962C8B-B14F-4D97-AF65-F5344CB8AC3E}">
         <p14:creationId xmlns:p14="http://schemas.microsoft.com/office/powerpoint/2010/main" val="2287488995"/>
-      </p:ext>
-    </p:extLst>
-  </p:cSld>
-  <p:clrMapOvr>
-    <a:masterClrMapping/>
-  </p:clrMapOvr>
-</p:sld>
-</file>
-
-<file path=ppt/slides/slide14.xml><?xml version="1.0" encoding="utf-8"?>
-<p:sld xmlns:a="http://schemas.openxmlformats.org/drawingml/2006/main" xmlns:r="http://schemas.openxmlformats.org/officeDocument/2006/relationships" xmlns:p="http://schemas.openxmlformats.org/presentationml/2006/main">
-  <p:cSld>
-    <p:spTree>
-      <p:nvGrpSpPr>
-        <p:cNvPr id="1" name=""/>
-        <p:cNvGrpSpPr/>
-        <p:nvPr/>
-      </p:nvGrpSpPr>
-      <p:grpSpPr>
-        <a:xfrm>
-          <a:off x="0" y="0"/>
-          <a:ext cx="0" cy="0"/>
-          <a:chOff x="0" y="0"/>
-          <a:chExt cx="0" cy="0"/>
-        </a:xfrm>
-      </p:grpSpPr>
-      <p:sp>
-        <p:nvSpPr>
-          <p:cNvPr id="2" name="Title 1">
-            <a:extLst>
-              <a:ext uri="{FF2B5EF4-FFF2-40B4-BE49-F238E27FC236}">
-                <a16:creationId xmlns:a16="http://schemas.microsoft.com/office/drawing/2014/main" xmlns="" id="{7614332B-4F24-42F4-A704-A6F1183E9470}"/>
-              </a:ext>
-            </a:extLst>
-          </p:cNvPr>
-          <p:cNvSpPr>
-            <a:spLocks noGrp="1"/>
-          </p:cNvSpPr>
-          <p:nvPr>
-            <p:ph type="ctrTitle"/>
-          </p:nvPr>
-        </p:nvSpPr>
-        <p:spPr/>
-        <p:txBody>
-          <a:bodyPr/>
-          <a:lstStyle/>
-          <a:p>
-            <a:r>
-              <a:rPr lang="en-US" dirty="0"/>
-              <a:t>Where do we go from here</a:t>
-            </a:r>
-          </a:p>
-        </p:txBody>
-      </p:sp>
-    </p:spTree>
-    <p:extLst>
-      <p:ext uri="{BB962C8B-B14F-4D97-AF65-F5344CB8AC3E}">
-        <p14:creationId xmlns:p14="http://schemas.microsoft.com/office/powerpoint/2010/main" val="2551221187"/>
       </p:ext>
     </p:extLst>
   </p:cSld>
@@ -8219,10 +8304,68 @@
       </p:grpSpPr>
       <p:sp>
         <p:nvSpPr>
+          <p:cNvPr id="2" name="Title 1">
+            <a:extLst>
+              <a:ext uri="{FF2B5EF4-FFF2-40B4-BE49-F238E27FC236}">
+                <a16:creationId xmlns="" xmlns:a16="http://schemas.microsoft.com/office/drawing/2014/main" id="{7614332B-4F24-42F4-A704-A6F1183E9470}"/>
+              </a:ext>
+            </a:extLst>
+          </p:cNvPr>
+          <p:cNvSpPr>
+            <a:spLocks noGrp="1"/>
+          </p:cNvSpPr>
+          <p:nvPr>
+            <p:ph type="ctrTitle"/>
+          </p:nvPr>
+        </p:nvSpPr>
+        <p:spPr/>
+        <p:txBody>
+          <a:bodyPr/>
+          <a:lstStyle/>
+          <a:p>
+            <a:r>
+              <a:rPr lang="en-US" dirty="0"/>
+              <a:t>Where do we go from here</a:t>
+            </a:r>
+          </a:p>
+        </p:txBody>
+      </p:sp>
+    </p:spTree>
+    <p:extLst>
+      <p:ext uri="{BB962C8B-B14F-4D97-AF65-F5344CB8AC3E}">
+        <p14:creationId xmlns:p14="http://schemas.microsoft.com/office/powerpoint/2010/main" val="2551221187"/>
+      </p:ext>
+    </p:extLst>
+  </p:cSld>
+  <p:clrMapOvr>
+    <a:masterClrMapping/>
+  </p:clrMapOvr>
+</p:sld>
+</file>
+
+<file path=ppt/slides/slide16.xml><?xml version="1.0" encoding="utf-8"?>
+<p:sld xmlns:a="http://schemas.openxmlformats.org/drawingml/2006/main" xmlns:r="http://schemas.openxmlformats.org/officeDocument/2006/relationships" xmlns:p="http://schemas.openxmlformats.org/presentationml/2006/main">
+  <p:cSld>
+    <p:spTree>
+      <p:nvGrpSpPr>
+        <p:cNvPr id="1" name=""/>
+        <p:cNvGrpSpPr/>
+        <p:nvPr/>
+      </p:nvGrpSpPr>
+      <p:grpSpPr>
+        <a:xfrm>
+          <a:off x="0" y="0"/>
+          <a:ext cx="0" cy="0"/>
+          <a:chOff x="0" y="0"/>
+          <a:chExt cx="0" cy="0"/>
+        </a:xfrm>
+      </p:grpSpPr>
+      <p:sp>
+        <p:nvSpPr>
           <p:cNvPr id="4" name="Title 1">
             <a:extLst>
               <a:ext uri="{FF2B5EF4-FFF2-40B4-BE49-F238E27FC236}">
-                <a16:creationId xmlns:a16="http://schemas.microsoft.com/office/drawing/2014/main" xmlns="" id="{B781D10C-0426-420D-A569-C70F2C81AAF0}"/>
+                <a16:creationId xmlns="" xmlns:a16="http://schemas.microsoft.com/office/drawing/2014/main" id="{B781D10C-0426-420D-A569-C70F2C81AAF0}"/>
               </a:ext>
             </a:extLst>
           </p:cNvPr>
@@ -8293,72 +8436,6 @@
 </p:sld>
 </file>
 
-<file path=ppt/slides/slide16.xml><?xml version="1.0" encoding="utf-8"?>
-<p:sld xmlns:a="http://schemas.openxmlformats.org/drawingml/2006/main" xmlns:r="http://schemas.openxmlformats.org/officeDocument/2006/relationships" xmlns:p="http://schemas.openxmlformats.org/presentationml/2006/main">
-  <p:cSld>
-    <p:spTree>
-      <p:nvGrpSpPr>
-        <p:cNvPr id="1" name=""/>
-        <p:cNvGrpSpPr/>
-        <p:nvPr/>
-      </p:nvGrpSpPr>
-      <p:grpSpPr>
-        <a:xfrm>
-          <a:off x="0" y="0"/>
-          <a:ext cx="0" cy="0"/>
-          <a:chOff x="0" y="0"/>
-          <a:chExt cx="0" cy="0"/>
-        </a:xfrm>
-      </p:grpSpPr>
-      <p:sp>
-        <p:nvSpPr>
-          <p:cNvPr id="2" name="Title 1">
-            <a:extLst>
-              <a:ext uri="{FF2B5EF4-FFF2-40B4-BE49-F238E27FC236}">
-                <a16:creationId xmlns:a16="http://schemas.microsoft.com/office/drawing/2014/main" xmlns="" id="{85099D8A-7BF6-4A5A-ACD4-C59D23E4D745}"/>
-              </a:ext>
-            </a:extLst>
-          </p:cNvPr>
-          <p:cNvSpPr>
-            <a:spLocks noGrp="1"/>
-          </p:cNvSpPr>
-          <p:nvPr>
-            <p:ph type="title"/>
-          </p:nvPr>
-        </p:nvSpPr>
-        <p:spPr>
-          <a:xfrm>
-            <a:off x="1066800" y="2454764"/>
-            <a:ext cx="10058400" cy="2025792"/>
-          </a:xfrm>
-        </p:spPr>
-        <p:txBody>
-          <a:bodyPr>
-            <a:normAutofit/>
-          </a:bodyPr>
-          <a:lstStyle/>
-          <a:p>
-            <a:pPr algn="ctr"/>
-            <a:r>
-              <a:rPr lang="en-US" sz="5400" dirty="0"/>
-              <a:t>What if this is too basic?!</a:t>
-            </a:r>
-          </a:p>
-        </p:txBody>
-      </p:sp>
-    </p:spTree>
-    <p:extLst>
-      <p:ext uri="{BB962C8B-B14F-4D97-AF65-F5344CB8AC3E}">
-        <p14:creationId xmlns:p14="http://schemas.microsoft.com/office/powerpoint/2010/main" val="2605250684"/>
-      </p:ext>
-    </p:extLst>
-  </p:cSld>
-  <p:clrMapOvr>
-    <a:masterClrMapping/>
-  </p:clrMapOvr>
-</p:sld>
-</file>
-
 <file path=ppt/slides/slide17.xml><?xml version="1.0" encoding="utf-8"?>
 <p:sld xmlns:a="http://schemas.openxmlformats.org/drawingml/2006/main" xmlns:r="http://schemas.openxmlformats.org/officeDocument/2006/relationships" xmlns:p="http://schemas.openxmlformats.org/presentationml/2006/main">
   <p:cSld>
@@ -8381,7 +8458,7 @@
           <p:cNvPr id="2" name="Title 1">
             <a:extLst>
               <a:ext uri="{FF2B5EF4-FFF2-40B4-BE49-F238E27FC236}">
-                <a16:creationId xmlns:a16="http://schemas.microsoft.com/office/drawing/2014/main" xmlns="" id="{85099D8A-7BF6-4A5A-ACD4-C59D23E4D745}"/>
+                <a16:creationId xmlns="" xmlns:a16="http://schemas.microsoft.com/office/drawing/2014/main" id="{85099D8A-7BF6-4A5A-ACD4-C59D23E4D745}"/>
               </a:ext>
             </a:extLst>
           </p:cNvPr>
@@ -8407,7 +8484,7 @@
             <a:pPr algn="ctr"/>
             <a:r>
               <a:rPr lang="en-US" sz="5400" dirty="0"/>
-              <a:t>What if I find an issue in the documentation?</a:t>
+              <a:t>What if this is too basic?!</a:t>
             </a:r>
           </a:p>
         </p:txBody>
@@ -8415,7 +8492,7 @@
     </p:spTree>
     <p:extLst>
       <p:ext uri="{BB962C8B-B14F-4D97-AF65-F5344CB8AC3E}">
-        <p14:creationId xmlns:p14="http://schemas.microsoft.com/office/powerpoint/2010/main" val="51954009"/>
+        <p14:creationId xmlns:p14="http://schemas.microsoft.com/office/powerpoint/2010/main" val="2605250684"/>
       </p:ext>
     </p:extLst>
   </p:cSld>
@@ -8447,7 +8524,7 @@
           <p:cNvPr id="2" name="Title 1">
             <a:extLst>
               <a:ext uri="{FF2B5EF4-FFF2-40B4-BE49-F238E27FC236}">
-                <a16:creationId xmlns:a16="http://schemas.microsoft.com/office/drawing/2014/main" xmlns="" id="{85099D8A-7BF6-4A5A-ACD4-C59D23E4D745}"/>
+                <a16:creationId xmlns="" xmlns:a16="http://schemas.microsoft.com/office/drawing/2014/main" id="{85099D8A-7BF6-4A5A-ACD4-C59D23E4D745}"/>
               </a:ext>
             </a:extLst>
           </p:cNvPr>
@@ -8473,7 +8550,7 @@
             <a:pPr algn="ctr"/>
             <a:r>
               <a:rPr lang="en-US" sz="5400" dirty="0"/>
-              <a:t>What if I get stuck?</a:t>
+              <a:t>What if I find an issue in the documentation?</a:t>
             </a:r>
           </a:p>
         </p:txBody>
@@ -8481,7 +8558,7 @@
     </p:spTree>
     <p:extLst>
       <p:ext uri="{BB962C8B-B14F-4D97-AF65-F5344CB8AC3E}">
-        <p14:creationId xmlns:p14="http://schemas.microsoft.com/office/powerpoint/2010/main" val="190418656"/>
+        <p14:creationId xmlns:p14="http://schemas.microsoft.com/office/powerpoint/2010/main" val="51954009"/>
       </p:ext>
     </p:extLst>
   </p:cSld>
@@ -8513,7 +8590,7 @@
           <p:cNvPr id="2" name="Title 1">
             <a:extLst>
               <a:ext uri="{FF2B5EF4-FFF2-40B4-BE49-F238E27FC236}">
-                <a16:creationId xmlns:a16="http://schemas.microsoft.com/office/drawing/2014/main" xmlns="" id="{7614332B-4F24-42F4-A704-A6F1183E9470}"/>
+                <a16:creationId xmlns="" xmlns:a16="http://schemas.microsoft.com/office/drawing/2014/main" id="{85099D8A-7BF6-4A5A-ACD4-C59D23E4D745}"/>
               </a:ext>
             </a:extLst>
           </p:cNvPr>
@@ -8521,29 +8598,25 @@
             <a:spLocks noGrp="1"/>
           </p:cNvSpPr>
           <p:nvPr>
-            <p:ph type="ctrTitle"/>
+            <p:ph type="title"/>
           </p:nvPr>
         </p:nvSpPr>
         <p:spPr>
           <a:xfrm>
-            <a:off x="1629102" y="1847788"/>
-            <a:ext cx="8933796" cy="2437232"/>
+            <a:off x="1066800" y="2454764"/>
+            <a:ext cx="10058400" cy="2025792"/>
           </a:xfrm>
         </p:spPr>
         <p:txBody>
-          <a:bodyPr/>
+          <a:bodyPr>
+            <a:normAutofit/>
+          </a:bodyPr>
           <a:lstStyle/>
           <a:p>
-            <a:r>
-              <a:rPr lang="en-US" dirty="0"/>
-              <a:t>Ready?</a:t>
-            </a:r>
-            <a:br>
-              <a:rPr lang="en-US" dirty="0"/>
-            </a:br>
-            <a:r>
-              <a:rPr lang="en-US" dirty="0"/>
-              <a:t>Lets Go!</a:t>
+            <a:pPr algn="ctr"/>
+            <a:r>
+              <a:rPr lang="en-US" sz="5400" dirty="0"/>
+              <a:t>What if I get stuck?</a:t>
             </a:r>
           </a:p>
         </p:txBody>
@@ -8551,7 +8624,7 @@
     </p:spTree>
     <p:extLst>
       <p:ext uri="{BB962C8B-B14F-4D97-AF65-F5344CB8AC3E}">
-        <p14:creationId xmlns:p14="http://schemas.microsoft.com/office/powerpoint/2010/main" val="723637389"/>
+        <p14:creationId xmlns:p14="http://schemas.microsoft.com/office/powerpoint/2010/main" val="190418656"/>
       </p:ext>
     </p:extLst>
   </p:cSld>
@@ -8583,7 +8656,7 @@
           <p:cNvPr id="2" name="Title 1">
             <a:extLst>
               <a:ext uri="{FF2B5EF4-FFF2-40B4-BE49-F238E27FC236}">
-                <a16:creationId xmlns:a16="http://schemas.microsoft.com/office/drawing/2014/main" xmlns="" id="{749E0D1B-C9EF-4CB6-9922-ED9D4AC52C59}"/>
+                <a16:creationId xmlns="" xmlns:a16="http://schemas.microsoft.com/office/drawing/2014/main" id="{749E0D1B-C9EF-4CB6-9922-ED9D4AC52C59}"/>
               </a:ext>
             </a:extLst>
           </p:cNvPr>
@@ -8611,7 +8684,7 @@
           <p:cNvPr id="5" name="Content Placeholder 4">
             <a:extLst>
               <a:ext uri="{FF2B5EF4-FFF2-40B4-BE49-F238E27FC236}">
-                <a16:creationId xmlns:a16="http://schemas.microsoft.com/office/drawing/2014/main" xmlns="" id="{7E558183-391D-4056-BC02-A181C5440B05}"/>
+                <a16:creationId xmlns="" xmlns:a16="http://schemas.microsoft.com/office/drawing/2014/main" id="{7E558183-391D-4056-BC02-A181C5440B05}"/>
               </a:ext>
             </a:extLst>
           </p:cNvPr>
@@ -8635,8 +8708,9 @@
             </a:r>
             <a:r>
               <a:rPr lang="en-US" sz="2400" dirty="0" smtClean="0"/>
-              <a:t>Am I</a:t>
-            </a:r>
+              <a:t>Are We</a:t>
+            </a:r>
+            <a:endParaRPr lang="en-US" sz="2400" dirty="0" smtClean="0"/>
           </a:p>
           <a:p>
             <a:r>
@@ -8683,6 +8757,76 @@
     <p:extLst>
       <p:ext uri="{BB962C8B-B14F-4D97-AF65-F5344CB8AC3E}">
         <p14:creationId xmlns:p14="http://schemas.microsoft.com/office/powerpoint/2010/main" val="1601236187"/>
+      </p:ext>
+    </p:extLst>
+  </p:cSld>
+  <p:clrMapOvr>
+    <a:masterClrMapping/>
+  </p:clrMapOvr>
+</p:sld>
+</file>
+
+<file path=ppt/slides/slide20.xml><?xml version="1.0" encoding="utf-8"?>
+<p:sld xmlns:a="http://schemas.openxmlformats.org/drawingml/2006/main" xmlns:r="http://schemas.openxmlformats.org/officeDocument/2006/relationships" xmlns:p="http://schemas.openxmlformats.org/presentationml/2006/main">
+  <p:cSld>
+    <p:spTree>
+      <p:nvGrpSpPr>
+        <p:cNvPr id="1" name=""/>
+        <p:cNvGrpSpPr/>
+        <p:nvPr/>
+      </p:nvGrpSpPr>
+      <p:grpSpPr>
+        <a:xfrm>
+          <a:off x="0" y="0"/>
+          <a:ext cx="0" cy="0"/>
+          <a:chOff x="0" y="0"/>
+          <a:chExt cx="0" cy="0"/>
+        </a:xfrm>
+      </p:grpSpPr>
+      <p:sp>
+        <p:nvSpPr>
+          <p:cNvPr id="2" name="Title 1">
+            <a:extLst>
+              <a:ext uri="{FF2B5EF4-FFF2-40B4-BE49-F238E27FC236}">
+                <a16:creationId xmlns="" xmlns:a16="http://schemas.microsoft.com/office/drawing/2014/main" id="{7614332B-4F24-42F4-A704-A6F1183E9470}"/>
+              </a:ext>
+            </a:extLst>
+          </p:cNvPr>
+          <p:cNvSpPr>
+            <a:spLocks noGrp="1"/>
+          </p:cNvSpPr>
+          <p:nvPr>
+            <p:ph type="ctrTitle"/>
+          </p:nvPr>
+        </p:nvSpPr>
+        <p:spPr>
+          <a:xfrm>
+            <a:off x="1629102" y="1847788"/>
+            <a:ext cx="8933796" cy="2437232"/>
+          </a:xfrm>
+        </p:spPr>
+        <p:txBody>
+          <a:bodyPr/>
+          <a:lstStyle/>
+          <a:p>
+            <a:r>
+              <a:rPr lang="en-US" dirty="0"/>
+              <a:t>Ready?</a:t>
+            </a:r>
+            <a:br>
+              <a:rPr lang="en-US" dirty="0"/>
+            </a:br>
+            <a:r>
+              <a:rPr lang="en-US" dirty="0"/>
+              <a:t>Lets Go!</a:t>
+            </a:r>
+          </a:p>
+        </p:txBody>
+      </p:sp>
+    </p:spTree>
+    <p:extLst>
+      <p:ext uri="{BB962C8B-B14F-4D97-AF65-F5344CB8AC3E}">
+        <p14:creationId xmlns:p14="http://schemas.microsoft.com/office/powerpoint/2010/main" val="723637389"/>
       </p:ext>
     </p:extLst>
   </p:cSld>
@@ -8714,7 +8858,7 @@
           <p:cNvPr id="2" name="Title 1">
             <a:extLst>
               <a:ext uri="{FF2B5EF4-FFF2-40B4-BE49-F238E27FC236}">
-                <a16:creationId xmlns:a16="http://schemas.microsoft.com/office/drawing/2014/main" xmlns="" id="{7614332B-4F24-42F4-A704-A6F1183E9470}"/>
+                <a16:creationId xmlns="" xmlns:a16="http://schemas.microsoft.com/office/drawing/2014/main" id="{7614332B-4F24-42F4-A704-A6F1183E9470}"/>
               </a:ext>
             </a:extLst>
           </p:cNvPr>
@@ -8736,7 +8880,7 @@
             </a:r>
             <a:r>
               <a:rPr lang="en-US" dirty="0" smtClean="0"/>
-              <a:t>AM I</a:t>
+              <a:t>ARE WE</a:t>
             </a:r>
             <a:r>
               <a:rPr lang="en-US" dirty="0"/>
@@ -8784,7 +8928,7 @@
           <p:cNvPr id="2" name="Title 1">
             <a:extLst>
               <a:ext uri="{FF2B5EF4-FFF2-40B4-BE49-F238E27FC236}">
-                <a16:creationId xmlns:a16="http://schemas.microsoft.com/office/drawing/2014/main" xmlns="" id="{4F3B95D1-4C83-407C-A358-C8C4A597CFA8}"/>
+                <a16:creationId xmlns="" xmlns:a16="http://schemas.microsoft.com/office/drawing/2014/main" id="{4F3B95D1-4C83-407C-A358-C8C4A597CFA8}"/>
               </a:ext>
             </a:extLst>
           </p:cNvPr>
@@ -8812,7 +8956,7 @@
           <p:cNvPr id="3" name="Content Placeholder 2">
             <a:extLst>
               <a:ext uri="{FF2B5EF4-FFF2-40B4-BE49-F238E27FC236}">
-                <a16:creationId xmlns:a16="http://schemas.microsoft.com/office/drawing/2014/main" xmlns="" id="{37E9709E-5457-48A1-A3E0-58A90B971B97}"/>
+                <a16:creationId xmlns="" xmlns:a16="http://schemas.microsoft.com/office/drawing/2014/main" id="{37E9709E-5457-48A1-A3E0-58A90B971B97}"/>
               </a:ext>
             </a:extLst>
           </p:cNvPr>
@@ -8913,7 +9057,7 @@
           <p:cNvPr id="7" name="Content Placeholder 6">
             <a:extLst>
               <a:ext uri="{FF2B5EF4-FFF2-40B4-BE49-F238E27FC236}">
-                <a16:creationId xmlns:a16="http://schemas.microsoft.com/office/drawing/2014/main" xmlns="" id="{70A593EF-FA8A-45B5-A4ED-19FBE7ABFFA5}"/>
+                <a16:creationId xmlns="" xmlns:a16="http://schemas.microsoft.com/office/drawing/2014/main" id="{70A593EF-FA8A-45B5-A4ED-19FBE7ABFFA5}"/>
               </a:ext>
             </a:extLst>
           </p:cNvPr>
@@ -8943,7 +9087,7 @@
             <a:hlinkClick r:id="rId5"/>
             <a:extLst>
               <a:ext uri="{FF2B5EF4-FFF2-40B4-BE49-F238E27FC236}">
-                <a16:creationId xmlns:a16="http://schemas.microsoft.com/office/drawing/2014/main" xmlns="" id="{036F6E0C-5803-469B-ABC1-2798AD6137BE}"/>
+                <a16:creationId xmlns="" xmlns:a16="http://schemas.microsoft.com/office/drawing/2014/main" id="{036F6E0C-5803-469B-ABC1-2798AD6137BE}"/>
               </a:ext>
             </a:extLst>
           </p:cNvPr>
@@ -8974,7 +9118,7 @@
             <a:hlinkClick r:id="rId7"/>
             <a:extLst>
               <a:ext uri="{FF2B5EF4-FFF2-40B4-BE49-F238E27FC236}">
-                <a16:creationId xmlns:a16="http://schemas.microsoft.com/office/drawing/2014/main" xmlns="" id="{4C33B757-0AEB-4F53-AB7F-9E42D5B9DD55}"/>
+                <a16:creationId xmlns="" xmlns:a16="http://schemas.microsoft.com/office/drawing/2014/main" id="{4C33B757-0AEB-4F53-AB7F-9E42D5B9DD55}"/>
               </a:ext>
             </a:extLst>
           </p:cNvPr>
@@ -9034,7 +9178,7 @@
           <p:cNvPr id="2" name="Title 1">
             <a:extLst>
               <a:ext uri="{FF2B5EF4-FFF2-40B4-BE49-F238E27FC236}">
-                <a16:creationId xmlns:a16="http://schemas.microsoft.com/office/drawing/2014/main" xmlns="" id="{7614332B-4F24-42F4-A704-A6F1183E9470}"/>
+                <a16:creationId xmlns="" xmlns:a16="http://schemas.microsoft.com/office/drawing/2014/main" id="{4F3B95D1-4C83-407C-A358-C8C4A597CFA8}"/>
               </a:ext>
             </a:extLst>
           </p:cNvPr>
@@ -9042,7 +9186,7 @@
             <a:spLocks noGrp="1"/>
           </p:cNvSpPr>
           <p:nvPr>
-            <p:ph type="ctrTitle"/>
+            <p:ph type="title"/>
           </p:nvPr>
         </p:nvSpPr>
         <p:spPr/>
@@ -9052,15 +9196,408 @@
           <a:p>
             <a:r>
               <a:rPr lang="en-US" dirty="0"/>
-              <a:t>Why are we here</a:t>
+              <a:t>Marie Vendettuoli</a:t>
             </a:r>
           </a:p>
         </p:txBody>
       </p:sp>
+      <p:pic>
+        <p:nvPicPr>
+          <p:cNvPr id="6" name="Content Placeholder 5">
+            <a:extLst>
+              <a:ext uri="{FF2B5EF4-FFF2-40B4-BE49-F238E27FC236}">
+                <a16:creationId xmlns="" xmlns:a16="http://schemas.microsoft.com/office/drawing/2014/main" id="{EF865C96-2337-4A23-9653-09031EF4BDD1}"/>
+              </a:ext>
+            </a:extLst>
+          </p:cNvPr>
+          <p:cNvPicPr>
+            <a:picLocks noGrp="1" noChangeAspect="1"/>
+          </p:cNvPicPr>
+          <p:nvPr>
+            <p:ph sz="half" idx="1"/>
+          </p:nvPr>
+        </p:nvPicPr>
+        <p:blipFill>
+          <a:blip r:embed="rId3"/>
+          <a:stretch>
+            <a:fillRect/>
+          </a:stretch>
+        </p:blipFill>
+        <p:spPr>
+          <a:xfrm>
+            <a:off x="1782297" y="1986306"/>
+            <a:ext cx="3749039" cy="3749039"/>
+          </a:xfrm>
+          <a:prstGeom prst="rect">
+            <a:avLst/>
+          </a:prstGeom>
+        </p:spPr>
+      </p:pic>
+      <p:sp>
+        <p:nvSpPr>
+          <p:cNvPr id="5" name="Content Placeholder 4">
+            <a:extLst>
+              <a:ext uri="{FF2B5EF4-FFF2-40B4-BE49-F238E27FC236}">
+                <a16:creationId xmlns="" xmlns:a16="http://schemas.microsoft.com/office/drawing/2014/main" id="{E4708D06-5299-4CFC-B296-7FBBB8D5D933}"/>
+              </a:ext>
+            </a:extLst>
+          </p:cNvPr>
+          <p:cNvSpPr>
+            <a:spLocks noGrp="1"/>
+          </p:cNvSpPr>
+          <p:nvPr>
+            <p:ph sz="half" idx="2"/>
+          </p:nvPr>
+        </p:nvSpPr>
+        <p:spPr>
+          <a:xfrm>
+            <a:off x="5958448" y="2312758"/>
+            <a:ext cx="5044832" cy="1635356"/>
+          </a:xfrm>
+        </p:spPr>
+        <p:txBody>
+          <a:bodyPr/>
+          <a:lstStyle/>
+          <a:p>
+            <a:r>
+              <a:rPr lang="en-US" sz="2000" dirty="0"/>
+              <a:t>Statistical Programmer</a:t>
+            </a:r>
+          </a:p>
+          <a:p>
+            <a:pPr lvl="1"/>
+            <a:r>
+              <a:rPr lang="en-US" sz="1800" dirty="0"/>
+              <a:t>R package developer</a:t>
+            </a:r>
+          </a:p>
+          <a:p>
+            <a:pPr lvl="1"/>
+            <a:r>
+              <a:rPr lang="en-US" sz="1800" dirty="0"/>
+              <a:t>Industry &amp; gov regulatory experience</a:t>
+            </a:r>
+          </a:p>
+          <a:p>
+            <a:pPr lvl="1"/>
+            <a:r>
+              <a:rPr lang="en-US" sz="1800" dirty="0"/>
+              <a:t>Recovering wet lab scientist</a:t>
+            </a:r>
+          </a:p>
+          <a:p>
+            <a:pPr marL="0" indent="0">
+              <a:buNone/>
+            </a:pPr>
+            <a:endParaRPr lang="en-US" sz="1800" dirty="0"/>
+          </a:p>
+          <a:p>
+            <a:pPr lvl="1"/>
+            <a:endParaRPr lang="en-US" dirty="0"/>
+          </a:p>
+        </p:txBody>
+      </p:sp>
+      <p:grpSp>
+        <p:nvGrpSpPr>
+          <p:cNvPr id="23" name="Group 22">
+            <a:extLst>
+              <a:ext uri="{FF2B5EF4-FFF2-40B4-BE49-F238E27FC236}">
+                <a16:creationId xmlns="" xmlns:a16="http://schemas.microsoft.com/office/drawing/2014/main" id="{7B66FF87-DDA2-43E9-8DA4-03D2187E7D8E}"/>
+              </a:ext>
+            </a:extLst>
+          </p:cNvPr>
+          <p:cNvGrpSpPr/>
+          <p:nvPr/>
+        </p:nvGrpSpPr>
+        <p:grpSpPr>
+          <a:xfrm>
+            <a:off x="6313547" y="4950170"/>
+            <a:ext cx="5114512" cy="576999"/>
+            <a:chOff x="6709787" y="4873970"/>
+            <a:chExt cx="5114512" cy="576999"/>
+          </a:xfrm>
+        </p:grpSpPr>
+        <p:grpSp>
+          <p:nvGrpSpPr>
+            <p:cNvPr id="21" name="Group 20">
+              <a:extLst>
+                <a:ext uri="{FF2B5EF4-FFF2-40B4-BE49-F238E27FC236}">
+                  <a16:creationId xmlns="" xmlns:a16="http://schemas.microsoft.com/office/drawing/2014/main" id="{B6043552-B536-4BE5-A7A8-2D20EA3131AD}"/>
+                </a:ext>
+              </a:extLst>
+            </p:cNvPr>
+            <p:cNvGrpSpPr/>
+            <p:nvPr/>
+          </p:nvGrpSpPr>
+          <p:grpSpPr>
+            <a:xfrm>
+              <a:off x="6709787" y="4873970"/>
+              <a:ext cx="4464695" cy="576999"/>
+              <a:chOff x="6660666" y="4815105"/>
+              <a:chExt cx="4056196" cy="576999"/>
+            </a:xfrm>
+          </p:grpSpPr>
+          <p:grpSp>
+            <p:nvGrpSpPr>
+              <p:cNvPr id="19" name="Group 18">
+                <a:extLst>
+                  <a:ext uri="{FF2B5EF4-FFF2-40B4-BE49-F238E27FC236}">
+                    <a16:creationId xmlns="" xmlns:a16="http://schemas.microsoft.com/office/drawing/2014/main" id="{0937586A-1A08-4716-A1A6-85AA4A5A35B7}"/>
+                  </a:ext>
+                </a:extLst>
+              </p:cNvPr>
+              <p:cNvGrpSpPr/>
+              <p:nvPr/>
+            </p:nvGrpSpPr>
+            <p:grpSpPr>
+              <a:xfrm>
+                <a:off x="6660666" y="4864825"/>
+                <a:ext cx="1702559" cy="421615"/>
+                <a:chOff x="6533678" y="3390977"/>
+                <a:chExt cx="1702559" cy="421615"/>
+              </a:xfrm>
+            </p:grpSpPr>
+            <p:pic>
+              <p:nvPicPr>
+                <p:cNvPr id="10" name="Picture 9">
+                  <a:hlinkClick r:id="rId4"/>
+                  <a:extLst>
+                    <a:ext uri="{FF2B5EF4-FFF2-40B4-BE49-F238E27FC236}">
+                      <a16:creationId xmlns="" xmlns:a16="http://schemas.microsoft.com/office/drawing/2014/main" id="{DFBCDDA2-17B0-4D17-9617-27F717DDF9D0}"/>
+                    </a:ext>
+                  </a:extLst>
+                </p:cNvPr>
+                <p:cNvPicPr>
+                  <a:picLocks noChangeAspect="1"/>
+                </p:cNvPicPr>
+                <p:nvPr/>
+              </p:nvPicPr>
+              <p:blipFill>
+                <a:blip r:embed="rId5"/>
+                <a:stretch>
+                  <a:fillRect/>
+                </a:stretch>
+              </p:blipFill>
+              <p:spPr>
+                <a:xfrm>
+                  <a:off x="6533678" y="3390977"/>
+                  <a:ext cx="421615" cy="421615"/>
+                </a:xfrm>
+                <a:prstGeom prst="rect">
+                  <a:avLst/>
+                </a:prstGeom>
+              </p:spPr>
+            </p:pic>
+            <p:sp>
+              <p:nvSpPr>
+                <p:cNvPr id="11" name="TextBox 10">
+                  <a:extLst>
+                    <a:ext uri="{FF2B5EF4-FFF2-40B4-BE49-F238E27FC236}">
+                      <a16:creationId xmlns="" xmlns:a16="http://schemas.microsoft.com/office/drawing/2014/main" id="{61AAC64F-6C8C-4419-A007-C655711C278A}"/>
+                    </a:ext>
+                  </a:extLst>
+                </p:cNvPr>
+                <p:cNvSpPr txBox="1"/>
+                <p:nvPr/>
+              </p:nvSpPr>
+              <p:spPr>
+                <a:xfrm>
+                  <a:off x="6961930" y="3401729"/>
+                  <a:ext cx="1274307" cy="400110"/>
+                </a:xfrm>
+                <a:prstGeom prst="rect">
+                  <a:avLst/>
+                </a:prstGeom>
+                <a:noFill/>
+              </p:spPr>
+              <p:txBody>
+                <a:bodyPr wrap="square" rtlCol="0" anchor="ctr">
+                  <a:spAutoFit/>
+                </a:bodyPr>
+                <a:lstStyle/>
+                <a:p>
+                  <a:r>
+                    <a:rPr lang="en-US" sz="2000" dirty="0">
+                      <a:hlinkClick r:id="rId4"/>
+                    </a:rPr>
+                    <a:t>mariev</a:t>
+                  </a:r>
+                  <a:endParaRPr lang="en-US" sz="2000" dirty="0"/>
+                </a:p>
+              </p:txBody>
+            </p:sp>
+          </p:grpSp>
+          <p:grpSp>
+            <p:nvGrpSpPr>
+              <p:cNvPr id="20" name="Group 19">
+                <a:extLst>
+                  <a:ext uri="{FF2B5EF4-FFF2-40B4-BE49-F238E27FC236}">
+                    <a16:creationId xmlns="" xmlns:a16="http://schemas.microsoft.com/office/drawing/2014/main" id="{BC1B9026-B07D-44D9-BA2F-E7B8BAA26FEC}"/>
+                  </a:ext>
+                </a:extLst>
+              </p:cNvPr>
+              <p:cNvGrpSpPr/>
+              <p:nvPr/>
+            </p:nvGrpSpPr>
+            <p:grpSpPr>
+              <a:xfrm>
+                <a:off x="8856320" y="4815105"/>
+                <a:ext cx="1860542" cy="576999"/>
+                <a:chOff x="8806820" y="5201966"/>
+                <a:chExt cx="1860542" cy="576999"/>
+              </a:xfrm>
+            </p:grpSpPr>
+            <p:pic>
+              <p:nvPicPr>
+                <p:cNvPr id="14" name="Picture 13" descr="Logo, icon&#10;&#10;Description automatically generated">
+                  <a:hlinkClick r:id="rId6"/>
+                  <a:extLst>
+                    <a:ext uri="{FF2B5EF4-FFF2-40B4-BE49-F238E27FC236}">
+                      <a16:creationId xmlns="" xmlns:a16="http://schemas.microsoft.com/office/drawing/2014/main" id="{1F549E15-3955-4606-A759-7C9B3E2B0137}"/>
+                    </a:ext>
+                  </a:extLst>
+                </p:cNvPr>
+                <p:cNvPicPr>
+                  <a:picLocks noChangeAspect="1"/>
+                </p:cNvPicPr>
+                <p:nvPr/>
+              </p:nvPicPr>
+              <p:blipFill>
+                <a:blip r:embed="rId7"/>
+                <a:stretch>
+                  <a:fillRect/>
+                </a:stretch>
+              </p:blipFill>
+              <p:spPr>
+                <a:xfrm>
+                  <a:off x="8806820" y="5201966"/>
+                  <a:ext cx="306360" cy="260527"/>
+                </a:xfrm>
+                <a:prstGeom prst="rect">
+                  <a:avLst/>
+                </a:prstGeom>
+              </p:spPr>
+            </p:pic>
+            <p:pic>
+              <p:nvPicPr>
+                <p:cNvPr id="16" name="Picture 15" descr="A picture containing ax, vector graphics, tool&#10;&#10;Description automatically generated">
+                  <a:hlinkClick r:id="rId8"/>
+                  <a:extLst>
+                    <a:ext uri="{FF2B5EF4-FFF2-40B4-BE49-F238E27FC236}">
+                      <a16:creationId xmlns="" xmlns:a16="http://schemas.microsoft.com/office/drawing/2014/main" id="{BCB2A5CC-D7D3-4CAD-BD70-42608C6F4B9A}"/>
+                    </a:ext>
+                  </a:extLst>
+                </p:cNvPr>
+                <p:cNvPicPr>
+                  <a:picLocks noChangeAspect="1"/>
+                </p:cNvPicPr>
+                <p:nvPr/>
+              </p:nvPicPr>
+              <p:blipFill>
+                <a:blip r:embed="rId9"/>
+                <a:stretch>
+                  <a:fillRect/>
+                </a:stretch>
+              </p:blipFill>
+              <p:spPr>
+                <a:xfrm>
+                  <a:off x="8818549" y="5546131"/>
+                  <a:ext cx="282903" cy="232834"/>
+                </a:xfrm>
+                <a:prstGeom prst="rect">
+                  <a:avLst/>
+                </a:prstGeom>
+              </p:spPr>
+            </p:pic>
+            <p:sp>
+              <p:nvSpPr>
+                <p:cNvPr id="17" name="TextBox 16">
+                  <a:extLst>
+                    <a:ext uri="{FF2B5EF4-FFF2-40B4-BE49-F238E27FC236}">
+                      <a16:creationId xmlns="" xmlns:a16="http://schemas.microsoft.com/office/drawing/2014/main" id="{E00864D8-354D-43DF-9773-7BE698A64200}"/>
+                    </a:ext>
+                  </a:extLst>
+                </p:cNvPr>
+                <p:cNvSpPr txBox="1"/>
+                <p:nvPr/>
+              </p:nvSpPr>
+              <p:spPr>
+                <a:xfrm>
+                  <a:off x="9101452" y="5494897"/>
+                  <a:ext cx="1565910" cy="261610"/>
+                </a:xfrm>
+                <a:prstGeom prst="rect">
+                  <a:avLst/>
+                </a:prstGeom>
+                <a:noFill/>
+              </p:spPr>
+              <p:txBody>
+                <a:bodyPr wrap="square" rtlCol="0" anchor="ctr">
+                  <a:spAutoFit/>
+                </a:bodyPr>
+                <a:lstStyle/>
+                <a:p>
+                  <a:r>
+                    <a:rPr lang="en-US" sz="1100" dirty="0">
+                      <a:hlinkClick r:id="rId8"/>
+                    </a:rPr>
+                    <a:t>@</a:t>
+                  </a:r>
+                  <a:r>
+                    <a:rPr lang="en-US" sz="1050" dirty="0">
+                      <a:hlinkClick r:id="rId8"/>
+                    </a:rPr>
+                    <a:t>mvendettuoli</a:t>
+                  </a:r>
+                  <a:endParaRPr lang="en-US" sz="1100" dirty="0"/>
+                </a:p>
+              </p:txBody>
+            </p:sp>
+          </p:grpSp>
+        </p:grpSp>
+        <p:sp>
+          <p:nvSpPr>
+            <p:cNvPr id="22" name="TextBox 21">
+              <a:extLst>
+                <a:ext uri="{FF2B5EF4-FFF2-40B4-BE49-F238E27FC236}">
+                  <a16:creationId xmlns="" xmlns:a16="http://schemas.microsoft.com/office/drawing/2014/main" id="{612B68EA-8263-442D-815F-C3308D8899FF}"/>
+                </a:ext>
+              </a:extLst>
+            </p:cNvPr>
+            <p:cNvSpPr txBox="1"/>
+            <p:nvPr/>
+          </p:nvSpPr>
+          <p:spPr>
+            <a:xfrm>
+              <a:off x="9403080" y="4890995"/>
+              <a:ext cx="2421219" cy="246221"/>
+            </a:xfrm>
+            <a:prstGeom prst="rect">
+              <a:avLst/>
+            </a:prstGeom>
+            <a:noFill/>
+          </p:spPr>
+          <p:txBody>
+            <a:bodyPr wrap="square" rtlCol="0" anchor="ctr">
+              <a:spAutoFit/>
+            </a:bodyPr>
+            <a:lstStyle/>
+            <a:p>
+              <a:r>
+                <a:rPr lang="en-US" sz="1000" dirty="0">
+                  <a:hlinkClick r:id="rId6"/>
+                </a:rPr>
+                <a:t>www.linkedin.com/in/mvendettuoli</a:t>
+              </a:r>
+              <a:endParaRPr lang="en-US" sz="1000" dirty="0"/>
+            </a:p>
+          </p:txBody>
+        </p:sp>
+      </p:grpSp>
     </p:spTree>
     <p:extLst>
       <p:ext uri="{BB962C8B-B14F-4D97-AF65-F5344CB8AC3E}">
-        <p14:creationId xmlns:p14="http://schemas.microsoft.com/office/powerpoint/2010/main" val="2920857757"/>
+        <p14:creationId xmlns:p14="http://schemas.microsoft.com/office/powerpoint/2010/main" val="3334567973"/>
       </p:ext>
     </p:extLst>
   </p:cSld>
@@ -9092,7 +9629,7 @@
           <p:cNvPr id="2" name="Title 1">
             <a:extLst>
               <a:ext uri="{FF2B5EF4-FFF2-40B4-BE49-F238E27FC236}">
-                <a16:creationId xmlns:a16="http://schemas.microsoft.com/office/drawing/2014/main" xmlns="" id="{4DA197EC-75CE-4967-B49A-620F6D94CA9D}"/>
+                <a16:creationId xmlns="" xmlns:a16="http://schemas.microsoft.com/office/drawing/2014/main" id="{7614332B-4F24-42F4-A704-A6F1183E9470}"/>
               </a:ext>
             </a:extLst>
           </p:cNvPr>
@@ -9100,7 +9637,7 @@
             <a:spLocks noGrp="1"/>
           </p:cNvSpPr>
           <p:nvPr>
-            <p:ph type="title"/>
+            <p:ph type="ctrTitle"/>
           </p:nvPr>
         </p:nvSpPr>
         <p:spPr/>
@@ -9110,6 +9647,64 @@
           <a:p>
             <a:r>
               <a:rPr lang="en-US" dirty="0"/>
+              <a:t>Why are we here</a:t>
+            </a:r>
+          </a:p>
+        </p:txBody>
+      </p:sp>
+    </p:spTree>
+    <p:extLst>
+      <p:ext uri="{BB962C8B-B14F-4D97-AF65-F5344CB8AC3E}">
+        <p14:creationId xmlns:p14="http://schemas.microsoft.com/office/powerpoint/2010/main" val="2920857757"/>
+      </p:ext>
+    </p:extLst>
+  </p:cSld>
+  <p:clrMapOvr>
+    <a:masterClrMapping/>
+  </p:clrMapOvr>
+</p:sld>
+</file>
+
+<file path=ppt/slides/slide7.xml><?xml version="1.0" encoding="utf-8"?>
+<p:sld xmlns:a="http://schemas.openxmlformats.org/drawingml/2006/main" xmlns:r="http://schemas.openxmlformats.org/officeDocument/2006/relationships" xmlns:p="http://schemas.openxmlformats.org/presentationml/2006/main">
+  <p:cSld>
+    <p:spTree>
+      <p:nvGrpSpPr>
+        <p:cNvPr id="1" name=""/>
+        <p:cNvGrpSpPr/>
+        <p:nvPr/>
+      </p:nvGrpSpPr>
+      <p:grpSpPr>
+        <a:xfrm>
+          <a:off x="0" y="0"/>
+          <a:ext cx="0" cy="0"/>
+          <a:chOff x="0" y="0"/>
+          <a:chExt cx="0" cy="0"/>
+        </a:xfrm>
+      </p:grpSpPr>
+      <p:sp>
+        <p:nvSpPr>
+          <p:cNvPr id="2" name="Title 1">
+            <a:extLst>
+              <a:ext uri="{FF2B5EF4-FFF2-40B4-BE49-F238E27FC236}">
+                <a16:creationId xmlns="" xmlns:a16="http://schemas.microsoft.com/office/drawing/2014/main" id="{4DA197EC-75CE-4967-B49A-620F6D94CA9D}"/>
+              </a:ext>
+            </a:extLst>
+          </p:cNvPr>
+          <p:cNvSpPr>
+            <a:spLocks noGrp="1"/>
+          </p:cNvSpPr>
+          <p:nvPr>
+            <p:ph type="title"/>
+          </p:nvPr>
+        </p:nvSpPr>
+        <p:spPr/>
+        <p:txBody>
+          <a:bodyPr/>
+          <a:lstStyle/>
+          <a:p>
+            <a:r>
+              <a:rPr lang="en-US" dirty="0"/>
               <a:t>Workshop Goals</a:t>
             </a:r>
           </a:p>
@@ -9120,7 +9715,7 @@
           <p:cNvPr id="3" name="Content Placeholder 2">
             <a:extLst>
               <a:ext uri="{FF2B5EF4-FFF2-40B4-BE49-F238E27FC236}">
-                <a16:creationId xmlns:a16="http://schemas.microsoft.com/office/drawing/2014/main" xmlns="" id="{8AB0FEEC-3BEF-46E7-912B-C736F42B180B}"/>
+                <a16:creationId xmlns="" xmlns:a16="http://schemas.microsoft.com/office/drawing/2014/main" id="{8AB0FEEC-3BEF-46E7-912B-C736F42B180B}"/>
               </a:ext>
             </a:extLst>
           </p:cNvPr>
@@ -9339,65 +9934,6 @@
 </p:sld>
 </file>
 
-<file path=ppt/slides/slide7.xml><?xml version="1.0" encoding="utf-8"?>
-<p:sld xmlns:a="http://schemas.openxmlformats.org/drawingml/2006/main" xmlns:r="http://schemas.openxmlformats.org/officeDocument/2006/relationships" xmlns:p="http://schemas.openxmlformats.org/presentationml/2006/main">
-  <p:cSld>
-    <p:spTree>
-      <p:nvGrpSpPr>
-        <p:cNvPr id="1" name=""/>
-        <p:cNvGrpSpPr/>
-        <p:nvPr/>
-      </p:nvGrpSpPr>
-      <p:grpSpPr>
-        <a:xfrm>
-          <a:off x="0" y="0"/>
-          <a:ext cx="0" cy="0"/>
-          <a:chOff x="0" y="0"/>
-          <a:chExt cx="0" cy="0"/>
-        </a:xfrm>
-      </p:grpSpPr>
-      <p:sp>
-        <p:nvSpPr>
-          <p:cNvPr id="2" name="Title 1">
-            <a:extLst>
-              <a:ext uri="{FF2B5EF4-FFF2-40B4-BE49-F238E27FC236}">
-                <a16:creationId xmlns:a16="http://schemas.microsoft.com/office/drawing/2014/main" xmlns="" id="{7614332B-4F24-42F4-A704-A6F1183E9470}"/>
-              </a:ext>
-            </a:extLst>
-          </p:cNvPr>
-          <p:cNvSpPr>
-            <a:spLocks noGrp="1"/>
-          </p:cNvSpPr>
-          <p:nvPr>
-            <p:ph type="ctrTitle"/>
-          </p:nvPr>
-        </p:nvSpPr>
-        <p:spPr/>
-        <p:txBody>
-          <a:bodyPr/>
-          <a:lstStyle/>
-          <a:p>
-            <a:r>
-              <a:rPr lang="en-US" dirty="0" smtClean="0"/>
-              <a:t>What do I need to know</a:t>
-            </a:r>
-            <a:endParaRPr lang="en-US" dirty="0"/>
-          </a:p>
-        </p:txBody>
-      </p:sp>
-    </p:spTree>
-    <p:extLst>
-      <p:ext uri="{BB962C8B-B14F-4D97-AF65-F5344CB8AC3E}">
-        <p14:creationId xmlns:p14="http://schemas.microsoft.com/office/powerpoint/2010/main" val="2169220439"/>
-      </p:ext>
-    </p:extLst>
-  </p:cSld>
-  <p:clrMapOvr>
-    <a:masterClrMapping/>
-  </p:clrMapOvr>
-</p:sld>
-</file>
-
 <file path=ppt/slides/slide8.xml><?xml version="1.0" encoding="utf-8"?>
 <p:sld xmlns:a="http://schemas.openxmlformats.org/drawingml/2006/main" xmlns:r="http://schemas.openxmlformats.org/officeDocument/2006/relationships" xmlns:p="http://schemas.openxmlformats.org/presentationml/2006/main">
   <p:cSld>
@@ -9420,7 +9956,7 @@
           <p:cNvPr id="2" name="Title 1">
             <a:extLst>
               <a:ext uri="{FF2B5EF4-FFF2-40B4-BE49-F238E27FC236}">
-                <a16:creationId xmlns:a16="http://schemas.microsoft.com/office/drawing/2014/main" xmlns="" id="{4DA197EC-75CE-4967-B49A-620F6D94CA9D}"/>
+                <a16:creationId xmlns="" xmlns:a16="http://schemas.microsoft.com/office/drawing/2014/main" id="{7614332B-4F24-42F4-A704-A6F1183E9470}"/>
               </a:ext>
             </a:extLst>
           </p:cNvPr>
@@ -9428,7 +9964,7 @@
             <a:spLocks noGrp="1"/>
           </p:cNvSpPr>
           <p:nvPr>
-            <p:ph type="title"/>
+            <p:ph type="ctrTitle"/>
           </p:nvPr>
         </p:nvSpPr>
         <p:spPr/>
@@ -9438,6 +9974,65 @@
           <a:p>
             <a:r>
               <a:rPr lang="en-US" dirty="0" smtClean="0"/>
+              <a:t>What do I need to know</a:t>
+            </a:r>
+            <a:endParaRPr lang="en-US" dirty="0"/>
+          </a:p>
+        </p:txBody>
+      </p:sp>
+    </p:spTree>
+    <p:extLst>
+      <p:ext uri="{BB962C8B-B14F-4D97-AF65-F5344CB8AC3E}">
+        <p14:creationId xmlns:p14="http://schemas.microsoft.com/office/powerpoint/2010/main" val="2169220439"/>
+      </p:ext>
+    </p:extLst>
+  </p:cSld>
+  <p:clrMapOvr>
+    <a:masterClrMapping/>
+  </p:clrMapOvr>
+</p:sld>
+</file>
+
+<file path=ppt/slides/slide9.xml><?xml version="1.0" encoding="utf-8"?>
+<p:sld xmlns:a="http://schemas.openxmlformats.org/drawingml/2006/main" xmlns:r="http://schemas.openxmlformats.org/officeDocument/2006/relationships" xmlns:p="http://schemas.openxmlformats.org/presentationml/2006/main">
+  <p:cSld>
+    <p:spTree>
+      <p:nvGrpSpPr>
+        <p:cNvPr id="1" name=""/>
+        <p:cNvGrpSpPr/>
+        <p:nvPr/>
+      </p:nvGrpSpPr>
+      <p:grpSpPr>
+        <a:xfrm>
+          <a:off x="0" y="0"/>
+          <a:ext cx="0" cy="0"/>
+          <a:chOff x="0" y="0"/>
+          <a:chExt cx="0" cy="0"/>
+        </a:xfrm>
+      </p:grpSpPr>
+      <p:sp>
+        <p:nvSpPr>
+          <p:cNvPr id="2" name="Title 1">
+            <a:extLst>
+              <a:ext uri="{FF2B5EF4-FFF2-40B4-BE49-F238E27FC236}">
+                <a16:creationId xmlns="" xmlns:a16="http://schemas.microsoft.com/office/drawing/2014/main" id="{4DA197EC-75CE-4967-B49A-620F6D94CA9D}"/>
+              </a:ext>
+            </a:extLst>
+          </p:cNvPr>
+          <p:cNvSpPr>
+            <a:spLocks noGrp="1"/>
+          </p:cNvSpPr>
+          <p:nvPr>
+            <p:ph type="title"/>
+          </p:nvPr>
+        </p:nvSpPr>
+        <p:spPr/>
+        <p:txBody>
+          <a:bodyPr/>
+          <a:lstStyle/>
+          <a:p>
+            <a:r>
+              <a:rPr lang="en-US" dirty="0" smtClean="0"/>
               <a:t>Expected Knowledge</a:t>
             </a:r>
             <a:endParaRPr lang="en-US" dirty="0"/>
@@ -9449,7 +10044,7 @@
           <p:cNvPr id="3" name="Content Placeholder 2">
             <a:extLst>
               <a:ext uri="{FF2B5EF4-FFF2-40B4-BE49-F238E27FC236}">
-                <a16:creationId xmlns:a16="http://schemas.microsoft.com/office/drawing/2014/main" xmlns="" id="{8AB0FEEC-3BEF-46E7-912B-C736F42B180B}"/>
+                <a16:creationId xmlns="" xmlns:a16="http://schemas.microsoft.com/office/drawing/2014/main" id="{8AB0FEEC-3BEF-46E7-912B-C736F42B180B}"/>
               </a:ext>
             </a:extLst>
           </p:cNvPr>
@@ -9746,64 +10341,6 @@
       <p:bldP spid="3" grpId="0" build="p"/>
     </p:bldLst>
   </p:timing>
-</p:sld>
-</file>
-
-<file path=ppt/slides/slide9.xml><?xml version="1.0" encoding="utf-8"?>
-<p:sld xmlns:a="http://schemas.openxmlformats.org/drawingml/2006/main" xmlns:r="http://schemas.openxmlformats.org/officeDocument/2006/relationships" xmlns:p="http://schemas.openxmlformats.org/presentationml/2006/main">
-  <p:cSld>
-    <p:spTree>
-      <p:nvGrpSpPr>
-        <p:cNvPr id="1" name=""/>
-        <p:cNvGrpSpPr/>
-        <p:nvPr/>
-      </p:nvGrpSpPr>
-      <p:grpSpPr>
-        <a:xfrm>
-          <a:off x="0" y="0"/>
-          <a:ext cx="0" cy="0"/>
-          <a:chOff x="0" y="0"/>
-          <a:chExt cx="0" cy="0"/>
-        </a:xfrm>
-      </p:grpSpPr>
-      <p:sp>
-        <p:nvSpPr>
-          <p:cNvPr id="2" name="Title 1">
-            <a:extLst>
-              <a:ext uri="{FF2B5EF4-FFF2-40B4-BE49-F238E27FC236}">
-                <a16:creationId xmlns:a16="http://schemas.microsoft.com/office/drawing/2014/main" xmlns="" id="{7614332B-4F24-42F4-A704-A6F1183E9470}"/>
-              </a:ext>
-            </a:extLst>
-          </p:cNvPr>
-          <p:cNvSpPr>
-            <a:spLocks noGrp="1"/>
-          </p:cNvSpPr>
-          <p:nvPr>
-            <p:ph type="ctrTitle"/>
-          </p:nvPr>
-        </p:nvSpPr>
-        <p:spPr/>
-        <p:txBody>
-          <a:bodyPr/>
-          <a:lstStyle/>
-          <a:p>
-            <a:r>
-              <a:rPr lang="en-US" dirty="0"/>
-              <a:t>How are we going to get there</a:t>
-            </a:r>
-          </a:p>
-        </p:txBody>
-      </p:sp>
-    </p:spTree>
-    <p:extLst>
-      <p:ext uri="{BB962C8B-B14F-4D97-AF65-F5344CB8AC3E}">
-        <p14:creationId xmlns:p14="http://schemas.microsoft.com/office/powerpoint/2010/main" val="2358439516"/>
-      </p:ext>
-    </p:extLst>
-  </p:cSld>
-  <p:clrMapOvr>
-    <a:masterClrMapping/>
-  </p:clrMapOvr>
 </p:sld>
 </file>
 
@@ -10077,7 +10614,7 @@
   <a:extraClrSchemeLst/>
   <a:extLst>
     <a:ext uri="{05A4C25C-085E-4340-85A3-A5531E510DB2}">
-      <thm15:themeFamily xmlns:thm15="http://schemas.microsoft.com/office/thememl/2012/main" xmlns="" name="Original 5_01_Win32" id="{77344C68-A3F1-476B-8680-97D7F429B46B}" vid="{89780073-58E8-4DFF-BF29-BA99F8052841}"/>
+      <thm15:themeFamily xmlns="" xmlns:thm15="http://schemas.microsoft.com/office/thememl/2012/main" name="Original 5_01_Win32" id="{77344C68-A3F1-476B-8680-97D7F429B46B}" vid="{89780073-58E8-4DFF-BF29-BA99F8052841}"/>
     </a:ext>
   </a:extLst>
 </a:theme>
@@ -10372,31 +10909,13 @@
   <a:extraClrSchemeLst/>
   <a:extLst>
     <a:ext uri="{05A4C25C-085E-4340-85A3-A5531E510DB2}">
-      <thm15:themeFamily xmlns:thm15="http://schemas.microsoft.com/office/thememl/2012/main" xmlns="" name="Office Theme" id="{62F939B6-93AF-4DB8-9C6B-D6C7DFDC589F}" vid="{4A3C46E8-61CC-4603-A589-7422A47A8E4A}"/>
+      <thm15:themeFamily xmlns="" xmlns:thm15="http://schemas.microsoft.com/office/thememl/2012/main" name="Office Theme" id="{62F939B6-93AF-4DB8-9C6B-D6C7DFDC589F}" vid="{4A3C46E8-61CC-4603-A589-7422A47A8E4A}"/>
     </a:ext>
   </a:extLst>
 </a:theme>
 </file>
 
 <file path=customXml/item1.xml><?xml version="1.0" encoding="utf-8"?>
-<p:properties xmlns:p="http://schemas.microsoft.com/office/2006/metadata/properties" xmlns:xsi="http://www.w3.org/2001/XMLSchema-instance" xmlns:pc="http://schemas.microsoft.com/office/infopath/2007/PartnerControls">
-  <documentManagement>
-    <Status xmlns="71af3243-3dd4-4a8d-8c0d-dd76da1f02a5">Not started</Status>
-    <MediaServiceKeyPoints xmlns="71af3243-3dd4-4a8d-8c0d-dd76da1f02a5" xsi:nil="true"/>
-  </documentManagement>
-</p:properties>
-</file>
-
-<file path=customXml/item2.xml><?xml version="1.0" encoding="utf-8"?>
-<?mso-contentType ?>
-<FormTemplates xmlns="http://schemas.microsoft.com/sharepoint/v3/contenttype/forms">
-  <Display>DocumentLibraryForm</Display>
-  <Edit>DocumentLibraryForm</Edit>
-  <New>DocumentLibraryForm</New>
-</FormTemplates>
-</file>
-
-<file path=customXml/item3.xml><?xml version="1.0" encoding="utf-8"?>
 <ct:contentTypeSchema xmlns:ct="http://schemas.microsoft.com/office/2006/metadata/contentType" xmlns:ma="http://schemas.microsoft.com/office/2006/metadata/properties/metaAttributes" ct:_="" ma:_="" ma:contentTypeName="Document" ma:contentTypeID="0x01010079F111ED35F8CC479449609E8A0923A6" ma:contentTypeVersion="12" ma:contentTypeDescription="Create a new document." ma:contentTypeScope="" ma:versionID="a410dd7f93c95333ffa1b60ed6adedd1">
   <xsd:schema xmlns:xsd="http://www.w3.org/2001/XMLSchema" xmlns:xs="http://www.w3.org/2001/XMLSchema" xmlns:p="http://schemas.microsoft.com/office/2006/metadata/properties" xmlns:ns2="71af3243-3dd4-4a8d-8c0d-dd76da1f02a5" xmlns:ns3="16c05727-aa75-4e4a-9b5f-8a80a1165891" targetNamespace="http://schemas.microsoft.com/office/2006/metadata/properties" ma:root="true" ma:fieldsID="a936d9baba76aa3866493feff160faab" ns2:_="" ns3:_="">
     <xsd:import namespace="71af3243-3dd4-4a8d-8c0d-dd76da1f02a5"/>
@@ -10617,32 +11136,25 @@
 </ct:contentTypeSchema>
 </file>
 
-<file path=customXml/itemProps1.xml><?xml version="1.0" encoding="utf-8"?>
-<ds:datastoreItem xmlns:ds="http://schemas.openxmlformats.org/officeDocument/2006/customXml" ds:itemID="{137651BA-F45C-4845-9AB3-E0A65B39F5E1}">
-  <ds:schemaRefs>
-    <ds:schemaRef ds:uri="http://schemas.microsoft.com/office/2006/metadata/properties"/>
-    <ds:schemaRef ds:uri="http://schemas.microsoft.com/office/2006/documentManagement/types"/>
-    <ds:schemaRef ds:uri="http://purl.org/dc/terms/"/>
-    <ds:schemaRef ds:uri="http://schemas.openxmlformats.org/package/2006/metadata/core-properties"/>
-    <ds:schemaRef ds:uri="16c05727-aa75-4e4a-9b5f-8a80a1165891"/>
-    <ds:schemaRef ds:uri="http://purl.org/dc/dcmitype/"/>
-    <ds:schemaRef ds:uri="http://schemas.microsoft.com/office/infopath/2007/PartnerControls"/>
-    <ds:schemaRef ds:uri="http://purl.org/dc/elements/1.1/"/>
-    <ds:schemaRef ds:uri="71af3243-3dd4-4a8d-8c0d-dd76da1f02a5"/>
-    <ds:schemaRef ds:uri="http://www.w3.org/XML/1998/namespace"/>
-  </ds:schemaRefs>
-</ds:datastoreItem>
+<file path=customXml/item2.xml><?xml version="1.0" encoding="utf-8"?>
+<?mso-contentType ?>
+<FormTemplates xmlns="http://schemas.microsoft.com/sharepoint/v3/contenttype/forms">
+  <Display>DocumentLibraryForm</Display>
+  <Edit>DocumentLibraryForm</Edit>
+  <New>DocumentLibraryForm</New>
+</FormTemplates>
 </file>
 
-<file path=customXml/itemProps2.xml><?xml version="1.0" encoding="utf-8"?>
-<ds:datastoreItem xmlns:ds="http://schemas.openxmlformats.org/officeDocument/2006/customXml" ds:itemID="{CDB58277-F8DF-46FF-84EC-EF41B835E69F}">
-  <ds:schemaRefs>
-    <ds:schemaRef ds:uri="http://schemas.microsoft.com/sharepoint/v3/contenttype/forms"/>
-  </ds:schemaRefs>
-</ds:datastoreItem>
+<file path=customXml/item3.xml><?xml version="1.0" encoding="utf-8"?>
+<p:properties xmlns:p="http://schemas.microsoft.com/office/2006/metadata/properties" xmlns:xsi="http://www.w3.org/2001/XMLSchema-instance" xmlns:pc="http://schemas.microsoft.com/office/infopath/2007/PartnerControls">
+  <documentManagement>
+    <Status xmlns="71af3243-3dd4-4a8d-8c0d-dd76da1f02a5">Not started</Status>
+    <MediaServiceKeyPoints xmlns="71af3243-3dd4-4a8d-8c0d-dd76da1f02a5" xsi:nil="true"/>
+  </documentManagement>
+</p:properties>
 </file>
 
-<file path=customXml/itemProps3.xml><?xml version="1.0" encoding="utf-8"?>
+<file path=customXml/itemProps1.xml><?xml version="1.0" encoding="utf-8"?>
 <ds:datastoreItem xmlns:ds="http://schemas.openxmlformats.org/officeDocument/2006/customXml" ds:itemID="{2D276E62-80A3-44DD-9BCC-97ED2B99B57F}">
   <ds:schemaRefs>
     <ds:schemaRef ds:uri="http://schemas.microsoft.com/office/2006/metadata/contentType"/>
@@ -10659,4 +11171,29 @@
     <ds:schemaRef ds:uri="http://schemas.microsoft.com/internal/obd"/>
   </ds:schemaRefs>
 </ds:datastoreItem>
+</file>
+
+<file path=customXml/itemProps2.xml><?xml version="1.0" encoding="utf-8"?>
+<ds:datastoreItem xmlns:ds="http://schemas.openxmlformats.org/officeDocument/2006/customXml" ds:itemID="{CDB58277-F8DF-46FF-84EC-EF41B835E69F}">
+  <ds:schemaRefs>
+    <ds:schemaRef ds:uri="http://schemas.microsoft.com/sharepoint/v3/contenttype/forms"/>
+  </ds:schemaRefs>
+</ds:datastoreItem>
+</file>
+
+<file path=customXml/itemProps3.xml><?xml version="1.0" encoding="utf-8"?>
+<ds:datastoreItem xmlns:ds="http://schemas.openxmlformats.org/officeDocument/2006/customXml" ds:itemID="{137651BA-F45C-4845-9AB3-E0A65B39F5E1}">
+  <ds:schemaRefs>
+    <ds:schemaRef ds:uri="http://schemas.microsoft.com/office/2006/metadata/properties"/>
+    <ds:schemaRef ds:uri="http://schemas.microsoft.com/office/2006/documentManagement/types"/>
+    <ds:schemaRef ds:uri="http://purl.org/dc/terms/"/>
+    <ds:schemaRef ds:uri="http://schemas.openxmlformats.org/package/2006/metadata/core-properties"/>
+    <ds:schemaRef ds:uri="16c05727-aa75-4e4a-9b5f-8a80a1165891"/>
+    <ds:schemaRef ds:uri="http://purl.org/dc/dcmitype/"/>
+    <ds:schemaRef ds:uri="http://schemas.microsoft.com/office/infopath/2007/PartnerControls"/>
+    <ds:schemaRef ds:uri="http://purl.org/dc/elements/1.1/"/>
+    <ds:schemaRef ds:uri="71af3243-3dd4-4a8d-8c0d-dd76da1f02a5"/>
+    <ds:schemaRef ds:uri="http://www.w3.org/XML/1998/namespace"/>
+  </ds:schemaRefs>
+</ds:datastoreItem>
 </file>
</xml_diff>

<commit_message>
Updates based on feedback from Practice session
</commit_message>
<xml_diff>
--- a/Slides/Slides-01-Welcome_and_Orientation/Slides-01-Welcome_and_Orientation.pptx
+++ b/Slides/Slides-01-Welcome_and_Orientation/Slides-01-Welcome_and_Orientation.pptx
@@ -5,7 +5,7 @@
     <p:sldMasterId id="2147483673" r:id="rId4"/>
   </p:sldMasterIdLst>
   <p:notesMasterIdLst>
-    <p:notesMasterId r:id="rId25"/>
+    <p:notesMasterId r:id="rId26"/>
   </p:notesMasterIdLst>
   <p:sldIdLst>
     <p:sldId id="257" r:id="rId5"/>
@@ -13,21 +13,22 @@
     <p:sldId id="263" r:id="rId7"/>
     <p:sldId id="265" r:id="rId8"/>
     <p:sldId id="287" r:id="rId9"/>
-    <p:sldId id="268" r:id="rId10"/>
-    <p:sldId id="270" r:id="rId11"/>
-    <p:sldId id="285" r:id="rId12"/>
-    <p:sldId id="286" r:id="rId13"/>
-    <p:sldId id="271" r:id="rId14"/>
-    <p:sldId id="272" r:id="rId15"/>
-    <p:sldId id="284" r:id="rId16"/>
-    <p:sldId id="273" r:id="rId17"/>
-    <p:sldId id="274" r:id="rId18"/>
-    <p:sldId id="277" r:id="rId19"/>
-    <p:sldId id="278" r:id="rId20"/>
-    <p:sldId id="279" r:id="rId21"/>
-    <p:sldId id="282" r:id="rId22"/>
-    <p:sldId id="283" r:id="rId23"/>
-    <p:sldId id="281" r:id="rId24"/>
+    <p:sldId id="288" r:id="rId10"/>
+    <p:sldId id="268" r:id="rId11"/>
+    <p:sldId id="270" r:id="rId12"/>
+    <p:sldId id="285" r:id="rId13"/>
+    <p:sldId id="286" r:id="rId14"/>
+    <p:sldId id="271" r:id="rId15"/>
+    <p:sldId id="272" r:id="rId16"/>
+    <p:sldId id="284" r:id="rId17"/>
+    <p:sldId id="273" r:id="rId18"/>
+    <p:sldId id="274" r:id="rId19"/>
+    <p:sldId id="277" r:id="rId20"/>
+    <p:sldId id="278" r:id="rId21"/>
+    <p:sldId id="279" r:id="rId22"/>
+    <p:sldId id="282" r:id="rId23"/>
+    <p:sldId id="283" r:id="rId24"/>
+    <p:sldId id="281" r:id="rId25"/>
   </p:sldIdLst>
   <p:sldSz cx="12192000" cy="6858000"/>
   <p:notesSz cx="6858000" cy="9144000"/>
@@ -128,10 +129,168 @@
   </p:defaultTextStyle>
   <p:extLst>
     <p:ext uri="{EFAFB233-063F-42B5-8137-9DF3F51BA10A}">
-      <p15:sldGuideLst xmlns="" xmlns:p15="http://schemas.microsoft.com/office/powerpoint/2012/main"/>
+      <p15:sldGuideLst xmlns:p15="http://schemas.microsoft.com/office/powerpoint/2012/main">
+        <p15:guide id="1" orient="horz" pos="2160">
+          <p15:clr>
+            <a:srgbClr val="A4A3A4"/>
+          </p15:clr>
+        </p15:guide>
+        <p15:guide id="2" pos="3840">
+          <p15:clr>
+            <a:srgbClr val="A4A3A4"/>
+          </p15:clr>
+        </p15:guide>
+      </p15:sldGuideLst>
     </p:ext>
   </p:extLst>
 </p:presentation>
+</file>
+
+<file path=ppt/revisionInfo.xml><?xml version="1.0" encoding="utf-8"?>
+<p1510:revInfo xmlns:a="http://schemas.openxmlformats.org/drawingml/2006/main" xmlns:r="http://schemas.openxmlformats.org/officeDocument/2006/relationships" xmlns:p1510="http://schemas.microsoft.com/office/powerpoint/2015/10/main">
+  <p1510:revLst>
+    <p1510:client id="{77697593-36FA-4171-A4F3-5A9D46E69B8E}" v="8" dt="2021-10-26T21:08:18.194"/>
+  </p1510:revLst>
+</p1510:revInfo>
+</file>
+
+<file path=ppt/changesInfos/changesInfo1.xml><?xml version="1.0" encoding="utf-8"?>
+<pc:chgInfo xmlns:a="http://schemas.openxmlformats.org/drawingml/2006/main" xmlns:r="http://schemas.openxmlformats.org/officeDocument/2006/relationships" xmlns:ac="http://schemas.microsoft.com/office/drawing/2013/main/command" xmlns:pc="http://schemas.microsoft.com/office/powerpoint/2013/main/command">
+  <pc:docChgLst>
+    <pc:chgData name="Ellis Hughes" userId="70958ad1-f5a5-48f5-9815-bf834be6566e" providerId="ADAL" clId="{77697593-36FA-4171-A4F3-5A9D46E69B8E}"/>
+    <pc:docChg chg="custSel addSld modSld">
+      <pc:chgData name="Ellis Hughes" userId="70958ad1-f5a5-48f5-9815-bf834be6566e" providerId="ADAL" clId="{77697593-36FA-4171-A4F3-5A9D46E69B8E}" dt="2021-10-26T21:09:41.162" v="243" actId="20577"/>
+      <pc:docMkLst>
+        <pc:docMk/>
+      </pc:docMkLst>
+      <pc:sldChg chg="modSp mod">
+        <pc:chgData name="Ellis Hughes" userId="70958ad1-f5a5-48f5-9815-bf834be6566e" providerId="ADAL" clId="{77697593-36FA-4171-A4F3-5A9D46E69B8E}" dt="2021-10-26T21:08:30.090" v="224" actId="20577"/>
+        <pc:sldMkLst>
+          <pc:docMk/>
+          <pc:sldMk cId="2961198549" sldId="272"/>
+        </pc:sldMkLst>
+        <pc:spChg chg="mod">
+          <ac:chgData name="Ellis Hughes" userId="70958ad1-f5a5-48f5-9815-bf834be6566e" providerId="ADAL" clId="{77697593-36FA-4171-A4F3-5A9D46E69B8E}" dt="2021-10-26T21:08:30.090" v="224" actId="20577"/>
+          <ac:spMkLst>
+            <pc:docMk/>
+            <pc:sldMk cId="2961198549" sldId="272"/>
+            <ac:spMk id="3" creationId="{8AB0FEEC-3BEF-46E7-912B-C736F42B180B}"/>
+          </ac:spMkLst>
+        </pc:spChg>
+        <pc:spChg chg="mod">
+          <ac:chgData name="Ellis Hughes" userId="70958ad1-f5a5-48f5-9815-bf834be6566e" providerId="ADAL" clId="{77697593-36FA-4171-A4F3-5A9D46E69B8E}" dt="2021-10-26T21:08:18.193" v="215" actId="207"/>
+          <ac:spMkLst>
+            <pc:docMk/>
+            <pc:sldMk cId="2961198549" sldId="272"/>
+            <ac:spMk id="4" creationId="{D59083DE-6E1A-4132-A4C8-A18D53074B76}"/>
+          </ac:spMkLst>
+        </pc:spChg>
+        <pc:spChg chg="mod">
+          <ac:chgData name="Ellis Hughes" userId="70958ad1-f5a5-48f5-9815-bf834be6566e" providerId="ADAL" clId="{77697593-36FA-4171-A4F3-5A9D46E69B8E}" dt="2021-10-26T21:08:24.561" v="216" actId="1076"/>
+          <ac:spMkLst>
+            <pc:docMk/>
+            <pc:sldMk cId="2961198549" sldId="272"/>
+            <ac:spMk id="5" creationId="{2B0E1A9C-DED3-4FD3-978C-825945879A48}"/>
+          </ac:spMkLst>
+        </pc:spChg>
+      </pc:sldChg>
+      <pc:sldChg chg="modSp mod">
+        <pc:chgData name="Ellis Hughes" userId="70958ad1-f5a5-48f5-9815-bf834be6566e" providerId="ADAL" clId="{77697593-36FA-4171-A4F3-5A9D46E69B8E}" dt="2021-10-26T21:09:41.162" v="243" actId="20577"/>
+        <pc:sldMkLst>
+          <pc:docMk/>
+          <pc:sldMk cId="4286147586" sldId="284"/>
+        </pc:sldMkLst>
+        <pc:spChg chg="mod">
+          <ac:chgData name="Ellis Hughes" userId="70958ad1-f5a5-48f5-9815-bf834be6566e" providerId="ADAL" clId="{77697593-36FA-4171-A4F3-5A9D46E69B8E}" dt="2021-10-26T21:09:41.162" v="243" actId="20577"/>
+          <ac:spMkLst>
+            <pc:docMk/>
+            <pc:sldMk cId="4286147586" sldId="284"/>
+            <ac:spMk id="5" creationId="{2B0E1A9C-DED3-4FD3-978C-825945879A48}"/>
+          </ac:spMkLst>
+        </pc:spChg>
+      </pc:sldChg>
+      <pc:sldChg chg="addSp delSp modSp add mod">
+        <pc:chgData name="Ellis Hughes" userId="70958ad1-f5a5-48f5-9815-bf834be6566e" providerId="ADAL" clId="{77697593-36FA-4171-A4F3-5A9D46E69B8E}" dt="2021-10-26T21:07:10.411" v="138" actId="20577"/>
+        <pc:sldMkLst>
+          <pc:docMk/>
+          <pc:sldMk cId="1674326587" sldId="288"/>
+        </pc:sldMkLst>
+        <pc:spChg chg="mod">
+          <ac:chgData name="Ellis Hughes" userId="70958ad1-f5a5-48f5-9815-bf834be6566e" providerId="ADAL" clId="{77697593-36FA-4171-A4F3-5A9D46E69B8E}" dt="2021-10-26T21:04:05.325" v="43" actId="313"/>
+          <ac:spMkLst>
+            <pc:docMk/>
+            <pc:sldMk cId="1674326587" sldId="288"/>
+            <ac:spMk id="2" creationId="{4F3B95D1-4C83-407C-A358-C8C4A597CFA8}"/>
+          </ac:spMkLst>
+        </pc:spChg>
+        <pc:spChg chg="add mod">
+          <ac:chgData name="Ellis Hughes" userId="70958ad1-f5a5-48f5-9815-bf834be6566e" providerId="ADAL" clId="{77697593-36FA-4171-A4F3-5A9D46E69B8E}" dt="2021-10-26T21:06:28.174" v="130" actId="14100"/>
+          <ac:spMkLst>
+            <pc:docMk/>
+            <pc:sldMk cId="1674326587" sldId="288"/>
+            <ac:spMk id="4" creationId="{96D685A5-EBBD-428C-83EF-E93B4FD86C68}"/>
+          </ac:spMkLst>
+        </pc:spChg>
+        <pc:spChg chg="del">
+          <ac:chgData name="Ellis Hughes" userId="70958ad1-f5a5-48f5-9815-bf834be6566e" providerId="ADAL" clId="{77697593-36FA-4171-A4F3-5A9D46E69B8E}" dt="2021-10-26T21:04:12.796" v="45" actId="478"/>
+          <ac:spMkLst>
+            <pc:docMk/>
+            <pc:sldMk cId="1674326587" sldId="288"/>
+            <ac:spMk id="5" creationId="{E4708D06-5299-4CFC-B296-7FBBB8D5D933}"/>
+          </ac:spMkLst>
+        </pc:spChg>
+        <pc:spChg chg="add del mod">
+          <ac:chgData name="Ellis Hughes" userId="70958ad1-f5a5-48f5-9815-bf834be6566e" providerId="ADAL" clId="{77697593-36FA-4171-A4F3-5A9D46E69B8E}" dt="2021-10-26T21:05:04.543" v="75" actId="478"/>
+          <ac:spMkLst>
+            <pc:docMk/>
+            <pc:sldMk cId="1674326587" sldId="288"/>
+            <ac:spMk id="8" creationId="{0AC06E8A-63D5-4D0D-BCB5-0F56011F394E}"/>
+          </ac:spMkLst>
+        </pc:spChg>
+        <pc:spChg chg="add mod">
+          <ac:chgData name="Ellis Hughes" userId="70958ad1-f5a5-48f5-9815-bf834be6566e" providerId="ADAL" clId="{77697593-36FA-4171-A4F3-5A9D46E69B8E}" dt="2021-10-26T21:06:35.941" v="131" actId="14100"/>
+          <ac:spMkLst>
+            <pc:docMk/>
+            <pc:sldMk cId="1674326587" sldId="288"/>
+            <ac:spMk id="24" creationId="{5787A165-931F-424F-B188-AABAF4686571}"/>
+          </ac:spMkLst>
+        </pc:spChg>
+        <pc:spChg chg="add mod">
+          <ac:chgData name="Ellis Hughes" userId="70958ad1-f5a5-48f5-9815-bf834be6566e" providerId="ADAL" clId="{77697593-36FA-4171-A4F3-5A9D46E69B8E}" dt="2021-10-26T21:05:45.096" v="97" actId="20577"/>
+          <ac:spMkLst>
+            <pc:docMk/>
+            <pc:sldMk cId="1674326587" sldId="288"/>
+            <ac:spMk id="25" creationId="{1C818B16-ACD8-42CC-8F6D-8133DD0CD376}"/>
+          </ac:spMkLst>
+        </pc:spChg>
+        <pc:spChg chg="add mod">
+          <ac:chgData name="Ellis Hughes" userId="70958ad1-f5a5-48f5-9815-bf834be6566e" providerId="ADAL" clId="{77697593-36FA-4171-A4F3-5A9D46E69B8E}" dt="2021-10-26T21:07:10.411" v="138" actId="20577"/>
+          <ac:spMkLst>
+            <pc:docMk/>
+            <pc:sldMk cId="1674326587" sldId="288"/>
+            <ac:spMk id="26" creationId="{9F2E9A6B-24D8-40E1-B1BB-67246FD59E32}"/>
+          </ac:spMkLst>
+        </pc:spChg>
+        <pc:grpChg chg="del">
+          <ac:chgData name="Ellis Hughes" userId="70958ad1-f5a5-48f5-9815-bf834be6566e" providerId="ADAL" clId="{77697593-36FA-4171-A4F3-5A9D46E69B8E}" dt="2021-10-26T21:05:28.205" v="92" actId="478"/>
+          <ac:grpSpMkLst>
+            <pc:docMk/>
+            <pc:sldMk cId="1674326587" sldId="288"/>
+            <ac:grpSpMk id="23" creationId="{7B66FF87-DDA2-43E9-8DA4-03D2187E7D8E}"/>
+          </ac:grpSpMkLst>
+        </pc:grpChg>
+        <pc:picChg chg="del">
+          <ac:chgData name="Ellis Hughes" userId="70958ad1-f5a5-48f5-9815-bf834be6566e" providerId="ADAL" clId="{77697593-36FA-4171-A4F3-5A9D46E69B8E}" dt="2021-10-26T21:04:10.551" v="44" actId="478"/>
+          <ac:picMkLst>
+            <pc:docMk/>
+            <pc:sldMk cId="1674326587" sldId="288"/>
+            <ac:picMk id="6" creationId="{EF865C96-2337-4A23-9653-09031EF4BDD1}"/>
+          </ac:picMkLst>
+        </pc:picChg>
+      </pc:sldChg>
+    </pc:docChg>
+  </pc:docChgLst>
+</pc:chgInfo>
 </file>
 
 <file path=ppt/notesMasters/notesMaster1.xml><?xml version="1.0" encoding="utf-8"?>
@@ -216,7 +375,7 @@
           <a:p>
             <a:fld id="{AE1375EF-7AC2-40F0-8984-3657FAAC21B8}" type="datetimeFigureOut">
               <a:rPr lang="en-US" smtClean="0"/>
-              <a:t>10/7/2021</a:t>
+              <a:t>10/26/2021</a:t>
             </a:fld>
             <a:endParaRPr lang="en-US"/>
           </a:p>
@@ -567,6 +726,132 @@
 </p:notes>
 </file>
 
+<file path=ppt/notesSlides/notesSlide10.xml><?xml version="1.0" encoding="utf-8"?>
+<p:notes xmlns:a="http://schemas.openxmlformats.org/drawingml/2006/main" xmlns:r="http://schemas.openxmlformats.org/officeDocument/2006/relationships" xmlns:p="http://schemas.openxmlformats.org/presentationml/2006/main">
+  <p:cSld>
+    <p:spTree>
+      <p:nvGrpSpPr>
+        <p:cNvPr id="1" name=""/>
+        <p:cNvGrpSpPr/>
+        <p:nvPr/>
+      </p:nvGrpSpPr>
+      <p:grpSpPr>
+        <a:xfrm>
+          <a:off x="0" y="0"/>
+          <a:ext cx="0" cy="0"/>
+          <a:chOff x="0" y="0"/>
+          <a:chExt cx="0" cy="0"/>
+        </a:xfrm>
+      </p:grpSpPr>
+      <p:sp>
+        <p:nvSpPr>
+          <p:cNvPr id="2" name="Slide Image Placeholder 1"/>
+          <p:cNvSpPr>
+            <a:spLocks noGrp="1" noRot="1" noChangeAspect="1"/>
+          </p:cNvSpPr>
+          <p:nvPr>
+            <p:ph type="sldImg"/>
+          </p:nvPr>
+        </p:nvSpPr>
+        <p:spPr/>
+      </p:sp>
+      <p:sp>
+        <p:nvSpPr>
+          <p:cNvPr id="3" name="Notes Placeholder 2"/>
+          <p:cNvSpPr>
+            <a:spLocks noGrp="1"/>
+          </p:cNvSpPr>
+          <p:nvPr>
+            <p:ph type="body" idx="1"/>
+          </p:nvPr>
+        </p:nvSpPr>
+        <p:spPr/>
+        <p:txBody>
+          <a:bodyPr/>
+          <a:lstStyle/>
+          <a:p>
+            <a:r>
+              <a:rPr lang="en-US" dirty="0"/>
+              <a:t>If you have not yet, clone the R Package Validation Tutorial repository or make sure you have access to materials via </a:t>
+            </a:r>
+            <a:r>
+              <a:rPr lang="en-US" dirty="0" err="1"/>
+              <a:t>RStudio</a:t>
+            </a:r>
+            <a:r>
+              <a:rPr lang="en-US" dirty="0"/>
+              <a:t> Cloud.</a:t>
+            </a:r>
+          </a:p>
+          <a:p>
+            <a:endParaRPr lang="en-US" dirty="0"/>
+          </a:p>
+          <a:p>
+            <a:r>
+              <a:rPr lang="en-US" dirty="0"/>
+              <a:t>Github.com/</a:t>
+            </a:r>
+            <a:r>
+              <a:rPr lang="en-US" dirty="0" err="1"/>
+              <a:t>thebioengineer</a:t>
+            </a:r>
+            <a:r>
+              <a:rPr lang="en-US" dirty="0"/>
+              <a:t>/</a:t>
+            </a:r>
+            <a:r>
+              <a:rPr lang="en-US" dirty="0" err="1"/>
+              <a:t>R_Package_Validation_Tutorial</a:t>
+            </a:r>
+            <a:endParaRPr lang="en-US" dirty="0"/>
+          </a:p>
+          <a:p>
+            <a:endParaRPr lang="en-US" dirty="0"/>
+          </a:p>
+          <a:p>
+            <a:r>
+              <a:rPr lang="en-US" dirty="0"/>
+              <a:t> We will move onto the first series – basics of package building!</a:t>
+            </a:r>
+          </a:p>
+        </p:txBody>
+      </p:sp>
+      <p:sp>
+        <p:nvSpPr>
+          <p:cNvPr id="4" name="Slide Number Placeholder 3"/>
+          <p:cNvSpPr>
+            <a:spLocks noGrp="1"/>
+          </p:cNvSpPr>
+          <p:nvPr>
+            <p:ph type="sldNum" sz="quarter" idx="5"/>
+          </p:nvPr>
+        </p:nvSpPr>
+        <p:spPr/>
+        <p:txBody>
+          <a:bodyPr/>
+          <a:lstStyle/>
+          <a:p>
+            <a:fld id="{B9F26414-4BE6-427A-9F34-1430B41B92D6}" type="slidenum">
+              <a:rPr lang="en-US" smtClean="0"/>
+              <a:t>21</a:t>
+            </a:fld>
+            <a:endParaRPr lang="en-US"/>
+          </a:p>
+        </p:txBody>
+      </p:sp>
+    </p:spTree>
+    <p:extLst>
+      <p:ext uri="{BB962C8B-B14F-4D97-AF65-F5344CB8AC3E}">
+        <p14:creationId xmlns:p14="http://schemas.microsoft.com/office/powerpoint/2010/main" val="3803340894"/>
+      </p:ext>
+    </p:extLst>
+  </p:cSld>
+  <p:clrMapOvr>
+    <a:masterClrMapping/>
+  </p:clrMapOvr>
+</p:notes>
+</file>
+
 <file path=ppt/notesSlides/notesSlide2.xml><?xml version="1.0" encoding="utf-8"?>
 <p:notes xmlns:a="http://schemas.openxmlformats.org/drawingml/2006/main" xmlns:r="http://schemas.openxmlformats.org/officeDocument/2006/relationships" xmlns:p="http://schemas.openxmlformats.org/presentationml/2006/main">
   <p:cSld>
@@ -695,14 +980,6 @@
           <a:bodyPr/>
           <a:lstStyle/>
           <a:p>
-            <a:r>
-              <a:rPr lang="en-US" dirty="0" smtClean="0"/>
-              <a:t>Many thanks to R/Pharma</a:t>
-            </a:r>
-            <a:r>
-              <a:rPr lang="en-US" baseline="0" dirty="0" smtClean="0"/>
-              <a:t> for providing this resource</a:t>
-            </a:r>
             <a:endParaRPr lang="en-US" dirty="0"/>
           </a:p>
         </p:txBody>
@@ -714,7 +991,7 @@
             <a:spLocks noGrp="1"/>
           </p:cNvSpPr>
           <p:nvPr>
-            <p:ph type="sldNum" sz="quarter" idx="10"/>
+            <p:ph type="sldNum" sz="quarter" idx="5"/>
           </p:nvPr>
         </p:nvSpPr>
         <p:spPr/>
@@ -724,7 +1001,7 @@
           <a:p>
             <a:fld id="{B9F26414-4BE6-427A-9F34-1430B41B92D6}" type="slidenum">
               <a:rPr lang="en-US" smtClean="0"/>
-              <a:t>12</a:t>
+              <a:t>6</a:t>
             </a:fld>
             <a:endParaRPr lang="en-US"/>
           </a:p>
@@ -733,7 +1010,7 @@
     </p:spTree>
     <p:extLst>
       <p:ext uri="{BB962C8B-B14F-4D97-AF65-F5344CB8AC3E}">
-        <p14:creationId xmlns:p14="http://schemas.microsoft.com/office/powerpoint/2010/main" val="1470043137"/>
+        <p14:creationId xmlns:p14="http://schemas.microsoft.com/office/powerpoint/2010/main" val="1284151761"/>
       </p:ext>
     </p:extLst>
   </p:cSld>
@@ -787,6 +1064,14 @@
           <a:bodyPr/>
           <a:lstStyle/>
           <a:p>
+            <a:r>
+              <a:rPr lang="en-US" dirty="0"/>
+              <a:t>Many thanks to R/Pharma</a:t>
+            </a:r>
+            <a:r>
+              <a:rPr lang="en-US" baseline="0" dirty="0"/>
+              <a:t> for providing this resource</a:t>
+            </a:r>
             <a:endParaRPr lang="en-US" dirty="0"/>
           </a:p>
         </p:txBody>
@@ -798,7 +1083,7 @@
             <a:spLocks noGrp="1"/>
           </p:cNvSpPr>
           <p:nvPr>
-            <p:ph type="sldNum" sz="quarter" idx="5"/>
+            <p:ph type="sldNum" sz="quarter" idx="10"/>
           </p:nvPr>
         </p:nvSpPr>
         <p:spPr/>
@@ -808,7 +1093,7 @@
           <a:p>
             <a:fld id="{B9F26414-4BE6-427A-9F34-1430B41B92D6}" type="slidenum">
               <a:rPr lang="en-US" smtClean="0"/>
-              <a:t>14</a:t>
+              <a:t>13</a:t>
             </a:fld>
             <a:endParaRPr lang="en-US"/>
           </a:p>
@@ -817,7 +1102,7 @@
     </p:spTree>
     <p:extLst>
       <p:ext uri="{BB962C8B-B14F-4D97-AF65-F5344CB8AC3E}">
-        <p14:creationId xmlns:p14="http://schemas.microsoft.com/office/powerpoint/2010/main" val="2674332949"/>
+        <p14:creationId xmlns:p14="http://schemas.microsoft.com/office/powerpoint/2010/main" val="1470043137"/>
       </p:ext>
     </p:extLst>
   </p:cSld>
@@ -871,19 +1156,7 @@
           <a:bodyPr/>
           <a:lstStyle/>
           <a:p>
-            <a:r>
-              <a:rPr lang="en-US" dirty="0"/>
-              <a:t>Please ask questions  - we are here to help! Also, we will work through the examples together.</a:t>
-            </a:r>
-          </a:p>
-          <a:p>
             <a:endParaRPr lang="en-US" dirty="0"/>
-          </a:p>
-          <a:p>
-            <a:r>
-              <a:rPr lang="en-US" dirty="0"/>
-              <a:t>Post questions into the slack channel is preferred to raising your hand on zoom or posting into zoom chat so it is preserved for the future and we can make improvements to the workshop.</a:t>
-            </a:r>
           </a:p>
         </p:txBody>
       </p:sp>
@@ -904,7 +1177,7 @@
           <a:p>
             <a:fld id="{B9F26414-4BE6-427A-9F34-1430B41B92D6}" type="slidenum">
               <a:rPr lang="en-US" smtClean="0"/>
-              <a:t>16</a:t>
+              <a:t>15</a:t>
             </a:fld>
             <a:endParaRPr lang="en-US"/>
           </a:p>
@@ -913,7 +1186,7 @@
     </p:spTree>
     <p:extLst>
       <p:ext uri="{BB962C8B-B14F-4D97-AF65-F5344CB8AC3E}">
-        <p14:creationId xmlns:p14="http://schemas.microsoft.com/office/powerpoint/2010/main" val="3200179349"/>
+        <p14:creationId xmlns:p14="http://schemas.microsoft.com/office/powerpoint/2010/main" val="2674332949"/>
       </p:ext>
     </p:extLst>
   </p:cSld>
@@ -969,7 +1242,7 @@
           <a:p>
             <a:r>
               <a:rPr lang="en-US" dirty="0"/>
-              <a:t>Bear with us. We will get into more complex topics in validation. This workshop is specifically trying to build a foundation for knowledge. And you never know, you might learn something.</a:t>
+              <a:t>Please ask questions  - we are here to help! Also, we will work through the examples together.</a:t>
             </a:r>
           </a:p>
           <a:p>
@@ -978,7 +1251,7 @@
           <a:p>
             <a:r>
               <a:rPr lang="en-US" dirty="0"/>
-              <a:t>Also, as we go into breakout rooms, it would be helpful if you could work with the rest of the members of the breakout group to answer any questions. There are more of you than us, and any help we can get is appreciated!</a:t>
+              <a:t>Post questions into the slack channel is preferred to raising your hand on zoom or posting into zoom chat so it is preserved for the future and we can make improvements to the workshop.</a:t>
             </a:r>
           </a:p>
         </p:txBody>
@@ -1009,7 +1282,7 @@
     </p:spTree>
     <p:extLst>
       <p:ext uri="{BB962C8B-B14F-4D97-AF65-F5344CB8AC3E}">
-        <p14:creationId xmlns:p14="http://schemas.microsoft.com/office/powerpoint/2010/main" val="282342033"/>
+        <p14:creationId xmlns:p14="http://schemas.microsoft.com/office/powerpoint/2010/main" val="3200179349"/>
       </p:ext>
     </p:extLst>
   </p:cSld>
@@ -1063,81 +1336,19 @@
           <a:bodyPr/>
           <a:lstStyle/>
           <a:p>
-            <a:pPr marL="0" marR="0" lvl="0" indent="0" algn="l" defTabSz="914400" rtl="0" eaLnBrk="1" fontAlgn="auto" latinLnBrk="0" hangingPunct="1">
-              <a:lnSpc>
-                <a:spcPct val="100000"/>
-              </a:lnSpc>
-              <a:spcBef>
-                <a:spcPts val="0"/>
-              </a:spcBef>
-              <a:spcAft>
-                <a:spcPts val="0"/>
-              </a:spcAft>
-              <a:buClrTx/>
-              <a:buSzTx/>
-              <a:buFontTx/>
-              <a:buNone/>
-              <a:tabLst/>
-              <a:defRPr/>
-            </a:pPr>
             <a:r>
               <a:rPr lang="en-US" dirty="0"/>
-              <a:t>Please open an issue in the </a:t>
-            </a:r>
-            <a:r>
-              <a:rPr lang="en-US" dirty="0" err="1"/>
-              <a:t>github</a:t>
-            </a:r>
+              <a:t>Bear with us. We will get into more complex topics in validation. This workshop is specifically trying to build a foundation for knowledge. And you never know, you might learn something.</a:t>
+            </a:r>
+          </a:p>
+          <a:p>
+            <a:endParaRPr lang="en-US" dirty="0"/>
+          </a:p>
+          <a:p>
             <a:r>
               <a:rPr lang="en-US" dirty="0"/>
-              <a:t> page. We are human, we did our best, but would love to do better and make this easy for you to understand these concepts</a:t>
-            </a:r>
-          </a:p>
-          <a:p>
-            <a:pPr marL="0" marR="0" lvl="0" indent="0" algn="l" defTabSz="914400" rtl="0" eaLnBrk="1" fontAlgn="auto" latinLnBrk="0" hangingPunct="1">
-              <a:lnSpc>
-                <a:spcPct val="100000"/>
-              </a:lnSpc>
-              <a:spcBef>
-                <a:spcPts val="0"/>
-              </a:spcBef>
-              <a:spcAft>
-                <a:spcPts val="0"/>
-              </a:spcAft>
-              <a:buClrTx/>
-              <a:buSzTx/>
-              <a:buFontTx/>
-              <a:buNone/>
-              <a:tabLst/>
-              <a:defRPr/>
-            </a:pPr>
-            <a:endParaRPr lang="en-US" dirty="0"/>
-          </a:p>
-          <a:p>
-            <a:pPr marL="0" marR="0" lvl="0" indent="0" algn="l" defTabSz="914400" rtl="0" eaLnBrk="1" fontAlgn="auto" latinLnBrk="0" hangingPunct="1">
-              <a:lnSpc>
-                <a:spcPct val="100000"/>
-              </a:lnSpc>
-              <a:spcBef>
-                <a:spcPts val="0"/>
-              </a:spcBef>
-              <a:spcAft>
-                <a:spcPts val="0"/>
-              </a:spcAft>
-              <a:buClrTx/>
-              <a:buSzTx/>
-              <a:buFontTx/>
-              <a:buNone/>
-              <a:tabLst/>
-              <a:defRPr/>
-            </a:pPr>
-            <a:r>
-              <a:rPr lang="en-US" dirty="0"/>
-              <a:t>Also, anything that would help make things clearer we would love to know too!</a:t>
-            </a:r>
-          </a:p>
-          <a:p>
-            <a:endParaRPr lang="en-US" dirty="0"/>
+              <a:t>Also, as we go into breakout rooms, it would be helpful if you could work with the rest of the members of the breakout group to answer any questions. There are more of you than us, and any help we can get is appreciated!</a:t>
+            </a:r>
           </a:p>
         </p:txBody>
       </p:sp>
@@ -1167,7 +1378,7 @@
     </p:spTree>
     <p:extLst>
       <p:ext uri="{BB962C8B-B14F-4D97-AF65-F5344CB8AC3E}">
-        <p14:creationId xmlns:p14="http://schemas.microsoft.com/office/powerpoint/2010/main" val="493363971"/>
+        <p14:creationId xmlns:p14="http://schemas.microsoft.com/office/powerpoint/2010/main" val="282342033"/>
       </p:ext>
     </p:extLst>
   </p:cSld>
@@ -1221,19 +1432,81 @@
           <a:bodyPr/>
           <a:lstStyle/>
           <a:p>
+            <a:pPr marL="0" marR="0" lvl="0" indent="0" algn="l" defTabSz="914400" rtl="0" eaLnBrk="1" fontAlgn="auto" latinLnBrk="0" hangingPunct="1">
+              <a:lnSpc>
+                <a:spcPct val="100000"/>
+              </a:lnSpc>
+              <a:spcBef>
+                <a:spcPts val="0"/>
+              </a:spcBef>
+              <a:spcAft>
+                <a:spcPts val="0"/>
+              </a:spcAft>
+              <a:buClrTx/>
+              <a:buSzTx/>
+              <a:buFontTx/>
+              <a:buNone/>
+              <a:tabLst/>
+              <a:defRPr/>
+            </a:pPr>
             <a:r>
               <a:rPr lang="en-US" dirty="0"/>
-              <a:t>That is okay – if you are working on the sparse exercise documentation, go back to the more verbose set! Also, we will be setting up break out rooms, so see if any other members are also stuck. You can also pose a question in slack to the rest of the workshop or directly message the instructors.</a:t>
-            </a:r>
-          </a:p>
-          <a:p>
+              <a:t>Please open an issue in the </a:t>
+            </a:r>
+            <a:r>
+              <a:rPr lang="en-US" dirty="0" err="1"/>
+              <a:t>github</a:t>
+            </a:r>
+            <a:r>
+              <a:rPr lang="en-US" dirty="0"/>
+              <a:t> page. We are human, we did our best, but would love to do better and make this easy for you to understand these concepts</a:t>
+            </a:r>
+          </a:p>
+          <a:p>
+            <a:pPr marL="0" marR="0" lvl="0" indent="0" algn="l" defTabSz="914400" rtl="0" eaLnBrk="1" fontAlgn="auto" latinLnBrk="0" hangingPunct="1">
+              <a:lnSpc>
+                <a:spcPct val="100000"/>
+              </a:lnSpc>
+              <a:spcBef>
+                <a:spcPts val="0"/>
+              </a:spcBef>
+              <a:spcAft>
+                <a:spcPts val="0"/>
+              </a:spcAft>
+              <a:buClrTx/>
+              <a:buSzTx/>
+              <a:buFontTx/>
+              <a:buNone/>
+              <a:tabLst/>
+              <a:defRPr/>
+            </a:pPr>
             <a:endParaRPr lang="en-US" dirty="0"/>
           </a:p>
           <a:p>
+            <a:pPr marL="0" marR="0" lvl="0" indent="0" algn="l" defTabSz="914400" rtl="0" eaLnBrk="1" fontAlgn="auto" latinLnBrk="0" hangingPunct="1">
+              <a:lnSpc>
+                <a:spcPct val="100000"/>
+              </a:lnSpc>
+              <a:spcBef>
+                <a:spcPts val="0"/>
+              </a:spcBef>
+              <a:spcAft>
+                <a:spcPts val="0"/>
+              </a:spcAft>
+              <a:buClrTx/>
+              <a:buSzTx/>
+              <a:buFontTx/>
+              <a:buNone/>
+              <a:tabLst/>
+              <a:defRPr/>
+            </a:pPr>
             <a:r>
               <a:rPr lang="en-US" dirty="0"/>
-              <a:t>Finally, we will work through all the answers together!</a:t>
-            </a:r>
+              <a:t>Also, anything that would help make things clearer we would love to know too!</a:t>
+            </a:r>
+          </a:p>
+          <a:p>
+            <a:endParaRPr lang="en-US" dirty="0"/>
           </a:p>
         </p:txBody>
       </p:sp>
@@ -1263,7 +1536,7 @@
     </p:spTree>
     <p:extLst>
       <p:ext uri="{BB962C8B-B14F-4D97-AF65-F5344CB8AC3E}">
-        <p14:creationId xmlns:p14="http://schemas.microsoft.com/office/powerpoint/2010/main" val="1741456198"/>
+        <p14:creationId xmlns:p14="http://schemas.microsoft.com/office/powerpoint/2010/main" val="493363971"/>
       </p:ext>
     </p:extLst>
   </p:cSld>
@@ -1319,46 +1592,16 @@
           <a:p>
             <a:r>
               <a:rPr lang="en-US" dirty="0"/>
-              <a:t>If you have not yet, clone the R Package Validation Tutorial repository or make sure you have access to materials via </a:t>
-            </a:r>
-            <a:r>
-              <a:rPr lang="en-US" dirty="0" err="1"/>
-              <a:t>RStudio</a:t>
-            </a:r>
+              <a:t>That is okay – if you are working on the sparse exercise documentation, go back to the more verbose set! Also, we will be setting up break out rooms, so see if any other members are also stuck. You can also pose a question in slack to the rest of the workshop or directly message the instructors.</a:t>
+            </a:r>
+          </a:p>
+          <a:p>
+            <a:endParaRPr lang="en-US" dirty="0"/>
+          </a:p>
+          <a:p>
             <a:r>
               <a:rPr lang="en-US" dirty="0"/>
-              <a:t> Cloud.</a:t>
-            </a:r>
-          </a:p>
-          <a:p>
-            <a:endParaRPr lang="en-US" dirty="0"/>
-          </a:p>
-          <a:p>
-            <a:r>
-              <a:rPr lang="en-US" dirty="0" smtClean="0"/>
-              <a:t>Github.com/</a:t>
-            </a:r>
-            <a:r>
-              <a:rPr lang="en-US" dirty="0" err="1" smtClean="0"/>
-              <a:t>thebioengineer</a:t>
-            </a:r>
-            <a:r>
-              <a:rPr lang="en-US" dirty="0" smtClean="0"/>
-              <a:t>/</a:t>
-            </a:r>
-            <a:r>
-              <a:rPr lang="en-US" dirty="0" err="1" smtClean="0"/>
-              <a:t>R_Package_Validation_Tutorial</a:t>
-            </a:r>
-            <a:endParaRPr lang="en-US" dirty="0"/>
-          </a:p>
-          <a:p>
-            <a:endParaRPr lang="en-US" dirty="0"/>
-          </a:p>
-          <a:p>
-            <a:r>
-              <a:rPr lang="en-US" dirty="0"/>
-              <a:t> We will move onto the first series – basics of package building!</a:t>
+              <a:t>Finally, we will work through all the answers together!</a:t>
             </a:r>
           </a:p>
         </p:txBody>
@@ -1389,7 +1632,7 @@
     </p:spTree>
     <p:extLst>
       <p:ext uri="{BB962C8B-B14F-4D97-AF65-F5344CB8AC3E}">
-        <p14:creationId xmlns:p14="http://schemas.microsoft.com/office/powerpoint/2010/main" val="3803340894"/>
+        <p14:creationId xmlns:p14="http://schemas.microsoft.com/office/powerpoint/2010/main" val="1741456198"/>
       </p:ext>
     </p:extLst>
   </p:cSld>
@@ -1421,7 +1664,7 @@
           <p:cNvPr id="5" name="Rectangle 4">
             <a:extLst>
               <a:ext uri="{FF2B5EF4-FFF2-40B4-BE49-F238E27FC236}">
-                <a16:creationId xmlns="" xmlns:a16="http://schemas.microsoft.com/office/drawing/2014/main" id="{904DB13E-F722-4ED6-BB00-556651E95281}"/>
+                <a16:creationId xmlns:a16="http://schemas.microsoft.com/office/drawing/2014/main" id="{904DB13E-F722-4ED6-BB00-556651E95281}"/>
               </a:ext>
             </a:extLst>
           </p:cNvPr>
@@ -1570,7 +1813,7 @@
           <p:cNvPr id="7" name="Group 6">
             <a:extLst>
               <a:ext uri="{FF2B5EF4-FFF2-40B4-BE49-F238E27FC236}">
-                <a16:creationId xmlns="" xmlns:a16="http://schemas.microsoft.com/office/drawing/2014/main" id="{E26428D7-C6F3-473D-A360-A3F5C3E8728C}"/>
+                <a16:creationId xmlns:a16="http://schemas.microsoft.com/office/drawing/2014/main" id="{E26428D7-C6F3-473D-A360-A3F5C3E8728C}"/>
               </a:ext>
             </a:extLst>
           </p:cNvPr>
@@ -1868,7 +2111,7 @@
           <a:p>
             <a:fld id="{EA0C0817-A112-4847-8014-A94B7D2A4EA3}" type="datetime1">
               <a:rPr lang="en-US" smtClean="0"/>
-              <a:t>10/7/2021</a:t>
+              <a:t>10/26/2021</a:t>
             </a:fld>
             <a:endParaRPr lang="en-US" dirty="0"/>
           </a:p>
@@ -2070,7 +2313,7 @@
           <a:p>
             <a:fld id="{7332B432-ACDA-4023-A761-2BAB76577B62}" type="datetime1">
               <a:rPr lang="en-US" smtClean="0"/>
-              <a:t>10/7/2021</a:t>
+              <a:t>10/26/2021</a:t>
             </a:fld>
             <a:endParaRPr lang="en-US" dirty="0"/>
           </a:p>
@@ -2153,7 +2396,7 @@
           <p:cNvPr id="15" name="Rectangle 14">
             <a:extLst>
               <a:ext uri="{FF2B5EF4-FFF2-40B4-BE49-F238E27FC236}">
-                <a16:creationId xmlns="" xmlns:a16="http://schemas.microsoft.com/office/drawing/2014/main" id="{0A4A1889-E37C-4EC3-9E41-9DAD221CF389}"/>
+                <a16:creationId xmlns:a16="http://schemas.microsoft.com/office/drawing/2014/main" id="{0A4A1889-E37C-4EC3-9E41-9DAD221CF389}"/>
               </a:ext>
             </a:extLst>
           </p:cNvPr>
@@ -2350,7 +2593,7 @@
           <p:cNvPr id="16" name="Group 15">
             <a:extLst>
               <a:ext uri="{FF2B5EF4-FFF2-40B4-BE49-F238E27FC236}">
-                <a16:creationId xmlns="" xmlns:a16="http://schemas.microsoft.com/office/drawing/2014/main" id="{1683EB04-C23E-490C-A1A6-030CF79D23C8}"/>
+                <a16:creationId xmlns:a16="http://schemas.microsoft.com/office/drawing/2014/main" id="{1683EB04-C23E-490C-A1A6-030CF79D23C8}"/>
               </a:ext>
             </a:extLst>
           </p:cNvPr>
@@ -2370,7 +2613,7 @@
             <p:cNvPr id="17" name="Straight Connector 16">
               <a:extLst>
                 <a:ext uri="{FF2B5EF4-FFF2-40B4-BE49-F238E27FC236}">
-                  <a16:creationId xmlns="" xmlns:a16="http://schemas.microsoft.com/office/drawing/2014/main" id="{F8A84C03-E1CA-4A4E-81D6-9BB0C335B7A0}"/>
+                  <a16:creationId xmlns:a16="http://schemas.microsoft.com/office/drawing/2014/main" id="{F8A84C03-E1CA-4A4E-81D6-9BB0C335B7A0}"/>
                 </a:ext>
               </a:extLst>
             </p:cNvPr>
@@ -2418,7 +2661,7 @@
             <p:cNvPr id="18" name="Straight Connector 17">
               <a:extLst>
                 <a:ext uri="{FF2B5EF4-FFF2-40B4-BE49-F238E27FC236}">
-                  <a16:creationId xmlns="" xmlns:a16="http://schemas.microsoft.com/office/drawing/2014/main" id="{4A26FB5A-D5D1-4DAB-AC43-7F51A7F2D197}"/>
+                  <a16:creationId xmlns:a16="http://schemas.microsoft.com/office/drawing/2014/main" id="{4A26FB5A-D5D1-4DAB-AC43-7F51A7F2D197}"/>
                 </a:ext>
               </a:extLst>
             </p:cNvPr>
@@ -2466,7 +2709,7 @@
             <p:cNvPr id="19" name="Straight Connector 18">
               <a:extLst>
                 <a:ext uri="{FF2B5EF4-FFF2-40B4-BE49-F238E27FC236}">
-                  <a16:creationId xmlns="" xmlns:a16="http://schemas.microsoft.com/office/drawing/2014/main" id="{49303F14-E560-4C02-94F4-B4695FE26813}"/>
+                  <a16:creationId xmlns:a16="http://schemas.microsoft.com/office/drawing/2014/main" id="{49303F14-E560-4C02-94F4-B4695FE26813}"/>
                 </a:ext>
               </a:extLst>
             </p:cNvPr>
@@ -2669,7 +2912,7 @@
           <a:p>
             <a:fld id="{D9C646AA-F36E-4540-911D-FFFC0A0EF24A}" type="datetime1">
               <a:rPr lang="en-US" smtClean="0"/>
-              <a:t>10/7/2021</a:t>
+              <a:t>10/26/2021</a:t>
             </a:fld>
             <a:endParaRPr lang="en-US" dirty="0"/>
           </a:p>
@@ -2989,7 +3232,7 @@
           <a:p>
             <a:fld id="{69186D26-FA5F-4637-B602-B7C2DC34CFD4}" type="datetime1">
               <a:rPr lang="en-US" smtClean="0"/>
-              <a:t>10/7/2021</a:t>
+              <a:t>10/26/2021</a:t>
             </a:fld>
             <a:endParaRPr lang="en-US" dirty="0"/>
           </a:p>
@@ -3426,7 +3669,7 @@
           <a:p>
             <a:fld id="{8A7F15D8-96D1-4781-BC50-CA8A088B2FE4}" type="datetime1">
               <a:rPr lang="en-US" smtClean="0"/>
-              <a:t>10/7/2021</a:t>
+              <a:t>10/26/2021</a:t>
             </a:fld>
             <a:endParaRPr lang="en-US" dirty="0"/>
           </a:p>
@@ -3544,7 +3787,7 @@
           <a:p>
             <a:fld id="{F9A96C99-B8F8-4528-BD05-0E16E943DC09}" type="datetime1">
               <a:rPr lang="en-US" smtClean="0"/>
-              <a:t>10/7/2021</a:t>
+              <a:t>10/26/2021</a:t>
             </a:fld>
             <a:endParaRPr lang="en-US" dirty="0"/>
           </a:p>
@@ -3639,7 +3882,7 @@
           <a:p>
             <a:fld id="{03636942-C211-4B28-8DBD-C953E00AF71B}" type="datetime1">
               <a:rPr lang="en-US" smtClean="0"/>
-              <a:t>10/7/2021</a:t>
+              <a:t>10/26/2021</a:t>
             </a:fld>
             <a:endParaRPr lang="en-US" dirty="0"/>
           </a:p>
@@ -3722,7 +3965,7 @@
           <p:cNvPr id="10" name="Rectangle 9">
             <a:extLst>
               <a:ext uri="{FF2B5EF4-FFF2-40B4-BE49-F238E27FC236}">
-                <a16:creationId xmlns="" xmlns:a16="http://schemas.microsoft.com/office/drawing/2014/main" id="{D5E1BBF9-8BEF-4353-BA68-30AAF9EBD8D8}"/>
+                <a16:creationId xmlns:a16="http://schemas.microsoft.com/office/drawing/2014/main" id="{D5E1BBF9-8BEF-4353-BA68-30AAF9EBD8D8}"/>
               </a:ext>
             </a:extLst>
           </p:cNvPr>
@@ -3769,7 +4012,7 @@
           <p:cNvPr id="13" name="Rectangle 12">
             <a:extLst>
               <a:ext uri="{FF2B5EF4-FFF2-40B4-BE49-F238E27FC236}">
-                <a16:creationId xmlns="" xmlns:a16="http://schemas.microsoft.com/office/drawing/2014/main" id="{5B941C21-2A5D-4912-AB06-1BB0C0EB6AE1}"/>
+                <a16:creationId xmlns:a16="http://schemas.microsoft.com/office/drawing/2014/main" id="{5B941C21-2A5D-4912-AB06-1BB0C0EB6AE1}"/>
               </a:ext>
             </a:extLst>
           </p:cNvPr>
@@ -4056,7 +4299,7 @@
           <a:p>
             <a:fld id="{7E8D12A6-918A-48BD-8CB9-CA713993B0EA}" type="datetime1">
               <a:rPr lang="en-US" smtClean="0"/>
-              <a:t>10/7/2021</a:t>
+              <a:t>10/26/2021</a:t>
             </a:fld>
             <a:endParaRPr lang="en-US" dirty="0"/>
           </a:p>
@@ -4164,7 +4407,7 @@
           <p:cNvPr id="11" name="Rectangle 10">
             <a:extLst>
               <a:ext uri="{FF2B5EF4-FFF2-40B4-BE49-F238E27FC236}">
-                <a16:creationId xmlns="" xmlns:a16="http://schemas.microsoft.com/office/drawing/2014/main" id="{E687CA98-D9C7-497F-A1DA-7D22F8753BCE}"/>
+                <a16:creationId xmlns:a16="http://schemas.microsoft.com/office/drawing/2014/main" id="{E687CA98-D9C7-497F-A1DA-7D22F8753BCE}"/>
               </a:ext>
             </a:extLst>
           </p:cNvPr>
@@ -4318,7 +4561,7 @@
             <a:fld id="{E778CE86-875F-4587-BCF6-FA054AFC0D53}" type="datetime1">
               <a:rPr lang="en-US" smtClean="0"/>
               <a:pPr/>
-              <a:t>10/7/2021</a:t>
+              <a:t>10/26/2021</a:t>
             </a:fld>
             <a:endParaRPr lang="en-US" dirty="0"/>
           </a:p>
@@ -4400,7 +4643,7 @@
           <p:cNvPr id="12" name="Rectangle 11">
             <a:extLst>
               <a:ext uri="{FF2B5EF4-FFF2-40B4-BE49-F238E27FC236}">
-                <a16:creationId xmlns="" xmlns:a16="http://schemas.microsoft.com/office/drawing/2014/main" id="{F8B3D8CC-BB13-41A5-8F34-B8E84A4F9534}"/>
+                <a16:creationId xmlns:a16="http://schemas.microsoft.com/office/drawing/2014/main" id="{F8B3D8CC-BB13-41A5-8F34-B8E84A4F9534}"/>
               </a:ext>
             </a:extLst>
           </p:cNvPr>
@@ -4602,7 +4845,7 @@
           <p:cNvPr id="9" name="Rectangle 8">
             <a:extLst>
               <a:ext uri="{FF2B5EF4-FFF2-40B4-BE49-F238E27FC236}">
-                <a16:creationId xmlns="" xmlns:a16="http://schemas.microsoft.com/office/drawing/2014/main" id="{1E94681D-2A4C-4A8D-B9B5-31D440D0328D}"/>
+                <a16:creationId xmlns:a16="http://schemas.microsoft.com/office/drawing/2014/main" id="{1E94681D-2A4C-4A8D-B9B5-31D440D0328D}"/>
               </a:ext>
             </a:extLst>
           </p:cNvPr>
@@ -4834,7 +5077,7 @@
           <a:p>
             <a:fld id="{F6FA2B21-3FCD-4721-B95C-427943F61125}" type="datetime1">
               <a:rPr lang="en-US" smtClean="0"/>
-              <a:t>10/7/2021</a:t>
+              <a:t>10/26/2021</a:t>
             </a:fld>
             <a:endParaRPr lang="en-US" dirty="0"/>
           </a:p>
@@ -5314,7 +5557,7 @@
           <p:cNvPr id="6" name="Picture 5" descr="abstract image">
             <a:extLst>
               <a:ext uri="{FF2B5EF4-FFF2-40B4-BE49-F238E27FC236}">
-                <a16:creationId xmlns="" xmlns:a16="http://schemas.microsoft.com/office/drawing/2014/main" id="{8045422F-7258-40AC-BD2E-2469AA448922}"/>
+                <a16:creationId xmlns:a16="http://schemas.microsoft.com/office/drawing/2014/main" id="{8045422F-7258-40AC-BD2E-2469AA448922}"/>
               </a:ext>
             </a:extLst>
           </p:cNvPr>
@@ -5349,10 +5592,10 @@
           <p:cNvPr id="82" name="Rectangle 81">
             <a:extLst>
               <a:ext uri="{FF2B5EF4-FFF2-40B4-BE49-F238E27FC236}">
-                <a16:creationId xmlns="" xmlns:a16="http://schemas.microsoft.com/office/drawing/2014/main" id="{2644B391-9BFE-445C-A9EC-F544BB85FBC7}"/>
+                <a16:creationId xmlns:a16="http://schemas.microsoft.com/office/drawing/2014/main" id="{2644B391-9BFE-445C-A9EC-F544BB85FBC7}"/>
               </a:ext>
               <a:ext uri="{C183D7F6-B498-43B3-948B-1728B52AA6E4}">
-                <adec:decorative xmlns="" xmlns:adec="http://schemas.microsoft.com/office/drawing/2017/decorative" val="1"/>
+                <adec:decorative xmlns:adec="http://schemas.microsoft.com/office/drawing/2017/decorative" val="1"/>
               </a:ext>
             </a:extLst>
           </p:cNvPr>
@@ -5362,7 +5605,7 @@
           <p:nvPr>
             <p:extLst>
               <p:ext uri="{386F3935-93C4-4BCD-93E2-E3B085C9AB24}">
-                <p16:designElem xmlns="" xmlns:p16="http://schemas.microsoft.com/office/powerpoint/2015/main" val="1"/>
+                <p16:designElem xmlns:p16="http://schemas.microsoft.com/office/powerpoint/2015/main" val="1"/>
               </p:ext>
             </p:extLst>
           </p:nvPr>
@@ -5394,10 +5637,10 @@
           <p:cNvPr id="84" name="Rectangle 83">
             <a:extLst>
               <a:ext uri="{FF2B5EF4-FFF2-40B4-BE49-F238E27FC236}">
-                <a16:creationId xmlns="" xmlns:a16="http://schemas.microsoft.com/office/drawing/2014/main" id="{80F26E69-87D9-4655-AE7B-280A87AA3CAD}"/>
+                <a16:creationId xmlns:a16="http://schemas.microsoft.com/office/drawing/2014/main" id="{80F26E69-87D9-4655-AE7B-280A87AA3CAD}"/>
               </a:ext>
               <a:ext uri="{C183D7F6-B498-43B3-948B-1728B52AA6E4}">
-                <adec:decorative xmlns="" xmlns:adec="http://schemas.microsoft.com/office/drawing/2017/decorative" val="1"/>
+                <adec:decorative xmlns:adec="http://schemas.microsoft.com/office/drawing/2017/decorative" val="1"/>
               </a:ext>
             </a:extLst>
           </p:cNvPr>
@@ -5407,7 +5650,7 @@
           <p:nvPr>
             <p:extLst>
               <p:ext uri="{386F3935-93C4-4BCD-93E2-E3B085C9AB24}">
-                <p16:designElem xmlns="" xmlns:p16="http://schemas.microsoft.com/office/powerpoint/2015/main" val="1"/>
+                <p16:designElem xmlns:p16="http://schemas.microsoft.com/office/powerpoint/2015/main" val="1"/>
               </p:ext>
             </p:extLst>
           </p:nvPr>
@@ -5438,7 +5681,7 @@
           <p:cNvPr id="2" name="Title 1">
             <a:extLst>
               <a:ext uri="{FF2B5EF4-FFF2-40B4-BE49-F238E27FC236}">
-                <a16:creationId xmlns="" xmlns:a16="http://schemas.microsoft.com/office/drawing/2014/main" id="{18C3B467-088C-4F3D-A9A7-105C4E1E20CD}"/>
+                <a16:creationId xmlns:a16="http://schemas.microsoft.com/office/drawing/2014/main" id="{18C3B467-088C-4F3D-A9A7-105C4E1E20CD}"/>
               </a:ext>
             </a:extLst>
           </p:cNvPr>
@@ -5463,17 +5706,13 @@
           <a:p>
             <a:r>
               <a:rPr lang="en-GB" sz="4000" dirty="0"/>
-              <a:t>R Package </a:t>
-            </a:r>
-            <a:r>
-              <a:rPr lang="en-GB" sz="4000" dirty="0" smtClean="0"/>
-              <a:t>Validation</a:t>
+              <a:t>R Package Validation</a:t>
             </a:r>
             <a:br>
-              <a:rPr lang="en-GB" sz="4000" dirty="0" smtClean="0"/>
+              <a:rPr lang="en-GB" sz="4000" dirty="0"/>
             </a:br>
             <a:r>
-              <a:rPr lang="en-GB" sz="4000" dirty="0" smtClean="0"/>
+              <a:rPr lang="en-GB" sz="4000" dirty="0"/>
               <a:t>Workshop</a:t>
             </a:r>
             <a:endParaRPr lang="en-US" sz="4400" dirty="0">
@@ -5489,7 +5728,7 @@
           <p:cNvPr id="3" name="Subtitle 2">
             <a:extLst>
               <a:ext uri="{FF2B5EF4-FFF2-40B4-BE49-F238E27FC236}">
-                <a16:creationId xmlns="" xmlns:a16="http://schemas.microsoft.com/office/drawing/2014/main" id="{C8722DDC-8EEE-4A06-8DFE-B44871EAA2CF}"/>
+                <a16:creationId xmlns:a16="http://schemas.microsoft.com/office/drawing/2014/main" id="{C8722DDC-8EEE-4A06-8DFE-B44871EAA2CF}"/>
               </a:ext>
             </a:extLst>
           </p:cNvPr>
@@ -5533,7 +5772,7 @@
           <p:cNvPr id="5" name="Straight Connector 4">
             <a:extLst>
               <a:ext uri="{FF2B5EF4-FFF2-40B4-BE49-F238E27FC236}">
-                <a16:creationId xmlns="" xmlns:a16="http://schemas.microsoft.com/office/drawing/2014/main" id="{20AC4B09-ED72-42FC-9845-45FC1F4BC29D}"/>
+                <a16:creationId xmlns:a16="http://schemas.microsoft.com/office/drawing/2014/main" id="{20AC4B09-ED72-42FC-9845-45FC1F4BC29D}"/>
               </a:ext>
             </a:extLst>
           </p:cNvPr>
@@ -5604,7 +5843,7 @@
           <p:cNvPr id="2" name="Title 1">
             <a:extLst>
               <a:ext uri="{FF2B5EF4-FFF2-40B4-BE49-F238E27FC236}">
-                <a16:creationId xmlns="" xmlns:a16="http://schemas.microsoft.com/office/drawing/2014/main" id="{7614332B-4F24-42F4-A704-A6F1183E9470}"/>
+                <a16:creationId xmlns:a16="http://schemas.microsoft.com/office/drawing/2014/main" id="{4DA197EC-75CE-4967-B49A-620F6D94CA9D}"/>
               </a:ext>
             </a:extLst>
           </p:cNvPr>
@@ -5612,7 +5851,7 @@
             <a:spLocks noGrp="1"/>
           </p:cNvSpPr>
           <p:nvPr>
-            <p:ph type="ctrTitle"/>
+            <p:ph type="title"/>
           </p:nvPr>
         </p:nvSpPr>
         <p:spPr/>
@@ -5622,21 +5861,305 @@
           <a:p>
             <a:r>
               <a:rPr lang="en-US" dirty="0"/>
-              <a:t>How are we going to get there</a:t>
-            </a:r>
+              <a:t>Expected Knowledge</a:t>
+            </a:r>
+          </a:p>
+        </p:txBody>
+      </p:sp>
+      <p:sp>
+        <p:nvSpPr>
+          <p:cNvPr id="3" name="Content Placeholder 2">
+            <a:extLst>
+              <a:ext uri="{FF2B5EF4-FFF2-40B4-BE49-F238E27FC236}">
+                <a16:creationId xmlns:a16="http://schemas.microsoft.com/office/drawing/2014/main" id="{8AB0FEEC-3BEF-46E7-912B-C736F42B180B}"/>
+              </a:ext>
+            </a:extLst>
+          </p:cNvPr>
+          <p:cNvSpPr>
+            <a:spLocks noGrp="1"/>
+          </p:cNvSpPr>
+          <p:nvPr>
+            <p:ph sz="half" idx="1"/>
+          </p:nvPr>
+        </p:nvSpPr>
+        <p:spPr>
+          <a:xfrm>
+            <a:off x="1066800" y="2103120"/>
+            <a:ext cx="10363200" cy="3749040"/>
+          </a:xfrm>
+        </p:spPr>
+        <p:txBody>
+          <a:bodyPr>
+            <a:normAutofit/>
+          </a:bodyPr>
+          <a:lstStyle/>
+          <a:p>
+            <a:r>
+              <a:rPr lang="en-US" sz="2200" dirty="0"/>
+              <a:t>R Package Development</a:t>
+            </a:r>
+          </a:p>
+          <a:p>
+            <a:pPr lvl="1"/>
+            <a:r>
+              <a:rPr lang="en-US" sz="2000" dirty="0" err="1"/>
+              <a:t>devtools</a:t>
+            </a:r>
+            <a:r>
+              <a:rPr lang="en-US" sz="2000" dirty="0"/>
+              <a:t>, </a:t>
+            </a:r>
+            <a:r>
+              <a:rPr lang="en-US" sz="2000" dirty="0" err="1"/>
+              <a:t>usethis</a:t>
+            </a:r>
+            <a:r>
+              <a:rPr lang="en-US" sz="2000" dirty="0"/>
+              <a:t>, </a:t>
+            </a:r>
+            <a:r>
+              <a:rPr lang="en-US" sz="2000" dirty="0" err="1"/>
+              <a:t>roxygen</a:t>
+            </a:r>
+            <a:r>
+              <a:rPr lang="en-US" sz="2000" dirty="0"/>
+              <a:t>, </a:t>
+            </a:r>
+            <a:r>
+              <a:rPr lang="en-US" sz="2000" dirty="0" err="1"/>
+              <a:t>testthat</a:t>
+            </a:r>
+            <a:endParaRPr lang="en-US" sz="2000" dirty="0"/>
+          </a:p>
+          <a:p>
+            <a:pPr lvl="1"/>
+            <a:endParaRPr lang="en-US" sz="2000" dirty="0"/>
+          </a:p>
+          <a:p>
+            <a:r>
+              <a:rPr lang="en-US" sz="2200" dirty="0"/>
+              <a:t>Literate Programming</a:t>
+            </a:r>
+          </a:p>
+          <a:p>
+            <a:pPr lvl="1"/>
+            <a:r>
+              <a:rPr lang="en-US" sz="2000" dirty="0" err="1"/>
+              <a:t>rmarkdown</a:t>
+            </a:r>
+            <a:endParaRPr lang="en-US" sz="2000" dirty="0"/>
+          </a:p>
+          <a:p>
+            <a:pPr marL="0" indent="0">
+              <a:buNone/>
+            </a:pPr>
+            <a:endParaRPr lang="en-US" sz="2400" dirty="0"/>
           </a:p>
         </p:txBody>
       </p:sp>
     </p:spTree>
     <p:extLst>
       <p:ext uri="{BB962C8B-B14F-4D97-AF65-F5344CB8AC3E}">
-        <p14:creationId xmlns:p14="http://schemas.microsoft.com/office/powerpoint/2010/main" val="2358439516"/>
+        <p14:creationId xmlns:p14="http://schemas.microsoft.com/office/powerpoint/2010/main" val="1632441355"/>
       </p:ext>
     </p:extLst>
   </p:cSld>
   <p:clrMapOvr>
     <a:masterClrMapping/>
   </p:clrMapOvr>
+  <p:timing>
+    <p:tnLst>
+      <p:par>
+        <p:cTn id="1" dur="indefinite" restart="never" nodeType="tmRoot">
+          <p:childTnLst>
+            <p:seq concurrent="1" nextAc="seek">
+              <p:cTn id="2" dur="indefinite" nodeType="mainSeq">
+                <p:childTnLst>
+                  <p:par>
+                    <p:cTn id="3" fill="hold">
+                      <p:stCondLst>
+                        <p:cond delay="indefinite"/>
+                      </p:stCondLst>
+                      <p:childTnLst>
+                        <p:par>
+                          <p:cTn id="4" fill="hold">
+                            <p:stCondLst>
+                              <p:cond delay="0"/>
+                            </p:stCondLst>
+                            <p:childTnLst>
+                              <p:par>
+                                <p:cTn id="5" presetID="1" presetClass="entr" presetSubtype="0" fill="hold" grpId="0" nodeType="clickEffect">
+                                  <p:stCondLst>
+                                    <p:cond delay="0"/>
+                                  </p:stCondLst>
+                                  <p:childTnLst>
+                                    <p:set>
+                                      <p:cBhvr>
+                                        <p:cTn id="6" dur="1" fill="hold">
+                                          <p:stCondLst>
+                                            <p:cond delay="0"/>
+                                          </p:stCondLst>
+                                        </p:cTn>
+                                        <p:tgtEl>
+                                          <p:spTgt spid="3">
+                                            <p:txEl>
+                                              <p:pRg st="0" end="0"/>
+                                            </p:txEl>
+                                          </p:spTgt>
+                                        </p:tgtEl>
+                                        <p:attrNameLst>
+                                          <p:attrName>style.visibility</p:attrName>
+                                        </p:attrNameLst>
+                                      </p:cBhvr>
+                                      <p:to>
+                                        <p:strVal val="visible"/>
+                                      </p:to>
+                                    </p:set>
+                                  </p:childTnLst>
+                                </p:cTn>
+                              </p:par>
+                              <p:par>
+                                <p:cTn id="7" presetID="1" presetClass="entr" presetSubtype="0" fill="hold" grpId="0" nodeType="withEffect">
+                                  <p:stCondLst>
+                                    <p:cond delay="0"/>
+                                  </p:stCondLst>
+                                  <p:childTnLst>
+                                    <p:set>
+                                      <p:cBhvr>
+                                        <p:cTn id="8" dur="1" fill="hold">
+                                          <p:stCondLst>
+                                            <p:cond delay="0"/>
+                                          </p:stCondLst>
+                                        </p:cTn>
+                                        <p:tgtEl>
+                                          <p:spTgt spid="3">
+                                            <p:txEl>
+                                              <p:pRg st="1" end="1"/>
+                                            </p:txEl>
+                                          </p:spTgt>
+                                        </p:tgtEl>
+                                        <p:attrNameLst>
+                                          <p:attrName>style.visibility</p:attrName>
+                                        </p:attrNameLst>
+                                      </p:cBhvr>
+                                      <p:to>
+                                        <p:strVal val="visible"/>
+                                      </p:to>
+                                    </p:set>
+                                  </p:childTnLst>
+                                </p:cTn>
+                              </p:par>
+                            </p:childTnLst>
+                          </p:cTn>
+                        </p:par>
+                      </p:childTnLst>
+                    </p:cTn>
+                  </p:par>
+                  <p:par>
+                    <p:cTn id="9" fill="hold">
+                      <p:stCondLst>
+                        <p:cond delay="indefinite"/>
+                      </p:stCondLst>
+                      <p:childTnLst>
+                        <p:par>
+                          <p:cTn id="10" fill="hold">
+                            <p:stCondLst>
+                              <p:cond delay="0"/>
+                            </p:stCondLst>
+                            <p:childTnLst>
+                              <p:par>
+                                <p:cTn id="11" presetID="1" presetClass="entr" presetSubtype="0" fill="hold" grpId="0" nodeType="clickEffect">
+                                  <p:stCondLst>
+                                    <p:cond delay="0"/>
+                                  </p:stCondLst>
+                                  <p:childTnLst>
+                                    <p:set>
+                                      <p:cBhvr>
+                                        <p:cTn id="12" dur="1" fill="hold">
+                                          <p:stCondLst>
+                                            <p:cond delay="0"/>
+                                          </p:stCondLst>
+                                        </p:cTn>
+                                        <p:tgtEl>
+                                          <p:spTgt spid="3">
+                                            <p:txEl>
+                                              <p:pRg st="3" end="3"/>
+                                            </p:txEl>
+                                          </p:spTgt>
+                                        </p:tgtEl>
+                                        <p:attrNameLst>
+                                          <p:attrName>style.visibility</p:attrName>
+                                        </p:attrNameLst>
+                                      </p:cBhvr>
+                                      <p:to>
+                                        <p:strVal val="visible"/>
+                                      </p:to>
+                                    </p:set>
+                                  </p:childTnLst>
+                                </p:cTn>
+                              </p:par>
+                              <p:par>
+                                <p:cTn id="13" presetID="1" presetClass="entr" presetSubtype="0" fill="hold" grpId="0" nodeType="withEffect">
+                                  <p:stCondLst>
+                                    <p:cond delay="0"/>
+                                  </p:stCondLst>
+                                  <p:childTnLst>
+                                    <p:set>
+                                      <p:cBhvr>
+                                        <p:cTn id="14" dur="1" fill="hold">
+                                          <p:stCondLst>
+                                            <p:cond delay="0"/>
+                                          </p:stCondLst>
+                                        </p:cTn>
+                                        <p:tgtEl>
+                                          <p:spTgt spid="3">
+                                            <p:txEl>
+                                              <p:pRg st="4" end="4"/>
+                                            </p:txEl>
+                                          </p:spTgt>
+                                        </p:tgtEl>
+                                        <p:attrNameLst>
+                                          <p:attrName>style.visibility</p:attrName>
+                                        </p:attrNameLst>
+                                      </p:cBhvr>
+                                      <p:to>
+                                        <p:strVal val="visible"/>
+                                      </p:to>
+                                    </p:set>
+                                  </p:childTnLst>
+                                </p:cTn>
+                              </p:par>
+                            </p:childTnLst>
+                          </p:cTn>
+                        </p:par>
+                      </p:childTnLst>
+                    </p:cTn>
+                  </p:par>
+                </p:childTnLst>
+              </p:cTn>
+              <p:prevCondLst>
+                <p:cond evt="onPrev" delay="0">
+                  <p:tgtEl>
+                    <p:sldTgt/>
+                  </p:tgtEl>
+                </p:cond>
+              </p:prevCondLst>
+              <p:nextCondLst>
+                <p:cond evt="onNext" delay="0">
+                  <p:tgtEl>
+                    <p:sldTgt/>
+                  </p:tgtEl>
+                </p:cond>
+              </p:nextCondLst>
+            </p:seq>
+          </p:childTnLst>
+        </p:cTn>
+      </p:par>
+    </p:tnLst>
+    <p:bldLst>
+      <p:bldP spid="3" grpId="0" build="p"/>
+    </p:bldLst>
+  </p:timing>
 </p:sld>
 </file>
 
@@ -5662,7 +6185,7 @@
           <p:cNvPr id="2" name="Title 1">
             <a:extLst>
               <a:ext uri="{FF2B5EF4-FFF2-40B4-BE49-F238E27FC236}">
-                <a16:creationId xmlns="" xmlns:a16="http://schemas.microsoft.com/office/drawing/2014/main" id="{4DA197EC-75CE-4967-B49A-620F6D94CA9D}"/>
+                <a16:creationId xmlns:a16="http://schemas.microsoft.com/office/drawing/2014/main" id="{7614332B-4F24-42F4-A704-A6F1183E9470}"/>
               </a:ext>
             </a:extLst>
           </p:cNvPr>
@@ -5670,7 +6193,7 @@
             <a:spLocks noGrp="1"/>
           </p:cNvSpPr>
           <p:nvPr>
-            <p:ph type="title"/>
+            <p:ph type="ctrTitle"/>
           </p:nvPr>
         </p:nvSpPr>
         <p:spPr/>
@@ -5680,206 +6203,15 @@
           <a:p>
             <a:r>
               <a:rPr lang="en-US" dirty="0"/>
-              <a:t>Workshop Materials</a:t>
-            </a:r>
-          </a:p>
-        </p:txBody>
-      </p:sp>
-      <p:sp>
-        <p:nvSpPr>
-          <p:cNvPr id="3" name="Content Placeholder 2">
-            <a:extLst>
-              <a:ext uri="{FF2B5EF4-FFF2-40B4-BE49-F238E27FC236}">
-                <a16:creationId xmlns="" xmlns:a16="http://schemas.microsoft.com/office/drawing/2014/main" id="{8AB0FEEC-3BEF-46E7-912B-C736F42B180B}"/>
-              </a:ext>
-            </a:extLst>
-          </p:cNvPr>
-          <p:cNvSpPr>
-            <a:spLocks noGrp="1"/>
-          </p:cNvSpPr>
-          <p:nvPr>
-            <p:ph sz="half" idx="1"/>
-          </p:nvPr>
-        </p:nvSpPr>
-        <p:spPr>
-          <a:xfrm>
-            <a:off x="914400" y="2014194"/>
-            <a:ext cx="10363200" cy="789709"/>
-          </a:xfrm>
-        </p:spPr>
-        <p:txBody>
-          <a:bodyPr/>
-          <a:lstStyle/>
-          <a:p>
-            <a:pPr marL="0" indent="0" algn="ctr">
-              <a:buNone/>
-            </a:pPr>
-            <a:r>
-              <a:rPr lang="en-US" sz="3600" b="1" dirty="0" smtClean="0"/>
-              <a:t>bit.ly/</a:t>
-            </a:r>
-            <a:r>
-              <a:rPr lang="en-US" sz="3600" b="1" dirty="0" err="1" smtClean="0"/>
-              <a:t>valtools_CSS</a:t>
-            </a:r>
-            <a:endParaRPr lang="en-US" sz="3600" b="1" dirty="0"/>
-          </a:p>
-          <a:p>
-            <a:pPr marL="274320" lvl="1" indent="0">
-              <a:buNone/>
-            </a:pPr>
-            <a:endParaRPr lang="en-US" sz="1400" b="1" dirty="0"/>
-          </a:p>
-          <a:p>
-            <a:pPr marL="822960" lvl="3" indent="0">
-              <a:buNone/>
-            </a:pPr>
-            <a:endParaRPr lang="en-US" sz="1800" b="1" dirty="0"/>
-          </a:p>
-          <a:p>
-            <a:pPr lvl="1"/>
-            <a:endParaRPr lang="en-US" b="1" dirty="0"/>
-          </a:p>
-          <a:p>
-            <a:endParaRPr lang="en-US" b="1" dirty="0"/>
-          </a:p>
-        </p:txBody>
-      </p:sp>
-      <p:sp>
-        <p:nvSpPr>
-          <p:cNvPr id="4" name="TextBox 3">
-            <a:extLst>
-              <a:ext uri="{FF2B5EF4-FFF2-40B4-BE49-F238E27FC236}">
-                <a16:creationId xmlns="" xmlns:a16="http://schemas.microsoft.com/office/drawing/2014/main" id="{D59083DE-6E1A-4132-A4C8-A18D53074B76}"/>
-              </a:ext>
-            </a:extLst>
-          </p:cNvPr>
-          <p:cNvSpPr txBox="1"/>
-          <p:nvPr/>
-        </p:nvSpPr>
-        <p:spPr>
-          <a:xfrm>
-            <a:off x="2643447" y="2990406"/>
-            <a:ext cx="7187736" cy="1938992"/>
-          </a:xfrm>
-          <a:prstGeom prst="rect">
-            <a:avLst/>
-          </a:prstGeom>
-          <a:noFill/>
-        </p:spPr>
-        <p:txBody>
-          <a:bodyPr wrap="square" rtlCol="0">
-            <a:spAutoFit/>
-          </a:bodyPr>
-          <a:lstStyle/>
-          <a:p>
-            <a:pPr marL="0" lvl="2" algn="ctr" defTabSz="114300"/>
-            <a:r>
-              <a:rPr lang="en-US" sz="2400" dirty="0">
-                <a:solidFill>
-                  <a:schemeClr val="accent2"/>
-                </a:solidFill>
-              </a:rPr>
-              <a:t>Slides</a:t>
-            </a:r>
-            <a:r>
-              <a:rPr lang="en-US" sz="2400" dirty="0"/>
-              <a:t> folder contains presentation slides</a:t>
-            </a:r>
-          </a:p>
-          <a:p>
-            <a:pPr marL="0" lvl="2" algn="ctr" defTabSz="114300"/>
-            <a:endParaRPr lang="en-US" sz="2400" dirty="0"/>
-          </a:p>
-          <a:p>
-            <a:pPr marL="0" lvl="2" algn="ctr" defTabSz="114300"/>
-            <a:r>
-              <a:rPr lang="en-US" sz="2400" dirty="0">
-                <a:solidFill>
-                  <a:schemeClr val="accent2"/>
-                </a:solidFill>
-              </a:rPr>
-              <a:t>Materials</a:t>
-            </a:r>
-            <a:r>
-              <a:rPr lang="en-US" sz="2400" dirty="0"/>
-              <a:t> folder contains 2 types of exercises:</a:t>
-            </a:r>
-            <a:r>
-              <a:rPr lang="en-US" sz="2400" dirty="0">
-                <a:solidFill>
-                  <a:schemeClr val="accent1">
-                    <a:lumMod val="75000"/>
-                  </a:schemeClr>
-                </a:solidFill>
-              </a:rPr>
-              <a:t> Sparse </a:t>
-            </a:r>
-            <a:r>
-              <a:rPr lang="en-US" sz="2400" dirty="0"/>
-              <a:t>or </a:t>
-            </a:r>
-            <a:r>
-              <a:rPr lang="en-US" sz="2400" dirty="0">
-                <a:solidFill>
-                  <a:schemeClr val="accent4">
-                    <a:lumMod val="75000"/>
-                  </a:schemeClr>
-                </a:solidFill>
-              </a:rPr>
-              <a:t>Verbose</a:t>
-            </a:r>
-          </a:p>
-          <a:p>
-            <a:pPr algn="ctr"/>
-            <a:endParaRPr lang="en-US" sz="2400" dirty="0"/>
-          </a:p>
-        </p:txBody>
-      </p:sp>
-      <p:sp>
-        <p:nvSpPr>
-          <p:cNvPr id="5" name="TextBox 4">
-            <a:extLst>
-              <a:ext uri="{FF2B5EF4-FFF2-40B4-BE49-F238E27FC236}">
-                <a16:creationId xmlns="" xmlns:a16="http://schemas.microsoft.com/office/drawing/2014/main" id="{2B0E1A9C-DED3-4FD3-978C-825945879A48}"/>
-              </a:ext>
-            </a:extLst>
-          </p:cNvPr>
-          <p:cNvSpPr txBox="1"/>
-          <p:nvPr/>
-        </p:nvSpPr>
-        <p:spPr>
-          <a:xfrm>
-            <a:off x="1162395" y="4879571"/>
-            <a:ext cx="9867207" cy="1384995"/>
-          </a:xfrm>
-          <a:prstGeom prst="rect">
-            <a:avLst/>
-          </a:prstGeom>
-          <a:noFill/>
-        </p:spPr>
-        <p:txBody>
-          <a:bodyPr wrap="square" rtlCol="0">
-            <a:spAutoFit/>
-          </a:bodyPr>
-          <a:lstStyle/>
-          <a:p>
-            <a:pPr algn="ctr"/>
-            <a:r>
-              <a:rPr lang="en-US" sz="2800" dirty="0"/>
-              <a:t>Workshop slides and exercises are online now and will be available after the conference too.</a:t>
-            </a:r>
-          </a:p>
-          <a:p>
-            <a:pPr algn="ctr"/>
-            <a:endParaRPr lang="en-US" sz="2800" dirty="0"/>
+              <a:t>How are we going to get there</a:t>
+            </a:r>
           </a:p>
         </p:txBody>
       </p:sp>
     </p:spTree>
     <p:extLst>
       <p:ext uri="{BB962C8B-B14F-4D97-AF65-F5344CB8AC3E}">
-        <p14:creationId xmlns:p14="http://schemas.microsoft.com/office/powerpoint/2010/main" val="2961198549"/>
+        <p14:creationId xmlns:p14="http://schemas.microsoft.com/office/powerpoint/2010/main" val="2358439516"/>
       </p:ext>
     </p:extLst>
   </p:cSld>
@@ -5911,7 +6243,7 @@
           <p:cNvPr id="2" name="Title 1">
             <a:extLst>
               <a:ext uri="{FF2B5EF4-FFF2-40B4-BE49-F238E27FC236}">
-                <a16:creationId xmlns="" xmlns:a16="http://schemas.microsoft.com/office/drawing/2014/main" id="{4DA197EC-75CE-4967-B49A-620F6D94CA9D}"/>
+                <a16:creationId xmlns:a16="http://schemas.microsoft.com/office/drawing/2014/main" id="{4DA197EC-75CE-4967-B49A-620F6D94CA9D}"/>
               </a:ext>
             </a:extLst>
           </p:cNvPr>
@@ -5929,7 +6261,7 @@
           <a:p>
             <a:r>
               <a:rPr lang="en-US" dirty="0"/>
-              <a:t>R Studio Cloud workspace</a:t>
+              <a:t>Workshop Materials</a:t>
             </a:r>
           </a:p>
         </p:txBody>
@@ -5939,7 +6271,281 @@
           <p:cNvPr id="3" name="Content Placeholder 2">
             <a:extLst>
               <a:ext uri="{FF2B5EF4-FFF2-40B4-BE49-F238E27FC236}">
-                <a16:creationId xmlns="" xmlns:a16="http://schemas.microsoft.com/office/drawing/2014/main" id="{8AB0FEEC-3BEF-46E7-912B-C736F42B180B}"/>
+                <a16:creationId xmlns:a16="http://schemas.microsoft.com/office/drawing/2014/main" id="{8AB0FEEC-3BEF-46E7-912B-C736F42B180B}"/>
+              </a:ext>
+            </a:extLst>
+          </p:cNvPr>
+          <p:cNvSpPr>
+            <a:spLocks noGrp="1"/>
+          </p:cNvSpPr>
+          <p:nvPr>
+            <p:ph sz="half" idx="1"/>
+          </p:nvPr>
+        </p:nvSpPr>
+        <p:spPr>
+          <a:xfrm>
+            <a:off x="914400" y="2014194"/>
+            <a:ext cx="10363200" cy="789709"/>
+          </a:xfrm>
+        </p:spPr>
+        <p:txBody>
+          <a:bodyPr/>
+          <a:lstStyle/>
+          <a:p>
+            <a:pPr marL="0" indent="0" algn="ctr">
+              <a:buNone/>
+            </a:pPr>
+            <a:r>
+              <a:rPr lang="en-US" sz="3600" b="1" dirty="0"/>
+              <a:t>bit.ly/</a:t>
+            </a:r>
+            <a:r>
+              <a:rPr lang="en-US" sz="3600" b="1" dirty="0" err="1"/>
+              <a:t>valtools_workshop</a:t>
+            </a:r>
+            <a:endParaRPr lang="en-US" sz="3600" b="1" dirty="0"/>
+          </a:p>
+          <a:p>
+            <a:pPr marL="274320" lvl="1" indent="0">
+              <a:buNone/>
+            </a:pPr>
+            <a:endParaRPr lang="en-US" sz="1400" b="1" dirty="0"/>
+          </a:p>
+          <a:p>
+            <a:pPr marL="822960" lvl="3" indent="0">
+              <a:buNone/>
+            </a:pPr>
+            <a:endParaRPr lang="en-US" sz="1800" b="1" dirty="0"/>
+          </a:p>
+          <a:p>
+            <a:pPr lvl="1"/>
+            <a:endParaRPr lang="en-US" b="1" dirty="0"/>
+          </a:p>
+          <a:p>
+            <a:endParaRPr lang="en-US" b="1" dirty="0"/>
+          </a:p>
+        </p:txBody>
+      </p:sp>
+      <p:sp>
+        <p:nvSpPr>
+          <p:cNvPr id="4" name="TextBox 3">
+            <a:extLst>
+              <a:ext uri="{FF2B5EF4-FFF2-40B4-BE49-F238E27FC236}">
+                <a16:creationId xmlns:a16="http://schemas.microsoft.com/office/drawing/2014/main" id="{D59083DE-6E1A-4132-A4C8-A18D53074B76}"/>
+              </a:ext>
+            </a:extLst>
+          </p:cNvPr>
+          <p:cNvSpPr txBox="1"/>
+          <p:nvPr/>
+        </p:nvSpPr>
+        <p:spPr>
+          <a:xfrm>
+            <a:off x="2020511" y="2899936"/>
+            <a:ext cx="8150973" cy="2677656"/>
+          </a:xfrm>
+          <a:prstGeom prst="rect">
+            <a:avLst/>
+          </a:prstGeom>
+          <a:noFill/>
+        </p:spPr>
+        <p:txBody>
+          <a:bodyPr wrap="square" rtlCol="0">
+            <a:spAutoFit/>
+          </a:bodyPr>
+          <a:lstStyle/>
+          <a:p>
+            <a:pPr marL="0" lvl="2" algn="ctr" defTabSz="114300"/>
+            <a:r>
+              <a:rPr lang="en-US" sz="2400" dirty="0">
+                <a:solidFill>
+                  <a:schemeClr val="accent2"/>
+                </a:solidFill>
+              </a:rPr>
+              <a:t>Slides</a:t>
+            </a:r>
+            <a:r>
+              <a:rPr lang="en-US" sz="2400" dirty="0"/>
+              <a:t> folder contains presentation slides</a:t>
+            </a:r>
+          </a:p>
+          <a:p>
+            <a:pPr marL="0" lvl="2" algn="ctr" defTabSz="114300"/>
+            <a:endParaRPr lang="en-US" sz="2400" dirty="0"/>
+          </a:p>
+          <a:p>
+            <a:pPr marL="0" lvl="2" algn="ctr" defTabSz="114300"/>
+            <a:r>
+              <a:rPr lang="en-US" sz="2400" dirty="0">
+                <a:solidFill>
+                  <a:schemeClr val="accent2"/>
+                </a:solidFill>
+              </a:rPr>
+              <a:t>Materials</a:t>
+            </a:r>
+            <a:r>
+              <a:rPr lang="en-US" sz="2400" dirty="0"/>
+              <a:t> folder contains 2 types of exercises:</a:t>
+            </a:r>
+            <a:r>
+              <a:rPr lang="en-US" sz="2400" dirty="0">
+                <a:solidFill>
+                  <a:schemeClr val="accent1">
+                    <a:lumMod val="75000"/>
+                  </a:schemeClr>
+                </a:solidFill>
+              </a:rPr>
+              <a:t> </a:t>
+            </a:r>
+          </a:p>
+          <a:p>
+            <a:pPr marL="0" lvl="2" algn="ctr" defTabSz="114300"/>
+            <a:r>
+              <a:rPr lang="en-US" sz="2400" dirty="0">
+                <a:solidFill>
+                  <a:schemeClr val="accent1">
+                    <a:lumMod val="75000"/>
+                  </a:schemeClr>
+                </a:solidFill>
+              </a:rPr>
+              <a:t>Sparse </a:t>
+            </a:r>
+            <a:r>
+              <a:rPr lang="en-US" sz="2400" dirty="0"/>
+              <a:t>or </a:t>
+            </a:r>
+            <a:r>
+              <a:rPr lang="en-US" sz="2400" dirty="0">
+                <a:solidFill>
+                  <a:srgbClr val="0070C0"/>
+                </a:solidFill>
+              </a:rPr>
+              <a:t>Verbose</a:t>
+            </a:r>
+          </a:p>
+          <a:p>
+            <a:pPr marL="0" lvl="2" algn="ctr" defTabSz="114300"/>
+            <a:r>
+              <a:rPr lang="en-US" sz="2400" dirty="0"/>
+              <a:t>Named according to the</a:t>
+            </a:r>
+          </a:p>
+          <a:p>
+            <a:pPr marL="0" lvl="2" algn="ctr" defTabSz="114300"/>
+            <a:r>
+              <a:rPr lang="en-US" sz="2400" dirty="0"/>
+              <a:t> Slides they correspond with</a:t>
+            </a:r>
+          </a:p>
+          <a:p>
+            <a:pPr algn="ctr"/>
+            <a:endParaRPr lang="en-US" sz="2400" dirty="0"/>
+          </a:p>
+        </p:txBody>
+      </p:sp>
+      <p:sp>
+        <p:nvSpPr>
+          <p:cNvPr id="5" name="TextBox 4">
+            <a:extLst>
+              <a:ext uri="{FF2B5EF4-FFF2-40B4-BE49-F238E27FC236}">
+                <a16:creationId xmlns:a16="http://schemas.microsoft.com/office/drawing/2014/main" id="{2B0E1A9C-DED3-4FD3-978C-825945879A48}"/>
+              </a:ext>
+            </a:extLst>
+          </p:cNvPr>
+          <p:cNvSpPr txBox="1"/>
+          <p:nvPr/>
+        </p:nvSpPr>
+        <p:spPr>
+          <a:xfrm>
+            <a:off x="1162393" y="5325341"/>
+            <a:ext cx="9867207" cy="1384995"/>
+          </a:xfrm>
+          <a:prstGeom prst="rect">
+            <a:avLst/>
+          </a:prstGeom>
+          <a:noFill/>
+        </p:spPr>
+        <p:txBody>
+          <a:bodyPr wrap="square" rtlCol="0">
+            <a:spAutoFit/>
+          </a:bodyPr>
+          <a:lstStyle/>
+          <a:p>
+            <a:pPr algn="ctr"/>
+            <a:r>
+              <a:rPr lang="en-US" sz="2800" dirty="0"/>
+              <a:t>Workshop slides and exercises are online now and will be available after the conference too.</a:t>
+            </a:r>
+          </a:p>
+          <a:p>
+            <a:pPr algn="ctr"/>
+            <a:endParaRPr lang="en-US" sz="2800" dirty="0"/>
+          </a:p>
+        </p:txBody>
+      </p:sp>
+    </p:spTree>
+    <p:extLst>
+      <p:ext uri="{BB962C8B-B14F-4D97-AF65-F5344CB8AC3E}">
+        <p14:creationId xmlns:p14="http://schemas.microsoft.com/office/powerpoint/2010/main" val="2961198549"/>
+      </p:ext>
+    </p:extLst>
+  </p:cSld>
+  <p:clrMapOvr>
+    <a:masterClrMapping/>
+  </p:clrMapOvr>
+</p:sld>
+</file>
+
+<file path=ppt/slides/slide13.xml><?xml version="1.0" encoding="utf-8"?>
+<p:sld xmlns:a="http://schemas.openxmlformats.org/drawingml/2006/main" xmlns:r="http://schemas.openxmlformats.org/officeDocument/2006/relationships" xmlns:p="http://schemas.openxmlformats.org/presentationml/2006/main">
+  <p:cSld>
+    <p:spTree>
+      <p:nvGrpSpPr>
+        <p:cNvPr id="1" name=""/>
+        <p:cNvGrpSpPr/>
+        <p:nvPr/>
+      </p:nvGrpSpPr>
+      <p:grpSpPr>
+        <a:xfrm>
+          <a:off x="0" y="0"/>
+          <a:ext cx="0" cy="0"/>
+          <a:chOff x="0" y="0"/>
+          <a:chExt cx="0" cy="0"/>
+        </a:xfrm>
+      </p:grpSpPr>
+      <p:sp>
+        <p:nvSpPr>
+          <p:cNvPr id="2" name="Title 1">
+            <a:extLst>
+              <a:ext uri="{FF2B5EF4-FFF2-40B4-BE49-F238E27FC236}">
+                <a16:creationId xmlns:a16="http://schemas.microsoft.com/office/drawing/2014/main" id="{4DA197EC-75CE-4967-B49A-620F6D94CA9D}"/>
+              </a:ext>
+            </a:extLst>
+          </p:cNvPr>
+          <p:cNvSpPr>
+            <a:spLocks noGrp="1"/>
+          </p:cNvSpPr>
+          <p:nvPr>
+            <p:ph type="title"/>
+          </p:nvPr>
+        </p:nvSpPr>
+        <p:spPr/>
+        <p:txBody>
+          <a:bodyPr/>
+          <a:lstStyle/>
+          <a:p>
+            <a:r>
+              <a:rPr lang="en-US" dirty="0"/>
+              <a:t>R Studio Cloud workspace</a:t>
+            </a:r>
+          </a:p>
+        </p:txBody>
+      </p:sp>
+      <p:sp>
+        <p:nvSpPr>
+          <p:cNvPr id="3" name="Content Placeholder 2">
+            <a:extLst>
+              <a:ext uri="{FF2B5EF4-FFF2-40B4-BE49-F238E27FC236}">
+                <a16:creationId xmlns:a16="http://schemas.microsoft.com/office/drawing/2014/main" id="{8AB0FEEC-3BEF-46E7-912B-C736F42B180B}"/>
               </a:ext>
             </a:extLst>
           </p:cNvPr>
@@ -5994,7 +6600,7 @@
           <p:cNvPr id="5" name="TextBox 4">
             <a:extLst>
               <a:ext uri="{FF2B5EF4-FFF2-40B4-BE49-F238E27FC236}">
-                <a16:creationId xmlns="" xmlns:a16="http://schemas.microsoft.com/office/drawing/2014/main" id="{2B0E1A9C-DED3-4FD3-978C-825945879A48}"/>
+                <a16:creationId xmlns:a16="http://schemas.microsoft.com/office/drawing/2014/main" id="{2B0E1A9C-DED3-4FD3-978C-825945879A48}"/>
               </a:ext>
             </a:extLst>
           </p:cNvPr>
@@ -6020,7 +6626,7 @@
             <a:pPr algn="ctr"/>
             <a:r>
               <a:rPr lang="en-US" sz="2800" dirty="0"/>
-              <a:t>Please check your email for invites!</a:t>
+              <a:t>Please check see the chat email for the URL!</a:t>
             </a:r>
           </a:p>
           <a:p>
@@ -6034,7 +6640,7 @@
           <p:cNvPr id="7" name="Picture 6" descr="Graphical user interface, text&#10;&#10;Description automatically generated">
             <a:extLst>
               <a:ext uri="{FF2B5EF4-FFF2-40B4-BE49-F238E27FC236}">
-                <a16:creationId xmlns="" xmlns:a16="http://schemas.microsoft.com/office/drawing/2014/main" id="{D8A3034C-41BD-4820-B9F6-D84867DB66F9}"/>
+                <a16:creationId xmlns:a16="http://schemas.microsoft.com/office/drawing/2014/main" id="{D8A3034C-41BD-4820-B9F6-D84867DB66F9}"/>
               </a:ext>
             </a:extLst>
           </p:cNvPr>
@@ -6072,64 +6678,6 @@
 </p:sld>
 </file>
 
-<file path=ppt/slides/slide13.xml><?xml version="1.0" encoding="utf-8"?>
-<p:sld xmlns:a="http://schemas.openxmlformats.org/drawingml/2006/main" xmlns:r="http://schemas.openxmlformats.org/officeDocument/2006/relationships" xmlns:p="http://schemas.openxmlformats.org/presentationml/2006/main">
-  <p:cSld>
-    <p:spTree>
-      <p:nvGrpSpPr>
-        <p:cNvPr id="1" name=""/>
-        <p:cNvGrpSpPr/>
-        <p:nvPr/>
-      </p:nvGrpSpPr>
-      <p:grpSpPr>
-        <a:xfrm>
-          <a:off x="0" y="0"/>
-          <a:ext cx="0" cy="0"/>
-          <a:chOff x="0" y="0"/>
-          <a:chExt cx="0" cy="0"/>
-        </a:xfrm>
-      </p:grpSpPr>
-      <p:sp>
-        <p:nvSpPr>
-          <p:cNvPr id="2" name="Title 1">
-            <a:extLst>
-              <a:ext uri="{FF2B5EF4-FFF2-40B4-BE49-F238E27FC236}">
-                <a16:creationId xmlns="" xmlns:a16="http://schemas.microsoft.com/office/drawing/2014/main" id="{7614332B-4F24-42F4-A704-A6F1183E9470}"/>
-              </a:ext>
-            </a:extLst>
-          </p:cNvPr>
-          <p:cNvSpPr>
-            <a:spLocks noGrp="1"/>
-          </p:cNvSpPr>
-          <p:nvPr>
-            <p:ph type="ctrTitle"/>
-          </p:nvPr>
-        </p:nvSpPr>
-        <p:spPr/>
-        <p:txBody>
-          <a:bodyPr/>
-          <a:lstStyle/>
-          <a:p>
-            <a:r>
-              <a:rPr lang="en-US" dirty="0"/>
-              <a:t>When are we getting there</a:t>
-            </a:r>
-          </a:p>
-        </p:txBody>
-      </p:sp>
-    </p:spTree>
-    <p:extLst>
-      <p:ext uri="{BB962C8B-B14F-4D97-AF65-F5344CB8AC3E}">
-        <p14:creationId xmlns:p14="http://schemas.microsoft.com/office/powerpoint/2010/main" val="1671609768"/>
-      </p:ext>
-    </p:extLst>
-  </p:cSld>
-  <p:clrMapOvr>
-    <a:masterClrMapping/>
-  </p:clrMapOvr>
-</p:sld>
-</file>
-
 <file path=ppt/slides/slide14.xml><?xml version="1.0" encoding="utf-8"?>
 <p:sld xmlns:a="http://schemas.openxmlformats.org/drawingml/2006/main" xmlns:r="http://schemas.openxmlformats.org/officeDocument/2006/relationships" xmlns:p="http://schemas.openxmlformats.org/presentationml/2006/main">
   <p:cSld>
@@ -6152,7 +6700,65 @@
           <p:cNvPr id="2" name="Title 1">
             <a:extLst>
               <a:ext uri="{FF2B5EF4-FFF2-40B4-BE49-F238E27FC236}">
-                <a16:creationId xmlns="" xmlns:a16="http://schemas.microsoft.com/office/drawing/2014/main" id="{4DA197EC-75CE-4967-B49A-620F6D94CA9D}"/>
+                <a16:creationId xmlns:a16="http://schemas.microsoft.com/office/drawing/2014/main" id="{7614332B-4F24-42F4-A704-A6F1183E9470}"/>
+              </a:ext>
+            </a:extLst>
+          </p:cNvPr>
+          <p:cNvSpPr>
+            <a:spLocks noGrp="1"/>
+          </p:cNvSpPr>
+          <p:nvPr>
+            <p:ph type="ctrTitle"/>
+          </p:nvPr>
+        </p:nvSpPr>
+        <p:spPr/>
+        <p:txBody>
+          <a:bodyPr/>
+          <a:lstStyle/>
+          <a:p>
+            <a:r>
+              <a:rPr lang="en-US" dirty="0"/>
+              <a:t>When are we getting there</a:t>
+            </a:r>
+          </a:p>
+        </p:txBody>
+      </p:sp>
+    </p:spTree>
+    <p:extLst>
+      <p:ext uri="{BB962C8B-B14F-4D97-AF65-F5344CB8AC3E}">
+        <p14:creationId xmlns:p14="http://schemas.microsoft.com/office/powerpoint/2010/main" val="1671609768"/>
+      </p:ext>
+    </p:extLst>
+  </p:cSld>
+  <p:clrMapOvr>
+    <a:masterClrMapping/>
+  </p:clrMapOvr>
+</p:sld>
+</file>
+
+<file path=ppt/slides/slide15.xml><?xml version="1.0" encoding="utf-8"?>
+<p:sld xmlns:a="http://schemas.openxmlformats.org/drawingml/2006/main" xmlns:r="http://schemas.openxmlformats.org/officeDocument/2006/relationships" xmlns:p="http://schemas.openxmlformats.org/presentationml/2006/main">
+  <p:cSld>
+    <p:spTree>
+      <p:nvGrpSpPr>
+        <p:cNvPr id="1" name=""/>
+        <p:cNvGrpSpPr/>
+        <p:nvPr/>
+      </p:nvGrpSpPr>
+      <p:grpSpPr>
+        <a:xfrm>
+          <a:off x="0" y="0"/>
+          <a:ext cx="0" cy="0"/>
+          <a:chOff x="0" y="0"/>
+          <a:chExt cx="0" cy="0"/>
+        </a:xfrm>
+      </p:grpSpPr>
+      <p:sp>
+        <p:nvSpPr>
+          <p:cNvPr id="2" name="Title 1">
+            <a:extLst>
+              <a:ext uri="{FF2B5EF4-FFF2-40B4-BE49-F238E27FC236}">
+                <a16:creationId xmlns:a16="http://schemas.microsoft.com/office/drawing/2014/main" id="{4DA197EC-75CE-4967-B49A-620F6D94CA9D}"/>
               </a:ext>
             </a:extLst>
           </p:cNvPr>
@@ -6185,7 +6791,7 @@
           <p:cNvPr id="6" name="Table 5">
             <a:extLst>
               <a:ext uri="{FF2B5EF4-FFF2-40B4-BE49-F238E27FC236}">
-                <a16:creationId xmlns="" xmlns:a16="http://schemas.microsoft.com/office/drawing/2014/main" id="{79681E2D-3A7F-49C3-9B7F-2E9CED5B8FC5}"/>
+                <a16:creationId xmlns:a16="http://schemas.microsoft.com/office/drawing/2014/main" id="{79681E2D-3A7F-49C3-9B7F-2E9CED5B8FC5}"/>
               </a:ext>
             </a:extLst>
           </p:cNvPr>
@@ -6214,21 +6820,21 @@
                 <a:gridCol w="2068072">
                   <a:extLst>
                     <a:ext uri="{9D8B030D-6E8A-4147-A177-3AD203B41FA5}">
-                      <a16:colId xmlns="" xmlns:a16="http://schemas.microsoft.com/office/drawing/2014/main" val="1356780315"/>
+                      <a16:colId xmlns:a16="http://schemas.microsoft.com/office/drawing/2014/main" val="1356780315"/>
                     </a:ext>
                   </a:extLst>
                 </a:gridCol>
                 <a:gridCol w="3402349">
                   <a:extLst>
                     <a:ext uri="{9D8B030D-6E8A-4147-A177-3AD203B41FA5}">
-                      <a16:colId xmlns="" xmlns:a16="http://schemas.microsoft.com/office/drawing/2014/main" val="3006423282"/>
+                      <a16:colId xmlns:a16="http://schemas.microsoft.com/office/drawing/2014/main" val="3006423282"/>
                     </a:ext>
                   </a:extLst>
                 </a:gridCol>
                 <a:gridCol w="3789957">
                   <a:extLst>
                     <a:ext uri="{9D8B030D-6E8A-4147-A177-3AD203B41FA5}">
-                      <a16:colId xmlns="" xmlns:a16="http://schemas.microsoft.com/office/drawing/2014/main" val="857023930"/>
+                      <a16:colId xmlns:a16="http://schemas.microsoft.com/office/drawing/2014/main" val="857023930"/>
                     </a:ext>
                   </a:extLst>
                 </a:gridCol>
@@ -6416,7 +7022,7 @@
                 </a:tc>
                 <a:extLst>
                   <a:ext uri="{0D108BD9-81ED-4DB2-BD59-A6C34878D82A}">
-                    <a16:rowId xmlns="" xmlns:a16="http://schemas.microsoft.com/office/drawing/2014/main" val="1183580986"/>
+                    <a16:rowId xmlns:a16="http://schemas.microsoft.com/office/drawing/2014/main" val="1183580986"/>
                   </a:ext>
                 </a:extLst>
               </a:tr>
@@ -6428,7 +7034,7 @@
                     <a:p>
                       <a:pPr algn="ctr" fontAlgn="ctr"/>
                       <a:r>
-                        <a:rPr lang="en-US" sz="1400" u="none" strike="noStrike" dirty="0" smtClean="0">
+                        <a:rPr lang="en-US" sz="1400" u="none" strike="noStrike" dirty="0">
                           <a:effectLst/>
                           <a:latin typeface="+mn-lt"/>
                         </a:rPr>
@@ -6606,7 +7212,7 @@
                 </a:tc>
                 <a:extLst>
                   <a:ext uri="{0D108BD9-81ED-4DB2-BD59-A6C34878D82A}">
-                    <a16:rowId xmlns="" xmlns:a16="http://schemas.microsoft.com/office/drawing/2014/main" val="2899440749"/>
+                    <a16:rowId xmlns:a16="http://schemas.microsoft.com/office/drawing/2014/main" val="2899440749"/>
                   </a:ext>
                 </a:extLst>
               </a:tr>
@@ -6618,7 +7224,7 @@
                     <a:p>
                       <a:pPr algn="ctr" fontAlgn="ctr"/>
                       <a:r>
-                        <a:rPr lang="en-US" sz="1400" u="none" strike="noStrike" dirty="0" smtClean="0">
+                        <a:rPr lang="en-US" sz="1400" u="none" strike="noStrike" dirty="0">
                           <a:effectLst/>
                           <a:latin typeface="+mn-lt"/>
                         </a:rPr>
@@ -6740,30 +7346,26 @@
                     <a:p>
                       <a:pPr algn="ctr" fontAlgn="b"/>
                       <a:r>
-                        <a:rPr lang="en-US" sz="1400" u="none" strike="noStrike" dirty="0" smtClean="0">
+                        <a:rPr lang="en-US" sz="1400" u="none" strike="noStrike" dirty="0">
                           <a:effectLst/>
                           <a:latin typeface="+mn-lt"/>
                         </a:rPr>
                         <a:t>Intro</a:t>
                       </a:r>
                       <a:r>
-                        <a:rPr lang="en-US" sz="1400" u="none" strike="noStrike" baseline="0" dirty="0" smtClean="0">
+                        <a:rPr lang="en-US" sz="1400" u="none" strike="noStrike" baseline="0" dirty="0">
                           <a:effectLst/>
                           <a:latin typeface="+mn-lt"/>
                         </a:rPr>
                         <a:t> to </a:t>
                       </a:r>
                       <a:r>
-                        <a:rPr lang="en-US" sz="1400" u="none" strike="noStrike" dirty="0" smtClean="0">
+                        <a:rPr lang="en-US" sz="1400" u="none" strike="noStrike" dirty="0">
                           <a:effectLst/>
                           <a:latin typeface="+mn-lt"/>
                         </a:rPr>
                         <a:t>the</a:t>
                       </a:r>
-                      <a:endParaRPr lang="en-US" sz="1400" u="none" strike="noStrike" dirty="0">
-                        <a:effectLst/>
-                        <a:latin typeface="+mn-lt"/>
-                      </a:endParaRPr>
                     </a:p>
                     <a:p>
                       <a:pPr algn="ctr" fontAlgn="b"/>
@@ -6824,7 +7426,7 @@
                 </a:tc>
                 <a:extLst>
                   <a:ext uri="{0D108BD9-81ED-4DB2-BD59-A6C34878D82A}">
-                    <a16:rowId xmlns="" xmlns:a16="http://schemas.microsoft.com/office/drawing/2014/main" val="3644456092"/>
+                    <a16:rowId xmlns:a16="http://schemas.microsoft.com/office/drawing/2014/main" val="3644456092"/>
                   </a:ext>
                 </a:extLst>
               </a:tr>
@@ -6836,7 +7438,7 @@
                     <a:p>
                       <a:pPr algn="ctr" fontAlgn="ctr"/>
                       <a:r>
-                        <a:rPr lang="en-US" sz="1400" u="none" strike="noStrike" dirty="0" smtClean="0">
+                        <a:rPr lang="en-US" sz="1400" u="none" strike="noStrike" dirty="0">
                           <a:effectLst/>
                           <a:latin typeface="+mn-lt"/>
                         </a:rPr>
@@ -6897,7 +7499,7 @@
                     <a:p>
                       <a:pPr algn="ctr" fontAlgn="b"/>
                       <a:r>
-                        <a:rPr lang="en-US" sz="1400" u="none" strike="noStrike" dirty="0" smtClean="0">
+                        <a:rPr lang="en-US" sz="1400" u="none" strike="noStrike" dirty="0">
                           <a:effectLst/>
                           <a:latin typeface="+mn-lt"/>
                         </a:rPr>
@@ -7014,7 +7616,7 @@
                 </a:tc>
                 <a:extLst>
                   <a:ext uri="{0D108BD9-81ED-4DB2-BD59-A6C34878D82A}">
-                    <a16:rowId xmlns="" xmlns:a16="http://schemas.microsoft.com/office/drawing/2014/main" val="4195182062"/>
+                    <a16:rowId xmlns:a16="http://schemas.microsoft.com/office/drawing/2014/main" val="4195182062"/>
                   </a:ext>
                 </a:extLst>
               </a:tr>
@@ -7026,7 +7628,7 @@
                     <a:p>
                       <a:pPr algn="ctr" fontAlgn="ctr"/>
                       <a:r>
-                        <a:rPr lang="en-US" sz="1400" u="none" strike="noStrike" dirty="0" smtClean="0">
+                        <a:rPr lang="en-US" sz="1400" u="none" strike="noStrike" dirty="0">
                           <a:effectLst/>
                           <a:latin typeface="+mn-lt"/>
                         </a:rPr>
@@ -7232,7 +7834,7 @@
                 </a:tc>
                 <a:extLst>
                   <a:ext uri="{0D108BD9-81ED-4DB2-BD59-A6C34878D82A}">
-                    <a16:rowId xmlns="" xmlns:a16="http://schemas.microsoft.com/office/drawing/2014/main" val="3452375224"/>
+                    <a16:rowId xmlns:a16="http://schemas.microsoft.com/office/drawing/2014/main" val="3452375224"/>
                   </a:ext>
                 </a:extLst>
               </a:tr>
@@ -7244,7 +7846,7 @@
                     <a:p>
                       <a:pPr algn="ctr" fontAlgn="ctr"/>
                       <a:r>
-                        <a:rPr lang="en-US" sz="1400" b="0" i="0" u="none" strike="noStrike" dirty="0" smtClean="0">
+                        <a:rPr lang="en-US" sz="1400" b="0" i="0" u="none" strike="noStrike" dirty="0">
                           <a:solidFill>
                             <a:srgbClr val="000000"/>
                           </a:solidFill>
@@ -7253,13 +7855,6 @@
                         </a:rPr>
                         <a:t>50 - 90 minutes</a:t>
                       </a:r>
-                      <a:endParaRPr lang="en-US" sz="1400" b="0" i="0" u="none" strike="noStrike" dirty="0">
-                        <a:solidFill>
-                          <a:srgbClr val="000000"/>
-                        </a:solidFill>
-                        <a:effectLst/>
-                        <a:latin typeface="+mn-lt"/>
-                      </a:endParaRPr>
                     </a:p>
                   </a:txBody>
                   <a:tcPr marL="9371" marR="9371" marT="56227" marB="56227" anchor="ctr">
@@ -7308,7 +7903,7 @@
                     <a:p>
                       <a:pPr algn="ctr" fontAlgn="b"/>
                       <a:r>
-                        <a:rPr lang="en-US" sz="1400" b="0" i="0" u="none" strike="noStrike" dirty="0" smtClean="0">
+                        <a:rPr lang="en-US" sz="1400" b="0" i="0" u="none" strike="noStrike" dirty="0">
                           <a:solidFill>
                             <a:srgbClr val="000000"/>
                           </a:solidFill>
@@ -7318,7 +7913,7 @@
                         <a:t>Using {</a:t>
                       </a:r>
                       <a:r>
-                        <a:rPr lang="en-US" sz="1400" b="0" i="0" u="none" strike="noStrike" dirty="0" err="1" smtClean="0">
+                        <a:rPr lang="en-US" sz="1400" b="0" i="0" u="none" strike="noStrike" dirty="0" err="1">
                           <a:solidFill>
                             <a:srgbClr val="000000"/>
                           </a:solidFill>
@@ -7328,7 +7923,7 @@
                         <a:t>Valtools</a:t>
                       </a:r>
                       <a:r>
-                        <a:rPr lang="en-US" sz="1400" b="0" i="0" u="none" strike="noStrike" dirty="0" smtClean="0">
+                        <a:rPr lang="en-US" sz="1400" b="0" i="0" u="none" strike="noStrike" dirty="0">
                           <a:solidFill>
                             <a:srgbClr val="000000"/>
                           </a:solidFill>
@@ -7337,13 +7932,6 @@
                         </a:rPr>
                         <a:t>}</a:t>
                       </a:r>
-                      <a:endParaRPr lang="en-US" sz="1400" b="0" i="0" u="none" strike="noStrike" dirty="0">
-                        <a:solidFill>
-                          <a:srgbClr val="000000"/>
-                        </a:solidFill>
-                        <a:effectLst/>
-                        <a:latin typeface="+mn-lt"/>
-                      </a:endParaRPr>
                     </a:p>
                   </a:txBody>
                   <a:tcPr marL="9371" marR="9371" marT="56227" marB="56227" anchor="ctr">
@@ -7408,7 +7996,7 @@
                         <a:defRPr/>
                       </a:pPr>
                       <a:r>
-                        <a:rPr lang="en-US" sz="1400" u="none" strike="noStrike" dirty="0" smtClean="0">
+                        <a:rPr lang="en-US" sz="1400" u="none" strike="noStrike" dirty="0">
                           <a:effectLst/>
                           <a:latin typeface="+mn-lt"/>
                         </a:rPr>
@@ -7464,7 +8052,7 @@
                 </a:tc>
                 <a:extLst>
                   <a:ext uri="{0D108BD9-81ED-4DB2-BD59-A6C34878D82A}">
-                    <a16:rowId xmlns="" xmlns:a16="http://schemas.microsoft.com/office/drawing/2014/main" val="2400179646"/>
+                    <a16:rowId xmlns:a16="http://schemas.microsoft.com/office/drawing/2014/main" val="2400179646"/>
                   </a:ext>
                 </a:extLst>
               </a:tr>
@@ -7546,13 +8134,13 @@
                         <a:defRPr/>
                       </a:pPr>
                       <a:r>
-                        <a:rPr lang="en-US" sz="1400" u="none" strike="noStrike" dirty="0" smtClean="0">
+                        <a:rPr lang="en-US" sz="1400" u="none" strike="noStrike" dirty="0">
                           <a:effectLst/>
                           <a:latin typeface="+mn-lt"/>
                         </a:rPr>
                         <a:t>Break</a:t>
                       </a:r>
-                      <a:endParaRPr lang="en-US" sz="1400" b="0" i="0" u="none" strike="noStrike" dirty="0" smtClean="0">
+                      <a:endParaRPr lang="en-US" sz="1400" b="0" i="0" u="none" strike="noStrike" dirty="0">
                         <a:solidFill>
                           <a:srgbClr val="000000"/>
                         </a:solidFill>
@@ -7654,6 +8242,11 @@
                     </a:lnB>
                   </a:tcPr>
                 </a:tc>
+                <a:extLst>
+                  <a:ext uri="{0D108BD9-81ED-4DB2-BD59-A6C34878D82A}">
+                    <a16:rowId xmlns:a16="http://schemas.microsoft.com/office/drawing/2014/main" val="10006"/>
+                  </a:ext>
+                </a:extLst>
               </a:tr>
               <a:tr h="338107">
                 <a:tc>
@@ -7663,7 +8256,7 @@
                     <a:p>
                       <a:pPr algn="ctr" fontAlgn="ctr"/>
                       <a:r>
-                        <a:rPr lang="en-US" sz="1400" u="none" strike="noStrike" dirty="0" smtClean="0">
+                        <a:rPr lang="en-US" sz="1400" u="none" strike="noStrike" dirty="0">
                           <a:effectLst/>
                           <a:latin typeface="+mn-lt"/>
                         </a:rPr>
@@ -7724,18 +8317,11 @@
                     <a:p>
                       <a:pPr algn="ctr" fontAlgn="b"/>
                       <a:r>
-                        <a:rPr lang="en-US" sz="1400" u="none" strike="noStrike" dirty="0" smtClean="0">
-                          <a:effectLst/>
-                          <a:latin typeface="+mn-lt"/>
-                        </a:rPr>
-                        <a:t>Validation Reports</a:t>
-                      </a:r>
-                      <a:r>
                         <a:rPr lang="en-US" sz="1400" u="none" strike="noStrike" dirty="0">
                           <a:effectLst/>
                           <a:latin typeface="+mn-lt"/>
                         </a:rPr>
-                        <a:t> </a:t>
+                        <a:t>Validation Reports </a:t>
                       </a:r>
                       <a:endParaRPr lang="en-US" sz="1400" b="0" i="0" u="none" strike="noStrike" dirty="0">
                         <a:solidFill>
@@ -7808,13 +8394,13 @@
                         <a:defRPr/>
                       </a:pPr>
                       <a:r>
-                        <a:rPr lang="en-US" sz="1400" u="none" strike="noStrike" dirty="0" smtClean="0">
+                        <a:rPr lang="en-US" sz="1400" u="none" strike="noStrike" dirty="0">
                           <a:effectLst/>
                           <a:latin typeface="+mn-lt"/>
                         </a:rPr>
                         <a:t>Elements of a Validation Report</a:t>
                       </a:r>
-                      <a:endParaRPr lang="en-US" sz="1400" b="0" i="0" u="none" strike="noStrike" dirty="0" smtClean="0">
+                      <a:endParaRPr lang="en-US" sz="1400" b="0" i="0" u="none" strike="noStrike" dirty="0">
                         <a:solidFill>
                           <a:srgbClr val="000000"/>
                         </a:solidFill>
@@ -7864,7 +8450,7 @@
                 </a:tc>
                 <a:extLst>
                   <a:ext uri="{0D108BD9-81ED-4DB2-BD59-A6C34878D82A}">
-                    <a16:rowId xmlns="" xmlns:a16="http://schemas.microsoft.com/office/drawing/2014/main" val="885546553"/>
+                    <a16:rowId xmlns:a16="http://schemas.microsoft.com/office/drawing/2014/main" val="885546553"/>
                   </a:ext>
                 </a:extLst>
               </a:tr>
@@ -7876,7 +8462,7 @@
                     <a:p>
                       <a:pPr algn="ctr" fontAlgn="ctr"/>
                       <a:r>
-                        <a:rPr lang="en-US" sz="1400" b="0" i="0" u="none" strike="noStrike" dirty="0" smtClean="0">
+                        <a:rPr lang="en-US" sz="1400" b="0" i="0" u="none" strike="noStrike" dirty="0">
                           <a:solidFill>
                             <a:srgbClr val="000000"/>
                           </a:solidFill>
@@ -7886,7 +8472,7 @@
                         <a:t>125 -135</a:t>
                       </a:r>
                       <a:r>
-                        <a:rPr lang="en-US" sz="1400" b="0" i="0" u="none" strike="noStrike" baseline="0" dirty="0" smtClean="0">
+                        <a:rPr lang="en-US" sz="1400" b="0" i="0" u="none" strike="noStrike" baseline="0" dirty="0">
                           <a:solidFill>
                             <a:srgbClr val="000000"/>
                           </a:solidFill>
@@ -7950,7 +8536,7 @@
                     <a:p>
                       <a:pPr algn="ctr" fontAlgn="b"/>
                       <a:r>
-                        <a:rPr lang="en-US" sz="1400" u="none" strike="noStrike" dirty="0" smtClean="0">
+                        <a:rPr lang="en-US" sz="1400" u="none" strike="noStrike" dirty="0">
                           <a:effectLst/>
                           <a:latin typeface="+mn-lt"/>
                         </a:rPr>
@@ -8058,6 +8644,11 @@
                     </a:lnB>
                   </a:tcPr>
                 </a:tc>
+                <a:extLst>
+                  <a:ext uri="{0D108BD9-81ED-4DB2-BD59-A6C34878D82A}">
+                    <a16:rowId xmlns:a16="http://schemas.microsoft.com/office/drawing/2014/main" val="10008"/>
+                  </a:ext>
+                </a:extLst>
               </a:tr>
               <a:tr h="324247">
                 <a:tc>
@@ -8067,7 +8658,7 @@
                     <a:p>
                       <a:pPr algn="ctr" fontAlgn="ctr"/>
                       <a:r>
-                        <a:rPr lang="en-US" sz="1400" u="none" strike="noStrike" dirty="0" smtClean="0">
+                        <a:rPr lang="en-US" sz="1400" u="none" strike="noStrike" dirty="0">
                           <a:effectLst/>
                           <a:latin typeface="+mn-lt"/>
                         </a:rPr>
@@ -8128,7 +8719,7 @@
                     <a:p>
                       <a:pPr algn="ctr" fontAlgn="b"/>
                       <a:r>
-                        <a:rPr lang="en-US" sz="1400" b="0" i="0" u="none" strike="noStrike" dirty="0" smtClean="0">
+                        <a:rPr lang="en-US" sz="1400" b="0" i="0" u="none" strike="noStrike" dirty="0">
                           <a:solidFill>
                             <a:srgbClr val="000000"/>
                           </a:solidFill>
@@ -8137,13 +8728,6 @@
                         </a:rPr>
                         <a:t>Types of Validation &amp; Q&amp;A</a:t>
                       </a:r>
-                      <a:endParaRPr lang="en-US" sz="1400" b="0" i="0" u="none" strike="noStrike" dirty="0">
-                        <a:solidFill>
-                          <a:srgbClr val="000000"/>
-                        </a:solidFill>
-                        <a:effectLst/>
-                        <a:latin typeface="+mn-lt"/>
-                      </a:endParaRPr>
                     </a:p>
                   </a:txBody>
                   <a:tcPr marL="9371" marR="9371" marT="56227" marB="56227" anchor="ctr">
@@ -8208,7 +8792,7 @@
                         <a:defRPr/>
                       </a:pPr>
                       <a:r>
-                        <a:rPr lang="en-US" sz="1400" u="none" strike="noStrike" dirty="0" smtClean="0">
+                        <a:rPr lang="en-US" sz="1400" u="none" strike="noStrike" dirty="0">
                           <a:effectLst/>
                           <a:latin typeface="+mn-lt"/>
                         </a:rPr>
@@ -8264,7 +8848,7 @@
                 </a:tc>
                 <a:extLst>
                   <a:ext uri="{0D108BD9-81ED-4DB2-BD59-A6C34878D82A}">
-                    <a16:rowId xmlns="" xmlns:a16="http://schemas.microsoft.com/office/drawing/2014/main" val="1210118487"/>
+                    <a16:rowId xmlns:a16="http://schemas.microsoft.com/office/drawing/2014/main" val="1210118487"/>
                   </a:ext>
                 </a:extLst>
               </a:tr>
@@ -8276,64 +8860,6 @@
     <p:extLst>
       <p:ext uri="{BB962C8B-B14F-4D97-AF65-F5344CB8AC3E}">
         <p14:creationId xmlns:p14="http://schemas.microsoft.com/office/powerpoint/2010/main" val="2287488995"/>
-      </p:ext>
-    </p:extLst>
-  </p:cSld>
-  <p:clrMapOvr>
-    <a:masterClrMapping/>
-  </p:clrMapOvr>
-</p:sld>
-</file>
-
-<file path=ppt/slides/slide15.xml><?xml version="1.0" encoding="utf-8"?>
-<p:sld xmlns:a="http://schemas.openxmlformats.org/drawingml/2006/main" xmlns:r="http://schemas.openxmlformats.org/officeDocument/2006/relationships" xmlns:p="http://schemas.openxmlformats.org/presentationml/2006/main">
-  <p:cSld>
-    <p:spTree>
-      <p:nvGrpSpPr>
-        <p:cNvPr id="1" name=""/>
-        <p:cNvGrpSpPr/>
-        <p:nvPr/>
-      </p:nvGrpSpPr>
-      <p:grpSpPr>
-        <a:xfrm>
-          <a:off x="0" y="0"/>
-          <a:ext cx="0" cy="0"/>
-          <a:chOff x="0" y="0"/>
-          <a:chExt cx="0" cy="0"/>
-        </a:xfrm>
-      </p:grpSpPr>
-      <p:sp>
-        <p:nvSpPr>
-          <p:cNvPr id="2" name="Title 1">
-            <a:extLst>
-              <a:ext uri="{FF2B5EF4-FFF2-40B4-BE49-F238E27FC236}">
-                <a16:creationId xmlns="" xmlns:a16="http://schemas.microsoft.com/office/drawing/2014/main" id="{7614332B-4F24-42F4-A704-A6F1183E9470}"/>
-              </a:ext>
-            </a:extLst>
-          </p:cNvPr>
-          <p:cNvSpPr>
-            <a:spLocks noGrp="1"/>
-          </p:cNvSpPr>
-          <p:nvPr>
-            <p:ph type="ctrTitle"/>
-          </p:nvPr>
-        </p:nvSpPr>
-        <p:spPr/>
-        <p:txBody>
-          <a:bodyPr/>
-          <a:lstStyle/>
-          <a:p>
-            <a:r>
-              <a:rPr lang="en-US" dirty="0"/>
-              <a:t>Where do we go from here</a:t>
-            </a:r>
-          </a:p>
-        </p:txBody>
-      </p:sp>
-    </p:spTree>
-    <p:extLst>
-      <p:ext uri="{BB962C8B-B14F-4D97-AF65-F5344CB8AC3E}">
-        <p14:creationId xmlns:p14="http://schemas.microsoft.com/office/powerpoint/2010/main" val="2551221187"/>
       </p:ext>
     </p:extLst>
   </p:cSld>
@@ -8362,10 +8888,68 @@
       </p:grpSpPr>
       <p:sp>
         <p:nvSpPr>
+          <p:cNvPr id="2" name="Title 1">
+            <a:extLst>
+              <a:ext uri="{FF2B5EF4-FFF2-40B4-BE49-F238E27FC236}">
+                <a16:creationId xmlns:a16="http://schemas.microsoft.com/office/drawing/2014/main" id="{7614332B-4F24-42F4-A704-A6F1183E9470}"/>
+              </a:ext>
+            </a:extLst>
+          </p:cNvPr>
+          <p:cNvSpPr>
+            <a:spLocks noGrp="1"/>
+          </p:cNvSpPr>
+          <p:nvPr>
+            <p:ph type="ctrTitle"/>
+          </p:nvPr>
+        </p:nvSpPr>
+        <p:spPr/>
+        <p:txBody>
+          <a:bodyPr/>
+          <a:lstStyle/>
+          <a:p>
+            <a:r>
+              <a:rPr lang="en-US" dirty="0"/>
+              <a:t>Where do we go from here</a:t>
+            </a:r>
+          </a:p>
+        </p:txBody>
+      </p:sp>
+    </p:spTree>
+    <p:extLst>
+      <p:ext uri="{BB962C8B-B14F-4D97-AF65-F5344CB8AC3E}">
+        <p14:creationId xmlns:p14="http://schemas.microsoft.com/office/powerpoint/2010/main" val="2551221187"/>
+      </p:ext>
+    </p:extLst>
+  </p:cSld>
+  <p:clrMapOvr>
+    <a:masterClrMapping/>
+  </p:clrMapOvr>
+</p:sld>
+</file>
+
+<file path=ppt/slides/slide17.xml><?xml version="1.0" encoding="utf-8"?>
+<p:sld xmlns:a="http://schemas.openxmlformats.org/drawingml/2006/main" xmlns:r="http://schemas.openxmlformats.org/officeDocument/2006/relationships" xmlns:p="http://schemas.openxmlformats.org/presentationml/2006/main">
+  <p:cSld>
+    <p:spTree>
+      <p:nvGrpSpPr>
+        <p:cNvPr id="1" name=""/>
+        <p:cNvGrpSpPr/>
+        <p:nvPr/>
+      </p:nvGrpSpPr>
+      <p:grpSpPr>
+        <a:xfrm>
+          <a:off x="0" y="0"/>
+          <a:ext cx="0" cy="0"/>
+          <a:chOff x="0" y="0"/>
+          <a:chExt cx="0" cy="0"/>
+        </a:xfrm>
+      </p:grpSpPr>
+      <p:sp>
+        <p:nvSpPr>
           <p:cNvPr id="4" name="Title 1">
             <a:extLst>
               <a:ext uri="{FF2B5EF4-FFF2-40B4-BE49-F238E27FC236}">
-                <a16:creationId xmlns="" xmlns:a16="http://schemas.microsoft.com/office/drawing/2014/main" id="{B781D10C-0426-420D-A569-C70F2C81AAF0}"/>
+                <a16:creationId xmlns:a16="http://schemas.microsoft.com/office/drawing/2014/main" id="{B781D10C-0426-420D-A569-C70F2C81AAF0}"/>
               </a:ext>
             </a:extLst>
           </p:cNvPr>
@@ -8436,72 +9020,6 @@
 </p:sld>
 </file>
 
-<file path=ppt/slides/slide17.xml><?xml version="1.0" encoding="utf-8"?>
-<p:sld xmlns:a="http://schemas.openxmlformats.org/drawingml/2006/main" xmlns:r="http://schemas.openxmlformats.org/officeDocument/2006/relationships" xmlns:p="http://schemas.openxmlformats.org/presentationml/2006/main">
-  <p:cSld>
-    <p:spTree>
-      <p:nvGrpSpPr>
-        <p:cNvPr id="1" name=""/>
-        <p:cNvGrpSpPr/>
-        <p:nvPr/>
-      </p:nvGrpSpPr>
-      <p:grpSpPr>
-        <a:xfrm>
-          <a:off x="0" y="0"/>
-          <a:ext cx="0" cy="0"/>
-          <a:chOff x="0" y="0"/>
-          <a:chExt cx="0" cy="0"/>
-        </a:xfrm>
-      </p:grpSpPr>
-      <p:sp>
-        <p:nvSpPr>
-          <p:cNvPr id="2" name="Title 1">
-            <a:extLst>
-              <a:ext uri="{FF2B5EF4-FFF2-40B4-BE49-F238E27FC236}">
-                <a16:creationId xmlns="" xmlns:a16="http://schemas.microsoft.com/office/drawing/2014/main" id="{85099D8A-7BF6-4A5A-ACD4-C59D23E4D745}"/>
-              </a:ext>
-            </a:extLst>
-          </p:cNvPr>
-          <p:cNvSpPr>
-            <a:spLocks noGrp="1"/>
-          </p:cNvSpPr>
-          <p:nvPr>
-            <p:ph type="title"/>
-          </p:nvPr>
-        </p:nvSpPr>
-        <p:spPr>
-          <a:xfrm>
-            <a:off x="1066800" y="2454764"/>
-            <a:ext cx="10058400" cy="2025792"/>
-          </a:xfrm>
-        </p:spPr>
-        <p:txBody>
-          <a:bodyPr>
-            <a:normAutofit/>
-          </a:bodyPr>
-          <a:lstStyle/>
-          <a:p>
-            <a:pPr algn="ctr"/>
-            <a:r>
-              <a:rPr lang="en-US" sz="5400" dirty="0"/>
-              <a:t>What if this is too basic?!</a:t>
-            </a:r>
-          </a:p>
-        </p:txBody>
-      </p:sp>
-    </p:spTree>
-    <p:extLst>
-      <p:ext uri="{BB962C8B-B14F-4D97-AF65-F5344CB8AC3E}">
-        <p14:creationId xmlns:p14="http://schemas.microsoft.com/office/powerpoint/2010/main" val="2605250684"/>
-      </p:ext>
-    </p:extLst>
-  </p:cSld>
-  <p:clrMapOvr>
-    <a:masterClrMapping/>
-  </p:clrMapOvr>
-</p:sld>
-</file>
-
 <file path=ppt/slides/slide18.xml><?xml version="1.0" encoding="utf-8"?>
 <p:sld xmlns:a="http://schemas.openxmlformats.org/drawingml/2006/main" xmlns:r="http://schemas.openxmlformats.org/officeDocument/2006/relationships" xmlns:p="http://schemas.openxmlformats.org/presentationml/2006/main">
   <p:cSld>
@@ -8524,7 +9042,7 @@
           <p:cNvPr id="2" name="Title 1">
             <a:extLst>
               <a:ext uri="{FF2B5EF4-FFF2-40B4-BE49-F238E27FC236}">
-                <a16:creationId xmlns="" xmlns:a16="http://schemas.microsoft.com/office/drawing/2014/main" id="{85099D8A-7BF6-4A5A-ACD4-C59D23E4D745}"/>
+                <a16:creationId xmlns:a16="http://schemas.microsoft.com/office/drawing/2014/main" id="{85099D8A-7BF6-4A5A-ACD4-C59D23E4D745}"/>
               </a:ext>
             </a:extLst>
           </p:cNvPr>
@@ -8550,7 +9068,7 @@
             <a:pPr algn="ctr"/>
             <a:r>
               <a:rPr lang="en-US" sz="5400" dirty="0"/>
-              <a:t>What if I find an issue in the documentation?</a:t>
+              <a:t>What if this is too basic?!</a:t>
             </a:r>
           </a:p>
         </p:txBody>
@@ -8558,7 +9076,7 @@
     </p:spTree>
     <p:extLst>
       <p:ext uri="{BB962C8B-B14F-4D97-AF65-F5344CB8AC3E}">
-        <p14:creationId xmlns:p14="http://schemas.microsoft.com/office/powerpoint/2010/main" val="51954009"/>
+        <p14:creationId xmlns:p14="http://schemas.microsoft.com/office/powerpoint/2010/main" val="2605250684"/>
       </p:ext>
     </p:extLst>
   </p:cSld>
@@ -8590,7 +9108,7 @@
           <p:cNvPr id="2" name="Title 1">
             <a:extLst>
               <a:ext uri="{FF2B5EF4-FFF2-40B4-BE49-F238E27FC236}">
-                <a16:creationId xmlns="" xmlns:a16="http://schemas.microsoft.com/office/drawing/2014/main" id="{85099D8A-7BF6-4A5A-ACD4-C59D23E4D745}"/>
+                <a16:creationId xmlns:a16="http://schemas.microsoft.com/office/drawing/2014/main" id="{85099D8A-7BF6-4A5A-ACD4-C59D23E4D745}"/>
               </a:ext>
             </a:extLst>
           </p:cNvPr>
@@ -8616,7 +9134,7 @@
             <a:pPr algn="ctr"/>
             <a:r>
               <a:rPr lang="en-US" sz="5400" dirty="0"/>
-              <a:t>What if I get stuck?</a:t>
+              <a:t>What if I find an issue in the documentation?</a:t>
             </a:r>
           </a:p>
         </p:txBody>
@@ -8624,7 +9142,7 @@
     </p:spTree>
     <p:extLst>
       <p:ext uri="{BB962C8B-B14F-4D97-AF65-F5344CB8AC3E}">
-        <p14:creationId xmlns:p14="http://schemas.microsoft.com/office/powerpoint/2010/main" val="190418656"/>
+        <p14:creationId xmlns:p14="http://schemas.microsoft.com/office/powerpoint/2010/main" val="51954009"/>
       </p:ext>
     </p:extLst>
   </p:cSld>
@@ -8656,7 +9174,7 @@
           <p:cNvPr id="2" name="Title 1">
             <a:extLst>
               <a:ext uri="{FF2B5EF4-FFF2-40B4-BE49-F238E27FC236}">
-                <a16:creationId xmlns="" xmlns:a16="http://schemas.microsoft.com/office/drawing/2014/main" id="{749E0D1B-C9EF-4CB6-9922-ED9D4AC52C59}"/>
+                <a16:creationId xmlns:a16="http://schemas.microsoft.com/office/drawing/2014/main" id="{749E0D1B-C9EF-4CB6-9922-ED9D4AC52C59}"/>
               </a:ext>
             </a:extLst>
           </p:cNvPr>
@@ -8684,7 +9202,7 @@
           <p:cNvPr id="5" name="Content Placeholder 4">
             <a:extLst>
               <a:ext uri="{FF2B5EF4-FFF2-40B4-BE49-F238E27FC236}">
-                <a16:creationId xmlns="" xmlns:a16="http://schemas.microsoft.com/office/drawing/2014/main" id="{7E558183-391D-4056-BC02-A181C5440B05}"/>
+                <a16:creationId xmlns:a16="http://schemas.microsoft.com/office/drawing/2014/main" id="{7E558183-391D-4056-BC02-A181C5440B05}"/>
               </a:ext>
             </a:extLst>
           </p:cNvPr>
@@ -8704,34 +9222,20 @@
           <a:p>
             <a:r>
               <a:rPr lang="en-US" sz="2400" dirty="0"/>
-              <a:t>Who </a:t>
-            </a:r>
-            <a:r>
-              <a:rPr lang="en-US" sz="2400" dirty="0" smtClean="0"/>
-              <a:t>Are We</a:t>
-            </a:r>
-            <a:endParaRPr lang="en-US" sz="2400" dirty="0" smtClean="0"/>
-          </a:p>
-          <a:p>
-            <a:r>
-              <a:rPr lang="en-US" sz="2400" dirty="0" smtClean="0"/>
-              <a:t>Why </a:t>
-            </a:r>
+              <a:t>Who Are We</a:t>
+            </a:r>
+          </a:p>
+          <a:p>
             <a:r>
               <a:rPr lang="en-US" sz="2400" dirty="0"/>
-              <a:t>are we </a:t>
-            </a:r>
-            <a:r>
-              <a:rPr lang="en-US" sz="2400" dirty="0" smtClean="0"/>
-              <a:t>here</a:t>
-            </a:r>
-          </a:p>
-          <a:p>
-            <a:r>
-              <a:rPr lang="en-US" sz="2400" dirty="0" smtClean="0"/>
+              <a:t>Why are we here</a:t>
+            </a:r>
+          </a:p>
+          <a:p>
+            <a:r>
+              <a:rPr lang="en-US" sz="2400" dirty="0"/>
               <a:t>What do I need to know</a:t>
             </a:r>
-            <a:endParaRPr lang="en-US" sz="2400" dirty="0"/>
           </a:p>
           <a:p>
             <a:r>
@@ -8788,7 +9292,73 @@
           <p:cNvPr id="2" name="Title 1">
             <a:extLst>
               <a:ext uri="{FF2B5EF4-FFF2-40B4-BE49-F238E27FC236}">
-                <a16:creationId xmlns="" xmlns:a16="http://schemas.microsoft.com/office/drawing/2014/main" id="{7614332B-4F24-42F4-A704-A6F1183E9470}"/>
+                <a16:creationId xmlns:a16="http://schemas.microsoft.com/office/drawing/2014/main" id="{85099D8A-7BF6-4A5A-ACD4-C59D23E4D745}"/>
+              </a:ext>
+            </a:extLst>
+          </p:cNvPr>
+          <p:cNvSpPr>
+            <a:spLocks noGrp="1"/>
+          </p:cNvSpPr>
+          <p:nvPr>
+            <p:ph type="title"/>
+          </p:nvPr>
+        </p:nvSpPr>
+        <p:spPr>
+          <a:xfrm>
+            <a:off x="1066800" y="2454764"/>
+            <a:ext cx="10058400" cy="2025792"/>
+          </a:xfrm>
+        </p:spPr>
+        <p:txBody>
+          <a:bodyPr>
+            <a:normAutofit/>
+          </a:bodyPr>
+          <a:lstStyle/>
+          <a:p>
+            <a:pPr algn="ctr"/>
+            <a:r>
+              <a:rPr lang="en-US" sz="5400" dirty="0"/>
+              <a:t>What if I get stuck?</a:t>
+            </a:r>
+          </a:p>
+        </p:txBody>
+      </p:sp>
+    </p:spTree>
+    <p:extLst>
+      <p:ext uri="{BB962C8B-B14F-4D97-AF65-F5344CB8AC3E}">
+        <p14:creationId xmlns:p14="http://schemas.microsoft.com/office/powerpoint/2010/main" val="190418656"/>
+      </p:ext>
+    </p:extLst>
+  </p:cSld>
+  <p:clrMapOvr>
+    <a:masterClrMapping/>
+  </p:clrMapOvr>
+</p:sld>
+</file>
+
+<file path=ppt/slides/slide21.xml><?xml version="1.0" encoding="utf-8"?>
+<p:sld xmlns:a="http://schemas.openxmlformats.org/drawingml/2006/main" xmlns:r="http://schemas.openxmlformats.org/officeDocument/2006/relationships" xmlns:p="http://schemas.openxmlformats.org/presentationml/2006/main">
+  <p:cSld>
+    <p:spTree>
+      <p:nvGrpSpPr>
+        <p:cNvPr id="1" name=""/>
+        <p:cNvGrpSpPr/>
+        <p:nvPr/>
+      </p:nvGrpSpPr>
+      <p:grpSpPr>
+        <a:xfrm>
+          <a:off x="0" y="0"/>
+          <a:ext cx="0" cy="0"/>
+          <a:chOff x="0" y="0"/>
+          <a:chExt cx="0" cy="0"/>
+        </a:xfrm>
+      </p:grpSpPr>
+      <p:sp>
+        <p:nvSpPr>
+          <p:cNvPr id="2" name="Title 1">
+            <a:extLst>
+              <a:ext uri="{FF2B5EF4-FFF2-40B4-BE49-F238E27FC236}">
+                <a16:creationId xmlns:a16="http://schemas.microsoft.com/office/drawing/2014/main" id="{7614332B-4F24-42F4-A704-A6F1183E9470}"/>
               </a:ext>
             </a:extLst>
           </p:cNvPr>
@@ -8858,7 +9428,7 @@
           <p:cNvPr id="2" name="Title 1">
             <a:extLst>
               <a:ext uri="{FF2B5EF4-FFF2-40B4-BE49-F238E27FC236}">
-                <a16:creationId xmlns="" xmlns:a16="http://schemas.microsoft.com/office/drawing/2014/main" id="{7614332B-4F24-42F4-A704-A6F1183E9470}"/>
+                <a16:creationId xmlns:a16="http://schemas.microsoft.com/office/drawing/2014/main" id="{7614332B-4F24-42F4-A704-A6F1183E9470}"/>
               </a:ext>
             </a:extLst>
           </p:cNvPr>
@@ -8876,15 +9446,7 @@
           <a:p>
             <a:r>
               <a:rPr lang="en-US" dirty="0"/>
-              <a:t>Who </a:t>
-            </a:r>
-            <a:r>
-              <a:rPr lang="en-US" dirty="0" smtClean="0"/>
-              <a:t>ARE WE</a:t>
-            </a:r>
-            <a:r>
-              <a:rPr lang="en-US" dirty="0"/>
-              <a:t/>
+              <a:t>Who ARE WE</a:t>
             </a:r>
             <a:br>
               <a:rPr lang="en-US" dirty="0"/>
@@ -8928,7 +9490,7 @@
           <p:cNvPr id="2" name="Title 1">
             <a:extLst>
               <a:ext uri="{FF2B5EF4-FFF2-40B4-BE49-F238E27FC236}">
-                <a16:creationId xmlns="" xmlns:a16="http://schemas.microsoft.com/office/drawing/2014/main" id="{4F3B95D1-4C83-407C-A358-C8C4A597CFA8}"/>
+                <a16:creationId xmlns:a16="http://schemas.microsoft.com/office/drawing/2014/main" id="{4F3B95D1-4C83-407C-A358-C8C4A597CFA8}"/>
               </a:ext>
             </a:extLst>
           </p:cNvPr>
@@ -8956,7 +9518,7 @@
           <p:cNvPr id="3" name="Content Placeholder 2">
             <a:extLst>
               <a:ext uri="{FF2B5EF4-FFF2-40B4-BE49-F238E27FC236}">
-                <a16:creationId xmlns="" xmlns:a16="http://schemas.microsoft.com/office/drawing/2014/main" id="{37E9709E-5457-48A1-A3E0-58A90B971B97}"/>
+                <a16:creationId xmlns:a16="http://schemas.microsoft.com/office/drawing/2014/main" id="{37E9709E-5457-48A1-A3E0-58A90B971B97}"/>
               </a:ext>
             </a:extLst>
           </p:cNvPr>
@@ -8980,7 +9542,7 @@
           <a:lstStyle/>
           <a:p>
             <a:r>
-              <a:rPr lang="en-US" sz="2000" dirty="0" smtClean="0"/>
+              <a:rPr lang="en-US" sz="2000" dirty="0"/>
               <a:t>Seattle </a:t>
             </a:r>
             <a:r>
@@ -9057,7 +9619,7 @@
           <p:cNvPr id="7" name="Content Placeholder 6">
             <a:extLst>
               <a:ext uri="{FF2B5EF4-FFF2-40B4-BE49-F238E27FC236}">
-                <a16:creationId xmlns="" xmlns:a16="http://schemas.microsoft.com/office/drawing/2014/main" id="{70A593EF-FA8A-45B5-A4ED-19FBE7ABFFA5}"/>
+                <a16:creationId xmlns:a16="http://schemas.microsoft.com/office/drawing/2014/main" id="{70A593EF-FA8A-45B5-A4ED-19FBE7ABFFA5}"/>
               </a:ext>
             </a:extLst>
           </p:cNvPr>
@@ -9087,7 +9649,7 @@
             <a:hlinkClick r:id="rId5"/>
             <a:extLst>
               <a:ext uri="{FF2B5EF4-FFF2-40B4-BE49-F238E27FC236}">
-                <a16:creationId xmlns="" xmlns:a16="http://schemas.microsoft.com/office/drawing/2014/main" id="{036F6E0C-5803-469B-ABC1-2798AD6137BE}"/>
+                <a16:creationId xmlns:a16="http://schemas.microsoft.com/office/drawing/2014/main" id="{036F6E0C-5803-469B-ABC1-2798AD6137BE}"/>
               </a:ext>
             </a:extLst>
           </p:cNvPr>
@@ -9118,7 +9680,7 @@
             <a:hlinkClick r:id="rId7"/>
             <a:extLst>
               <a:ext uri="{FF2B5EF4-FFF2-40B4-BE49-F238E27FC236}">
-                <a16:creationId xmlns="" xmlns:a16="http://schemas.microsoft.com/office/drawing/2014/main" id="{4C33B757-0AEB-4F53-AB7F-9E42D5B9DD55}"/>
+                <a16:creationId xmlns:a16="http://schemas.microsoft.com/office/drawing/2014/main" id="{4C33B757-0AEB-4F53-AB7F-9E42D5B9DD55}"/>
               </a:ext>
             </a:extLst>
           </p:cNvPr>
@@ -9178,7 +9740,7 @@
           <p:cNvPr id="2" name="Title 1">
             <a:extLst>
               <a:ext uri="{FF2B5EF4-FFF2-40B4-BE49-F238E27FC236}">
-                <a16:creationId xmlns="" xmlns:a16="http://schemas.microsoft.com/office/drawing/2014/main" id="{4F3B95D1-4C83-407C-A358-C8C4A597CFA8}"/>
+                <a16:creationId xmlns:a16="http://schemas.microsoft.com/office/drawing/2014/main" id="{4F3B95D1-4C83-407C-A358-C8C4A597CFA8}"/>
               </a:ext>
             </a:extLst>
           </p:cNvPr>
@@ -9206,7 +9768,7 @@
           <p:cNvPr id="6" name="Content Placeholder 5">
             <a:extLst>
               <a:ext uri="{FF2B5EF4-FFF2-40B4-BE49-F238E27FC236}">
-                <a16:creationId xmlns="" xmlns:a16="http://schemas.microsoft.com/office/drawing/2014/main" id="{EF865C96-2337-4A23-9653-09031EF4BDD1}"/>
+                <a16:creationId xmlns:a16="http://schemas.microsoft.com/office/drawing/2014/main" id="{EF865C96-2337-4A23-9653-09031EF4BDD1}"/>
               </a:ext>
             </a:extLst>
           </p:cNvPr>
@@ -9238,7 +9800,7 @@
           <p:cNvPr id="5" name="Content Placeholder 4">
             <a:extLst>
               <a:ext uri="{FF2B5EF4-FFF2-40B4-BE49-F238E27FC236}">
-                <a16:creationId xmlns="" xmlns:a16="http://schemas.microsoft.com/office/drawing/2014/main" id="{E4708D06-5299-4CFC-B296-7FBBB8D5D933}"/>
+                <a16:creationId xmlns:a16="http://schemas.microsoft.com/office/drawing/2014/main" id="{E4708D06-5299-4CFC-B296-7FBBB8D5D933}"/>
               </a:ext>
             </a:extLst>
           </p:cNvPr>
@@ -9302,7 +9864,7 @@
           <p:cNvPr id="23" name="Group 22">
             <a:extLst>
               <a:ext uri="{FF2B5EF4-FFF2-40B4-BE49-F238E27FC236}">
-                <a16:creationId xmlns="" xmlns:a16="http://schemas.microsoft.com/office/drawing/2014/main" id="{7B66FF87-DDA2-43E9-8DA4-03D2187E7D8E}"/>
+                <a16:creationId xmlns:a16="http://schemas.microsoft.com/office/drawing/2014/main" id="{7B66FF87-DDA2-43E9-8DA4-03D2187E7D8E}"/>
               </a:ext>
             </a:extLst>
           </p:cNvPr>
@@ -9322,7 +9884,7 @@
             <p:cNvPr id="21" name="Group 20">
               <a:extLst>
                 <a:ext uri="{FF2B5EF4-FFF2-40B4-BE49-F238E27FC236}">
-                  <a16:creationId xmlns="" xmlns:a16="http://schemas.microsoft.com/office/drawing/2014/main" id="{B6043552-B536-4BE5-A7A8-2D20EA3131AD}"/>
+                  <a16:creationId xmlns:a16="http://schemas.microsoft.com/office/drawing/2014/main" id="{B6043552-B536-4BE5-A7A8-2D20EA3131AD}"/>
                 </a:ext>
               </a:extLst>
             </p:cNvPr>
@@ -9342,7 +9904,7 @@
               <p:cNvPr id="19" name="Group 18">
                 <a:extLst>
                   <a:ext uri="{FF2B5EF4-FFF2-40B4-BE49-F238E27FC236}">
-                    <a16:creationId xmlns="" xmlns:a16="http://schemas.microsoft.com/office/drawing/2014/main" id="{0937586A-1A08-4716-A1A6-85AA4A5A35B7}"/>
+                    <a16:creationId xmlns:a16="http://schemas.microsoft.com/office/drawing/2014/main" id="{0937586A-1A08-4716-A1A6-85AA4A5A35B7}"/>
                   </a:ext>
                 </a:extLst>
               </p:cNvPr>
@@ -9363,7 +9925,7 @@
                   <a:hlinkClick r:id="rId4"/>
                   <a:extLst>
                     <a:ext uri="{FF2B5EF4-FFF2-40B4-BE49-F238E27FC236}">
-                      <a16:creationId xmlns="" xmlns:a16="http://schemas.microsoft.com/office/drawing/2014/main" id="{DFBCDDA2-17B0-4D17-9617-27F717DDF9D0}"/>
+                      <a16:creationId xmlns:a16="http://schemas.microsoft.com/office/drawing/2014/main" id="{DFBCDDA2-17B0-4D17-9617-27F717DDF9D0}"/>
                     </a:ext>
                   </a:extLst>
                 </p:cNvPr>
@@ -9393,7 +9955,7 @@
                 <p:cNvPr id="11" name="TextBox 10">
                   <a:extLst>
                     <a:ext uri="{FF2B5EF4-FFF2-40B4-BE49-F238E27FC236}">
-                      <a16:creationId xmlns="" xmlns:a16="http://schemas.microsoft.com/office/drawing/2014/main" id="{61AAC64F-6C8C-4419-A007-C655711C278A}"/>
+                      <a16:creationId xmlns:a16="http://schemas.microsoft.com/office/drawing/2014/main" id="{61AAC64F-6C8C-4419-A007-C655711C278A}"/>
                     </a:ext>
                   </a:extLst>
                 </p:cNvPr>
@@ -9432,7 +9994,7 @@
               <p:cNvPr id="20" name="Group 19">
                 <a:extLst>
                   <a:ext uri="{FF2B5EF4-FFF2-40B4-BE49-F238E27FC236}">
-                    <a16:creationId xmlns="" xmlns:a16="http://schemas.microsoft.com/office/drawing/2014/main" id="{BC1B9026-B07D-44D9-BA2F-E7B8BAA26FEC}"/>
+                    <a16:creationId xmlns:a16="http://schemas.microsoft.com/office/drawing/2014/main" id="{BC1B9026-B07D-44D9-BA2F-E7B8BAA26FEC}"/>
                   </a:ext>
                 </a:extLst>
               </p:cNvPr>
@@ -9453,7 +10015,7 @@
                   <a:hlinkClick r:id="rId6"/>
                   <a:extLst>
                     <a:ext uri="{FF2B5EF4-FFF2-40B4-BE49-F238E27FC236}">
-                      <a16:creationId xmlns="" xmlns:a16="http://schemas.microsoft.com/office/drawing/2014/main" id="{1F549E15-3955-4606-A759-7C9B3E2B0137}"/>
+                      <a16:creationId xmlns:a16="http://schemas.microsoft.com/office/drawing/2014/main" id="{1F549E15-3955-4606-A759-7C9B3E2B0137}"/>
                     </a:ext>
                   </a:extLst>
                 </p:cNvPr>
@@ -9484,7 +10046,7 @@
                   <a:hlinkClick r:id="rId8"/>
                   <a:extLst>
                     <a:ext uri="{FF2B5EF4-FFF2-40B4-BE49-F238E27FC236}">
-                      <a16:creationId xmlns="" xmlns:a16="http://schemas.microsoft.com/office/drawing/2014/main" id="{BCB2A5CC-D7D3-4CAD-BD70-42608C6F4B9A}"/>
+                      <a16:creationId xmlns:a16="http://schemas.microsoft.com/office/drawing/2014/main" id="{BCB2A5CC-D7D3-4CAD-BD70-42608C6F4B9A}"/>
                     </a:ext>
                   </a:extLst>
                 </p:cNvPr>
@@ -9514,7 +10076,7 @@
                 <p:cNvPr id="17" name="TextBox 16">
                   <a:extLst>
                     <a:ext uri="{FF2B5EF4-FFF2-40B4-BE49-F238E27FC236}">
-                      <a16:creationId xmlns="" xmlns:a16="http://schemas.microsoft.com/office/drawing/2014/main" id="{E00864D8-354D-43DF-9773-7BE698A64200}"/>
+                      <a16:creationId xmlns:a16="http://schemas.microsoft.com/office/drawing/2014/main" id="{E00864D8-354D-43DF-9773-7BE698A64200}"/>
                     </a:ext>
                   </a:extLst>
                 </p:cNvPr>
@@ -9560,7 +10122,7 @@
             <p:cNvPr id="22" name="TextBox 21">
               <a:extLst>
                 <a:ext uri="{FF2B5EF4-FFF2-40B4-BE49-F238E27FC236}">
-                  <a16:creationId xmlns="" xmlns:a16="http://schemas.microsoft.com/office/drawing/2014/main" id="{612B68EA-8263-442D-815F-C3308D8899FF}"/>
+                  <a16:creationId xmlns:a16="http://schemas.microsoft.com/office/drawing/2014/main" id="{612B68EA-8263-442D-815F-C3308D8899FF}"/>
                 </a:ext>
               </a:extLst>
             </p:cNvPr>
@@ -9629,7 +10191,7 @@
           <p:cNvPr id="2" name="Title 1">
             <a:extLst>
               <a:ext uri="{FF2B5EF4-FFF2-40B4-BE49-F238E27FC236}">
-                <a16:creationId xmlns="" xmlns:a16="http://schemas.microsoft.com/office/drawing/2014/main" id="{7614332B-4F24-42F4-A704-A6F1183E9470}"/>
+                <a16:creationId xmlns:a16="http://schemas.microsoft.com/office/drawing/2014/main" id="{4F3B95D1-4C83-407C-A358-C8C4A597CFA8}"/>
               </a:ext>
             </a:extLst>
           </p:cNvPr>
@@ -9637,7 +10199,7 @@
             <a:spLocks noGrp="1"/>
           </p:cNvSpPr>
           <p:nvPr>
-            <p:ph type="ctrTitle"/>
+            <p:ph type="title"/>
           </p:nvPr>
         </p:nvSpPr>
         <p:spPr/>
@@ -9647,15 +10209,821 @@
           <a:p>
             <a:r>
               <a:rPr lang="en-US" dirty="0"/>
-              <a:t>Why are we here</a:t>
-            </a:r>
+              <a:t>Welcome to our TA’s!</a:t>
+            </a:r>
+          </a:p>
+        </p:txBody>
+      </p:sp>
+      <p:sp>
+        <p:nvSpPr>
+          <p:cNvPr id="4" name="Content Placeholder 3">
+            <a:extLst>
+              <a:ext uri="{FF2B5EF4-FFF2-40B4-BE49-F238E27FC236}">
+                <a16:creationId xmlns:a16="http://schemas.microsoft.com/office/drawing/2014/main" id="{96D685A5-EBBD-428C-83EF-E93B4FD86C68}"/>
+              </a:ext>
+            </a:extLst>
+          </p:cNvPr>
+          <p:cNvSpPr>
+            <a:spLocks noGrp="1"/>
+          </p:cNvSpPr>
+          <p:nvPr>
+            <p:ph sz="half" idx="1"/>
+          </p:nvPr>
+        </p:nvSpPr>
+        <p:spPr>
+          <a:xfrm>
+            <a:off x="926561" y="2103120"/>
+            <a:ext cx="2584348" cy="3749040"/>
+          </a:xfrm>
+        </p:spPr>
+        <p:txBody>
+          <a:bodyPr/>
+          <a:lstStyle/>
+          <a:p>
+            <a:r>
+              <a:rPr lang="en-US" dirty="0"/>
+              <a:t>Eli Miller</a:t>
+            </a:r>
+          </a:p>
+        </p:txBody>
+      </p:sp>
+      <p:sp>
+        <p:nvSpPr>
+          <p:cNvPr id="24" name="Content Placeholder 3">
+            <a:extLst>
+              <a:ext uri="{FF2B5EF4-FFF2-40B4-BE49-F238E27FC236}">
+                <a16:creationId xmlns:a16="http://schemas.microsoft.com/office/drawing/2014/main" id="{5787A165-931F-424F-B188-AABAF4686571}"/>
+              </a:ext>
+            </a:extLst>
+          </p:cNvPr>
+          <p:cNvSpPr txBox="1">
+            <a:spLocks/>
+          </p:cNvSpPr>
+          <p:nvPr/>
+        </p:nvSpPr>
+        <p:spPr>
+          <a:xfrm>
+            <a:off x="3510909" y="2103120"/>
+            <a:ext cx="2584348" cy="3749040"/>
+          </a:xfrm>
+          <a:prstGeom prst="rect">
+            <a:avLst/>
+          </a:prstGeom>
+        </p:spPr>
+        <p:txBody>
+          <a:bodyPr vert="horz" lIns="91440" tIns="45720" rIns="91440" bIns="45720" rtlCol="0">
+            <a:normAutofit/>
+          </a:bodyPr>
+          <a:lstStyle>
+            <a:lvl1pPr marL="182880" indent="-182880" algn="l" defTabSz="914400" rtl="0" eaLnBrk="1" latinLnBrk="0" hangingPunct="1">
+              <a:lnSpc>
+                <a:spcPct val="110000"/>
+              </a:lnSpc>
+              <a:spcBef>
+                <a:spcPts val="900"/>
+              </a:spcBef>
+              <a:spcAft>
+                <a:spcPts val="0"/>
+              </a:spcAft>
+              <a:buClr>
+                <a:schemeClr val="tx1">
+                  <a:lumMod val="85000"/>
+                  <a:lumOff val="15000"/>
+                </a:schemeClr>
+              </a:buClr>
+              <a:buFont typeface="Garamond" pitchFamily="18" charset="0"/>
+              <a:buChar char="◦"/>
+              <a:defRPr sz="1800" kern="1200">
+                <a:solidFill>
+                  <a:schemeClr val="tx1"/>
+                </a:solidFill>
+                <a:latin typeface="+mn-lt"/>
+                <a:ea typeface="+mn-ea"/>
+                <a:cs typeface="+mn-cs"/>
+              </a:defRPr>
+            </a:lvl1pPr>
+            <a:lvl2pPr marL="457200" indent="-182880" algn="l" defTabSz="914400" rtl="0" eaLnBrk="1" latinLnBrk="0" hangingPunct="1">
+              <a:lnSpc>
+                <a:spcPct val="100000"/>
+              </a:lnSpc>
+              <a:spcBef>
+                <a:spcPts val="500"/>
+              </a:spcBef>
+              <a:buClr>
+                <a:schemeClr val="tx1">
+                  <a:lumMod val="85000"/>
+                  <a:lumOff val="15000"/>
+                </a:schemeClr>
+              </a:buClr>
+              <a:buFont typeface="Garamond" pitchFamily="18" charset="0"/>
+              <a:buChar char="◦"/>
+              <a:defRPr sz="1600" kern="1200">
+                <a:solidFill>
+                  <a:schemeClr val="tx1"/>
+                </a:solidFill>
+                <a:latin typeface="+mn-lt"/>
+                <a:ea typeface="+mn-ea"/>
+                <a:cs typeface="+mn-cs"/>
+              </a:defRPr>
+            </a:lvl2pPr>
+            <a:lvl3pPr marL="731520" indent="-182880" algn="l" defTabSz="914400" rtl="0" eaLnBrk="1" latinLnBrk="0" hangingPunct="1">
+              <a:lnSpc>
+                <a:spcPct val="100000"/>
+              </a:lnSpc>
+              <a:spcBef>
+                <a:spcPts val="500"/>
+              </a:spcBef>
+              <a:buClr>
+                <a:schemeClr val="tx1">
+                  <a:lumMod val="85000"/>
+                  <a:lumOff val="15000"/>
+                </a:schemeClr>
+              </a:buClr>
+              <a:buFont typeface="Garamond" pitchFamily="18" charset="0"/>
+              <a:buChar char="◦"/>
+              <a:defRPr sz="1400" kern="1200">
+                <a:solidFill>
+                  <a:schemeClr val="tx1"/>
+                </a:solidFill>
+                <a:latin typeface="+mn-lt"/>
+                <a:ea typeface="+mn-ea"/>
+                <a:cs typeface="+mn-cs"/>
+              </a:defRPr>
+            </a:lvl3pPr>
+            <a:lvl4pPr marL="1005840" indent="-182880" algn="l" defTabSz="914400" rtl="0" eaLnBrk="1" latinLnBrk="0" hangingPunct="1">
+              <a:lnSpc>
+                <a:spcPct val="100000"/>
+              </a:lnSpc>
+              <a:spcBef>
+                <a:spcPts val="500"/>
+              </a:spcBef>
+              <a:buClr>
+                <a:schemeClr val="tx1">
+                  <a:lumMod val="85000"/>
+                  <a:lumOff val="15000"/>
+                </a:schemeClr>
+              </a:buClr>
+              <a:buFont typeface="Garamond" pitchFamily="18" charset="0"/>
+              <a:buChar char="◦"/>
+              <a:defRPr sz="1400" kern="1200">
+                <a:solidFill>
+                  <a:schemeClr val="tx1"/>
+                </a:solidFill>
+                <a:latin typeface="+mn-lt"/>
+                <a:ea typeface="+mn-ea"/>
+                <a:cs typeface="+mn-cs"/>
+              </a:defRPr>
+            </a:lvl4pPr>
+            <a:lvl5pPr marL="1280160" indent="-182880" algn="l" defTabSz="914400" rtl="0" eaLnBrk="1" latinLnBrk="0" hangingPunct="1">
+              <a:lnSpc>
+                <a:spcPct val="100000"/>
+              </a:lnSpc>
+              <a:spcBef>
+                <a:spcPts val="500"/>
+              </a:spcBef>
+              <a:buClr>
+                <a:schemeClr val="tx1">
+                  <a:lumMod val="85000"/>
+                  <a:lumOff val="15000"/>
+                </a:schemeClr>
+              </a:buClr>
+              <a:buFont typeface="Garamond" pitchFamily="18" charset="0"/>
+              <a:buChar char="◦"/>
+              <a:defRPr sz="1400" kern="1200">
+                <a:solidFill>
+                  <a:schemeClr val="tx1"/>
+                </a:solidFill>
+                <a:latin typeface="+mn-lt"/>
+                <a:ea typeface="+mn-ea"/>
+                <a:cs typeface="+mn-cs"/>
+              </a:defRPr>
+            </a:lvl5pPr>
+            <a:lvl6pPr marL="1600000" indent="-228600" algn="l" defTabSz="914400" rtl="0" eaLnBrk="1" latinLnBrk="0" hangingPunct="1">
+              <a:lnSpc>
+                <a:spcPct val="100000"/>
+              </a:lnSpc>
+              <a:spcBef>
+                <a:spcPts val="500"/>
+              </a:spcBef>
+              <a:buClr>
+                <a:schemeClr val="tx1">
+                  <a:lumMod val="85000"/>
+                  <a:lumOff val="15000"/>
+                </a:schemeClr>
+              </a:buClr>
+              <a:buFont typeface="Garamond" pitchFamily="18" charset="0"/>
+              <a:buChar char="◦"/>
+              <a:defRPr sz="1400" kern="1200">
+                <a:solidFill>
+                  <a:schemeClr val="tx1"/>
+                </a:solidFill>
+                <a:latin typeface="+mn-lt"/>
+                <a:ea typeface="+mn-ea"/>
+                <a:cs typeface="+mn-cs"/>
+              </a:defRPr>
+            </a:lvl6pPr>
+            <a:lvl7pPr marL="1900000" indent="-228600" algn="l" defTabSz="914400" rtl="0" eaLnBrk="1" latinLnBrk="0" hangingPunct="1">
+              <a:lnSpc>
+                <a:spcPct val="100000"/>
+              </a:lnSpc>
+              <a:spcBef>
+                <a:spcPts val="500"/>
+              </a:spcBef>
+              <a:buClr>
+                <a:schemeClr val="tx1">
+                  <a:lumMod val="85000"/>
+                  <a:lumOff val="15000"/>
+                </a:schemeClr>
+              </a:buClr>
+              <a:buFont typeface="Garamond" pitchFamily="18" charset="0"/>
+              <a:buChar char="◦"/>
+              <a:defRPr sz="1400" kern="1200">
+                <a:solidFill>
+                  <a:schemeClr val="tx1"/>
+                </a:solidFill>
+                <a:latin typeface="+mn-lt"/>
+                <a:ea typeface="+mn-ea"/>
+                <a:cs typeface="+mn-cs"/>
+              </a:defRPr>
+            </a:lvl7pPr>
+            <a:lvl8pPr marL="2200000" indent="-228600" algn="l" defTabSz="914400" rtl="0" eaLnBrk="1" latinLnBrk="0" hangingPunct="1">
+              <a:lnSpc>
+                <a:spcPct val="100000"/>
+              </a:lnSpc>
+              <a:spcBef>
+                <a:spcPts val="500"/>
+              </a:spcBef>
+              <a:buClr>
+                <a:schemeClr val="tx1">
+                  <a:lumMod val="85000"/>
+                  <a:lumOff val="15000"/>
+                </a:schemeClr>
+              </a:buClr>
+              <a:buFont typeface="Garamond" pitchFamily="18" charset="0"/>
+              <a:buChar char="◦"/>
+              <a:defRPr sz="1400" kern="1200">
+                <a:solidFill>
+                  <a:schemeClr val="tx1"/>
+                </a:solidFill>
+                <a:latin typeface="+mn-lt"/>
+                <a:ea typeface="+mn-ea"/>
+                <a:cs typeface="+mn-cs"/>
+              </a:defRPr>
+            </a:lvl8pPr>
+            <a:lvl9pPr marL="2500000" indent="-228600" algn="l" defTabSz="914400" rtl="0" eaLnBrk="1" latinLnBrk="0" hangingPunct="1">
+              <a:lnSpc>
+                <a:spcPct val="100000"/>
+              </a:lnSpc>
+              <a:spcBef>
+                <a:spcPts val="500"/>
+              </a:spcBef>
+              <a:buClr>
+                <a:schemeClr val="tx1">
+                  <a:lumMod val="85000"/>
+                  <a:lumOff val="15000"/>
+                </a:schemeClr>
+              </a:buClr>
+              <a:buFont typeface="Garamond" pitchFamily="18" charset="0"/>
+              <a:buChar char="◦"/>
+              <a:defRPr sz="1400" kern="1200">
+                <a:solidFill>
+                  <a:schemeClr val="tx1"/>
+                </a:solidFill>
+                <a:latin typeface="+mn-lt"/>
+                <a:ea typeface="+mn-ea"/>
+                <a:cs typeface="+mn-cs"/>
+              </a:defRPr>
+            </a:lvl9pPr>
+          </a:lstStyle>
+          <a:p>
+            <a:r>
+              <a:rPr lang="en-US" dirty="0"/>
+              <a:t>Peyman Eshghi</a:t>
+            </a:r>
+          </a:p>
+        </p:txBody>
+      </p:sp>
+      <p:sp>
+        <p:nvSpPr>
+          <p:cNvPr id="25" name="Content Placeholder 3">
+            <a:extLst>
+              <a:ext uri="{FF2B5EF4-FFF2-40B4-BE49-F238E27FC236}">
+                <a16:creationId xmlns:a16="http://schemas.microsoft.com/office/drawing/2014/main" id="{1C818B16-ACD8-42CC-8F6D-8133DD0CD376}"/>
+              </a:ext>
+            </a:extLst>
+          </p:cNvPr>
+          <p:cNvSpPr txBox="1">
+            <a:spLocks/>
+          </p:cNvSpPr>
+          <p:nvPr/>
+        </p:nvSpPr>
+        <p:spPr>
+          <a:xfrm>
+            <a:off x="6095258" y="2103120"/>
+            <a:ext cx="2584349" cy="3749040"/>
+          </a:xfrm>
+          <a:prstGeom prst="rect">
+            <a:avLst/>
+          </a:prstGeom>
+        </p:spPr>
+        <p:txBody>
+          <a:bodyPr vert="horz" lIns="91440" tIns="45720" rIns="91440" bIns="45720" rtlCol="0">
+            <a:normAutofit/>
+          </a:bodyPr>
+          <a:lstStyle>
+            <a:lvl1pPr marL="182880" indent="-182880" algn="l" defTabSz="914400" rtl="0" eaLnBrk="1" latinLnBrk="0" hangingPunct="1">
+              <a:lnSpc>
+                <a:spcPct val="110000"/>
+              </a:lnSpc>
+              <a:spcBef>
+                <a:spcPts val="900"/>
+              </a:spcBef>
+              <a:spcAft>
+                <a:spcPts val="0"/>
+              </a:spcAft>
+              <a:buClr>
+                <a:schemeClr val="tx1">
+                  <a:lumMod val="85000"/>
+                  <a:lumOff val="15000"/>
+                </a:schemeClr>
+              </a:buClr>
+              <a:buFont typeface="Garamond" pitchFamily="18" charset="0"/>
+              <a:buChar char="◦"/>
+              <a:defRPr sz="1800" kern="1200">
+                <a:solidFill>
+                  <a:schemeClr val="tx1"/>
+                </a:solidFill>
+                <a:latin typeface="+mn-lt"/>
+                <a:ea typeface="+mn-ea"/>
+                <a:cs typeface="+mn-cs"/>
+              </a:defRPr>
+            </a:lvl1pPr>
+            <a:lvl2pPr marL="457200" indent="-182880" algn="l" defTabSz="914400" rtl="0" eaLnBrk="1" latinLnBrk="0" hangingPunct="1">
+              <a:lnSpc>
+                <a:spcPct val="100000"/>
+              </a:lnSpc>
+              <a:spcBef>
+                <a:spcPts val="500"/>
+              </a:spcBef>
+              <a:buClr>
+                <a:schemeClr val="tx1">
+                  <a:lumMod val="85000"/>
+                  <a:lumOff val="15000"/>
+                </a:schemeClr>
+              </a:buClr>
+              <a:buFont typeface="Garamond" pitchFamily="18" charset="0"/>
+              <a:buChar char="◦"/>
+              <a:defRPr sz="1600" kern="1200">
+                <a:solidFill>
+                  <a:schemeClr val="tx1"/>
+                </a:solidFill>
+                <a:latin typeface="+mn-lt"/>
+                <a:ea typeface="+mn-ea"/>
+                <a:cs typeface="+mn-cs"/>
+              </a:defRPr>
+            </a:lvl2pPr>
+            <a:lvl3pPr marL="731520" indent="-182880" algn="l" defTabSz="914400" rtl="0" eaLnBrk="1" latinLnBrk="0" hangingPunct="1">
+              <a:lnSpc>
+                <a:spcPct val="100000"/>
+              </a:lnSpc>
+              <a:spcBef>
+                <a:spcPts val="500"/>
+              </a:spcBef>
+              <a:buClr>
+                <a:schemeClr val="tx1">
+                  <a:lumMod val="85000"/>
+                  <a:lumOff val="15000"/>
+                </a:schemeClr>
+              </a:buClr>
+              <a:buFont typeface="Garamond" pitchFamily="18" charset="0"/>
+              <a:buChar char="◦"/>
+              <a:defRPr sz="1400" kern="1200">
+                <a:solidFill>
+                  <a:schemeClr val="tx1"/>
+                </a:solidFill>
+                <a:latin typeface="+mn-lt"/>
+                <a:ea typeface="+mn-ea"/>
+                <a:cs typeface="+mn-cs"/>
+              </a:defRPr>
+            </a:lvl3pPr>
+            <a:lvl4pPr marL="1005840" indent="-182880" algn="l" defTabSz="914400" rtl="0" eaLnBrk="1" latinLnBrk="0" hangingPunct="1">
+              <a:lnSpc>
+                <a:spcPct val="100000"/>
+              </a:lnSpc>
+              <a:spcBef>
+                <a:spcPts val="500"/>
+              </a:spcBef>
+              <a:buClr>
+                <a:schemeClr val="tx1">
+                  <a:lumMod val="85000"/>
+                  <a:lumOff val="15000"/>
+                </a:schemeClr>
+              </a:buClr>
+              <a:buFont typeface="Garamond" pitchFamily="18" charset="0"/>
+              <a:buChar char="◦"/>
+              <a:defRPr sz="1400" kern="1200">
+                <a:solidFill>
+                  <a:schemeClr val="tx1"/>
+                </a:solidFill>
+                <a:latin typeface="+mn-lt"/>
+                <a:ea typeface="+mn-ea"/>
+                <a:cs typeface="+mn-cs"/>
+              </a:defRPr>
+            </a:lvl4pPr>
+            <a:lvl5pPr marL="1280160" indent="-182880" algn="l" defTabSz="914400" rtl="0" eaLnBrk="1" latinLnBrk="0" hangingPunct="1">
+              <a:lnSpc>
+                <a:spcPct val="100000"/>
+              </a:lnSpc>
+              <a:spcBef>
+                <a:spcPts val="500"/>
+              </a:spcBef>
+              <a:buClr>
+                <a:schemeClr val="tx1">
+                  <a:lumMod val="85000"/>
+                  <a:lumOff val="15000"/>
+                </a:schemeClr>
+              </a:buClr>
+              <a:buFont typeface="Garamond" pitchFamily="18" charset="0"/>
+              <a:buChar char="◦"/>
+              <a:defRPr sz="1400" kern="1200">
+                <a:solidFill>
+                  <a:schemeClr val="tx1"/>
+                </a:solidFill>
+                <a:latin typeface="+mn-lt"/>
+                <a:ea typeface="+mn-ea"/>
+                <a:cs typeface="+mn-cs"/>
+              </a:defRPr>
+            </a:lvl5pPr>
+            <a:lvl6pPr marL="1600000" indent="-228600" algn="l" defTabSz="914400" rtl="0" eaLnBrk="1" latinLnBrk="0" hangingPunct="1">
+              <a:lnSpc>
+                <a:spcPct val="100000"/>
+              </a:lnSpc>
+              <a:spcBef>
+                <a:spcPts val="500"/>
+              </a:spcBef>
+              <a:buClr>
+                <a:schemeClr val="tx1">
+                  <a:lumMod val="85000"/>
+                  <a:lumOff val="15000"/>
+                </a:schemeClr>
+              </a:buClr>
+              <a:buFont typeface="Garamond" pitchFamily="18" charset="0"/>
+              <a:buChar char="◦"/>
+              <a:defRPr sz="1400" kern="1200">
+                <a:solidFill>
+                  <a:schemeClr val="tx1"/>
+                </a:solidFill>
+                <a:latin typeface="+mn-lt"/>
+                <a:ea typeface="+mn-ea"/>
+                <a:cs typeface="+mn-cs"/>
+              </a:defRPr>
+            </a:lvl6pPr>
+            <a:lvl7pPr marL="1900000" indent="-228600" algn="l" defTabSz="914400" rtl="0" eaLnBrk="1" latinLnBrk="0" hangingPunct="1">
+              <a:lnSpc>
+                <a:spcPct val="100000"/>
+              </a:lnSpc>
+              <a:spcBef>
+                <a:spcPts val="500"/>
+              </a:spcBef>
+              <a:buClr>
+                <a:schemeClr val="tx1">
+                  <a:lumMod val="85000"/>
+                  <a:lumOff val="15000"/>
+                </a:schemeClr>
+              </a:buClr>
+              <a:buFont typeface="Garamond" pitchFamily="18" charset="0"/>
+              <a:buChar char="◦"/>
+              <a:defRPr sz="1400" kern="1200">
+                <a:solidFill>
+                  <a:schemeClr val="tx1"/>
+                </a:solidFill>
+                <a:latin typeface="+mn-lt"/>
+                <a:ea typeface="+mn-ea"/>
+                <a:cs typeface="+mn-cs"/>
+              </a:defRPr>
+            </a:lvl7pPr>
+            <a:lvl8pPr marL="2200000" indent="-228600" algn="l" defTabSz="914400" rtl="0" eaLnBrk="1" latinLnBrk="0" hangingPunct="1">
+              <a:lnSpc>
+                <a:spcPct val="100000"/>
+              </a:lnSpc>
+              <a:spcBef>
+                <a:spcPts val="500"/>
+              </a:spcBef>
+              <a:buClr>
+                <a:schemeClr val="tx1">
+                  <a:lumMod val="85000"/>
+                  <a:lumOff val="15000"/>
+                </a:schemeClr>
+              </a:buClr>
+              <a:buFont typeface="Garamond" pitchFamily="18" charset="0"/>
+              <a:buChar char="◦"/>
+              <a:defRPr sz="1400" kern="1200">
+                <a:solidFill>
+                  <a:schemeClr val="tx1"/>
+                </a:solidFill>
+                <a:latin typeface="+mn-lt"/>
+                <a:ea typeface="+mn-ea"/>
+                <a:cs typeface="+mn-cs"/>
+              </a:defRPr>
+            </a:lvl8pPr>
+            <a:lvl9pPr marL="2500000" indent="-228600" algn="l" defTabSz="914400" rtl="0" eaLnBrk="1" latinLnBrk="0" hangingPunct="1">
+              <a:lnSpc>
+                <a:spcPct val="100000"/>
+              </a:lnSpc>
+              <a:spcBef>
+                <a:spcPts val="500"/>
+              </a:spcBef>
+              <a:buClr>
+                <a:schemeClr val="tx1">
+                  <a:lumMod val="85000"/>
+                  <a:lumOff val="15000"/>
+                </a:schemeClr>
+              </a:buClr>
+              <a:buFont typeface="Garamond" pitchFamily="18" charset="0"/>
+              <a:buChar char="◦"/>
+              <a:defRPr sz="1400" kern="1200">
+                <a:solidFill>
+                  <a:schemeClr val="tx1"/>
+                </a:solidFill>
+                <a:latin typeface="+mn-lt"/>
+                <a:ea typeface="+mn-ea"/>
+                <a:cs typeface="+mn-cs"/>
+              </a:defRPr>
+            </a:lvl9pPr>
+          </a:lstStyle>
+          <a:p>
+            <a:r>
+              <a:rPr lang="en-US" dirty="0"/>
+              <a:t>Eric Simms-</a:t>
+            </a:r>
+          </a:p>
+        </p:txBody>
+      </p:sp>
+      <p:sp>
+        <p:nvSpPr>
+          <p:cNvPr id="26" name="Content Placeholder 3">
+            <a:extLst>
+              <a:ext uri="{FF2B5EF4-FFF2-40B4-BE49-F238E27FC236}">
+                <a16:creationId xmlns:a16="http://schemas.microsoft.com/office/drawing/2014/main" id="{9F2E9A6B-24D8-40E1-B1BB-67246FD59E32}"/>
+              </a:ext>
+            </a:extLst>
+          </p:cNvPr>
+          <p:cNvSpPr txBox="1">
+            <a:spLocks/>
+          </p:cNvSpPr>
+          <p:nvPr/>
+        </p:nvSpPr>
+        <p:spPr>
+          <a:xfrm>
+            <a:off x="8679606" y="2103120"/>
+            <a:ext cx="2584349" cy="3749040"/>
+          </a:xfrm>
+          <a:prstGeom prst="rect">
+            <a:avLst/>
+          </a:prstGeom>
+        </p:spPr>
+        <p:txBody>
+          <a:bodyPr vert="horz" lIns="91440" tIns="45720" rIns="91440" bIns="45720" rtlCol="0">
+            <a:normAutofit/>
+          </a:bodyPr>
+          <a:lstStyle>
+            <a:lvl1pPr marL="182880" indent="-182880" algn="l" defTabSz="914400" rtl="0" eaLnBrk="1" latinLnBrk="0" hangingPunct="1">
+              <a:lnSpc>
+                <a:spcPct val="110000"/>
+              </a:lnSpc>
+              <a:spcBef>
+                <a:spcPts val="900"/>
+              </a:spcBef>
+              <a:spcAft>
+                <a:spcPts val="0"/>
+              </a:spcAft>
+              <a:buClr>
+                <a:schemeClr val="tx1">
+                  <a:lumMod val="85000"/>
+                  <a:lumOff val="15000"/>
+                </a:schemeClr>
+              </a:buClr>
+              <a:buFont typeface="Garamond" pitchFamily="18" charset="0"/>
+              <a:buChar char="◦"/>
+              <a:defRPr sz="1800" kern="1200">
+                <a:solidFill>
+                  <a:schemeClr val="tx1"/>
+                </a:solidFill>
+                <a:latin typeface="+mn-lt"/>
+                <a:ea typeface="+mn-ea"/>
+                <a:cs typeface="+mn-cs"/>
+              </a:defRPr>
+            </a:lvl1pPr>
+            <a:lvl2pPr marL="457200" indent="-182880" algn="l" defTabSz="914400" rtl="0" eaLnBrk="1" latinLnBrk="0" hangingPunct="1">
+              <a:lnSpc>
+                <a:spcPct val="100000"/>
+              </a:lnSpc>
+              <a:spcBef>
+                <a:spcPts val="500"/>
+              </a:spcBef>
+              <a:buClr>
+                <a:schemeClr val="tx1">
+                  <a:lumMod val="85000"/>
+                  <a:lumOff val="15000"/>
+                </a:schemeClr>
+              </a:buClr>
+              <a:buFont typeface="Garamond" pitchFamily="18" charset="0"/>
+              <a:buChar char="◦"/>
+              <a:defRPr sz="1600" kern="1200">
+                <a:solidFill>
+                  <a:schemeClr val="tx1"/>
+                </a:solidFill>
+                <a:latin typeface="+mn-lt"/>
+                <a:ea typeface="+mn-ea"/>
+                <a:cs typeface="+mn-cs"/>
+              </a:defRPr>
+            </a:lvl2pPr>
+            <a:lvl3pPr marL="731520" indent="-182880" algn="l" defTabSz="914400" rtl="0" eaLnBrk="1" latinLnBrk="0" hangingPunct="1">
+              <a:lnSpc>
+                <a:spcPct val="100000"/>
+              </a:lnSpc>
+              <a:spcBef>
+                <a:spcPts val="500"/>
+              </a:spcBef>
+              <a:buClr>
+                <a:schemeClr val="tx1">
+                  <a:lumMod val="85000"/>
+                  <a:lumOff val="15000"/>
+                </a:schemeClr>
+              </a:buClr>
+              <a:buFont typeface="Garamond" pitchFamily="18" charset="0"/>
+              <a:buChar char="◦"/>
+              <a:defRPr sz="1400" kern="1200">
+                <a:solidFill>
+                  <a:schemeClr val="tx1"/>
+                </a:solidFill>
+                <a:latin typeface="+mn-lt"/>
+                <a:ea typeface="+mn-ea"/>
+                <a:cs typeface="+mn-cs"/>
+              </a:defRPr>
+            </a:lvl3pPr>
+            <a:lvl4pPr marL="1005840" indent="-182880" algn="l" defTabSz="914400" rtl="0" eaLnBrk="1" latinLnBrk="0" hangingPunct="1">
+              <a:lnSpc>
+                <a:spcPct val="100000"/>
+              </a:lnSpc>
+              <a:spcBef>
+                <a:spcPts val="500"/>
+              </a:spcBef>
+              <a:buClr>
+                <a:schemeClr val="tx1">
+                  <a:lumMod val="85000"/>
+                  <a:lumOff val="15000"/>
+                </a:schemeClr>
+              </a:buClr>
+              <a:buFont typeface="Garamond" pitchFamily="18" charset="0"/>
+              <a:buChar char="◦"/>
+              <a:defRPr sz="1400" kern="1200">
+                <a:solidFill>
+                  <a:schemeClr val="tx1"/>
+                </a:solidFill>
+                <a:latin typeface="+mn-lt"/>
+                <a:ea typeface="+mn-ea"/>
+                <a:cs typeface="+mn-cs"/>
+              </a:defRPr>
+            </a:lvl4pPr>
+            <a:lvl5pPr marL="1280160" indent="-182880" algn="l" defTabSz="914400" rtl="0" eaLnBrk="1" latinLnBrk="0" hangingPunct="1">
+              <a:lnSpc>
+                <a:spcPct val="100000"/>
+              </a:lnSpc>
+              <a:spcBef>
+                <a:spcPts val="500"/>
+              </a:spcBef>
+              <a:buClr>
+                <a:schemeClr val="tx1">
+                  <a:lumMod val="85000"/>
+                  <a:lumOff val="15000"/>
+                </a:schemeClr>
+              </a:buClr>
+              <a:buFont typeface="Garamond" pitchFamily="18" charset="0"/>
+              <a:buChar char="◦"/>
+              <a:defRPr sz="1400" kern="1200">
+                <a:solidFill>
+                  <a:schemeClr val="tx1"/>
+                </a:solidFill>
+                <a:latin typeface="+mn-lt"/>
+                <a:ea typeface="+mn-ea"/>
+                <a:cs typeface="+mn-cs"/>
+              </a:defRPr>
+            </a:lvl5pPr>
+            <a:lvl6pPr marL="1600000" indent="-228600" algn="l" defTabSz="914400" rtl="0" eaLnBrk="1" latinLnBrk="0" hangingPunct="1">
+              <a:lnSpc>
+                <a:spcPct val="100000"/>
+              </a:lnSpc>
+              <a:spcBef>
+                <a:spcPts val="500"/>
+              </a:spcBef>
+              <a:buClr>
+                <a:schemeClr val="tx1">
+                  <a:lumMod val="85000"/>
+                  <a:lumOff val="15000"/>
+                </a:schemeClr>
+              </a:buClr>
+              <a:buFont typeface="Garamond" pitchFamily="18" charset="0"/>
+              <a:buChar char="◦"/>
+              <a:defRPr sz="1400" kern="1200">
+                <a:solidFill>
+                  <a:schemeClr val="tx1"/>
+                </a:solidFill>
+                <a:latin typeface="+mn-lt"/>
+                <a:ea typeface="+mn-ea"/>
+                <a:cs typeface="+mn-cs"/>
+              </a:defRPr>
+            </a:lvl6pPr>
+            <a:lvl7pPr marL="1900000" indent="-228600" algn="l" defTabSz="914400" rtl="0" eaLnBrk="1" latinLnBrk="0" hangingPunct="1">
+              <a:lnSpc>
+                <a:spcPct val="100000"/>
+              </a:lnSpc>
+              <a:spcBef>
+                <a:spcPts val="500"/>
+              </a:spcBef>
+              <a:buClr>
+                <a:schemeClr val="tx1">
+                  <a:lumMod val="85000"/>
+                  <a:lumOff val="15000"/>
+                </a:schemeClr>
+              </a:buClr>
+              <a:buFont typeface="Garamond" pitchFamily="18" charset="0"/>
+              <a:buChar char="◦"/>
+              <a:defRPr sz="1400" kern="1200">
+                <a:solidFill>
+                  <a:schemeClr val="tx1"/>
+                </a:solidFill>
+                <a:latin typeface="+mn-lt"/>
+                <a:ea typeface="+mn-ea"/>
+                <a:cs typeface="+mn-cs"/>
+              </a:defRPr>
+            </a:lvl7pPr>
+            <a:lvl8pPr marL="2200000" indent="-228600" algn="l" defTabSz="914400" rtl="0" eaLnBrk="1" latinLnBrk="0" hangingPunct="1">
+              <a:lnSpc>
+                <a:spcPct val="100000"/>
+              </a:lnSpc>
+              <a:spcBef>
+                <a:spcPts val="500"/>
+              </a:spcBef>
+              <a:buClr>
+                <a:schemeClr val="tx1">
+                  <a:lumMod val="85000"/>
+                  <a:lumOff val="15000"/>
+                </a:schemeClr>
+              </a:buClr>
+              <a:buFont typeface="Garamond" pitchFamily="18" charset="0"/>
+              <a:buChar char="◦"/>
+              <a:defRPr sz="1400" kern="1200">
+                <a:solidFill>
+                  <a:schemeClr val="tx1"/>
+                </a:solidFill>
+                <a:latin typeface="+mn-lt"/>
+                <a:ea typeface="+mn-ea"/>
+                <a:cs typeface="+mn-cs"/>
+              </a:defRPr>
+            </a:lvl8pPr>
+            <a:lvl9pPr marL="2500000" indent="-228600" algn="l" defTabSz="914400" rtl="0" eaLnBrk="1" latinLnBrk="0" hangingPunct="1">
+              <a:lnSpc>
+                <a:spcPct val="100000"/>
+              </a:lnSpc>
+              <a:spcBef>
+                <a:spcPts val="500"/>
+              </a:spcBef>
+              <a:buClr>
+                <a:schemeClr val="tx1">
+                  <a:lumMod val="85000"/>
+                  <a:lumOff val="15000"/>
+                </a:schemeClr>
+              </a:buClr>
+              <a:buFont typeface="Garamond" pitchFamily="18" charset="0"/>
+              <a:buChar char="◦"/>
+              <a:defRPr sz="1400" kern="1200">
+                <a:solidFill>
+                  <a:schemeClr val="tx1"/>
+                </a:solidFill>
+                <a:latin typeface="+mn-lt"/>
+                <a:ea typeface="+mn-ea"/>
+                <a:cs typeface="+mn-cs"/>
+              </a:defRPr>
+            </a:lvl9pPr>
+          </a:lstStyle>
+          <a:p>
+            <a:r>
+              <a:rPr lang="en-US" dirty="0"/>
+              <a:t>Juliane </a:t>
+            </a:r>
+            <a:r>
+              <a:rPr lang="en-US" dirty="0" err="1"/>
+              <a:t>Mantiz</a:t>
+            </a:r>
+            <a:endParaRPr lang="en-US" dirty="0"/>
           </a:p>
         </p:txBody>
       </p:sp>
     </p:spTree>
     <p:extLst>
       <p:ext uri="{BB962C8B-B14F-4D97-AF65-F5344CB8AC3E}">
-        <p14:creationId xmlns:p14="http://schemas.microsoft.com/office/powerpoint/2010/main" val="2920857757"/>
+        <p14:creationId xmlns:p14="http://schemas.microsoft.com/office/powerpoint/2010/main" val="1674326587"/>
       </p:ext>
     </p:extLst>
   </p:cSld>
@@ -9687,7 +11055,7 @@
           <p:cNvPr id="2" name="Title 1">
             <a:extLst>
               <a:ext uri="{FF2B5EF4-FFF2-40B4-BE49-F238E27FC236}">
-                <a16:creationId xmlns="" xmlns:a16="http://schemas.microsoft.com/office/drawing/2014/main" id="{4DA197EC-75CE-4967-B49A-620F6D94CA9D}"/>
+                <a16:creationId xmlns:a16="http://schemas.microsoft.com/office/drawing/2014/main" id="{7614332B-4F24-42F4-A704-A6F1183E9470}"/>
               </a:ext>
             </a:extLst>
           </p:cNvPr>
@@ -9695,7 +11063,7 @@
             <a:spLocks noGrp="1"/>
           </p:cNvSpPr>
           <p:nvPr>
-            <p:ph type="title"/>
+            <p:ph type="ctrTitle"/>
           </p:nvPr>
         </p:nvSpPr>
         <p:spPr/>
@@ -9705,6 +11073,64 @@
           <a:p>
             <a:r>
               <a:rPr lang="en-US" dirty="0"/>
+              <a:t>Why are we here</a:t>
+            </a:r>
+          </a:p>
+        </p:txBody>
+      </p:sp>
+    </p:spTree>
+    <p:extLst>
+      <p:ext uri="{BB962C8B-B14F-4D97-AF65-F5344CB8AC3E}">
+        <p14:creationId xmlns:p14="http://schemas.microsoft.com/office/powerpoint/2010/main" val="2920857757"/>
+      </p:ext>
+    </p:extLst>
+  </p:cSld>
+  <p:clrMapOvr>
+    <a:masterClrMapping/>
+  </p:clrMapOvr>
+</p:sld>
+</file>
+
+<file path=ppt/slides/slide8.xml><?xml version="1.0" encoding="utf-8"?>
+<p:sld xmlns:a="http://schemas.openxmlformats.org/drawingml/2006/main" xmlns:r="http://schemas.openxmlformats.org/officeDocument/2006/relationships" xmlns:p="http://schemas.openxmlformats.org/presentationml/2006/main">
+  <p:cSld>
+    <p:spTree>
+      <p:nvGrpSpPr>
+        <p:cNvPr id="1" name=""/>
+        <p:cNvGrpSpPr/>
+        <p:nvPr/>
+      </p:nvGrpSpPr>
+      <p:grpSpPr>
+        <a:xfrm>
+          <a:off x="0" y="0"/>
+          <a:ext cx="0" cy="0"/>
+          <a:chOff x="0" y="0"/>
+          <a:chExt cx="0" cy="0"/>
+        </a:xfrm>
+      </p:grpSpPr>
+      <p:sp>
+        <p:nvSpPr>
+          <p:cNvPr id="2" name="Title 1">
+            <a:extLst>
+              <a:ext uri="{FF2B5EF4-FFF2-40B4-BE49-F238E27FC236}">
+                <a16:creationId xmlns:a16="http://schemas.microsoft.com/office/drawing/2014/main" id="{4DA197EC-75CE-4967-B49A-620F6D94CA9D}"/>
+              </a:ext>
+            </a:extLst>
+          </p:cNvPr>
+          <p:cNvSpPr>
+            <a:spLocks noGrp="1"/>
+          </p:cNvSpPr>
+          <p:nvPr>
+            <p:ph type="title"/>
+          </p:nvPr>
+        </p:nvSpPr>
+        <p:spPr/>
+        <p:txBody>
+          <a:bodyPr/>
+          <a:lstStyle/>
+          <a:p>
+            <a:r>
+              <a:rPr lang="en-US" dirty="0"/>
               <a:t>Workshop Goals</a:t>
             </a:r>
           </a:p>
@@ -9715,7 +11141,7 @@
           <p:cNvPr id="3" name="Content Placeholder 2">
             <a:extLst>
               <a:ext uri="{FF2B5EF4-FFF2-40B4-BE49-F238E27FC236}">
-                <a16:creationId xmlns="" xmlns:a16="http://schemas.microsoft.com/office/drawing/2014/main" id="{8AB0FEEC-3BEF-46E7-912B-C736F42B180B}"/>
+                <a16:creationId xmlns:a16="http://schemas.microsoft.com/office/drawing/2014/main" id="{8AB0FEEC-3BEF-46E7-912B-C736F42B180B}"/>
               </a:ext>
             </a:extLst>
           </p:cNvPr>
@@ -9740,34 +11166,29 @@
           <a:p>
             <a:pPr lvl="1"/>
             <a:r>
-              <a:rPr lang="en-US" sz="2000" dirty="0" smtClean="0"/>
-              <a:t>R </a:t>
-            </a:r>
-            <a:r>
               <a:rPr lang="en-US" sz="2000" dirty="0"/>
-              <a:t>Package validation Framework</a:t>
+              <a:t>R Package validation Framework</a:t>
             </a:r>
           </a:p>
           <a:p>
             <a:pPr lvl="1"/>
             <a:r>
-              <a:rPr lang="en-US" sz="2000" dirty="0" smtClean="0"/>
+              <a:rPr lang="en-US" sz="2000" dirty="0"/>
               <a:t>How to use {</a:t>
             </a:r>
             <a:r>
-              <a:rPr lang="en-US" sz="2000" dirty="0" err="1" smtClean="0"/>
+              <a:rPr lang="en-US" sz="2000" dirty="0" err="1"/>
               <a:t>valtools</a:t>
             </a:r>
             <a:r>
               <a:rPr lang="en-US" sz="2000" dirty="0"/>
               <a:t>} </a:t>
             </a:r>
-            <a:endParaRPr lang="en-US" sz="2000" dirty="0" smtClean="0"/>
           </a:p>
           <a:p>
             <a:pPr lvl="1"/>
             <a:r>
-              <a:rPr lang="en-US" sz="2000" dirty="0" smtClean="0"/>
+              <a:rPr lang="en-US" sz="2000" dirty="0"/>
               <a:t>Develop a simple package</a:t>
             </a:r>
             <a:endParaRPr lang="en-US" sz="1800" dirty="0"/>
@@ -9934,65 +11355,6 @@
 </p:sld>
 </file>
 
-<file path=ppt/slides/slide8.xml><?xml version="1.0" encoding="utf-8"?>
-<p:sld xmlns:a="http://schemas.openxmlformats.org/drawingml/2006/main" xmlns:r="http://schemas.openxmlformats.org/officeDocument/2006/relationships" xmlns:p="http://schemas.openxmlformats.org/presentationml/2006/main">
-  <p:cSld>
-    <p:spTree>
-      <p:nvGrpSpPr>
-        <p:cNvPr id="1" name=""/>
-        <p:cNvGrpSpPr/>
-        <p:nvPr/>
-      </p:nvGrpSpPr>
-      <p:grpSpPr>
-        <a:xfrm>
-          <a:off x="0" y="0"/>
-          <a:ext cx="0" cy="0"/>
-          <a:chOff x="0" y="0"/>
-          <a:chExt cx="0" cy="0"/>
-        </a:xfrm>
-      </p:grpSpPr>
-      <p:sp>
-        <p:nvSpPr>
-          <p:cNvPr id="2" name="Title 1">
-            <a:extLst>
-              <a:ext uri="{FF2B5EF4-FFF2-40B4-BE49-F238E27FC236}">
-                <a16:creationId xmlns="" xmlns:a16="http://schemas.microsoft.com/office/drawing/2014/main" id="{7614332B-4F24-42F4-A704-A6F1183E9470}"/>
-              </a:ext>
-            </a:extLst>
-          </p:cNvPr>
-          <p:cNvSpPr>
-            <a:spLocks noGrp="1"/>
-          </p:cNvSpPr>
-          <p:nvPr>
-            <p:ph type="ctrTitle"/>
-          </p:nvPr>
-        </p:nvSpPr>
-        <p:spPr/>
-        <p:txBody>
-          <a:bodyPr/>
-          <a:lstStyle/>
-          <a:p>
-            <a:r>
-              <a:rPr lang="en-US" dirty="0" smtClean="0"/>
-              <a:t>What do I need to know</a:t>
-            </a:r>
-            <a:endParaRPr lang="en-US" dirty="0"/>
-          </a:p>
-        </p:txBody>
-      </p:sp>
-    </p:spTree>
-    <p:extLst>
-      <p:ext uri="{BB962C8B-B14F-4D97-AF65-F5344CB8AC3E}">
-        <p14:creationId xmlns:p14="http://schemas.microsoft.com/office/powerpoint/2010/main" val="2169220439"/>
-      </p:ext>
-    </p:extLst>
-  </p:cSld>
-  <p:clrMapOvr>
-    <a:masterClrMapping/>
-  </p:clrMapOvr>
-</p:sld>
-</file>
-
 <file path=ppt/slides/slide9.xml><?xml version="1.0" encoding="utf-8"?>
 <p:sld xmlns:a="http://schemas.openxmlformats.org/drawingml/2006/main" xmlns:r="http://schemas.openxmlformats.org/officeDocument/2006/relationships" xmlns:p="http://schemas.openxmlformats.org/presentationml/2006/main">
   <p:cSld>
@@ -10015,7 +11377,7 @@
           <p:cNvPr id="2" name="Title 1">
             <a:extLst>
               <a:ext uri="{FF2B5EF4-FFF2-40B4-BE49-F238E27FC236}">
-                <a16:creationId xmlns="" xmlns:a16="http://schemas.microsoft.com/office/drawing/2014/main" id="{4DA197EC-75CE-4967-B49A-620F6D94CA9D}"/>
+                <a16:creationId xmlns:a16="http://schemas.microsoft.com/office/drawing/2014/main" id="{7614332B-4F24-42F4-A704-A6F1183E9470}"/>
               </a:ext>
             </a:extLst>
           </p:cNvPr>
@@ -10023,7 +11385,7 @@
             <a:spLocks noGrp="1"/>
           </p:cNvSpPr>
           <p:nvPr>
-            <p:ph type="title"/>
+            <p:ph type="ctrTitle"/>
           </p:nvPr>
         </p:nvSpPr>
         <p:spPr/>
@@ -10032,315 +11394,22 @@
           <a:lstStyle/>
           <a:p>
             <a:r>
-              <a:rPr lang="en-US" dirty="0" smtClean="0"/>
-              <a:t>Expected Knowledge</a:t>
-            </a:r>
-            <a:endParaRPr lang="en-US" dirty="0"/>
-          </a:p>
-        </p:txBody>
-      </p:sp>
-      <p:sp>
-        <p:nvSpPr>
-          <p:cNvPr id="3" name="Content Placeholder 2">
-            <a:extLst>
-              <a:ext uri="{FF2B5EF4-FFF2-40B4-BE49-F238E27FC236}">
-                <a16:creationId xmlns="" xmlns:a16="http://schemas.microsoft.com/office/drawing/2014/main" id="{8AB0FEEC-3BEF-46E7-912B-C736F42B180B}"/>
-              </a:ext>
-            </a:extLst>
-          </p:cNvPr>
-          <p:cNvSpPr>
-            <a:spLocks noGrp="1"/>
-          </p:cNvSpPr>
-          <p:nvPr>
-            <p:ph sz="half" idx="1"/>
-          </p:nvPr>
-        </p:nvSpPr>
-        <p:spPr>
-          <a:xfrm>
-            <a:off x="1066800" y="2103120"/>
-            <a:ext cx="10363200" cy="3749040"/>
-          </a:xfrm>
-        </p:spPr>
-        <p:txBody>
-          <a:bodyPr>
-            <a:normAutofit/>
-          </a:bodyPr>
-          <a:lstStyle/>
-          <a:p>
-            <a:r>
-              <a:rPr lang="en-US" sz="2200" dirty="0" smtClean="0"/>
-              <a:t>R </a:t>
-            </a:r>
-            <a:r>
-              <a:rPr lang="en-US" sz="2200" dirty="0"/>
-              <a:t>Package </a:t>
-            </a:r>
-            <a:r>
-              <a:rPr lang="en-US" sz="2200" dirty="0" smtClean="0"/>
-              <a:t>Development</a:t>
-            </a:r>
-          </a:p>
-          <a:p>
-            <a:pPr lvl="1"/>
-            <a:r>
-              <a:rPr lang="en-US" sz="2000" dirty="0" err="1" smtClean="0"/>
-              <a:t>devtools</a:t>
-            </a:r>
-            <a:r>
-              <a:rPr lang="en-US" sz="2000" dirty="0" smtClean="0"/>
-              <a:t>, </a:t>
-            </a:r>
-            <a:r>
-              <a:rPr lang="en-US" sz="2000" dirty="0" err="1" smtClean="0"/>
-              <a:t>usethis</a:t>
-            </a:r>
-            <a:r>
-              <a:rPr lang="en-US" sz="2000" dirty="0" smtClean="0"/>
-              <a:t>, </a:t>
-            </a:r>
-            <a:r>
-              <a:rPr lang="en-US" sz="2000" dirty="0" err="1" smtClean="0"/>
-              <a:t>roxygen</a:t>
-            </a:r>
-            <a:r>
-              <a:rPr lang="en-US" sz="2000" dirty="0" smtClean="0"/>
-              <a:t>, </a:t>
-            </a:r>
-            <a:r>
-              <a:rPr lang="en-US" sz="2000" dirty="0" err="1" smtClean="0"/>
-              <a:t>testthat</a:t>
-            </a:r>
-            <a:endParaRPr lang="en-US" sz="2000" dirty="0" smtClean="0"/>
-          </a:p>
-          <a:p>
-            <a:pPr lvl="1"/>
-            <a:endParaRPr lang="en-US" sz="2000" dirty="0"/>
-          </a:p>
-          <a:p>
-            <a:r>
-              <a:rPr lang="en-US" sz="2200" dirty="0" smtClean="0"/>
-              <a:t>Literate Programming</a:t>
-            </a:r>
-          </a:p>
-          <a:p>
-            <a:pPr lvl="1"/>
-            <a:r>
-              <a:rPr lang="en-US" sz="2000" dirty="0" err="1" smtClean="0"/>
-              <a:t>rmarkdown</a:t>
-            </a:r>
-            <a:endParaRPr lang="en-US" sz="2000" dirty="0"/>
-          </a:p>
-          <a:p>
-            <a:pPr marL="0" indent="0">
-              <a:buNone/>
-            </a:pPr>
-            <a:endParaRPr lang="en-US" sz="2400" dirty="0" smtClean="0"/>
+              <a:rPr lang="en-US" dirty="0"/>
+              <a:t>What do I need to know</a:t>
+            </a:r>
           </a:p>
         </p:txBody>
       </p:sp>
     </p:spTree>
     <p:extLst>
       <p:ext uri="{BB962C8B-B14F-4D97-AF65-F5344CB8AC3E}">
-        <p14:creationId xmlns:p14="http://schemas.microsoft.com/office/powerpoint/2010/main" val="1632441355"/>
+        <p14:creationId xmlns:p14="http://schemas.microsoft.com/office/powerpoint/2010/main" val="2169220439"/>
       </p:ext>
     </p:extLst>
   </p:cSld>
   <p:clrMapOvr>
     <a:masterClrMapping/>
   </p:clrMapOvr>
-  <p:timing>
-    <p:tnLst>
-      <p:par>
-        <p:cTn id="1" dur="indefinite" restart="never" nodeType="tmRoot">
-          <p:childTnLst>
-            <p:seq concurrent="1" nextAc="seek">
-              <p:cTn id="2" dur="indefinite" nodeType="mainSeq">
-                <p:childTnLst>
-                  <p:par>
-                    <p:cTn id="3" fill="hold">
-                      <p:stCondLst>
-                        <p:cond delay="indefinite"/>
-                      </p:stCondLst>
-                      <p:childTnLst>
-                        <p:par>
-                          <p:cTn id="4" fill="hold">
-                            <p:stCondLst>
-                              <p:cond delay="0"/>
-                            </p:stCondLst>
-                            <p:childTnLst>
-                              <p:par>
-                                <p:cTn id="5" presetID="1" presetClass="entr" presetSubtype="0" fill="hold" grpId="0" nodeType="clickEffect">
-                                  <p:stCondLst>
-                                    <p:cond delay="0"/>
-                                  </p:stCondLst>
-                                  <p:childTnLst>
-                                    <p:set>
-                                      <p:cBhvr>
-                                        <p:cTn id="6" dur="1" fill="hold">
-                                          <p:stCondLst>
-                                            <p:cond delay="0"/>
-                                          </p:stCondLst>
-                                        </p:cTn>
-                                        <p:tgtEl>
-                                          <p:spTgt spid="3">
-                                            <p:txEl>
-                                              <p:pRg st="0" end="0"/>
-                                            </p:txEl>
-                                          </p:spTgt>
-                                        </p:tgtEl>
-                                        <p:attrNameLst>
-                                          <p:attrName>style.visibility</p:attrName>
-                                        </p:attrNameLst>
-                                      </p:cBhvr>
-                                      <p:to>
-                                        <p:strVal val="visible"/>
-                                      </p:to>
-                                    </p:set>
-                                  </p:childTnLst>
-                                </p:cTn>
-                              </p:par>
-                              <p:par>
-                                <p:cTn id="7" presetID="1" presetClass="entr" presetSubtype="0" fill="hold" grpId="0" nodeType="withEffect">
-                                  <p:stCondLst>
-                                    <p:cond delay="0"/>
-                                  </p:stCondLst>
-                                  <p:childTnLst>
-                                    <p:set>
-                                      <p:cBhvr>
-                                        <p:cTn id="8" dur="1" fill="hold">
-                                          <p:stCondLst>
-                                            <p:cond delay="0"/>
-                                          </p:stCondLst>
-                                        </p:cTn>
-                                        <p:tgtEl>
-                                          <p:spTgt spid="3">
-                                            <p:txEl>
-                                              <p:pRg st="1" end="1"/>
-                                            </p:txEl>
-                                          </p:spTgt>
-                                        </p:tgtEl>
-                                        <p:attrNameLst>
-                                          <p:attrName>style.visibility</p:attrName>
-                                        </p:attrNameLst>
-                                      </p:cBhvr>
-                                      <p:to>
-                                        <p:strVal val="visible"/>
-                                      </p:to>
-                                    </p:set>
-                                  </p:childTnLst>
-                                </p:cTn>
-                              </p:par>
-                            </p:childTnLst>
-                          </p:cTn>
-                        </p:par>
-                      </p:childTnLst>
-                    </p:cTn>
-                  </p:par>
-                  <p:par>
-                    <p:cTn id="9" fill="hold">
-                      <p:stCondLst>
-                        <p:cond delay="indefinite"/>
-                      </p:stCondLst>
-                      <p:childTnLst>
-                        <p:par>
-                          <p:cTn id="10" fill="hold">
-                            <p:stCondLst>
-                              <p:cond delay="0"/>
-                            </p:stCondLst>
-                            <p:childTnLst>
-                              <p:par>
-                                <p:cTn id="11" presetID="1" presetClass="entr" presetSubtype="0" fill="hold" grpId="0" nodeType="clickEffect">
-                                  <p:stCondLst>
-                                    <p:cond delay="0"/>
-                                  </p:stCondLst>
-                                  <p:childTnLst>
-                                    <p:set>
-                                      <p:cBhvr>
-                                        <p:cTn id="12" dur="1" fill="hold">
-                                          <p:stCondLst>
-                                            <p:cond delay="0"/>
-                                          </p:stCondLst>
-                                        </p:cTn>
-                                        <p:tgtEl>
-                                          <p:spTgt spid="3">
-                                            <p:txEl>
-                                              <p:pRg st="3" end="3"/>
-                                            </p:txEl>
-                                          </p:spTgt>
-                                        </p:tgtEl>
-                                        <p:attrNameLst>
-                                          <p:attrName>style.visibility</p:attrName>
-                                        </p:attrNameLst>
-                                      </p:cBhvr>
-                                      <p:to>
-                                        <p:strVal val="visible"/>
-                                      </p:to>
-                                    </p:set>
-                                  </p:childTnLst>
-                                </p:cTn>
-                              </p:par>
-                              <p:par>
-                                <p:cTn id="13" presetID="1" presetClass="entr" presetSubtype="0" fill="hold" grpId="0" nodeType="withEffect">
-                                  <p:stCondLst>
-                                    <p:cond delay="0"/>
-                                  </p:stCondLst>
-                                  <p:childTnLst>
-                                    <p:set>
-                                      <p:cBhvr>
-                                        <p:cTn id="14" dur="1" fill="hold">
-                                          <p:stCondLst>
-                                            <p:cond delay="0"/>
-                                          </p:stCondLst>
-                                        </p:cTn>
-                                        <p:tgtEl>
-                                          <p:spTgt spid="3">
-                                            <p:txEl>
-                                              <p:pRg st="4" end="4"/>
-                                            </p:txEl>
-                                          </p:spTgt>
-                                        </p:tgtEl>
-                                        <p:attrNameLst>
-                                          <p:attrName>style.visibility</p:attrName>
-                                        </p:attrNameLst>
-                                      </p:cBhvr>
-                                      <p:to>
-                                        <p:strVal val="visible"/>
-                                      </p:to>
-                                    </p:set>
-                                  </p:childTnLst>
-                                </p:cTn>
-                              </p:par>
-                            </p:childTnLst>
-                          </p:cTn>
-                        </p:par>
-                      </p:childTnLst>
-                    </p:cTn>
-                  </p:par>
-                </p:childTnLst>
-              </p:cTn>
-              <p:prevCondLst>
-                <p:cond evt="onPrev" delay="0">
-                  <p:tgtEl>
-                    <p:sldTgt/>
-                  </p:tgtEl>
-                </p:cond>
-              </p:prevCondLst>
-              <p:nextCondLst>
-                <p:cond evt="onNext" delay="0">
-                  <p:tgtEl>
-                    <p:sldTgt/>
-                  </p:tgtEl>
-                </p:cond>
-              </p:nextCondLst>
-            </p:seq>
-          </p:childTnLst>
-        </p:cTn>
-      </p:par>
-    </p:tnLst>
-    <p:bldLst>
-      <p:bldP spid="3" grpId="0" build="p"/>
-    </p:bldLst>
-  </p:timing>
 </p:sld>
 </file>
 
@@ -10614,7 +11683,7 @@
   <a:extraClrSchemeLst/>
   <a:extLst>
     <a:ext uri="{05A4C25C-085E-4340-85A3-A5531E510DB2}">
-      <thm15:themeFamily xmlns="" xmlns:thm15="http://schemas.microsoft.com/office/thememl/2012/main" name="Original 5_01_Win32" id="{77344C68-A3F1-476B-8680-97D7F429B46B}" vid="{89780073-58E8-4DFF-BF29-BA99F8052841}"/>
+      <thm15:themeFamily xmlns:thm15="http://schemas.microsoft.com/office/thememl/2012/main" name="Original 5_01_Win32" id="{77344C68-A3F1-476B-8680-97D7F429B46B}" vid="{89780073-58E8-4DFF-BF29-BA99F8052841}"/>
     </a:ext>
   </a:extLst>
 </a:theme>
@@ -10909,13 +11978,31 @@
   <a:extraClrSchemeLst/>
   <a:extLst>
     <a:ext uri="{05A4C25C-085E-4340-85A3-A5531E510DB2}">
-      <thm15:themeFamily xmlns="" xmlns:thm15="http://schemas.microsoft.com/office/thememl/2012/main" name="Office Theme" id="{62F939B6-93AF-4DB8-9C6B-D6C7DFDC589F}" vid="{4A3C46E8-61CC-4603-A589-7422A47A8E4A}"/>
+      <thm15:themeFamily xmlns:thm15="http://schemas.microsoft.com/office/thememl/2012/main" name="Office Theme" id="{62F939B6-93AF-4DB8-9C6B-D6C7DFDC589F}" vid="{4A3C46E8-61CC-4603-A589-7422A47A8E4A}"/>
     </a:ext>
   </a:extLst>
 </a:theme>
 </file>
 
 <file path=customXml/item1.xml><?xml version="1.0" encoding="utf-8"?>
+<p:properties xmlns:p="http://schemas.microsoft.com/office/2006/metadata/properties" xmlns:xsi="http://www.w3.org/2001/XMLSchema-instance" xmlns:pc="http://schemas.microsoft.com/office/infopath/2007/PartnerControls">
+  <documentManagement>
+    <Status xmlns="71af3243-3dd4-4a8d-8c0d-dd76da1f02a5">Not started</Status>
+    <MediaServiceKeyPoints xmlns="71af3243-3dd4-4a8d-8c0d-dd76da1f02a5" xsi:nil="true"/>
+  </documentManagement>
+</p:properties>
+</file>
+
+<file path=customXml/item2.xml><?xml version="1.0" encoding="utf-8"?>
+<?mso-contentType ?>
+<FormTemplates xmlns="http://schemas.microsoft.com/sharepoint/v3/contenttype/forms">
+  <Display>DocumentLibraryForm</Display>
+  <Edit>DocumentLibraryForm</Edit>
+  <New>DocumentLibraryForm</New>
+</FormTemplates>
+</file>
+
+<file path=customXml/item3.xml><?xml version="1.0" encoding="utf-8"?>
 <ct:contentTypeSchema xmlns:ct="http://schemas.microsoft.com/office/2006/metadata/contentType" xmlns:ma="http://schemas.microsoft.com/office/2006/metadata/properties/metaAttributes" ct:_="" ma:_="" ma:contentTypeName="Document" ma:contentTypeID="0x01010079F111ED35F8CC479449609E8A0923A6" ma:contentTypeVersion="12" ma:contentTypeDescription="Create a new document." ma:contentTypeScope="" ma:versionID="a410dd7f93c95333ffa1b60ed6adedd1">
   <xsd:schema xmlns:xsd="http://www.w3.org/2001/XMLSchema" xmlns:xs="http://www.w3.org/2001/XMLSchema" xmlns:p="http://schemas.microsoft.com/office/2006/metadata/properties" xmlns:ns2="71af3243-3dd4-4a8d-8c0d-dd76da1f02a5" xmlns:ns3="16c05727-aa75-4e4a-9b5f-8a80a1165891" targetNamespace="http://schemas.microsoft.com/office/2006/metadata/properties" ma:root="true" ma:fieldsID="a936d9baba76aa3866493feff160faab" ns2:_="" ns3:_="">
     <xsd:import namespace="71af3243-3dd4-4a8d-8c0d-dd76da1f02a5"/>
@@ -11136,25 +12223,32 @@
 </ct:contentTypeSchema>
 </file>
 
-<file path=customXml/item2.xml><?xml version="1.0" encoding="utf-8"?>
-<?mso-contentType ?>
-<FormTemplates xmlns="http://schemas.microsoft.com/sharepoint/v3/contenttype/forms">
-  <Display>DocumentLibraryForm</Display>
-  <Edit>DocumentLibraryForm</Edit>
-  <New>DocumentLibraryForm</New>
-</FormTemplates>
+<file path=customXml/itemProps1.xml><?xml version="1.0" encoding="utf-8"?>
+<ds:datastoreItem xmlns:ds="http://schemas.openxmlformats.org/officeDocument/2006/customXml" ds:itemID="{137651BA-F45C-4845-9AB3-E0A65B39F5E1}">
+  <ds:schemaRefs>
+    <ds:schemaRef ds:uri="http://schemas.microsoft.com/office/2006/metadata/properties"/>
+    <ds:schemaRef ds:uri="http://schemas.microsoft.com/office/2006/documentManagement/types"/>
+    <ds:schemaRef ds:uri="http://purl.org/dc/terms/"/>
+    <ds:schemaRef ds:uri="http://schemas.openxmlformats.org/package/2006/metadata/core-properties"/>
+    <ds:schemaRef ds:uri="16c05727-aa75-4e4a-9b5f-8a80a1165891"/>
+    <ds:schemaRef ds:uri="http://purl.org/dc/dcmitype/"/>
+    <ds:schemaRef ds:uri="http://schemas.microsoft.com/office/infopath/2007/PartnerControls"/>
+    <ds:schemaRef ds:uri="http://purl.org/dc/elements/1.1/"/>
+    <ds:schemaRef ds:uri="71af3243-3dd4-4a8d-8c0d-dd76da1f02a5"/>
+    <ds:schemaRef ds:uri="http://www.w3.org/XML/1998/namespace"/>
+  </ds:schemaRefs>
+</ds:datastoreItem>
 </file>
 
-<file path=customXml/item3.xml><?xml version="1.0" encoding="utf-8"?>
-<p:properties xmlns:p="http://schemas.microsoft.com/office/2006/metadata/properties" xmlns:xsi="http://www.w3.org/2001/XMLSchema-instance" xmlns:pc="http://schemas.microsoft.com/office/infopath/2007/PartnerControls">
-  <documentManagement>
-    <Status xmlns="71af3243-3dd4-4a8d-8c0d-dd76da1f02a5">Not started</Status>
-    <MediaServiceKeyPoints xmlns="71af3243-3dd4-4a8d-8c0d-dd76da1f02a5" xsi:nil="true"/>
-  </documentManagement>
-</p:properties>
+<file path=customXml/itemProps2.xml><?xml version="1.0" encoding="utf-8"?>
+<ds:datastoreItem xmlns:ds="http://schemas.openxmlformats.org/officeDocument/2006/customXml" ds:itemID="{CDB58277-F8DF-46FF-84EC-EF41B835E69F}">
+  <ds:schemaRefs>
+    <ds:schemaRef ds:uri="http://schemas.microsoft.com/sharepoint/v3/contenttype/forms"/>
+  </ds:schemaRefs>
+</ds:datastoreItem>
 </file>
 
-<file path=customXml/itemProps1.xml><?xml version="1.0" encoding="utf-8"?>
+<file path=customXml/itemProps3.xml><?xml version="1.0" encoding="utf-8"?>
 <ds:datastoreItem xmlns:ds="http://schemas.openxmlformats.org/officeDocument/2006/customXml" ds:itemID="{2D276E62-80A3-44DD-9BCC-97ED2B99B57F}">
   <ds:schemaRefs>
     <ds:schemaRef ds:uri="http://schemas.microsoft.com/office/2006/metadata/contentType"/>
@@ -11171,29 +12265,4 @@
     <ds:schemaRef ds:uri="http://schemas.microsoft.com/internal/obd"/>
   </ds:schemaRefs>
 </ds:datastoreItem>
-</file>
-
-<file path=customXml/itemProps2.xml><?xml version="1.0" encoding="utf-8"?>
-<ds:datastoreItem xmlns:ds="http://schemas.openxmlformats.org/officeDocument/2006/customXml" ds:itemID="{CDB58277-F8DF-46FF-84EC-EF41B835E69F}">
-  <ds:schemaRefs>
-    <ds:schemaRef ds:uri="http://schemas.microsoft.com/sharepoint/v3/contenttype/forms"/>
-  </ds:schemaRefs>
-</ds:datastoreItem>
-</file>
-
-<file path=customXml/itemProps3.xml><?xml version="1.0" encoding="utf-8"?>
-<ds:datastoreItem xmlns:ds="http://schemas.openxmlformats.org/officeDocument/2006/customXml" ds:itemID="{137651BA-F45C-4845-9AB3-E0A65B39F5E1}">
-  <ds:schemaRefs>
-    <ds:schemaRef ds:uri="http://schemas.microsoft.com/office/2006/metadata/properties"/>
-    <ds:schemaRef ds:uri="http://schemas.microsoft.com/office/2006/documentManagement/types"/>
-    <ds:schemaRef ds:uri="http://purl.org/dc/terms/"/>
-    <ds:schemaRef ds:uri="http://schemas.openxmlformats.org/package/2006/metadata/core-properties"/>
-    <ds:schemaRef ds:uri="16c05727-aa75-4e4a-9b5f-8a80a1165891"/>
-    <ds:schemaRef ds:uri="http://purl.org/dc/dcmitype/"/>
-    <ds:schemaRef ds:uri="http://schemas.microsoft.com/office/infopath/2007/PartnerControls"/>
-    <ds:schemaRef ds:uri="http://purl.org/dc/elements/1.1/"/>
-    <ds:schemaRef ds:uri="71af3243-3dd4-4a8d-8c0d-dd76da1f02a5"/>
-    <ds:schemaRef ds:uri="http://www.w3.org/XML/1998/namespace"/>
-  </ds:schemaRefs>
-</ds:datastoreItem>
 </file>
</xml_diff>

<commit_message>
Add Schedule Add debugging triage instructions Update Readme
</commit_message>
<xml_diff>
--- a/Slides/Slides-01-Welcome_and_Orientation/Slides-01-Welcome_and_Orientation.pptx
+++ b/Slides/Slides-01-Welcome_and_Orientation/Slides-01-Welcome_and_Orientation.pptx
@@ -161,7 +161,7 @@
   <pc:docChgLst>
     <pc:chgData name="Ellis Hughes" userId="70958ad1-f5a5-48f5-9815-bf834be6566e" providerId="ADAL" clId="{77697593-36FA-4171-A4F3-5A9D46E69B8E}"/>
     <pc:docChg chg="undo custSel addSld delSld modSld sldOrd">
-      <pc:chgData name="Ellis Hughes" userId="70958ad1-f5a5-48f5-9815-bf834be6566e" providerId="ADAL" clId="{77697593-36FA-4171-A4F3-5A9D46E69B8E}" dt="2021-10-29T16:57:59.449" v="1270" actId="113"/>
+      <pc:chgData name="Ellis Hughes" userId="70958ad1-f5a5-48f5-9815-bf834be6566e" providerId="ADAL" clId="{77697593-36FA-4171-A4F3-5A9D46E69B8E}" dt="2021-10-29T18:04:27.128" v="1296" actId="20577"/>
       <pc:docMkLst>
         <pc:docMk/>
       </pc:docMkLst>
@@ -212,13 +212,13 @@
         </pc:spChg>
       </pc:sldChg>
       <pc:sldChg chg="modSp mod">
-        <pc:chgData name="Ellis Hughes" userId="70958ad1-f5a5-48f5-9815-bf834be6566e" providerId="ADAL" clId="{77697593-36FA-4171-A4F3-5A9D46E69B8E}" dt="2021-10-29T16:57:12.436" v="1194" actId="207"/>
+        <pc:chgData name="Ellis Hughes" userId="70958ad1-f5a5-48f5-9815-bf834be6566e" providerId="ADAL" clId="{77697593-36FA-4171-A4F3-5A9D46E69B8E}" dt="2021-10-29T18:04:27.128" v="1296" actId="20577"/>
         <pc:sldMkLst>
           <pc:docMk/>
           <pc:sldMk cId="2287488995" sldId="274"/>
         </pc:sldMkLst>
         <pc:graphicFrameChg chg="mod modGraphic">
-          <ac:chgData name="Ellis Hughes" userId="70958ad1-f5a5-48f5-9815-bf834be6566e" providerId="ADAL" clId="{77697593-36FA-4171-A4F3-5A9D46E69B8E}" dt="2021-10-29T16:57:12.436" v="1194" actId="207"/>
+          <ac:chgData name="Ellis Hughes" userId="70958ad1-f5a5-48f5-9815-bf834be6566e" providerId="ADAL" clId="{77697593-36FA-4171-A4F3-5A9D46E69B8E}" dt="2021-10-29T18:04:27.128" v="1296" actId="20577"/>
           <ac:graphicFrameMkLst>
             <pc:docMk/>
             <pc:sldMk cId="2287488995" sldId="274"/>
@@ -8243,7 +8243,7 @@
           <p:nvPr>
             <p:extLst>
               <p:ext uri="{D42A27DB-BD31-4B8C-83A1-F6EECF244321}">
-                <p14:modId xmlns:p14="http://schemas.microsoft.com/office/powerpoint/2010/main" val="3680395466"/>
+                <p14:modId xmlns:p14="http://schemas.microsoft.com/office/powerpoint/2010/main" val="4267759093"/>
               </p:ext>
             </p:extLst>
           </p:nvPr>
@@ -8814,7 +8814,7 @@
                           <a:effectLst/>
                           <a:latin typeface="+mn-lt"/>
                         </a:rPr>
-                        <a:t>35 - 70 minutes</a:t>
+                        <a:t>35 - 75 minutes</a:t>
                       </a:r>
                       <a:endParaRPr lang="en-US" sz="1400" b="0" i="0" u="none" strike="noStrike" dirty="0">
                         <a:solidFill>
@@ -8942,7 +8942,7 @@
                           <a:effectLst/>
                           <a:latin typeface="+mn-lt"/>
                         </a:rPr>
-                        <a:t>70 - 80 minutes</a:t>
+                        <a:t>75 - 85 minutes</a:t>
                       </a:r>
                     </a:p>
                   </a:txBody>
@@ -9073,7 +9073,7 @@
                           <a:effectLst/>
                           <a:latin typeface="+mn-lt"/>
                         </a:rPr>
-                        <a:t>80 - 120 minutes</a:t>
+                        <a:t>85 - 125 minutes</a:t>
                       </a:r>
                     </a:p>
                   </a:txBody>
@@ -9211,7 +9211,7 @@
                           <a:effectLst/>
                           <a:latin typeface="+mn-lt"/>
                         </a:rPr>
-                        <a:t>120 - 150 minutes</a:t>
+                        <a:t>125 - 155 minutes</a:t>
                       </a:r>
                       <a:endParaRPr lang="en-US" sz="1400" b="0" i="0" u="none" strike="noStrike" dirty="0">
                         <a:solidFill>
@@ -9343,7 +9343,7 @@
                           <a:effectLst/>
                           <a:latin typeface="+mn-lt"/>
                         </a:rPr>
-                        <a:t>150 -160</a:t>
+                        <a:t>155 -165</a:t>
                       </a:r>
                       <a:r>
                         <a:rPr lang="en-US" sz="1400" b="0" i="0" u="none" strike="noStrike" baseline="0" dirty="0">
@@ -9478,11 +9478,18 @@
                     <a:p>
                       <a:pPr algn="ctr" fontAlgn="ctr"/>
                       <a:r>
+                        <a:rPr lang="en-US" sz="1400" u="none" strike="noStrike">
+                          <a:effectLst/>
+                          <a:latin typeface="+mn-lt"/>
+                        </a:rPr>
+                        <a:t>165 </a:t>
+                      </a:r>
+                      <a:r>
                         <a:rPr lang="en-US" sz="1400" u="none" strike="noStrike" dirty="0">
                           <a:effectLst/>
                           <a:latin typeface="+mn-lt"/>
                         </a:rPr>
-                        <a:t>160 -180 minutes</a:t>
+                        <a:t>-180 minutes</a:t>
                       </a:r>
                       <a:endParaRPr lang="en-US" sz="1400" b="0" i="0" u="none" strike="noStrike" dirty="0">
                         <a:solidFill>
@@ -13175,21 +13182,21 @@
 </file>
 
 <file path=customXml/item1.xml><?xml version="1.0" encoding="utf-8"?>
+<p:properties xmlns:p="http://schemas.microsoft.com/office/2006/metadata/properties" xmlns:xsi="http://www.w3.org/2001/XMLSchema-instance" xmlns:pc="http://schemas.microsoft.com/office/infopath/2007/PartnerControls">
+  <documentManagement>
+    <Status xmlns="71af3243-3dd4-4a8d-8c0d-dd76da1f02a5">Not started</Status>
+    <MediaServiceKeyPoints xmlns="71af3243-3dd4-4a8d-8c0d-dd76da1f02a5" xsi:nil="true"/>
+  </documentManagement>
+</p:properties>
+</file>
+
+<file path=customXml/item2.xml><?xml version="1.0" encoding="utf-8"?>
 <?mso-contentType ?>
 <FormTemplates xmlns="http://schemas.microsoft.com/sharepoint/v3/contenttype/forms">
   <Display>DocumentLibraryForm</Display>
   <Edit>DocumentLibraryForm</Edit>
   <New>DocumentLibraryForm</New>
 </FormTemplates>
-</file>
-
-<file path=customXml/item2.xml><?xml version="1.0" encoding="utf-8"?>
-<p:properties xmlns:p="http://schemas.microsoft.com/office/2006/metadata/properties" xmlns:xsi="http://www.w3.org/2001/XMLSchema-instance" xmlns:pc="http://schemas.microsoft.com/office/infopath/2007/PartnerControls">
-  <documentManagement>
-    <Status xmlns="71af3243-3dd4-4a8d-8c0d-dd76da1f02a5">Not started</Status>
-    <MediaServiceKeyPoints xmlns="71af3243-3dd4-4a8d-8c0d-dd76da1f02a5" xsi:nil="true"/>
-  </documentManagement>
-</p:properties>
 </file>
 
 <file path=customXml/item3.xml><?xml version="1.0" encoding="utf-8"?>
@@ -13414,14 +13421,6 @@
 </file>
 
 <file path=customXml/itemProps1.xml><?xml version="1.0" encoding="utf-8"?>
-<ds:datastoreItem xmlns:ds="http://schemas.openxmlformats.org/officeDocument/2006/customXml" ds:itemID="{CDB58277-F8DF-46FF-84EC-EF41B835E69F}">
-  <ds:schemaRefs>
-    <ds:schemaRef ds:uri="http://schemas.microsoft.com/sharepoint/v3/contenttype/forms"/>
-  </ds:schemaRefs>
-</ds:datastoreItem>
-</file>
-
-<file path=customXml/itemProps2.xml><?xml version="1.0" encoding="utf-8"?>
 <ds:datastoreItem xmlns:ds="http://schemas.openxmlformats.org/officeDocument/2006/customXml" ds:itemID="{137651BA-F45C-4845-9AB3-E0A65B39F5E1}">
   <ds:schemaRefs>
     <ds:schemaRef ds:uri="http://schemas.microsoft.com/office/2006/metadata/properties"/>
@@ -13434,6 +13433,14 @@
     <ds:schemaRef ds:uri="http://purl.org/dc/elements/1.1/"/>
     <ds:schemaRef ds:uri="71af3243-3dd4-4a8d-8c0d-dd76da1f02a5"/>
     <ds:schemaRef ds:uri="http://www.w3.org/XML/1998/namespace"/>
+  </ds:schemaRefs>
+</ds:datastoreItem>
+</file>
+
+<file path=customXml/itemProps2.xml><?xml version="1.0" encoding="utf-8"?>
+<ds:datastoreItem xmlns:ds="http://schemas.openxmlformats.org/officeDocument/2006/customXml" ds:itemID="{CDB58277-F8DF-46FF-84EC-EF41B835E69F}">
+  <ds:schemaRefs>
+    <ds:schemaRef ds:uri="http://schemas.microsoft.com/sharepoint/v3/contenttype/forms"/>
   </ds:schemaRefs>
 </ds:datastoreItem>
 </file>

</xml_diff>